<commit_message>
Technical discussion has been updated
</commit_message>
<xml_diff>
--- a/Project/Presentation.pptx
+++ b/Project/Presentation.pptx
@@ -10,9 +10,12 @@
     <p:sldId id="258" r:id="rId4"/>
     <p:sldId id="259" r:id="rId5"/>
     <p:sldId id="260" r:id="rId6"/>
-    <p:sldId id="261" r:id="rId7"/>
-    <p:sldId id="263" r:id="rId8"/>
-    <p:sldId id="262" r:id="rId9"/>
+    <p:sldId id="264" r:id="rId7"/>
+    <p:sldId id="265" r:id="rId8"/>
+    <p:sldId id="266" r:id="rId9"/>
+    <p:sldId id="261" r:id="rId10"/>
+    <p:sldId id="263" r:id="rId11"/>
+    <p:sldId id="262" r:id="rId12"/>
   </p:sldIdLst>
   <p:sldSz cx="12192000" cy="6858000"/>
   <p:notesSz cx="6858000" cy="9144000"/>
@@ -250,7 +253,7 @@
           <a:p>
             <a:fld id="{B2D0CF44-E440-43D6-9C2C-A2A207973FB3}" type="datetimeFigureOut">
               <a:rPr lang="en-IN" smtClean="0"/>
-              <a:t>03-11-2015</a:t>
+              <a:t>04-11-2015</a:t>
             </a:fld>
             <a:endParaRPr lang="en-IN"/>
           </a:p>
@@ -420,7 +423,7 @@
           <a:p>
             <a:fld id="{B2D0CF44-E440-43D6-9C2C-A2A207973FB3}" type="datetimeFigureOut">
               <a:rPr lang="en-IN" smtClean="0"/>
-              <a:t>03-11-2015</a:t>
+              <a:t>04-11-2015</a:t>
             </a:fld>
             <a:endParaRPr lang="en-IN"/>
           </a:p>
@@ -600,7 +603,7 @@
           <a:p>
             <a:fld id="{B2D0CF44-E440-43D6-9C2C-A2A207973FB3}" type="datetimeFigureOut">
               <a:rPr lang="en-IN" smtClean="0"/>
-              <a:t>03-11-2015</a:t>
+              <a:t>04-11-2015</a:t>
             </a:fld>
             <a:endParaRPr lang="en-IN"/>
           </a:p>
@@ -770,7 +773,7 @@
           <a:p>
             <a:fld id="{B2D0CF44-E440-43D6-9C2C-A2A207973FB3}" type="datetimeFigureOut">
               <a:rPr lang="en-IN" smtClean="0"/>
-              <a:t>03-11-2015</a:t>
+              <a:t>04-11-2015</a:t>
             </a:fld>
             <a:endParaRPr lang="en-IN"/>
           </a:p>
@@ -1016,7 +1019,7 @@
           <a:p>
             <a:fld id="{B2D0CF44-E440-43D6-9C2C-A2A207973FB3}" type="datetimeFigureOut">
               <a:rPr lang="en-IN" smtClean="0"/>
-              <a:t>03-11-2015</a:t>
+              <a:t>04-11-2015</a:t>
             </a:fld>
             <a:endParaRPr lang="en-IN"/>
           </a:p>
@@ -1248,7 +1251,7 @@
           <a:p>
             <a:fld id="{B2D0CF44-E440-43D6-9C2C-A2A207973FB3}" type="datetimeFigureOut">
               <a:rPr lang="en-IN" smtClean="0"/>
-              <a:t>03-11-2015</a:t>
+              <a:t>04-11-2015</a:t>
             </a:fld>
             <a:endParaRPr lang="en-IN"/>
           </a:p>
@@ -1615,7 +1618,7 @@
           <a:p>
             <a:fld id="{B2D0CF44-E440-43D6-9C2C-A2A207973FB3}" type="datetimeFigureOut">
               <a:rPr lang="en-IN" smtClean="0"/>
-              <a:t>03-11-2015</a:t>
+              <a:t>04-11-2015</a:t>
             </a:fld>
             <a:endParaRPr lang="en-IN"/>
           </a:p>
@@ -1733,7 +1736,7 @@
           <a:p>
             <a:fld id="{B2D0CF44-E440-43D6-9C2C-A2A207973FB3}" type="datetimeFigureOut">
               <a:rPr lang="en-IN" smtClean="0"/>
-              <a:t>03-11-2015</a:t>
+              <a:t>04-11-2015</a:t>
             </a:fld>
             <a:endParaRPr lang="en-IN"/>
           </a:p>
@@ -1828,7 +1831,7 @@
           <a:p>
             <a:fld id="{B2D0CF44-E440-43D6-9C2C-A2A207973FB3}" type="datetimeFigureOut">
               <a:rPr lang="en-IN" smtClean="0"/>
-              <a:t>03-11-2015</a:t>
+              <a:t>04-11-2015</a:t>
             </a:fld>
             <a:endParaRPr lang="en-IN"/>
           </a:p>
@@ -2105,7 +2108,7 @@
           <a:p>
             <a:fld id="{B2D0CF44-E440-43D6-9C2C-A2A207973FB3}" type="datetimeFigureOut">
               <a:rPr lang="en-IN" smtClean="0"/>
-              <a:t>03-11-2015</a:t>
+              <a:t>04-11-2015</a:t>
             </a:fld>
             <a:endParaRPr lang="en-IN"/>
           </a:p>
@@ -2358,7 +2361,7 @@
           <a:p>
             <a:fld id="{B2D0CF44-E440-43D6-9C2C-A2A207973FB3}" type="datetimeFigureOut">
               <a:rPr lang="en-IN" smtClean="0"/>
-              <a:t>03-11-2015</a:t>
+              <a:t>04-11-2015</a:t>
             </a:fld>
             <a:endParaRPr lang="en-IN"/>
           </a:p>
@@ -2571,7 +2574,7 @@
           <a:p>
             <a:fld id="{B2D0CF44-E440-43D6-9C2C-A2A207973FB3}" type="datetimeFigureOut">
               <a:rPr lang="en-IN" smtClean="0"/>
-              <a:t>03-11-2015</a:t>
+              <a:t>04-11-2015</a:t>
             </a:fld>
             <a:endParaRPr lang="en-IN"/>
           </a:p>
@@ -3069,6 +3072,154 @@
 </p:sld>
 </file>
 
+<file path=ppt/slides/slide10.xml><?xml version="1.0" encoding="utf-8"?>
+<p:sld xmlns:a="http://schemas.openxmlformats.org/drawingml/2006/main" xmlns:r="http://schemas.openxmlformats.org/officeDocument/2006/relationships" xmlns:p="http://schemas.openxmlformats.org/presentationml/2006/main">
+  <p:cSld>
+    <p:spTree>
+      <p:nvGrpSpPr>
+        <p:cNvPr id="1" name=""/>
+        <p:cNvGrpSpPr/>
+        <p:nvPr/>
+      </p:nvGrpSpPr>
+      <p:grpSpPr>
+        <a:xfrm>
+          <a:off x="0" y="0"/>
+          <a:ext cx="0" cy="0"/>
+          <a:chOff x="0" y="0"/>
+          <a:chExt cx="0" cy="0"/>
+        </a:xfrm>
+      </p:grpSpPr>
+      <p:sp>
+        <p:nvSpPr>
+          <p:cNvPr id="2" name="Title 1"/>
+          <p:cNvSpPr>
+            <a:spLocks noGrp="1"/>
+          </p:cNvSpPr>
+          <p:nvPr>
+            <p:ph type="title"/>
+          </p:nvPr>
+        </p:nvSpPr>
+        <p:spPr/>
+        <p:txBody>
+          <a:bodyPr/>
+          <a:lstStyle/>
+          <a:p>
+            <a:r>
+              <a:rPr lang="en-IN" dirty="0" smtClean="0"/>
+              <a:t>4. Comparative study</a:t>
+            </a:r>
+            <a:endParaRPr lang="en-IN" dirty="0"/>
+          </a:p>
+        </p:txBody>
+      </p:sp>
+      <p:sp>
+        <p:nvSpPr>
+          <p:cNvPr id="3" name="Content Placeholder 2"/>
+          <p:cNvSpPr>
+            <a:spLocks noGrp="1"/>
+          </p:cNvSpPr>
+          <p:nvPr>
+            <p:ph idx="1"/>
+          </p:nvPr>
+        </p:nvSpPr>
+        <p:spPr/>
+        <p:txBody>
+          <a:bodyPr/>
+          <a:lstStyle/>
+          <a:p>
+            <a:endParaRPr lang="en-IN"/>
+          </a:p>
+        </p:txBody>
+      </p:sp>
+    </p:spTree>
+    <p:extLst>
+      <p:ext uri="{BB962C8B-B14F-4D97-AF65-F5344CB8AC3E}">
+        <p14:creationId xmlns:p14="http://schemas.microsoft.com/office/powerpoint/2010/main" val="3614991796"/>
+      </p:ext>
+    </p:extLst>
+  </p:cSld>
+  <p:clrMapOvr>
+    <a:masterClrMapping/>
+  </p:clrMapOvr>
+</p:sld>
+</file>
+
+<file path=ppt/slides/slide11.xml><?xml version="1.0" encoding="utf-8"?>
+<p:sld xmlns:a="http://schemas.openxmlformats.org/drawingml/2006/main" xmlns:r="http://schemas.openxmlformats.org/officeDocument/2006/relationships" xmlns:p="http://schemas.openxmlformats.org/presentationml/2006/main">
+  <p:cSld>
+    <p:spTree>
+      <p:nvGrpSpPr>
+        <p:cNvPr id="1" name=""/>
+        <p:cNvGrpSpPr/>
+        <p:nvPr/>
+      </p:nvGrpSpPr>
+      <p:grpSpPr>
+        <a:xfrm>
+          <a:off x="0" y="0"/>
+          <a:ext cx="0" cy="0"/>
+          <a:chOff x="0" y="0"/>
+          <a:chExt cx="0" cy="0"/>
+        </a:xfrm>
+      </p:grpSpPr>
+      <p:sp>
+        <p:nvSpPr>
+          <p:cNvPr id="2" name="Title 1"/>
+          <p:cNvSpPr>
+            <a:spLocks noGrp="1"/>
+          </p:cNvSpPr>
+          <p:nvPr>
+            <p:ph type="title"/>
+          </p:nvPr>
+        </p:nvSpPr>
+        <p:spPr/>
+        <p:txBody>
+          <a:bodyPr/>
+          <a:lstStyle/>
+          <a:p>
+            <a:r>
+              <a:rPr lang="en-IN" dirty="0"/>
+              <a:t>5</a:t>
+            </a:r>
+            <a:r>
+              <a:rPr lang="en-IN" dirty="0" smtClean="0"/>
+              <a:t>. Conclusions</a:t>
+            </a:r>
+            <a:endParaRPr lang="en-IN" dirty="0"/>
+          </a:p>
+        </p:txBody>
+      </p:sp>
+      <p:sp>
+        <p:nvSpPr>
+          <p:cNvPr id="3" name="Content Placeholder 2"/>
+          <p:cNvSpPr>
+            <a:spLocks noGrp="1"/>
+          </p:cNvSpPr>
+          <p:nvPr>
+            <p:ph idx="1"/>
+          </p:nvPr>
+        </p:nvSpPr>
+        <p:spPr/>
+        <p:txBody>
+          <a:bodyPr/>
+          <a:lstStyle/>
+          <a:p>
+            <a:endParaRPr lang="en-IN"/>
+          </a:p>
+        </p:txBody>
+      </p:sp>
+    </p:spTree>
+    <p:extLst>
+      <p:ext uri="{BB962C8B-B14F-4D97-AF65-F5344CB8AC3E}">
+        <p14:creationId xmlns:p14="http://schemas.microsoft.com/office/powerpoint/2010/main" val="241898102"/>
+      </p:ext>
+    </p:extLst>
+  </p:cSld>
+  <p:clrMapOvr>
+    <a:masterClrMapping/>
+  </p:clrMapOvr>
+</p:sld>
+</file>
+
 <file path=ppt/slides/slide2.xml><?xml version="1.0" encoding="utf-8"?>
 <p:sld xmlns:a="http://schemas.openxmlformats.org/drawingml/2006/main" xmlns:r="http://schemas.openxmlformats.org/officeDocument/2006/relationships" xmlns:p="http://schemas.openxmlformats.org/presentationml/2006/main">
   <p:cSld>
@@ -3129,7 +3280,7 @@
         </p:spPr>
         <p:txBody>
           <a:bodyPr>
-            <a:normAutofit lnSpcReduction="10000"/>
+            <a:normAutofit/>
           </a:bodyPr>
           <a:lstStyle/>
           <a:p>
@@ -3180,24 +3331,6 @@
             </a:r>
           </a:p>
           <a:p>
-            <a:pPr marL="457200" lvl="1" indent="0">
-              <a:buNone/>
-            </a:pPr>
-            <a:r>
-              <a:rPr lang="en-IN" sz="2200" dirty="0" smtClean="0"/>
-              <a:t>2.A. Basic Idea.</a:t>
-            </a:r>
-          </a:p>
-          <a:p>
-            <a:pPr marL="457200" lvl="1" indent="0">
-              <a:buNone/>
-            </a:pPr>
-            <a:r>
-              <a:rPr lang="en-IN" sz="2200" dirty="0" smtClean="0"/>
-              <a:t>2.B. Special cases.</a:t>
-            </a:r>
-          </a:p>
-          <a:p>
             <a:pPr marL="514350" indent="-514350">
               <a:buFont typeface="+mj-lt"/>
               <a:buAutoNum type="arabicPeriod"/>
@@ -3206,6 +3339,7 @@
               <a:rPr lang="en-IN" sz="2400" dirty="0" smtClean="0"/>
               <a:t>Results</a:t>
             </a:r>
+            <a:endParaRPr lang="en-IN" sz="2400" dirty="0" smtClean="0"/>
           </a:p>
           <a:p>
             <a:pPr marL="514350" indent="-514350">
@@ -3290,7 +3424,7 @@
         <p:spPr>
           <a:xfrm>
             <a:off x="838200" y="365126"/>
-            <a:ext cx="10515600" cy="977900"/>
+            <a:ext cx="10515600" cy="573658"/>
           </a:xfrm>
         </p:spPr>
         <p:txBody>
@@ -3300,10 +3434,16 @@
           <a:lstStyle/>
           <a:p>
             <a:r>
-              <a:rPr lang="en-IN" sz="3200" dirty="0" smtClean="0"/>
+              <a:rPr lang="en-IN" sz="3200" dirty="0" smtClean="0">
+                <a:latin typeface="Times New Roman" panose="02020603050405020304" pitchFamily="18" charset="0"/>
+                <a:cs typeface="Times New Roman" panose="02020603050405020304" pitchFamily="18" charset="0"/>
+              </a:rPr>
               <a:t>1. Introduction.</a:t>
             </a:r>
-            <a:endParaRPr lang="en-IN" sz="3200" dirty="0"/>
+            <a:endParaRPr lang="en-IN" sz="3200" dirty="0">
+              <a:latin typeface="Times New Roman" panose="02020603050405020304" pitchFamily="18" charset="0"/>
+              <a:cs typeface="Times New Roman" panose="02020603050405020304" pitchFamily="18" charset="0"/>
+            </a:endParaRPr>
           </a:p>
         </p:txBody>
       </p:sp>
@@ -3319,8 +3459,8 @@
         </p:nvSpPr>
         <p:spPr>
           <a:xfrm>
-            <a:off x="838200" y="1343026"/>
-            <a:ext cx="10515600" cy="4833937"/>
+            <a:off x="838200" y="938784"/>
+            <a:ext cx="10515600" cy="5238179"/>
           </a:xfrm>
         </p:spPr>
         <p:txBody>
@@ -3337,24 +3477,56 @@
                 <a:latin typeface="Times New Roman" panose="02020603050405020304" pitchFamily="18" charset="0"/>
                 <a:cs typeface="Times New Roman" panose="02020603050405020304" pitchFamily="18" charset="0"/>
               </a:rPr>
-              <a:t>1.A. Histogram</a:t>
-            </a:r>
+              <a:t>1.A. Histogram: </a:t>
+            </a:r>
+          </a:p>
+          <a:p>
+            <a:pPr lvl="1"/>
+            <a:r>
+              <a:rPr lang="en-IN" sz="2000" dirty="0" smtClean="0">
+                <a:latin typeface="Times New Roman" panose="02020603050405020304" pitchFamily="18" charset="0"/>
+                <a:cs typeface="Times New Roman" panose="02020603050405020304" pitchFamily="18" charset="0"/>
+              </a:rPr>
+              <a:t>A Histogram of an image gives information about the distribution of intensity levels.</a:t>
+            </a:r>
+          </a:p>
+          <a:p>
+            <a:pPr lvl="1"/>
+            <a:r>
+              <a:rPr lang="en-IN" sz="2000" dirty="0" smtClean="0">
+                <a:latin typeface="Times New Roman" panose="02020603050405020304" pitchFamily="18" charset="0"/>
+                <a:cs typeface="Times New Roman" panose="02020603050405020304" pitchFamily="18" charset="0"/>
+              </a:rPr>
+              <a:t>A histogram doesn’t provide any information about the spatial distribution of pixels.</a:t>
+            </a:r>
+          </a:p>
+          <a:p>
+            <a:pPr marL="0" indent="0">
+              <a:buNone/>
+            </a:pPr>
             <a:r>
               <a:rPr lang="en-IN" sz="2400" dirty="0" smtClean="0">
                 <a:latin typeface="Times New Roman" panose="02020603050405020304" pitchFamily="18" charset="0"/>
                 <a:cs typeface="Times New Roman" panose="02020603050405020304" pitchFamily="18" charset="0"/>
               </a:rPr>
-              <a:t>: </a:t>
+              <a:t>1.B. Histogram Equalization:</a:t>
             </a:r>
           </a:p>
           <a:p>
             <a:pPr lvl="1"/>
             <a:r>
+              <a:rPr lang="en-IN" sz="2000" dirty="0">
+                <a:latin typeface="Times New Roman" panose="02020603050405020304" pitchFamily="18" charset="0"/>
+                <a:cs typeface="Times New Roman" panose="02020603050405020304" pitchFamily="18" charset="0"/>
+              </a:rPr>
+              <a:t>Histogram equalization is used to enhance contrast</a:t>
+            </a:r>
+            <a:r>
               <a:rPr lang="en-IN" sz="2000" dirty="0" smtClean="0">
                 <a:latin typeface="Times New Roman" panose="02020603050405020304" pitchFamily="18" charset="0"/>
                 <a:cs typeface="Times New Roman" panose="02020603050405020304" pitchFamily="18" charset="0"/>
               </a:rPr>
-              <a:t>A Histogram of an image gives information about the distribution of intensity levels.</a:t>
+              <a:t>.</a:t>
             </a:r>
           </a:p>
           <a:p>
@@ -3364,96 +3536,110 @@
                 <a:latin typeface="Times New Roman" panose="02020603050405020304" pitchFamily="18" charset="0"/>
                 <a:cs typeface="Times New Roman" panose="02020603050405020304" pitchFamily="18" charset="0"/>
               </a:rPr>
-              <a:t>A histogram doesn’t provide any information about the spatial distribution of pixels.</a:t>
-            </a:r>
-          </a:p>
-          <a:p>
-            <a:pPr marL="0" indent="0">
-              <a:buNone/>
-            </a:pPr>
-            <a:r>
-              <a:rPr lang="en-IN" sz="2400" dirty="0" smtClean="0">
-                <a:latin typeface="Times New Roman" panose="02020603050405020304" pitchFamily="18" charset="0"/>
-                <a:cs typeface="Times New Roman" panose="02020603050405020304" pitchFamily="18" charset="0"/>
-              </a:rPr>
-              <a:t>1.B</a:t>
-            </a:r>
-            <a:r>
-              <a:rPr lang="en-IN" sz="2400" dirty="0" smtClean="0">
-                <a:latin typeface="Times New Roman" panose="02020603050405020304" pitchFamily="18" charset="0"/>
-                <a:cs typeface="Times New Roman" panose="02020603050405020304" pitchFamily="18" charset="0"/>
-              </a:rPr>
-              <a:t>. Histogram Equalization</a:t>
-            </a:r>
-            <a:r>
-              <a:rPr lang="en-IN" sz="2400" dirty="0" smtClean="0">
-                <a:latin typeface="Times New Roman" panose="02020603050405020304" pitchFamily="18" charset="0"/>
-                <a:cs typeface="Times New Roman" panose="02020603050405020304" pitchFamily="18" charset="0"/>
-              </a:rPr>
-              <a:t>:</a:t>
+              <a:t>The level mapping equation is                               where </a:t>
+            </a:r>
+            <a:r>
+              <a:rPr lang="en-IN" sz="2000" i="1" dirty="0" err="1" smtClean="0">
+                <a:latin typeface="Times New Roman" panose="02020603050405020304" pitchFamily="18" charset="0"/>
+                <a:cs typeface="Times New Roman" panose="02020603050405020304" pitchFamily="18" charset="0"/>
+              </a:rPr>
+              <a:t>H</a:t>
+            </a:r>
+            <a:r>
+              <a:rPr lang="en-IN" sz="2000" i="1" baseline="-25000" dirty="0" err="1" smtClean="0">
+                <a:latin typeface="Times New Roman" panose="02020603050405020304" pitchFamily="18" charset="0"/>
+                <a:cs typeface="Times New Roman" panose="02020603050405020304" pitchFamily="18" charset="0"/>
+              </a:rPr>
+              <a:t>k</a:t>
+            </a:r>
+            <a:r>
+              <a:rPr lang="en-IN" sz="2000" i="1" dirty="0" smtClean="0">
+                <a:latin typeface="Times New Roman" panose="02020603050405020304" pitchFamily="18" charset="0"/>
+                <a:cs typeface="Times New Roman" panose="02020603050405020304" pitchFamily="18" charset="0"/>
+              </a:rPr>
+              <a:t> is output leve</a:t>
+            </a:r>
+            <a:r>
+              <a:rPr lang="en-IN" sz="2000" i="1" dirty="0" smtClean="0">
+                <a:latin typeface="Times New Roman" panose="02020603050405020304" pitchFamily="18" charset="0"/>
+                <a:cs typeface="Times New Roman" panose="02020603050405020304" pitchFamily="18" charset="0"/>
+              </a:rPr>
+              <a:t>l, K </a:t>
+            </a:r>
+            <a:r>
+              <a:rPr lang="en-IN" sz="2000" dirty="0" smtClean="0">
+                <a:latin typeface="Times New Roman" panose="02020603050405020304" pitchFamily="18" charset="0"/>
+                <a:cs typeface="Times New Roman" panose="02020603050405020304" pitchFamily="18" charset="0"/>
+              </a:rPr>
+              <a:t> is range of </a:t>
+            </a:r>
+            <a:r>
+              <a:rPr lang="en-US" sz="2000" dirty="0" smtClean="0">
+                <a:latin typeface="Times New Roman" panose="02020603050405020304" pitchFamily="18" charset="0"/>
+                <a:cs typeface="Times New Roman" panose="02020603050405020304" pitchFamily="18" charset="0"/>
+              </a:rPr>
+              <a:t>gray</a:t>
+            </a:r>
+            <a:r>
+              <a:rPr lang="en-IN" sz="2000" dirty="0" smtClean="0">
+                <a:latin typeface="Times New Roman" panose="02020603050405020304" pitchFamily="18" charset="0"/>
+                <a:cs typeface="Times New Roman" panose="02020603050405020304" pitchFamily="18" charset="0"/>
+              </a:rPr>
+              <a:t> levels, </a:t>
+            </a:r>
+            <a:r>
+              <a:rPr lang="en-IN" sz="2000" i="1" dirty="0" smtClean="0">
+                <a:latin typeface="Times New Roman" panose="02020603050405020304" pitchFamily="18" charset="0"/>
+                <a:cs typeface="Times New Roman" panose="02020603050405020304" pitchFamily="18" charset="0"/>
+              </a:rPr>
+              <a:t>C(k)</a:t>
+            </a:r>
+            <a:r>
+              <a:rPr lang="en-IN" sz="2000" dirty="0" smtClean="0">
+                <a:latin typeface="Times New Roman" panose="02020603050405020304" pitchFamily="18" charset="0"/>
+                <a:cs typeface="Times New Roman" panose="02020603050405020304" pitchFamily="18" charset="0"/>
+              </a:rPr>
+              <a:t> is the cumulative distribution function.</a:t>
             </a:r>
           </a:p>
           <a:p>
             <a:pPr lvl="1"/>
             <a:r>
+              <a:rPr lang="en-IN" sz="2000" dirty="0" smtClean="0">
+                <a:latin typeface="Times New Roman" panose="02020603050405020304" pitchFamily="18" charset="0"/>
+                <a:cs typeface="Times New Roman" panose="02020603050405020304" pitchFamily="18" charset="0"/>
+              </a:rPr>
+              <a:t>The increment in the output level </a:t>
+            </a:r>
+            <a:r>
+              <a:rPr lang="en-IN" sz="2000" i="1" dirty="0" err="1" smtClean="0">
+                <a:latin typeface="Times New Roman" panose="02020603050405020304" pitchFamily="18" charset="0"/>
+                <a:cs typeface="Times New Roman" panose="02020603050405020304" pitchFamily="18" charset="0"/>
+              </a:rPr>
+              <a:t>H</a:t>
+            </a:r>
+            <a:r>
+              <a:rPr lang="en-IN" sz="2000" i="1" baseline="-25000" dirty="0" err="1" smtClean="0">
+                <a:latin typeface="Times New Roman" panose="02020603050405020304" pitchFamily="18" charset="0"/>
+                <a:cs typeface="Times New Roman" panose="02020603050405020304" pitchFamily="18" charset="0"/>
+              </a:rPr>
+              <a:t>k</a:t>
+            </a:r>
+            <a:r>
               <a:rPr lang="en-IN" sz="2000" dirty="0">
                 <a:latin typeface="Times New Roman" panose="02020603050405020304" pitchFamily="18" charset="0"/>
                 <a:cs typeface="Times New Roman" panose="02020603050405020304" pitchFamily="18" charset="0"/>
               </a:rPr>
-              <a:t>Histogram equalization is used to enhance contrast</a:t>
+              <a:t> </a:t>
             </a:r>
             <a:r>
               <a:rPr lang="en-IN" sz="2000" dirty="0" smtClean="0">
                 <a:latin typeface="Times New Roman" panose="02020603050405020304" pitchFamily="18" charset="0"/>
                 <a:cs typeface="Times New Roman" panose="02020603050405020304" pitchFamily="18" charset="0"/>
               </a:rPr>
-              <a:t>.</a:t>
-            </a:r>
-          </a:p>
-          <a:p>
-            <a:pPr marL="0" indent="0">
-              <a:buNone/>
-            </a:pPr>
-            <a:r>
-              <a:rPr lang="en-IN" sz="2400" dirty="0" smtClean="0">
-                <a:latin typeface="Times New Roman" panose="02020603050405020304" pitchFamily="18" charset="0"/>
-                <a:cs typeface="Times New Roman" panose="02020603050405020304" pitchFamily="18" charset="0"/>
-              </a:rPr>
-              <a:t>1.D. Drawbacks:</a:t>
-            </a:r>
-          </a:p>
-          <a:p>
-            <a:pPr lvl="1"/>
-            <a:r>
-              <a:rPr lang="en-IN" sz="2000" dirty="0" smtClean="0">
-                <a:latin typeface="Times New Roman" panose="02020603050405020304" pitchFamily="18" charset="0"/>
-                <a:cs typeface="Times New Roman" panose="02020603050405020304" pitchFamily="18" charset="0"/>
-              </a:rPr>
-              <a:t>It cannot be controlled.</a:t>
-            </a:r>
-          </a:p>
-          <a:p>
-            <a:pPr lvl="1"/>
-            <a:r>
-              <a:rPr lang="en-IN" sz="2000" dirty="0" smtClean="0">
-                <a:latin typeface="Times New Roman" panose="02020603050405020304" pitchFamily="18" charset="0"/>
-                <a:cs typeface="Times New Roman" panose="02020603050405020304" pitchFamily="18" charset="0"/>
-              </a:rPr>
-              <a:t>Unpleasant visual effects such as, over enhancing and increase in noise.</a:t>
-            </a:r>
-          </a:p>
-          <a:p>
-            <a:pPr marL="0" indent="0">
-              <a:buNone/>
-            </a:pPr>
-            <a:r>
-              <a:rPr lang="en-IN" sz="2400" dirty="0" smtClean="0">
-                <a:latin typeface="Times New Roman" panose="02020603050405020304" pitchFamily="18" charset="0"/>
-                <a:cs typeface="Times New Roman" panose="02020603050405020304" pitchFamily="18" charset="0"/>
-              </a:rPr>
-              <a:t> </a:t>
-            </a:r>
-            <a:endParaRPr lang="en-IN" sz="2400" dirty="0" smtClean="0">
+              <a:t>is, </a:t>
+            </a:r>
+            <a:endParaRPr lang="en-IN" sz="2000" dirty="0" smtClean="0">
               <a:latin typeface="Times New Roman" panose="02020603050405020304" pitchFamily="18" charset="0"/>
               <a:cs typeface="Times New Roman" panose="02020603050405020304" pitchFamily="18" charset="0"/>
             </a:endParaRPr>
@@ -3462,10 +3648,109 @@
             <a:pPr marL="0" indent="0">
               <a:buNone/>
             </a:pPr>
+            <a:r>
+              <a:rPr lang="en-IN" sz="2400" dirty="0" smtClean="0">
+                <a:latin typeface="Times New Roman" panose="02020603050405020304" pitchFamily="18" charset="0"/>
+                <a:cs typeface="Times New Roman" panose="02020603050405020304" pitchFamily="18" charset="0"/>
+              </a:rPr>
+              <a:t>1.C. Drawbacks:</a:t>
+            </a:r>
+          </a:p>
+          <a:p>
+            <a:pPr lvl="1"/>
+            <a:r>
+              <a:rPr lang="en-IN" sz="2000" dirty="0" smtClean="0">
+                <a:latin typeface="Times New Roman" panose="02020603050405020304" pitchFamily="18" charset="0"/>
+                <a:cs typeface="Times New Roman" panose="02020603050405020304" pitchFamily="18" charset="0"/>
+              </a:rPr>
+              <a:t>It </a:t>
+            </a:r>
+            <a:r>
+              <a:rPr lang="en-IN" sz="2000" dirty="0" smtClean="0">
+                <a:latin typeface="Times New Roman" panose="02020603050405020304" pitchFamily="18" charset="0"/>
+                <a:cs typeface="Times New Roman" panose="02020603050405020304" pitchFamily="18" charset="0"/>
+              </a:rPr>
+              <a:t>cannot be controlled.</a:t>
+            </a:r>
+          </a:p>
+          <a:p>
+            <a:pPr lvl="1"/>
+            <a:r>
+              <a:rPr lang="en-IN" sz="2000" dirty="0" smtClean="0">
+                <a:latin typeface="Times New Roman" panose="02020603050405020304" pitchFamily="18" charset="0"/>
+                <a:cs typeface="Times New Roman" panose="02020603050405020304" pitchFamily="18" charset="0"/>
+              </a:rPr>
+              <a:t>Unpleasant visual effects such as, over enhancing and increase in noise.</a:t>
+            </a:r>
+          </a:p>
+          <a:p>
+            <a:pPr marL="0" indent="0">
+              <a:buNone/>
+            </a:pPr>
+            <a:r>
+              <a:rPr lang="en-IN" sz="2400" dirty="0" smtClean="0">
+                <a:latin typeface="Times New Roman" panose="02020603050405020304" pitchFamily="18" charset="0"/>
+                <a:cs typeface="Times New Roman" panose="02020603050405020304" pitchFamily="18" charset="0"/>
+              </a:rPr>
+              <a:t> </a:t>
+            </a:r>
+          </a:p>
+          <a:p>
+            <a:pPr marL="0" indent="0">
+              <a:buNone/>
+            </a:pPr>
             <a:endParaRPr lang="en-IN" dirty="0"/>
           </a:p>
         </p:txBody>
       </p:sp>
+      <p:pic>
+        <p:nvPicPr>
+          <p:cNvPr id="4" name="Picture 3"/>
+          <p:cNvPicPr>
+            <a:picLocks noChangeAspect="1"/>
+          </p:cNvPicPr>
+          <p:nvPr/>
+        </p:nvPicPr>
+        <p:blipFill>
+          <a:blip r:embed="rId2"/>
+          <a:stretch>
+            <a:fillRect/>
+          </a:stretch>
+        </p:blipFill>
+        <p:spPr>
+          <a:xfrm>
+            <a:off x="4781931" y="3178398"/>
+            <a:ext cx="1847850" cy="371475"/>
+          </a:xfrm>
+          <a:prstGeom prst="rect">
+            <a:avLst/>
+          </a:prstGeom>
+        </p:spPr>
+      </p:pic>
+      <p:pic>
+        <p:nvPicPr>
+          <p:cNvPr id="5" name="Picture 4"/>
+          <p:cNvPicPr>
+            <a:picLocks noChangeAspect="1"/>
+          </p:cNvPicPr>
+          <p:nvPr/>
+        </p:nvPicPr>
+        <p:blipFill>
+          <a:blip r:embed="rId3"/>
+          <a:stretch>
+            <a:fillRect/>
+          </a:stretch>
+        </p:blipFill>
+        <p:spPr>
+          <a:xfrm>
+            <a:off x="5705856" y="3818953"/>
+            <a:ext cx="3562350" cy="390525"/>
+          </a:xfrm>
+          <a:prstGeom prst="rect">
+            <a:avLst/>
+          </a:prstGeom>
+        </p:spPr>
+      </p:pic>
     </p:spTree>
     <p:extLst>
       <p:ext uri="{BB962C8B-B14F-4D97-AF65-F5344CB8AC3E}">
@@ -3513,7 +3798,12 @@
             <p:ph type="title"/>
           </p:nvPr>
         </p:nvSpPr>
-        <p:spPr/>
+        <p:spPr>
+          <a:xfrm>
+            <a:off x="838200" y="365125"/>
+            <a:ext cx="10515600" cy="890651"/>
+          </a:xfrm>
+        </p:spPr>
         <p:txBody>
           <a:bodyPr>
             <a:normAutofit/>
@@ -3522,9 +3812,19 @@
           <a:p>
             <a:r>
               <a:rPr lang="en-IN" sz="3200" dirty="0" smtClean="0"/>
-              <a:t>1. Introduction</a:t>
-            </a:r>
-            <a:endParaRPr lang="en-IN" sz="3200" dirty="0"/>
+              <a:t>1. </a:t>
+            </a:r>
+            <a:r>
+              <a:rPr lang="en-IN" sz="3200" dirty="0" smtClean="0">
+                <a:latin typeface="Times New Roman" panose="02020603050405020304" pitchFamily="18" charset="0"/>
+                <a:cs typeface="Times New Roman" panose="02020603050405020304" pitchFamily="18" charset="0"/>
+              </a:rPr>
+              <a:t>Introduction</a:t>
+            </a:r>
+            <a:endParaRPr lang="en-IN" sz="3200" dirty="0">
+              <a:latin typeface="Times New Roman" panose="02020603050405020304" pitchFamily="18" charset="0"/>
+              <a:cs typeface="Times New Roman" panose="02020603050405020304" pitchFamily="18" charset="0"/>
+            </a:endParaRPr>
           </a:p>
         </p:txBody>
       </p:sp>
@@ -3540,8 +3840,8 @@
         </p:nvSpPr>
         <p:spPr>
           <a:xfrm>
-            <a:off x="838200" y="1690688"/>
-            <a:ext cx="10515600" cy="4486275"/>
+            <a:off x="838200" y="1524000"/>
+            <a:ext cx="10515600" cy="4652963"/>
           </a:xfrm>
         </p:spPr>
         <p:txBody>
@@ -3723,16 +4023,34 @@
             <p:ph type="title"/>
           </p:nvPr>
         </p:nvSpPr>
-        <p:spPr/>
-        <p:txBody>
-          <a:bodyPr/>
-          <a:lstStyle/>
-          <a:p>
-            <a:r>
-              <a:rPr lang="en-IN" dirty="0" smtClean="0"/>
-              <a:t>2. Technical discussion</a:t>
-            </a:r>
-            <a:endParaRPr lang="en-IN" dirty="0"/>
+        <p:spPr>
+          <a:xfrm>
+            <a:off x="838200" y="365126"/>
+            <a:ext cx="10515600" cy="602041"/>
+          </a:xfrm>
+        </p:spPr>
+        <p:txBody>
+          <a:bodyPr/>
+          <a:lstStyle/>
+          <a:p>
+            <a:r>
+              <a:rPr lang="en-IN" sz="3200" dirty="0">
+                <a:latin typeface="Times New Roman" panose="02020603050405020304" pitchFamily="18" charset="0"/>
+                <a:cs typeface="Times New Roman" panose="02020603050405020304" pitchFamily="18" charset="0"/>
+              </a:rPr>
+              <a:t>2. </a:t>
+            </a:r>
+            <a:r>
+              <a:rPr lang="en-IN" sz="3200" dirty="0" smtClean="0">
+                <a:latin typeface="Times New Roman" panose="02020603050405020304" pitchFamily="18" charset="0"/>
+                <a:cs typeface="Times New Roman" panose="02020603050405020304" pitchFamily="18" charset="0"/>
+              </a:rPr>
+              <a:t>Technical discussion</a:t>
+            </a:r>
+            <a:endParaRPr lang="en-IN" sz="3200" dirty="0">
+              <a:latin typeface="Times New Roman" panose="02020603050405020304" pitchFamily="18" charset="0"/>
+              <a:cs typeface="Times New Roman" panose="02020603050405020304" pitchFamily="18" charset="0"/>
+            </a:endParaRPr>
           </a:p>
         </p:txBody>
       </p:sp>
@@ -3746,49 +4064,270 @@
             <p:ph idx="1"/>
           </p:nvPr>
         </p:nvSpPr>
-        <p:spPr/>
+        <p:spPr>
+          <a:xfrm>
+            <a:off x="838200" y="967168"/>
+            <a:ext cx="10515600" cy="5209796"/>
+          </a:xfrm>
+        </p:spPr>
         <p:txBody>
           <a:bodyPr>
             <a:normAutofit/>
           </a:bodyPr>
           <a:lstStyle/>
           <a:p>
+            <a:r>
+              <a:rPr lang="en-IN" sz="2400" dirty="0" smtClean="0">
+                <a:latin typeface="Times New Roman" panose="02020603050405020304" pitchFamily="18" charset="0"/>
+                <a:cs typeface="Times New Roman" panose="02020603050405020304" pitchFamily="18" charset="0"/>
+              </a:rPr>
+              <a:t>The proposed weighted </a:t>
+            </a:r>
+            <a:r>
+              <a:rPr lang="en-IN" sz="2400" dirty="0" err="1" smtClean="0">
+                <a:latin typeface="Times New Roman" panose="02020603050405020304" pitchFamily="18" charset="0"/>
+                <a:cs typeface="Times New Roman" panose="02020603050405020304" pitchFamily="18" charset="0"/>
+              </a:rPr>
+              <a:t>thresholded</a:t>
+            </a:r>
+            <a:r>
+              <a:rPr lang="en-IN" sz="2400" dirty="0" smtClean="0">
+                <a:latin typeface="Times New Roman" panose="02020603050405020304" pitchFamily="18" charset="0"/>
+                <a:cs typeface="Times New Roman" panose="02020603050405020304" pitchFamily="18" charset="0"/>
+              </a:rPr>
+              <a:t>(WTHE) enhancement method performs histogram equalization based on a modified histogram.</a:t>
+            </a:r>
+          </a:p>
+          <a:p>
+            <a:r>
+              <a:rPr lang="en-IN" sz="2400" dirty="0" smtClean="0">
+                <a:latin typeface="Times New Roman" panose="02020603050405020304" pitchFamily="18" charset="0"/>
+                <a:cs typeface="Times New Roman" panose="02020603050405020304" pitchFamily="18" charset="0"/>
+              </a:rPr>
+              <a:t>Each original probability density value </a:t>
+            </a:r>
+            <a:r>
+              <a:rPr lang="en-IN" sz="2400" i="1" dirty="0" smtClean="0">
+                <a:latin typeface="Times New Roman" panose="02020603050405020304" pitchFamily="18" charset="0"/>
+                <a:cs typeface="Times New Roman" panose="02020603050405020304" pitchFamily="18" charset="0"/>
+              </a:rPr>
+              <a:t>P</a:t>
+            </a:r>
+            <a:r>
+              <a:rPr lang="en-IN" sz="2400" dirty="0" smtClean="0">
+                <a:latin typeface="Times New Roman" panose="02020603050405020304" pitchFamily="18" charset="0"/>
+                <a:cs typeface="Times New Roman" panose="02020603050405020304" pitchFamily="18" charset="0"/>
+              </a:rPr>
+              <a:t>(k) is replaced by a weighted and </a:t>
+            </a:r>
+            <a:r>
+              <a:rPr lang="en-IN" sz="2400" dirty="0" err="1" smtClean="0">
+                <a:latin typeface="Times New Roman" panose="02020603050405020304" pitchFamily="18" charset="0"/>
+                <a:cs typeface="Times New Roman" panose="02020603050405020304" pitchFamily="18" charset="0"/>
+              </a:rPr>
+              <a:t>thresholded</a:t>
+            </a:r>
+            <a:r>
+              <a:rPr lang="en-IN" sz="2400" dirty="0" smtClean="0">
+                <a:latin typeface="Times New Roman" panose="02020603050405020304" pitchFamily="18" charset="0"/>
+                <a:cs typeface="Times New Roman" panose="02020603050405020304" pitchFamily="18" charset="0"/>
+              </a:rPr>
+              <a:t> PDF value </a:t>
+            </a:r>
+            <a:r>
+              <a:rPr lang="en-IN" sz="2400" i="1" dirty="0" err="1" smtClean="0">
+                <a:latin typeface="Times New Roman" panose="02020603050405020304" pitchFamily="18" charset="0"/>
+                <a:cs typeface="Times New Roman" panose="02020603050405020304" pitchFamily="18" charset="0"/>
+              </a:rPr>
+              <a:t>P</a:t>
+            </a:r>
+            <a:r>
+              <a:rPr lang="en-IN" sz="2400" i="1" baseline="-25000" dirty="0" err="1" smtClean="0">
+                <a:latin typeface="Times New Roman" panose="02020603050405020304" pitchFamily="18" charset="0"/>
+                <a:cs typeface="Times New Roman" panose="02020603050405020304" pitchFamily="18" charset="0"/>
+              </a:rPr>
+              <a:t>wt</a:t>
+            </a:r>
+            <a:r>
+              <a:rPr lang="en-IN" sz="2400" i="1" dirty="0" smtClean="0">
+                <a:latin typeface="Times New Roman" panose="02020603050405020304" pitchFamily="18" charset="0"/>
+                <a:cs typeface="Times New Roman" panose="02020603050405020304" pitchFamily="18" charset="0"/>
+              </a:rPr>
+              <a:t>(k)</a:t>
+            </a:r>
+            <a:r>
+              <a:rPr lang="en-IN" sz="2400" dirty="0" smtClean="0">
+                <a:latin typeface="Times New Roman" panose="02020603050405020304" pitchFamily="18" charset="0"/>
+                <a:cs typeface="Times New Roman" panose="02020603050405020304" pitchFamily="18" charset="0"/>
+              </a:rPr>
+              <a:t> </a:t>
+            </a:r>
+          </a:p>
+          <a:p>
+            <a:r>
+              <a:rPr lang="en-IN" sz="2400" i="1" dirty="0" err="1" smtClean="0">
+                <a:latin typeface="Times New Roman" panose="02020603050405020304" pitchFamily="18" charset="0"/>
+                <a:cs typeface="Times New Roman" panose="02020603050405020304" pitchFamily="18" charset="0"/>
+              </a:rPr>
+              <a:t>P</a:t>
+            </a:r>
+            <a:r>
+              <a:rPr lang="en-IN" sz="2400" i="1" baseline="-25000" dirty="0" err="1" smtClean="0">
+                <a:latin typeface="Times New Roman" panose="02020603050405020304" pitchFamily="18" charset="0"/>
+                <a:cs typeface="Times New Roman" panose="02020603050405020304" pitchFamily="18" charset="0"/>
+              </a:rPr>
+              <a:t>wt</a:t>
+            </a:r>
+            <a:r>
+              <a:rPr lang="en-IN" sz="2400" i="1" dirty="0" smtClean="0">
+                <a:latin typeface="Times New Roman" panose="02020603050405020304" pitchFamily="18" charset="0"/>
+                <a:cs typeface="Times New Roman" panose="02020603050405020304" pitchFamily="18" charset="0"/>
+              </a:rPr>
+              <a:t>(k) </a:t>
+            </a:r>
+            <a:r>
+              <a:rPr lang="en-IN" sz="2400" dirty="0" smtClean="0">
+                <a:latin typeface="Times New Roman" panose="02020603050405020304" pitchFamily="18" charset="0"/>
+                <a:cs typeface="Times New Roman" panose="02020603050405020304" pitchFamily="18" charset="0"/>
+              </a:rPr>
+              <a:t>is obtained by applying a transformation function </a:t>
+            </a:r>
+            <a:r>
+              <a:rPr lang="el-GR" sz="2400" dirty="0" smtClean="0">
+                <a:latin typeface="Times New Roman" panose="02020603050405020304" pitchFamily="18" charset="0"/>
+                <a:cs typeface="Times New Roman" panose="02020603050405020304" pitchFamily="18" charset="0"/>
+              </a:rPr>
+              <a:t>Ω</a:t>
+            </a:r>
+            <a:r>
+              <a:rPr lang="en-IN" sz="2400" dirty="0" smtClean="0">
+                <a:latin typeface="Times New Roman" panose="02020603050405020304" pitchFamily="18" charset="0"/>
+                <a:cs typeface="Times New Roman" panose="02020603050405020304" pitchFamily="18" charset="0"/>
+              </a:rPr>
+              <a:t>(.) to P(k),</a:t>
+            </a:r>
+          </a:p>
+          <a:p>
+            <a:endParaRPr lang="en-IN" sz="2400" i="1" dirty="0" smtClean="0">
+              <a:latin typeface="Times New Roman" panose="02020603050405020304" pitchFamily="18" charset="0"/>
+              <a:cs typeface="Times New Roman" panose="02020603050405020304" pitchFamily="18" charset="0"/>
+            </a:endParaRPr>
+          </a:p>
+          <a:p>
             <a:pPr marL="0" indent="0">
               <a:buNone/>
             </a:pPr>
-            <a:r>
-              <a:rPr lang="en-IN" sz="2400" dirty="0" smtClean="0"/>
-              <a:t>2.A. Basic </a:t>
-            </a:r>
-            <a:r>
-              <a:rPr lang="en-IN" sz="2400" dirty="0" smtClean="0"/>
-              <a:t>idea: </a:t>
-            </a:r>
+            <a:endParaRPr lang="en-IN" sz="2000" dirty="0" smtClean="0">
+              <a:latin typeface="Times New Roman" panose="02020603050405020304" pitchFamily="18" charset="0"/>
+              <a:cs typeface="Times New Roman" panose="02020603050405020304" pitchFamily="18" charset="0"/>
+            </a:endParaRPr>
           </a:p>
           <a:p>
             <a:pPr marL="0" indent="0">
               <a:buNone/>
             </a:pPr>
-            <a:endParaRPr lang="en-IN" sz="2000" dirty="0" smtClean="0"/>
-          </a:p>
-          <a:p>
-            <a:pPr marL="0" indent="0">
-              <a:buNone/>
-            </a:pPr>
-            <a:endParaRPr lang="en-IN" dirty="0"/>
-          </a:p>
-          <a:p>
-            <a:pPr marL="0" indent="0">
-              <a:buNone/>
-            </a:pPr>
-            <a:r>
-              <a:rPr lang="en-IN" dirty="0" smtClean="0"/>
-              <a:t>2.B. Special cases</a:t>
-            </a:r>
-            <a:endParaRPr lang="en-IN" dirty="0"/>
-          </a:p>
-        </p:txBody>
-      </p:sp>
+            <a:endParaRPr lang="en-IN" dirty="0" smtClean="0">
+              <a:latin typeface="Times New Roman" panose="02020603050405020304" pitchFamily="18" charset="0"/>
+              <a:cs typeface="Times New Roman" panose="02020603050405020304" pitchFamily="18" charset="0"/>
+            </a:endParaRPr>
+          </a:p>
+          <a:p>
+            <a:endParaRPr lang="en-IN" dirty="0" smtClean="0">
+              <a:latin typeface="Times New Roman" panose="02020603050405020304" pitchFamily="18" charset="0"/>
+              <a:cs typeface="Times New Roman" panose="02020603050405020304" pitchFamily="18" charset="0"/>
+            </a:endParaRPr>
+          </a:p>
+          <a:p>
+            <a:r>
+              <a:rPr lang="en-IN" sz="2400" dirty="0" smtClean="0">
+                <a:latin typeface="Times New Roman" panose="02020603050405020304" pitchFamily="18" charset="0"/>
+                <a:cs typeface="Times New Roman" panose="02020603050405020304" pitchFamily="18" charset="0"/>
+              </a:rPr>
+              <a:t>The original PDF is clamped at an upper threshold P</a:t>
+            </a:r>
+            <a:r>
+              <a:rPr lang="en-IN" sz="2400" baseline="-25000" dirty="0" smtClean="0">
+                <a:latin typeface="Times New Roman" panose="02020603050405020304" pitchFamily="18" charset="0"/>
+                <a:cs typeface="Times New Roman" panose="02020603050405020304" pitchFamily="18" charset="0"/>
+              </a:rPr>
+              <a:t>u</a:t>
+            </a:r>
+            <a:r>
+              <a:rPr lang="en-IN" sz="2400" dirty="0" smtClean="0">
+                <a:latin typeface="Times New Roman" panose="02020603050405020304" pitchFamily="18" charset="0"/>
+                <a:cs typeface="Times New Roman" panose="02020603050405020304" pitchFamily="18" charset="0"/>
+              </a:rPr>
+              <a:t> and at a lower threshold P</a:t>
+            </a:r>
+            <a:r>
+              <a:rPr lang="en-IN" sz="2400" baseline="-25000" dirty="0" smtClean="0">
+                <a:latin typeface="Times New Roman" panose="02020603050405020304" pitchFamily="18" charset="0"/>
+                <a:cs typeface="Times New Roman" panose="02020603050405020304" pitchFamily="18" charset="0"/>
+              </a:rPr>
+              <a:t>l</a:t>
+            </a:r>
+            <a:r>
+              <a:rPr lang="en-IN" sz="2400" dirty="0" smtClean="0">
+                <a:latin typeface="Times New Roman" panose="02020603050405020304" pitchFamily="18" charset="0"/>
+                <a:cs typeface="Times New Roman" panose="02020603050405020304" pitchFamily="18" charset="0"/>
+              </a:rPr>
+              <a:t> and all other values between upper and lower thresholds are transformed using a normalized power law function with index r&gt;0.</a:t>
+            </a:r>
+            <a:endParaRPr lang="en-IN" sz="2400" dirty="0">
+              <a:latin typeface="Times New Roman" panose="02020603050405020304" pitchFamily="18" charset="0"/>
+              <a:cs typeface="Times New Roman" panose="02020603050405020304" pitchFamily="18" charset="0"/>
+            </a:endParaRPr>
+          </a:p>
+        </p:txBody>
+      </p:sp>
+      <p:pic>
+        <p:nvPicPr>
+          <p:cNvPr id="5" name="Picture 4"/>
+          <p:cNvPicPr>
+            <a:picLocks noChangeAspect="1"/>
+          </p:cNvPicPr>
+          <p:nvPr/>
+        </p:nvPicPr>
+        <p:blipFill>
+          <a:blip r:embed="rId2"/>
+          <a:stretch>
+            <a:fillRect/>
+          </a:stretch>
+        </p:blipFill>
+        <p:spPr>
+          <a:xfrm>
+            <a:off x="4847462" y="2144458"/>
+            <a:ext cx="2943225" cy="447675"/>
+          </a:xfrm>
+          <a:prstGeom prst="rect">
+            <a:avLst/>
+          </a:prstGeom>
+        </p:spPr>
+      </p:pic>
+      <p:pic>
+        <p:nvPicPr>
+          <p:cNvPr id="6" name="Picture 5"/>
+          <p:cNvPicPr>
+            <a:picLocks noChangeAspect="1"/>
+          </p:cNvPicPr>
+          <p:nvPr/>
+        </p:nvPicPr>
+        <p:blipFill>
+          <a:blip r:embed="rId3"/>
+          <a:stretch>
+            <a:fillRect/>
+          </a:stretch>
+        </p:blipFill>
+        <p:spPr>
+          <a:xfrm>
+            <a:off x="3148012" y="3092005"/>
+            <a:ext cx="5895975" cy="1800225"/>
+          </a:xfrm>
+          <a:prstGeom prst="rect">
+            <a:avLst/>
+          </a:prstGeom>
+        </p:spPr>
+      </p:pic>
     </p:spTree>
     <p:extLst>
       <p:ext uri="{BB962C8B-B14F-4D97-AF65-F5344CB8AC3E}">
@@ -3836,16 +4375,29 @@
             <p:ph type="title"/>
           </p:nvPr>
         </p:nvSpPr>
-        <p:spPr/>
-        <p:txBody>
-          <a:bodyPr/>
-          <a:lstStyle/>
-          <a:p>
-            <a:r>
-              <a:rPr lang="en-IN" dirty="0" smtClean="0"/>
-              <a:t>3. Results</a:t>
-            </a:r>
-            <a:endParaRPr lang="en-IN" dirty="0"/>
+        <p:spPr>
+          <a:xfrm>
+            <a:off x="838200" y="365125"/>
+            <a:ext cx="10515600" cy="805307"/>
+          </a:xfrm>
+        </p:spPr>
+        <p:txBody>
+          <a:bodyPr>
+            <a:normAutofit/>
+          </a:bodyPr>
+          <a:lstStyle/>
+          <a:p>
+            <a:r>
+              <a:rPr lang="en-IN" sz="3200" dirty="0" smtClean="0">
+                <a:latin typeface="Times New Roman" panose="02020603050405020304" pitchFamily="18" charset="0"/>
+                <a:cs typeface="Times New Roman" panose="02020603050405020304" pitchFamily="18" charset="0"/>
+              </a:rPr>
+              <a:t>2. Technical discussion</a:t>
+            </a:r>
+            <a:endParaRPr lang="en-IN" sz="3200" dirty="0">
+              <a:latin typeface="Times New Roman" panose="02020603050405020304" pitchFamily="18" charset="0"/>
+              <a:cs typeface="Times New Roman" panose="02020603050405020304" pitchFamily="18" charset="0"/>
+            </a:endParaRPr>
           </a:p>
         </p:txBody>
       </p:sp>
@@ -3859,25 +4411,270 @@
             <p:ph idx="1"/>
           </p:nvPr>
         </p:nvSpPr>
-        <p:spPr/>
-        <p:txBody>
-          <a:bodyPr/>
-          <a:lstStyle/>
-          <a:p>
-            <a:endParaRPr lang="en-IN" dirty="0"/>
-          </a:p>
-        </p:txBody>
-      </p:sp>
+        <p:spPr>
+          <a:xfrm>
+            <a:off x="838200" y="1170432"/>
+            <a:ext cx="10515600" cy="5006531"/>
+          </a:xfrm>
+        </p:spPr>
+        <p:txBody>
+          <a:bodyPr>
+            <a:normAutofit/>
+          </a:bodyPr>
+          <a:lstStyle/>
+          <a:p>
+            <a:r>
+              <a:rPr lang="en-IN" sz="2400" dirty="0" smtClean="0">
+                <a:latin typeface="Times New Roman" panose="02020603050405020304" pitchFamily="18" charset="0"/>
+                <a:cs typeface="Times New Roman" panose="02020603050405020304" pitchFamily="18" charset="0"/>
+              </a:rPr>
+              <a:t>The increment for each intensity level can be controlled by adjusting the index r of the power law transformation function.</a:t>
+            </a:r>
+          </a:p>
+          <a:p>
+            <a:pPr marL="0" indent="0">
+              <a:buNone/>
+            </a:pPr>
+            <a:r>
+              <a:rPr lang="en-IN" sz="2400" dirty="0" smtClean="0">
+                <a:latin typeface="Times New Roman" panose="02020603050405020304" pitchFamily="18" charset="0"/>
+                <a:cs typeface="Times New Roman" panose="02020603050405020304" pitchFamily="18" charset="0"/>
+              </a:rPr>
+              <a:t>    Ex: When r&lt;1, higher weights are given to low probabilities than the high probabilities. </a:t>
+            </a:r>
+            <a:r>
+              <a:rPr lang="en-IN" sz="2400" dirty="0" err="1" smtClean="0">
+                <a:latin typeface="Times New Roman" panose="02020603050405020304" pitchFamily="18" charset="0"/>
+                <a:cs typeface="Times New Roman" panose="02020603050405020304" pitchFamily="18" charset="0"/>
+              </a:rPr>
+              <a:t>i.e</a:t>
+            </a:r>
+            <a:r>
+              <a:rPr lang="en-IN" sz="2400" dirty="0" smtClean="0">
+                <a:latin typeface="Times New Roman" panose="02020603050405020304" pitchFamily="18" charset="0"/>
+                <a:cs typeface="Times New Roman" panose="02020603050405020304" pitchFamily="18" charset="0"/>
+              </a:rPr>
+              <a:t>, the less-probable levels are protected and over-enhancement is less likely to occur.</a:t>
+            </a:r>
+          </a:p>
+          <a:p>
+            <a:r>
+              <a:rPr lang="en-IN" sz="2400" dirty="0" smtClean="0">
+                <a:latin typeface="Times New Roman" panose="02020603050405020304" pitchFamily="18" charset="0"/>
+                <a:cs typeface="Times New Roman" panose="02020603050405020304" pitchFamily="18" charset="0"/>
+              </a:rPr>
+              <a:t>Also, there is an upper limit P</a:t>
+            </a:r>
+            <a:r>
+              <a:rPr lang="en-IN" sz="2400" baseline="-25000" dirty="0" smtClean="0">
+                <a:latin typeface="Times New Roman" panose="02020603050405020304" pitchFamily="18" charset="0"/>
+                <a:cs typeface="Times New Roman" panose="02020603050405020304" pitchFamily="18" charset="0"/>
+              </a:rPr>
+              <a:t>u</a:t>
+            </a:r>
+            <a:r>
+              <a:rPr lang="en-IN" sz="2400" dirty="0" smtClean="0">
+                <a:latin typeface="Times New Roman" panose="02020603050405020304" pitchFamily="18" charset="0"/>
+                <a:cs typeface="Times New Roman" panose="02020603050405020304" pitchFamily="18" charset="0"/>
+              </a:rPr>
+              <a:t> as a result, all levels whose PDF values are higher then P</a:t>
+            </a:r>
+            <a:r>
+              <a:rPr lang="en-IN" sz="2400" baseline="-25000" dirty="0" smtClean="0">
+                <a:latin typeface="Times New Roman" panose="02020603050405020304" pitchFamily="18" charset="0"/>
+                <a:cs typeface="Times New Roman" panose="02020603050405020304" pitchFamily="18" charset="0"/>
+              </a:rPr>
+              <a:t>u</a:t>
+            </a:r>
+            <a:r>
+              <a:rPr lang="en-IN" sz="2400" dirty="0" smtClean="0">
+                <a:latin typeface="Times New Roman" panose="02020603050405020304" pitchFamily="18" charset="0"/>
+                <a:cs typeface="Times New Roman" panose="02020603050405020304" pitchFamily="18" charset="0"/>
+              </a:rPr>
+              <a:t> will have the increment clamped at a max. </a:t>
+            </a:r>
+          </a:p>
+          <a:p>
+            <a:r>
+              <a:rPr lang="en-IN" sz="2400" dirty="0" smtClean="0">
+                <a:latin typeface="Times New Roman" panose="02020603050405020304" pitchFamily="18" charset="0"/>
+                <a:cs typeface="Times New Roman" panose="02020603050405020304" pitchFamily="18" charset="0"/>
+              </a:rPr>
+              <a:t>The value of P</a:t>
+            </a:r>
+            <a:r>
+              <a:rPr lang="en-IN" sz="2400" baseline="-25000" dirty="0" smtClean="0">
+                <a:latin typeface="Times New Roman" panose="02020603050405020304" pitchFamily="18" charset="0"/>
+                <a:cs typeface="Times New Roman" panose="02020603050405020304" pitchFamily="18" charset="0"/>
+              </a:rPr>
+              <a:t>u</a:t>
+            </a:r>
+            <a:r>
+              <a:rPr lang="en-IN" sz="2400" dirty="0" smtClean="0">
+                <a:latin typeface="Times New Roman" panose="02020603050405020304" pitchFamily="18" charset="0"/>
+                <a:cs typeface="Times New Roman" panose="02020603050405020304" pitchFamily="18" charset="0"/>
+              </a:rPr>
+              <a:t> is decided by                                           v  is a real number which defines the upper threshold normalized to </a:t>
+            </a:r>
+            <a:r>
+              <a:rPr lang="en-IN" sz="2400" dirty="0" err="1" smtClean="0">
+                <a:latin typeface="Times New Roman" panose="02020603050405020304" pitchFamily="18" charset="0"/>
+                <a:cs typeface="Times New Roman" panose="02020603050405020304" pitchFamily="18" charset="0"/>
+              </a:rPr>
+              <a:t>P</a:t>
+            </a:r>
+            <a:r>
+              <a:rPr lang="en-IN" sz="2400" baseline="-25000" dirty="0" err="1" smtClean="0">
+                <a:latin typeface="Times New Roman" panose="02020603050405020304" pitchFamily="18" charset="0"/>
+                <a:cs typeface="Times New Roman" panose="02020603050405020304" pitchFamily="18" charset="0"/>
+              </a:rPr>
+              <a:t>max</a:t>
+            </a:r>
+            <a:r>
+              <a:rPr lang="en-IN" sz="2400" dirty="0" smtClean="0">
+                <a:latin typeface="Times New Roman" panose="02020603050405020304" pitchFamily="18" charset="0"/>
+                <a:cs typeface="Times New Roman" panose="02020603050405020304" pitchFamily="18" charset="0"/>
+              </a:rPr>
+              <a:t> .</a:t>
+            </a:r>
+          </a:p>
+          <a:p>
+            <a:r>
+              <a:rPr lang="en-IN" sz="2400" dirty="0" smtClean="0">
+                <a:latin typeface="Times New Roman" panose="02020603050405020304" pitchFamily="18" charset="0"/>
+                <a:cs typeface="Times New Roman" panose="02020603050405020304" pitchFamily="18" charset="0"/>
+              </a:rPr>
+              <a:t>The lower threshold P</a:t>
+            </a:r>
+            <a:r>
+              <a:rPr lang="en-IN" sz="2400" baseline="-25000" dirty="0" smtClean="0">
+                <a:latin typeface="Times New Roman" panose="02020603050405020304" pitchFamily="18" charset="0"/>
+                <a:cs typeface="Times New Roman" panose="02020603050405020304" pitchFamily="18" charset="0"/>
+              </a:rPr>
+              <a:t>l</a:t>
+            </a:r>
+            <a:r>
+              <a:rPr lang="en-IN" sz="2400" dirty="0" smtClean="0">
+                <a:latin typeface="Times New Roman" panose="02020603050405020304" pitchFamily="18" charset="0"/>
+                <a:cs typeface="Times New Roman" panose="02020603050405020304" pitchFamily="18" charset="0"/>
+              </a:rPr>
+              <a:t> is only used to cut out the levels whose probabilities are too low( little visual importance).</a:t>
+            </a:r>
+          </a:p>
+          <a:p>
+            <a:r>
+              <a:rPr lang="en-IN" sz="2400" dirty="0" smtClean="0">
+                <a:latin typeface="Times New Roman" panose="02020603050405020304" pitchFamily="18" charset="0"/>
+                <a:cs typeface="Times New Roman" panose="02020603050405020304" pitchFamily="18" charset="0"/>
+              </a:rPr>
+              <a:t>We can also observe that when r=1, P</a:t>
+            </a:r>
+            <a:r>
+              <a:rPr lang="en-IN" sz="2400" baseline="-25000" dirty="0" smtClean="0">
+                <a:latin typeface="Times New Roman" panose="02020603050405020304" pitchFamily="18" charset="0"/>
+                <a:cs typeface="Times New Roman" panose="02020603050405020304" pitchFamily="18" charset="0"/>
+              </a:rPr>
+              <a:t>u</a:t>
+            </a:r>
+            <a:r>
+              <a:rPr lang="en-IN" sz="2400" dirty="0" smtClean="0">
+                <a:latin typeface="Times New Roman" panose="02020603050405020304" pitchFamily="18" charset="0"/>
+                <a:cs typeface="Times New Roman" panose="02020603050405020304" pitchFamily="18" charset="0"/>
+              </a:rPr>
+              <a:t>=1 and P</a:t>
+            </a:r>
+            <a:r>
+              <a:rPr lang="en-IN" sz="2400" baseline="-25000" dirty="0" smtClean="0">
+                <a:latin typeface="Times New Roman" panose="02020603050405020304" pitchFamily="18" charset="0"/>
+                <a:cs typeface="Times New Roman" panose="02020603050405020304" pitchFamily="18" charset="0"/>
+              </a:rPr>
+              <a:t>l</a:t>
+            </a:r>
+            <a:r>
+              <a:rPr lang="en-IN" sz="2400" dirty="0" smtClean="0">
+                <a:latin typeface="Times New Roman" panose="02020603050405020304" pitchFamily="18" charset="0"/>
+                <a:cs typeface="Times New Roman" panose="02020603050405020304" pitchFamily="18" charset="0"/>
+              </a:rPr>
+              <a:t>=0, the WTHE method reduces to traditional HE.</a:t>
+            </a:r>
+            <a:endParaRPr lang="en-IN" sz="2400" dirty="0">
+              <a:latin typeface="Times New Roman" panose="02020603050405020304" pitchFamily="18" charset="0"/>
+              <a:cs typeface="Times New Roman" panose="02020603050405020304" pitchFamily="18" charset="0"/>
+            </a:endParaRPr>
+          </a:p>
+          <a:p>
+            <a:endParaRPr lang="en-IN" sz="2400" dirty="0">
+              <a:latin typeface="Times New Roman" panose="02020603050405020304" pitchFamily="18" charset="0"/>
+              <a:cs typeface="Times New Roman" panose="02020603050405020304" pitchFamily="18" charset="0"/>
+            </a:endParaRPr>
+          </a:p>
+        </p:txBody>
+      </p:sp>
+      <p:pic>
+        <p:nvPicPr>
+          <p:cNvPr id="4" name="Picture 3"/>
+          <p:cNvPicPr>
+            <a:picLocks noChangeAspect="1"/>
+          </p:cNvPicPr>
+          <p:nvPr/>
+        </p:nvPicPr>
+        <p:blipFill>
+          <a:blip r:embed="rId2"/>
+          <a:stretch>
+            <a:fillRect/>
+          </a:stretch>
+        </p:blipFill>
+        <p:spPr>
+          <a:xfrm>
+            <a:off x="7707058" y="3445097"/>
+            <a:ext cx="1971675" cy="457200"/>
+          </a:xfrm>
+          <a:prstGeom prst="rect">
+            <a:avLst/>
+          </a:prstGeom>
+        </p:spPr>
+      </p:pic>
+      <p:pic>
+        <p:nvPicPr>
+          <p:cNvPr id="5" name="Picture 4"/>
+          <p:cNvPicPr>
+            <a:picLocks noChangeAspect="1"/>
+          </p:cNvPicPr>
+          <p:nvPr/>
+        </p:nvPicPr>
+        <p:blipFill>
+          <a:blip r:embed="rId3"/>
+          <a:stretch>
+            <a:fillRect/>
+          </a:stretch>
+        </p:blipFill>
+        <p:spPr>
+          <a:xfrm>
+            <a:off x="4720018" y="3673697"/>
+            <a:ext cx="3429000" cy="523875"/>
+          </a:xfrm>
+          <a:prstGeom prst="rect">
+            <a:avLst/>
+          </a:prstGeom>
+        </p:spPr>
+      </p:pic>
     </p:spTree>
     <p:extLst>
       <p:ext uri="{BB962C8B-B14F-4D97-AF65-F5344CB8AC3E}">
-        <p14:creationId xmlns:p14="http://schemas.microsoft.com/office/powerpoint/2010/main" val="538683382"/>
+        <p14:creationId xmlns:p14="http://schemas.microsoft.com/office/powerpoint/2010/main" val="1109763684"/>
       </p:ext>
     </p:extLst>
   </p:cSld>
   <p:clrMapOvr>
     <a:masterClrMapping/>
   </p:clrMapOvr>
+  <p:timing>
+    <p:tnLst>
+      <p:par>
+        <p:cTn id="1" dur="indefinite" restart="never" nodeType="tmRoot"/>
+      </p:par>
+    </p:tnLst>
+  </p:timing>
 </p:sld>
 </file>
 
@@ -3908,16 +4705,25 @@
             <p:ph type="title"/>
           </p:nvPr>
         </p:nvSpPr>
-        <p:spPr/>
-        <p:txBody>
-          <a:bodyPr/>
-          <a:lstStyle/>
-          <a:p>
-            <a:r>
-              <a:rPr lang="en-IN" dirty="0" smtClean="0"/>
-              <a:t>4. Comparative study</a:t>
-            </a:r>
-            <a:endParaRPr lang="en-IN" dirty="0"/>
+        <p:spPr>
+          <a:xfrm>
+            <a:off x="838200" y="365125"/>
+            <a:ext cx="10515600" cy="585851"/>
+          </a:xfrm>
+        </p:spPr>
+        <p:txBody>
+          <a:bodyPr>
+            <a:normAutofit/>
+          </a:bodyPr>
+          <a:lstStyle/>
+          <a:p>
+            <a:r>
+              <a:rPr lang="en-IN" sz="3200" dirty="0">
+                <a:latin typeface="Times New Roman" panose="02020603050405020304" pitchFamily="18" charset="0"/>
+                <a:cs typeface="Times New Roman" panose="02020603050405020304" pitchFamily="18" charset="0"/>
+              </a:rPr>
+              <a:t>2. Technical discussion</a:t>
+            </a:r>
           </a:p>
         </p:txBody>
       </p:sp>
@@ -3931,19 +4737,231 @@
             <p:ph idx="1"/>
           </p:nvPr>
         </p:nvSpPr>
-        <p:spPr/>
-        <p:txBody>
-          <a:bodyPr/>
-          <a:lstStyle/>
-          <a:p>
-            <a:endParaRPr lang="en-IN"/>
-          </a:p>
-        </p:txBody>
-      </p:sp>
+        <p:spPr>
+          <a:xfrm>
+            <a:off x="838200" y="950976"/>
+            <a:ext cx="10515600" cy="5225987"/>
+          </a:xfrm>
+        </p:spPr>
+        <p:txBody>
+          <a:bodyPr>
+            <a:normAutofit/>
+          </a:bodyPr>
+          <a:lstStyle/>
+          <a:p>
+            <a:r>
+              <a:rPr lang="en-IN" sz="2400" dirty="0" smtClean="0">
+                <a:latin typeface="Times New Roman" panose="02020603050405020304" pitchFamily="18" charset="0"/>
+                <a:cs typeface="Times New Roman" panose="02020603050405020304" pitchFamily="18" charset="0"/>
+              </a:rPr>
+              <a:t>After the weighted </a:t>
+            </a:r>
+            <a:r>
+              <a:rPr lang="en-IN" sz="2400" dirty="0" err="1" smtClean="0">
+                <a:latin typeface="Times New Roman" panose="02020603050405020304" pitchFamily="18" charset="0"/>
+                <a:cs typeface="Times New Roman" panose="02020603050405020304" pitchFamily="18" charset="0"/>
+              </a:rPr>
+              <a:t>thresholded</a:t>
+            </a:r>
+            <a:r>
+              <a:rPr lang="en-IN" sz="2400" dirty="0" smtClean="0">
+                <a:latin typeface="Times New Roman" panose="02020603050405020304" pitchFamily="18" charset="0"/>
+                <a:cs typeface="Times New Roman" panose="02020603050405020304" pitchFamily="18" charset="0"/>
+              </a:rPr>
+              <a:t> PDF is obtained the cumulative distribution function(CDF) is obtained by</a:t>
+            </a:r>
+          </a:p>
+          <a:p>
+            <a:endParaRPr lang="en-IN" sz="2400" dirty="0">
+              <a:latin typeface="Times New Roman" panose="02020603050405020304" pitchFamily="18" charset="0"/>
+              <a:cs typeface="Times New Roman" panose="02020603050405020304" pitchFamily="18" charset="0"/>
+            </a:endParaRPr>
+          </a:p>
+          <a:p>
+            <a:endParaRPr lang="en-IN" sz="2400" dirty="0" smtClean="0">
+              <a:latin typeface="Times New Roman" panose="02020603050405020304" pitchFamily="18" charset="0"/>
+              <a:cs typeface="Times New Roman" panose="02020603050405020304" pitchFamily="18" charset="0"/>
+            </a:endParaRPr>
+          </a:p>
+          <a:p>
+            <a:r>
+              <a:rPr lang="en-IN" sz="2400" dirty="0" smtClean="0">
+                <a:latin typeface="Times New Roman" panose="02020603050405020304" pitchFamily="18" charset="0"/>
+                <a:cs typeface="Times New Roman" panose="02020603050405020304" pitchFamily="18" charset="0"/>
+              </a:rPr>
+              <a:t>The HE procedure is, </a:t>
+            </a:r>
+          </a:p>
+          <a:p>
+            <a:r>
+              <a:rPr lang="en-IN" sz="2400" dirty="0" err="1" smtClean="0">
+                <a:latin typeface="Times New Roman" panose="02020603050405020304" pitchFamily="18" charset="0"/>
+                <a:cs typeface="Times New Roman" panose="02020603050405020304" pitchFamily="18" charset="0"/>
+              </a:rPr>
+              <a:t>W</a:t>
+            </a:r>
+            <a:r>
+              <a:rPr lang="en-IN" sz="2400" baseline="-25000" dirty="0" err="1" smtClean="0">
+                <a:latin typeface="Times New Roman" panose="02020603050405020304" pitchFamily="18" charset="0"/>
+                <a:cs typeface="Times New Roman" panose="02020603050405020304" pitchFamily="18" charset="0"/>
+              </a:rPr>
+              <a:t>out</a:t>
+            </a:r>
+            <a:r>
+              <a:rPr lang="en-IN" sz="2400" dirty="0" smtClean="0">
+                <a:latin typeface="Times New Roman" panose="02020603050405020304" pitchFamily="18" charset="0"/>
+                <a:cs typeface="Times New Roman" panose="02020603050405020304" pitchFamily="18" charset="0"/>
+              </a:rPr>
+              <a:t> is the dynamic range of output image, </a:t>
+            </a:r>
+            <a:r>
+              <a:rPr lang="en-IN" sz="2400" dirty="0" err="1" smtClean="0">
+                <a:latin typeface="Times New Roman" panose="02020603050405020304" pitchFamily="18" charset="0"/>
+                <a:cs typeface="Times New Roman" panose="02020603050405020304" pitchFamily="18" charset="0"/>
+              </a:rPr>
+              <a:t>M</a:t>
+            </a:r>
+            <a:r>
+              <a:rPr lang="en-IN" sz="2400" baseline="-25000" dirty="0" err="1" smtClean="0">
+                <a:latin typeface="Times New Roman" panose="02020603050405020304" pitchFamily="18" charset="0"/>
+                <a:cs typeface="Times New Roman" panose="02020603050405020304" pitchFamily="18" charset="0"/>
+              </a:rPr>
+              <a:t>adj</a:t>
+            </a:r>
+            <a:r>
+              <a:rPr lang="en-IN" sz="2400" dirty="0" smtClean="0">
+                <a:latin typeface="Times New Roman" panose="02020603050405020304" pitchFamily="18" charset="0"/>
+                <a:cs typeface="Times New Roman" panose="02020603050405020304" pitchFamily="18" charset="0"/>
+              </a:rPr>
+              <a:t> is the mean luminance level after enhancement. </a:t>
+            </a:r>
+          </a:p>
+          <a:p>
+            <a:pPr marL="0" indent="0">
+              <a:buNone/>
+            </a:pPr>
+            <a:r>
+              <a:rPr lang="en-IN" sz="2400" b="1" dirty="0" smtClean="0">
+                <a:latin typeface="Times New Roman" panose="02020603050405020304" pitchFamily="18" charset="0"/>
+                <a:cs typeface="Times New Roman" panose="02020603050405020304" pitchFamily="18" charset="0"/>
+              </a:rPr>
+              <a:t>Video Enhancement:</a:t>
+            </a:r>
+          </a:p>
+          <a:p>
+            <a:r>
+              <a:rPr lang="en-IN" sz="2400" dirty="0" smtClean="0">
+                <a:latin typeface="Times New Roman" panose="02020603050405020304" pitchFamily="18" charset="0"/>
+                <a:cs typeface="Times New Roman" panose="02020603050405020304" pitchFamily="18" charset="0"/>
+              </a:rPr>
+              <a:t>The proposed WTHE enhancement method is applied to the luminance component of the video, leaving chrominance components unchanged.</a:t>
+            </a:r>
+          </a:p>
+          <a:p>
+            <a:r>
+              <a:rPr lang="en-IN" sz="2400" dirty="0" smtClean="0">
+                <a:latin typeface="Times New Roman" panose="02020603050405020304" pitchFamily="18" charset="0"/>
+                <a:cs typeface="Times New Roman" panose="02020603050405020304" pitchFamily="18" charset="0"/>
+              </a:rPr>
+              <a:t>The equation for WTHE introduces enhancement gain control that constraints the ratio between the output and input dynamic range. </a:t>
+            </a:r>
+          </a:p>
+          <a:p>
+            <a:endParaRPr lang="en-IN" sz="2400" dirty="0" smtClean="0">
+              <a:latin typeface="Times New Roman" panose="02020603050405020304" pitchFamily="18" charset="0"/>
+              <a:cs typeface="Times New Roman" panose="02020603050405020304" pitchFamily="18" charset="0"/>
+            </a:endParaRPr>
+          </a:p>
+          <a:p>
+            <a:endParaRPr lang="en-IN" sz="2400" b="1" dirty="0" smtClean="0">
+              <a:latin typeface="Times New Roman" panose="02020603050405020304" pitchFamily="18" charset="0"/>
+              <a:cs typeface="Times New Roman" panose="02020603050405020304" pitchFamily="18" charset="0"/>
+            </a:endParaRPr>
+          </a:p>
+          <a:p>
+            <a:endParaRPr lang="en-IN" sz="2400" dirty="0">
+              <a:latin typeface="Times New Roman" panose="02020603050405020304" pitchFamily="18" charset="0"/>
+              <a:cs typeface="Times New Roman" panose="02020603050405020304" pitchFamily="18" charset="0"/>
+            </a:endParaRPr>
+          </a:p>
+        </p:txBody>
+      </p:sp>
+      <p:pic>
+        <p:nvPicPr>
+          <p:cNvPr id="4" name="Picture 3"/>
+          <p:cNvPicPr>
+            <a:picLocks noChangeAspect="1"/>
+          </p:cNvPicPr>
+          <p:nvPr/>
+        </p:nvPicPr>
+        <p:blipFill>
+          <a:blip r:embed="rId2"/>
+          <a:stretch>
+            <a:fillRect/>
+          </a:stretch>
+        </p:blipFill>
+        <p:spPr>
+          <a:xfrm>
+            <a:off x="5620893" y="1467135"/>
+            <a:ext cx="4705350" cy="847725"/>
+          </a:xfrm>
+          <a:prstGeom prst="rect">
+            <a:avLst/>
+          </a:prstGeom>
+        </p:spPr>
+      </p:pic>
+      <p:pic>
+        <p:nvPicPr>
+          <p:cNvPr id="5" name="Picture 4"/>
+          <p:cNvPicPr>
+            <a:picLocks noChangeAspect="1"/>
+          </p:cNvPicPr>
+          <p:nvPr/>
+        </p:nvPicPr>
+        <p:blipFill>
+          <a:blip r:embed="rId3"/>
+          <a:stretch>
+            <a:fillRect/>
+          </a:stretch>
+        </p:blipFill>
+        <p:spPr>
+          <a:xfrm>
+            <a:off x="3839718" y="2550031"/>
+            <a:ext cx="4133850" cy="561975"/>
+          </a:xfrm>
+          <a:prstGeom prst="rect">
+            <a:avLst/>
+          </a:prstGeom>
+        </p:spPr>
+      </p:pic>
+      <p:pic>
+        <p:nvPicPr>
+          <p:cNvPr id="6" name="Picture 5"/>
+          <p:cNvPicPr>
+            <a:picLocks noChangeAspect="1"/>
+          </p:cNvPicPr>
+          <p:nvPr/>
+        </p:nvPicPr>
+        <p:blipFill>
+          <a:blip r:embed="rId4"/>
+          <a:stretch>
+            <a:fillRect/>
+          </a:stretch>
+        </p:blipFill>
+        <p:spPr>
+          <a:xfrm>
+            <a:off x="4664773" y="5888354"/>
+            <a:ext cx="3057525" cy="514350"/>
+          </a:xfrm>
+          <a:prstGeom prst="rect">
+            <a:avLst/>
+          </a:prstGeom>
+        </p:spPr>
+      </p:pic>
     </p:spTree>
     <p:extLst>
       <p:ext uri="{BB962C8B-B14F-4D97-AF65-F5344CB8AC3E}">
-        <p14:creationId xmlns:p14="http://schemas.microsoft.com/office/powerpoint/2010/main" val="3614991796"/>
+        <p14:creationId xmlns:p14="http://schemas.microsoft.com/office/powerpoint/2010/main" val="3392351577"/>
       </p:ext>
     </p:extLst>
   </p:cSld>
@@ -3980,52 +4998,313 @@
             <p:ph type="title"/>
           </p:nvPr>
         </p:nvSpPr>
-        <p:spPr/>
-        <p:txBody>
-          <a:bodyPr/>
-          <a:lstStyle/>
-          <a:p>
+        <p:spPr>
+          <a:xfrm>
+            <a:off x="838200" y="365125"/>
+            <a:ext cx="10515600" cy="683387"/>
+          </a:xfrm>
+        </p:spPr>
+        <p:txBody>
+          <a:bodyPr>
+            <a:normAutofit/>
+          </a:bodyPr>
+          <a:lstStyle/>
+          <a:p>
+            <a:r>
+              <a:rPr lang="en-IN" sz="3200" dirty="0" smtClean="0">
+                <a:latin typeface="Times New Roman" panose="02020603050405020304" pitchFamily="18" charset="0"/>
+                <a:cs typeface="Times New Roman" panose="02020603050405020304" pitchFamily="18" charset="0"/>
+              </a:rPr>
+              <a:t>2. Technical discussion</a:t>
+            </a:r>
+            <a:endParaRPr lang="en-IN" sz="3200" dirty="0">
+              <a:latin typeface="Times New Roman" panose="02020603050405020304" pitchFamily="18" charset="0"/>
+              <a:cs typeface="Times New Roman" panose="02020603050405020304" pitchFamily="18" charset="0"/>
+            </a:endParaRPr>
+          </a:p>
+        </p:txBody>
+      </p:sp>
+      <p:sp>
+        <p:nvSpPr>
+          <p:cNvPr id="3" name="Content Placeholder 2"/>
+          <p:cNvSpPr>
+            <a:spLocks noGrp="1"/>
+          </p:cNvSpPr>
+          <p:nvPr>
+            <p:ph idx="1"/>
+          </p:nvPr>
+        </p:nvSpPr>
+        <p:spPr>
+          <a:xfrm>
+            <a:off x="838200" y="1048512"/>
+            <a:ext cx="10515600" cy="5128451"/>
+          </a:xfrm>
+        </p:spPr>
+        <p:txBody>
+          <a:bodyPr>
+            <a:normAutofit/>
+          </a:bodyPr>
+          <a:lstStyle/>
+          <a:p>
+            <a:r>
+              <a:rPr lang="en-IN" dirty="0" smtClean="0"/>
+              <a:t>W</a:t>
+            </a:r>
+            <a:r>
+              <a:rPr lang="en-IN" baseline="-25000" dirty="0" smtClean="0"/>
+              <a:t>in</a:t>
+            </a:r>
+            <a:r>
+              <a:rPr lang="en-IN" dirty="0" smtClean="0"/>
+              <a:t> is the dynamic range of the input image and </a:t>
+            </a:r>
+            <a:r>
+              <a:rPr lang="en-IN" dirty="0" err="1" smtClean="0"/>
+              <a:t>G</a:t>
+            </a:r>
+            <a:r>
+              <a:rPr lang="en-IN" baseline="-25000" dirty="0" err="1" smtClean="0"/>
+              <a:t>max</a:t>
+            </a:r>
+            <a:r>
+              <a:rPr lang="en-IN" dirty="0" smtClean="0"/>
+              <a:t> is a pre-set maximum gain of dynamic range. Enhancement gain control is especially useful for scenes that have narrow or gradually changing dynamic ranges.</a:t>
+            </a:r>
+          </a:p>
+          <a:p>
+            <a:r>
+              <a:rPr lang="en-IN" dirty="0" err="1" smtClean="0"/>
+              <a:t>M</a:t>
+            </a:r>
+            <a:r>
+              <a:rPr lang="en-IN" baseline="-25000" dirty="0" err="1" smtClean="0"/>
+              <a:t>adj</a:t>
+            </a:r>
+            <a:r>
+              <a:rPr lang="en-IN" dirty="0" smtClean="0"/>
+              <a:t> is </a:t>
+            </a:r>
             <a:r>
               <a:rPr lang="en-IN" dirty="0"/>
-              <a:t>5</a:t>
+              <a:t>the mean adjustment quantity </a:t>
             </a:r>
             <a:r>
               <a:rPr lang="en-IN" dirty="0" smtClean="0"/>
-              <a:t>. Conclusions</a:t>
-            </a:r>
+              <a:t>that reduces </a:t>
+            </a:r>
+            <a:r>
+              <a:rPr lang="en-IN" dirty="0"/>
+              <a:t>the luminance changes after enhancement. To </a:t>
+            </a:r>
+            <a:r>
+              <a:rPr lang="en-IN" dirty="0" smtClean="0"/>
+              <a:t>decide on </a:t>
+            </a:r>
+            <a:r>
+              <a:rPr lang="en-IN" dirty="0"/>
+              <a:t>the value of </a:t>
+            </a:r>
+            <a:r>
+              <a:rPr lang="en-IN" dirty="0" err="1" smtClean="0"/>
+              <a:t>M</a:t>
+            </a:r>
+            <a:r>
+              <a:rPr lang="en-IN" baseline="-25000" dirty="0" err="1" smtClean="0"/>
+              <a:t>adj</a:t>
+            </a:r>
+            <a:r>
+              <a:rPr lang="en-IN" dirty="0" smtClean="0"/>
+              <a:t>, </a:t>
+            </a:r>
+            <a:r>
+              <a:rPr lang="en-IN" dirty="0"/>
+              <a:t>we first calculate the mean of </a:t>
+            </a:r>
+            <a:r>
+              <a:rPr lang="en-IN" dirty="0" smtClean="0"/>
+              <a:t>the enhanced image F </a:t>
+            </a:r>
+            <a:r>
+              <a:rPr lang="en-IN" baseline="-25000" dirty="0" smtClean="0"/>
+              <a:t>hat</a:t>
+            </a:r>
+            <a:r>
+              <a:rPr lang="en-IN" dirty="0" smtClean="0"/>
+              <a:t>(</a:t>
+            </a:r>
+            <a:r>
+              <a:rPr lang="en-IN" dirty="0" err="1" smtClean="0"/>
+              <a:t>i,j</a:t>
+            </a:r>
+            <a:r>
+              <a:rPr lang="en-IN" dirty="0" smtClean="0"/>
+              <a:t>)</a:t>
+            </a:r>
+            <a:r>
+              <a:rPr lang="en-IN" baseline="-25000" dirty="0" smtClean="0"/>
+              <a:t> </a:t>
+            </a:r>
+            <a:r>
+              <a:rPr lang="en-IN" dirty="0" smtClean="0"/>
+              <a:t>assuming </a:t>
+            </a:r>
+            <a:r>
+              <a:rPr lang="en-IN" dirty="0" err="1" smtClean="0"/>
+              <a:t>M</a:t>
+            </a:r>
+            <a:r>
+              <a:rPr lang="en-IN" baseline="-25000" dirty="0" err="1" smtClean="0"/>
+              <a:t>adj</a:t>
+            </a:r>
+            <a:r>
+              <a:rPr lang="en-IN" dirty="0" smtClean="0"/>
+              <a:t> </a:t>
+            </a:r>
+            <a:r>
+              <a:rPr lang="en-IN" dirty="0"/>
+              <a:t>=0.</a:t>
+            </a:r>
+          </a:p>
+          <a:p>
+            <a:r>
+              <a:rPr lang="en-IN" dirty="0"/>
+              <a:t>Then the difference between it and the mean of the original </a:t>
+            </a:r>
+            <a:r>
+              <a:rPr lang="en-IN" dirty="0" smtClean="0"/>
+              <a:t>image </a:t>
+            </a:r>
+            <a:r>
+              <a:rPr lang="en-IN" dirty="0"/>
+              <a:t>is calculated. </a:t>
+            </a:r>
+            <a:r>
+              <a:rPr lang="en-IN" dirty="0" err="1" smtClean="0"/>
+              <a:t>M</a:t>
+            </a:r>
+            <a:r>
+              <a:rPr lang="en-IN" baseline="-25000" dirty="0" err="1" smtClean="0"/>
+              <a:t>adj</a:t>
+            </a:r>
+            <a:r>
+              <a:rPr lang="en-IN" dirty="0" smtClean="0"/>
+              <a:t> </a:t>
+            </a:r>
+            <a:r>
+              <a:rPr lang="en-IN" dirty="0"/>
+              <a:t>is set equal to the value closest to </a:t>
+            </a:r>
+            <a:r>
+              <a:rPr lang="en-IN" dirty="0" smtClean="0"/>
+              <a:t>this mean difference </a:t>
+            </a:r>
+            <a:r>
+              <a:rPr lang="en-IN" dirty="0"/>
+              <a:t>such that it does not cause serious </a:t>
+            </a:r>
+            <a:r>
+              <a:rPr lang="en-IN" dirty="0" smtClean="0"/>
+              <a:t>level saturation (clipping</a:t>
+            </a:r>
+            <a:r>
+              <a:rPr lang="en-IN" dirty="0"/>
+              <a:t>). </a:t>
+            </a:r>
+          </a:p>
+          <a:p>
             <a:endParaRPr lang="en-IN" dirty="0"/>
-          </a:p>
-        </p:txBody>
-      </p:sp>
-      <p:sp>
-        <p:nvSpPr>
-          <p:cNvPr id="3" name="Content Placeholder 2"/>
-          <p:cNvSpPr>
-            <a:spLocks noGrp="1"/>
-          </p:cNvSpPr>
-          <p:nvPr>
-            <p:ph idx="1"/>
-          </p:nvPr>
-        </p:nvSpPr>
-        <p:spPr/>
-        <p:txBody>
-          <a:bodyPr/>
-          <a:lstStyle/>
-          <a:p>
-            <a:endParaRPr lang="en-IN"/>
           </a:p>
         </p:txBody>
       </p:sp>
     </p:spTree>
     <p:extLst>
       <p:ext uri="{BB962C8B-B14F-4D97-AF65-F5344CB8AC3E}">
-        <p14:creationId xmlns:p14="http://schemas.microsoft.com/office/powerpoint/2010/main" val="241898102"/>
+        <p14:creationId xmlns:p14="http://schemas.microsoft.com/office/powerpoint/2010/main" val="288147633"/>
       </p:ext>
     </p:extLst>
   </p:cSld>
   <p:clrMapOvr>
     <a:masterClrMapping/>
   </p:clrMapOvr>
+</p:sld>
+</file>
+
+<file path=ppt/slides/slide9.xml><?xml version="1.0" encoding="utf-8"?>
+<p:sld xmlns:a="http://schemas.openxmlformats.org/drawingml/2006/main" xmlns:r="http://schemas.openxmlformats.org/officeDocument/2006/relationships" xmlns:p="http://schemas.openxmlformats.org/presentationml/2006/main">
+  <p:cSld>
+    <p:spTree>
+      <p:nvGrpSpPr>
+        <p:cNvPr id="1" name=""/>
+        <p:cNvGrpSpPr/>
+        <p:nvPr/>
+      </p:nvGrpSpPr>
+      <p:grpSpPr>
+        <a:xfrm>
+          <a:off x="0" y="0"/>
+          <a:ext cx="0" cy="0"/>
+          <a:chOff x="0" y="0"/>
+          <a:chExt cx="0" cy="0"/>
+        </a:xfrm>
+      </p:grpSpPr>
+      <p:sp>
+        <p:nvSpPr>
+          <p:cNvPr id="2" name="Title 1"/>
+          <p:cNvSpPr>
+            <a:spLocks noGrp="1"/>
+          </p:cNvSpPr>
+          <p:nvPr>
+            <p:ph type="title"/>
+          </p:nvPr>
+        </p:nvSpPr>
+        <p:spPr/>
+        <p:txBody>
+          <a:bodyPr/>
+          <a:lstStyle/>
+          <a:p>
+            <a:r>
+              <a:rPr lang="en-IN" dirty="0" smtClean="0"/>
+              <a:t>3. Results</a:t>
+            </a:r>
+            <a:endParaRPr lang="en-IN" dirty="0"/>
+          </a:p>
+        </p:txBody>
+      </p:sp>
+      <p:sp>
+        <p:nvSpPr>
+          <p:cNvPr id="3" name="Content Placeholder 2"/>
+          <p:cNvSpPr>
+            <a:spLocks noGrp="1"/>
+          </p:cNvSpPr>
+          <p:nvPr>
+            <p:ph idx="1"/>
+          </p:nvPr>
+        </p:nvSpPr>
+        <p:spPr/>
+        <p:txBody>
+          <a:bodyPr/>
+          <a:lstStyle/>
+          <a:p>
+            <a:endParaRPr lang="en-IN" dirty="0"/>
+          </a:p>
+        </p:txBody>
+      </p:sp>
+    </p:spTree>
+    <p:extLst>
+      <p:ext uri="{BB962C8B-B14F-4D97-AF65-F5344CB8AC3E}">
+        <p14:creationId xmlns:p14="http://schemas.microsoft.com/office/powerpoint/2010/main" val="538683382"/>
+      </p:ext>
+    </p:extLst>
+  </p:cSld>
+  <p:clrMapOvr>
+    <a:masterClrMapping/>
+  </p:clrMapOvr>
+  <p:timing>
+    <p:tnLst>
+      <p:par>
+        <p:cTn id="1" dur="indefinite" restart="never" nodeType="tmRoot"/>
+      </p:par>
+    </p:tnLst>
+  </p:timing>
 </p:sld>
 </file>
 

</xml_diff>

<commit_message>
added results, made format changes
</commit_message>
<xml_diff>
--- a/Project/Presentation.pptx
+++ b/Project/Presentation.pptx
@@ -9,13 +9,14 @@
     <p:sldId id="257" r:id="rId3"/>
     <p:sldId id="258" r:id="rId4"/>
     <p:sldId id="259" r:id="rId5"/>
-    <p:sldId id="260" r:id="rId6"/>
-    <p:sldId id="264" r:id="rId7"/>
-    <p:sldId id="265" r:id="rId8"/>
-    <p:sldId id="266" r:id="rId9"/>
-    <p:sldId id="261" r:id="rId10"/>
-    <p:sldId id="263" r:id="rId11"/>
-    <p:sldId id="262" r:id="rId12"/>
+    <p:sldId id="267" r:id="rId6"/>
+    <p:sldId id="260" r:id="rId7"/>
+    <p:sldId id="264" r:id="rId8"/>
+    <p:sldId id="265" r:id="rId9"/>
+    <p:sldId id="266" r:id="rId10"/>
+    <p:sldId id="268" r:id="rId11"/>
+    <p:sldId id="261" r:id="rId12"/>
+    <p:sldId id="262" r:id="rId13"/>
   </p:sldIdLst>
   <p:sldSz cx="12192000" cy="6858000"/>
   <p:notesSz cx="6858000" cy="9144000"/>
@@ -253,7 +254,7 @@
           <a:p>
             <a:fld id="{B2D0CF44-E440-43D6-9C2C-A2A207973FB3}" type="datetimeFigureOut">
               <a:rPr lang="en-IN" smtClean="0"/>
-              <a:t>04-11-2015</a:t>
+              <a:t>05-11-2015</a:t>
             </a:fld>
             <a:endParaRPr lang="en-IN"/>
           </a:p>
@@ -423,7 +424,7 @@
           <a:p>
             <a:fld id="{B2D0CF44-E440-43D6-9C2C-A2A207973FB3}" type="datetimeFigureOut">
               <a:rPr lang="en-IN" smtClean="0"/>
-              <a:t>04-11-2015</a:t>
+              <a:t>05-11-2015</a:t>
             </a:fld>
             <a:endParaRPr lang="en-IN"/>
           </a:p>
@@ -603,7 +604,7 @@
           <a:p>
             <a:fld id="{B2D0CF44-E440-43D6-9C2C-A2A207973FB3}" type="datetimeFigureOut">
               <a:rPr lang="en-IN" smtClean="0"/>
-              <a:t>04-11-2015</a:t>
+              <a:t>05-11-2015</a:t>
             </a:fld>
             <a:endParaRPr lang="en-IN"/>
           </a:p>
@@ -773,7 +774,7 @@
           <a:p>
             <a:fld id="{B2D0CF44-E440-43D6-9C2C-A2A207973FB3}" type="datetimeFigureOut">
               <a:rPr lang="en-IN" smtClean="0"/>
-              <a:t>04-11-2015</a:t>
+              <a:t>05-11-2015</a:t>
             </a:fld>
             <a:endParaRPr lang="en-IN"/>
           </a:p>
@@ -1019,7 +1020,7 @@
           <a:p>
             <a:fld id="{B2D0CF44-E440-43D6-9C2C-A2A207973FB3}" type="datetimeFigureOut">
               <a:rPr lang="en-IN" smtClean="0"/>
-              <a:t>04-11-2015</a:t>
+              <a:t>05-11-2015</a:t>
             </a:fld>
             <a:endParaRPr lang="en-IN"/>
           </a:p>
@@ -1251,7 +1252,7 @@
           <a:p>
             <a:fld id="{B2D0CF44-E440-43D6-9C2C-A2A207973FB3}" type="datetimeFigureOut">
               <a:rPr lang="en-IN" smtClean="0"/>
-              <a:t>04-11-2015</a:t>
+              <a:t>05-11-2015</a:t>
             </a:fld>
             <a:endParaRPr lang="en-IN"/>
           </a:p>
@@ -1618,7 +1619,7 @@
           <a:p>
             <a:fld id="{B2D0CF44-E440-43D6-9C2C-A2A207973FB3}" type="datetimeFigureOut">
               <a:rPr lang="en-IN" smtClean="0"/>
-              <a:t>04-11-2015</a:t>
+              <a:t>05-11-2015</a:t>
             </a:fld>
             <a:endParaRPr lang="en-IN"/>
           </a:p>
@@ -1736,7 +1737,7 @@
           <a:p>
             <a:fld id="{B2D0CF44-E440-43D6-9C2C-A2A207973FB3}" type="datetimeFigureOut">
               <a:rPr lang="en-IN" smtClean="0"/>
-              <a:t>04-11-2015</a:t>
+              <a:t>05-11-2015</a:t>
             </a:fld>
             <a:endParaRPr lang="en-IN"/>
           </a:p>
@@ -1831,7 +1832,7 @@
           <a:p>
             <a:fld id="{B2D0CF44-E440-43D6-9C2C-A2A207973FB3}" type="datetimeFigureOut">
               <a:rPr lang="en-IN" smtClean="0"/>
-              <a:t>04-11-2015</a:t>
+              <a:t>05-11-2015</a:t>
             </a:fld>
             <a:endParaRPr lang="en-IN"/>
           </a:p>
@@ -2108,7 +2109,7 @@
           <a:p>
             <a:fld id="{B2D0CF44-E440-43D6-9C2C-A2A207973FB3}" type="datetimeFigureOut">
               <a:rPr lang="en-IN" smtClean="0"/>
-              <a:t>04-11-2015</a:t>
+              <a:t>05-11-2015</a:t>
             </a:fld>
             <a:endParaRPr lang="en-IN"/>
           </a:p>
@@ -2361,7 +2362,7 @@
           <a:p>
             <a:fld id="{B2D0CF44-E440-43D6-9C2C-A2A207973FB3}" type="datetimeFigureOut">
               <a:rPr lang="en-IN" smtClean="0"/>
-              <a:t>04-11-2015</a:t>
+              <a:t>05-11-2015</a:t>
             </a:fld>
             <a:endParaRPr lang="en-IN"/>
           </a:p>
@@ -2574,7 +2575,7 @@
           <a:p>
             <a:fld id="{B2D0CF44-E440-43D6-9C2C-A2A207973FB3}" type="datetimeFigureOut">
               <a:rPr lang="en-IN" smtClean="0"/>
-              <a:t>04-11-2015</a:t>
+              <a:t>05-11-2015</a:t>
             </a:fld>
             <a:endParaRPr lang="en-IN"/>
           </a:p>
@@ -3101,14 +3102,22 @@
         </p:nvSpPr>
         <p:spPr/>
         <p:txBody>
-          <a:bodyPr/>
-          <a:lstStyle/>
-          <a:p>
-            <a:r>
-              <a:rPr lang="en-IN" dirty="0" smtClean="0"/>
-              <a:t>4. Comparative study</a:t>
-            </a:r>
-            <a:endParaRPr lang="en-IN" dirty="0"/>
+          <a:bodyPr>
+            <a:normAutofit/>
+          </a:bodyPr>
+          <a:lstStyle/>
+          <a:p>
+            <a:r>
+              <a:rPr lang="en-IN" sz="3200" b="1" dirty="0" smtClean="0">
+                <a:latin typeface="Times New Roman" panose="02020603050405020304" pitchFamily="18" charset="0"/>
+                <a:cs typeface="Times New Roman" panose="02020603050405020304" pitchFamily="18" charset="0"/>
+              </a:rPr>
+              <a:t>Outline:</a:t>
+            </a:r>
+            <a:endParaRPr lang="en-IN" sz="3200" b="1" dirty="0">
+              <a:latin typeface="Times New Roman" panose="02020603050405020304" pitchFamily="18" charset="0"/>
+              <a:cs typeface="Times New Roman" panose="02020603050405020304" pitchFamily="18" charset="0"/>
+            </a:endParaRPr>
           </a:p>
         </p:txBody>
       </p:sp>
@@ -3122,25 +3131,154 @@
             <p:ph idx="1"/>
           </p:nvPr>
         </p:nvSpPr>
-        <p:spPr/>
-        <p:txBody>
-          <a:bodyPr/>
-          <a:lstStyle/>
-          <a:p>
-            <a:endParaRPr lang="en-IN"/>
+        <p:spPr>
+          <a:xfrm>
+            <a:off x="838200" y="1690688"/>
+            <a:ext cx="10515600" cy="4486275"/>
+          </a:xfrm>
+        </p:spPr>
+        <p:txBody>
+          <a:bodyPr>
+            <a:normAutofit/>
+          </a:bodyPr>
+          <a:lstStyle/>
+          <a:p>
+            <a:pPr marL="514350" indent="-514350">
+              <a:buFont typeface="+mj-lt"/>
+              <a:buAutoNum type="arabicPeriod"/>
+            </a:pPr>
+            <a:r>
+              <a:rPr lang="en-IN" sz="2400" dirty="0" smtClean="0">
+                <a:latin typeface="Times New Roman" panose="02020603050405020304" pitchFamily="18" charset="0"/>
+                <a:cs typeface="Times New Roman" panose="02020603050405020304" pitchFamily="18" charset="0"/>
+              </a:rPr>
+              <a:t>Introduction</a:t>
+            </a:r>
+          </a:p>
+          <a:p>
+            <a:pPr marL="457200" lvl="1" indent="0">
+              <a:buNone/>
+            </a:pPr>
+            <a:r>
+              <a:rPr lang="en-IN" dirty="0" smtClean="0">
+                <a:latin typeface="Times New Roman" panose="02020603050405020304" pitchFamily="18" charset="0"/>
+                <a:cs typeface="Times New Roman" panose="02020603050405020304" pitchFamily="18" charset="0"/>
+              </a:rPr>
+              <a:t>1.A. Histogram </a:t>
+            </a:r>
+          </a:p>
+          <a:p>
+            <a:pPr marL="457200" lvl="1" indent="0">
+              <a:buNone/>
+            </a:pPr>
+            <a:r>
+              <a:rPr lang="en-IN" dirty="0" smtClean="0">
+                <a:latin typeface="Times New Roman" panose="02020603050405020304" pitchFamily="18" charset="0"/>
+                <a:cs typeface="Times New Roman" panose="02020603050405020304" pitchFamily="18" charset="0"/>
+              </a:rPr>
+              <a:t>1.B. Histogram Equalization</a:t>
+            </a:r>
+          </a:p>
+          <a:p>
+            <a:pPr marL="457200" lvl="1" indent="0">
+              <a:buNone/>
+            </a:pPr>
+            <a:r>
+              <a:rPr lang="en-IN" dirty="0" smtClean="0">
+                <a:latin typeface="Times New Roman" panose="02020603050405020304" pitchFamily="18" charset="0"/>
+                <a:cs typeface="Times New Roman" panose="02020603050405020304" pitchFamily="18" charset="0"/>
+              </a:rPr>
+              <a:t>1.C. Types of HE    </a:t>
+            </a:r>
+          </a:p>
+          <a:p>
+            <a:pPr marL="514350" indent="-514350">
+              <a:buFont typeface="+mj-lt"/>
+              <a:buAutoNum type="arabicPeriod"/>
+            </a:pPr>
+            <a:r>
+              <a:rPr lang="en-IN" sz="2400" dirty="0" smtClean="0">
+                <a:latin typeface="Times New Roman" panose="02020603050405020304" pitchFamily="18" charset="0"/>
+                <a:cs typeface="Times New Roman" panose="02020603050405020304" pitchFamily="18" charset="0"/>
+              </a:rPr>
+              <a:t>Technical discussion</a:t>
+            </a:r>
+          </a:p>
+          <a:p>
+            <a:pPr marL="514350" indent="-514350">
+              <a:buFont typeface="+mj-lt"/>
+              <a:buAutoNum type="arabicPeriod"/>
+            </a:pPr>
+            <a:r>
+              <a:rPr lang="en-IN" sz="2400" b="1" dirty="0" smtClean="0">
+                <a:latin typeface="Times New Roman" panose="02020603050405020304" pitchFamily="18" charset="0"/>
+                <a:cs typeface="Times New Roman" panose="02020603050405020304" pitchFamily="18" charset="0"/>
+              </a:rPr>
+              <a:t>Results</a:t>
+            </a:r>
+          </a:p>
+          <a:p>
+            <a:pPr marL="514350" indent="-514350">
+              <a:buFont typeface="+mj-lt"/>
+              <a:buAutoNum type="arabicPeriod"/>
+            </a:pPr>
+            <a:r>
+              <a:rPr lang="en-IN" sz="2400" dirty="0" smtClean="0">
+                <a:latin typeface="Times New Roman" panose="02020603050405020304" pitchFamily="18" charset="0"/>
+                <a:cs typeface="Times New Roman" panose="02020603050405020304" pitchFamily="18" charset="0"/>
+              </a:rPr>
+              <a:t>Comparative study</a:t>
+            </a:r>
+          </a:p>
+          <a:p>
+            <a:pPr marL="514350" indent="-514350">
+              <a:buFont typeface="+mj-lt"/>
+              <a:buAutoNum type="arabicPeriod"/>
+            </a:pPr>
+            <a:r>
+              <a:rPr lang="en-IN" sz="2400" dirty="0" smtClean="0">
+                <a:latin typeface="Times New Roman" panose="02020603050405020304" pitchFamily="18" charset="0"/>
+                <a:cs typeface="Times New Roman" panose="02020603050405020304" pitchFamily="18" charset="0"/>
+              </a:rPr>
+              <a:t>Conclusions</a:t>
+            </a:r>
+          </a:p>
+          <a:p>
+            <a:pPr marL="514350" indent="-514350">
+              <a:buFont typeface="+mj-lt"/>
+              <a:buAutoNum type="arabicPeriod"/>
+            </a:pPr>
+            <a:r>
+              <a:rPr lang="en-IN" sz="2400" dirty="0" smtClean="0">
+                <a:latin typeface="Times New Roman" panose="02020603050405020304" pitchFamily="18" charset="0"/>
+                <a:cs typeface="Times New Roman" panose="02020603050405020304" pitchFamily="18" charset="0"/>
+              </a:rPr>
+              <a:t>Questions &amp; Answers</a:t>
+            </a:r>
+            <a:endParaRPr lang="en-IN" sz="2400" dirty="0">
+              <a:latin typeface="Times New Roman" panose="02020603050405020304" pitchFamily="18" charset="0"/>
+              <a:cs typeface="Times New Roman" panose="02020603050405020304" pitchFamily="18" charset="0"/>
+            </a:endParaRPr>
           </a:p>
         </p:txBody>
       </p:sp>
     </p:spTree>
     <p:extLst>
       <p:ext uri="{BB962C8B-B14F-4D97-AF65-F5344CB8AC3E}">
-        <p14:creationId xmlns:p14="http://schemas.microsoft.com/office/powerpoint/2010/main" val="3614991796"/>
+        <p14:creationId xmlns:p14="http://schemas.microsoft.com/office/powerpoint/2010/main" val="202779880"/>
       </p:ext>
     </p:extLst>
   </p:cSld>
   <p:clrMapOvr>
     <a:masterClrMapping/>
   </p:clrMapOvr>
+  <p:timing>
+    <p:tnLst>
+      <p:par>
+        <p:cTn id="1" dur="indefinite" restart="never" nodeType="tmRoot"/>
+      </p:par>
+    </p:tnLst>
+  </p:timing>
 </p:sld>
 </file>
 
@@ -3171,6 +3309,355 @@
             <p:ph type="title"/>
           </p:nvPr>
         </p:nvSpPr>
+        <p:spPr>
+          <a:xfrm>
+            <a:off x="838200" y="365125"/>
+            <a:ext cx="10515600" cy="677863"/>
+          </a:xfrm>
+        </p:spPr>
+        <p:txBody>
+          <a:bodyPr>
+            <a:normAutofit/>
+          </a:bodyPr>
+          <a:lstStyle/>
+          <a:p>
+            <a:r>
+              <a:rPr lang="en-IN" sz="3200" b="1" dirty="0" smtClean="0">
+                <a:latin typeface="Times New Roman" panose="02020603050405020304" pitchFamily="18" charset="0"/>
+                <a:cs typeface="Times New Roman" panose="02020603050405020304" pitchFamily="18" charset="0"/>
+              </a:rPr>
+              <a:t>3. Results</a:t>
+            </a:r>
+            <a:endParaRPr lang="en-IN" sz="3200" b="1" dirty="0">
+              <a:latin typeface="Times New Roman" panose="02020603050405020304" pitchFamily="18" charset="0"/>
+              <a:cs typeface="Times New Roman" panose="02020603050405020304" pitchFamily="18" charset="0"/>
+            </a:endParaRPr>
+          </a:p>
+        </p:txBody>
+      </p:sp>
+      <p:pic>
+        <p:nvPicPr>
+          <p:cNvPr id="8" name="Content Placeholder 7"/>
+          <p:cNvPicPr>
+            <a:picLocks noGrp="1" noChangeAspect="1"/>
+          </p:cNvPicPr>
+          <p:nvPr>
+            <p:ph idx="1"/>
+          </p:nvPr>
+        </p:nvPicPr>
+        <p:blipFill>
+          <a:blip r:embed="rId2" cstate="print">
+            <a:extLst>
+              <a:ext uri="{28A0092B-C50C-407E-A947-70E740481C1C}">
+                <a14:useLocalDpi xmlns:a14="http://schemas.microsoft.com/office/drawing/2010/main" val="0"/>
+              </a:ext>
+            </a:extLst>
+          </a:blip>
+          <a:stretch>
+            <a:fillRect/>
+          </a:stretch>
+        </p:blipFill>
+        <p:spPr>
+          <a:xfrm>
+            <a:off x="838199" y="1228717"/>
+            <a:ext cx="3890963" cy="2571750"/>
+          </a:xfrm>
+        </p:spPr>
+      </p:pic>
+      <p:pic>
+        <p:nvPicPr>
+          <p:cNvPr id="9" name="Picture 8"/>
+          <p:cNvPicPr>
+            <a:picLocks noChangeAspect="1"/>
+          </p:cNvPicPr>
+          <p:nvPr/>
+        </p:nvPicPr>
+        <p:blipFill>
+          <a:blip r:embed="rId3"/>
+          <a:stretch>
+            <a:fillRect/>
+          </a:stretch>
+        </p:blipFill>
+        <p:spPr>
+          <a:xfrm>
+            <a:off x="5872163" y="1107273"/>
+            <a:ext cx="4029075" cy="2814637"/>
+          </a:xfrm>
+          <a:prstGeom prst="rect">
+            <a:avLst/>
+          </a:prstGeom>
+        </p:spPr>
+      </p:pic>
+      <p:pic>
+        <p:nvPicPr>
+          <p:cNvPr id="10" name="Picture 9"/>
+          <p:cNvPicPr>
+            <a:picLocks noChangeAspect="1"/>
+          </p:cNvPicPr>
+          <p:nvPr/>
+        </p:nvPicPr>
+        <p:blipFill>
+          <a:blip r:embed="rId4"/>
+          <a:stretch>
+            <a:fillRect/>
+          </a:stretch>
+        </p:blipFill>
+        <p:spPr>
+          <a:xfrm>
+            <a:off x="838198" y="4114799"/>
+            <a:ext cx="3890963" cy="2576513"/>
+          </a:xfrm>
+          <a:prstGeom prst="rect">
+            <a:avLst/>
+          </a:prstGeom>
+        </p:spPr>
+      </p:pic>
+      <p:pic>
+        <p:nvPicPr>
+          <p:cNvPr id="11" name="Picture 10"/>
+          <p:cNvPicPr>
+            <a:picLocks noChangeAspect="1"/>
+          </p:cNvPicPr>
+          <p:nvPr/>
+        </p:nvPicPr>
+        <p:blipFill>
+          <a:blip r:embed="rId5"/>
+          <a:stretch>
+            <a:fillRect/>
+          </a:stretch>
+        </p:blipFill>
+        <p:spPr>
+          <a:xfrm>
+            <a:off x="5976937" y="4114798"/>
+            <a:ext cx="3924301" cy="2576513"/>
+          </a:xfrm>
+          <a:prstGeom prst="rect">
+            <a:avLst/>
+          </a:prstGeom>
+        </p:spPr>
+      </p:pic>
+      <p:sp>
+        <p:nvSpPr>
+          <p:cNvPr id="12" name="TextBox 11"/>
+          <p:cNvSpPr txBox="1"/>
+          <p:nvPr/>
+        </p:nvSpPr>
+        <p:spPr>
+          <a:xfrm>
+            <a:off x="4729161" y="3598744"/>
+            <a:ext cx="1247776" cy="646331"/>
+          </a:xfrm>
+          <a:prstGeom prst="rect">
+            <a:avLst/>
+          </a:prstGeom>
+          <a:noFill/>
+        </p:spPr>
+        <p:txBody>
+          <a:bodyPr wrap="square" rtlCol="0">
+            <a:spAutoFit/>
+          </a:bodyPr>
+          <a:lstStyle/>
+          <a:p>
+            <a:r>
+              <a:rPr lang="en-IN" dirty="0" smtClean="0"/>
+              <a:t>a               b</a:t>
+            </a:r>
+          </a:p>
+          <a:p>
+            <a:r>
+              <a:rPr lang="en-IN" dirty="0"/>
+              <a:t>c</a:t>
+            </a:r>
+            <a:r>
+              <a:rPr lang="en-IN" dirty="0" smtClean="0"/>
+              <a:t>               d</a:t>
+            </a:r>
+            <a:endParaRPr lang="en-IN" dirty="0"/>
+          </a:p>
+        </p:txBody>
+      </p:sp>
+      <p:sp>
+        <p:nvSpPr>
+          <p:cNvPr id="13" name="TextBox 12"/>
+          <p:cNvSpPr txBox="1"/>
+          <p:nvPr/>
+        </p:nvSpPr>
+        <p:spPr>
+          <a:xfrm>
+            <a:off x="9954795" y="4643438"/>
+            <a:ext cx="2377639" cy="1754326"/>
+          </a:xfrm>
+          <a:prstGeom prst="rect">
+            <a:avLst/>
+          </a:prstGeom>
+          <a:noFill/>
+        </p:spPr>
+        <p:txBody>
+          <a:bodyPr wrap="none" rtlCol="0">
+            <a:spAutoFit/>
+          </a:bodyPr>
+          <a:lstStyle/>
+          <a:p>
+            <a:pPr marL="342900" indent="-342900">
+              <a:buAutoNum type="alphaLcPeriod"/>
+            </a:pPr>
+            <a:r>
+              <a:rPr lang="en-IN" dirty="0" smtClean="0">
+                <a:latin typeface="Times New Roman" panose="02020603050405020304" pitchFamily="18" charset="0"/>
+                <a:cs typeface="Times New Roman" panose="02020603050405020304" pitchFamily="18" charset="0"/>
+              </a:rPr>
+              <a:t>Original Arctic hare</a:t>
+            </a:r>
+          </a:p>
+          <a:p>
+            <a:pPr marL="342900" indent="-342900">
+              <a:buAutoNum type="alphaLcPeriod"/>
+            </a:pPr>
+            <a:r>
+              <a:rPr lang="en-IN" dirty="0" err="1" smtClean="0">
+                <a:latin typeface="Times New Roman" panose="02020603050405020304" pitchFamily="18" charset="0"/>
+                <a:cs typeface="Times New Roman" panose="02020603050405020304" pitchFamily="18" charset="0"/>
+              </a:rPr>
+              <a:t>Gray</a:t>
+            </a:r>
+            <a:r>
+              <a:rPr lang="en-IN" dirty="0" smtClean="0">
+                <a:latin typeface="Times New Roman" panose="02020603050405020304" pitchFamily="18" charset="0"/>
+                <a:cs typeface="Times New Roman" panose="02020603050405020304" pitchFamily="18" charset="0"/>
+              </a:rPr>
+              <a:t> scale image</a:t>
+            </a:r>
+          </a:p>
+          <a:p>
+            <a:pPr marL="342900" indent="-342900">
+              <a:buAutoNum type="alphaLcPeriod"/>
+            </a:pPr>
+            <a:r>
+              <a:rPr lang="en-IN" dirty="0" smtClean="0">
+                <a:latin typeface="Times New Roman" panose="02020603050405020304" pitchFamily="18" charset="0"/>
+                <a:cs typeface="Times New Roman" panose="02020603050405020304" pitchFamily="18" charset="0"/>
+              </a:rPr>
+              <a:t>Enhanced by</a:t>
+            </a:r>
+          </a:p>
+          <a:p>
+            <a:r>
+              <a:rPr lang="en-IN" dirty="0">
+                <a:latin typeface="Times New Roman" panose="02020603050405020304" pitchFamily="18" charset="0"/>
+                <a:cs typeface="Times New Roman" panose="02020603050405020304" pitchFamily="18" charset="0"/>
+              </a:rPr>
+              <a:t> </a:t>
+            </a:r>
+            <a:r>
+              <a:rPr lang="en-IN" dirty="0" smtClean="0">
+                <a:latin typeface="Times New Roman" panose="02020603050405020304" pitchFamily="18" charset="0"/>
+                <a:cs typeface="Times New Roman" panose="02020603050405020304" pitchFamily="18" charset="0"/>
+              </a:rPr>
+              <a:t>       MMBEHBE</a:t>
+            </a:r>
+          </a:p>
+          <a:p>
+            <a:pPr marL="342900" indent="-342900">
+              <a:buAutoNum type="alphaLcPeriod" startAt="4"/>
+            </a:pPr>
+            <a:r>
+              <a:rPr lang="en-IN" dirty="0" smtClean="0">
+                <a:latin typeface="Times New Roman" panose="02020603050405020304" pitchFamily="18" charset="0"/>
+                <a:cs typeface="Times New Roman" panose="02020603050405020304" pitchFamily="18" charset="0"/>
+              </a:rPr>
+              <a:t>WTHE with </a:t>
+            </a:r>
+            <a:r>
+              <a:rPr lang="en-IN" i="1" dirty="0" smtClean="0">
+                <a:latin typeface="Times New Roman" panose="02020603050405020304" pitchFamily="18" charset="0"/>
+                <a:cs typeface="Times New Roman" panose="02020603050405020304" pitchFamily="18" charset="0"/>
+              </a:rPr>
+              <a:t>r</a:t>
+            </a:r>
+            <a:r>
+              <a:rPr lang="en-IN" dirty="0" smtClean="0">
+                <a:latin typeface="Times New Roman" panose="02020603050405020304" pitchFamily="18" charset="0"/>
+                <a:cs typeface="Times New Roman" panose="02020603050405020304" pitchFamily="18" charset="0"/>
+              </a:rPr>
+              <a:t>=0.5</a:t>
+            </a:r>
+          </a:p>
+          <a:p>
+            <a:r>
+              <a:rPr lang="en-IN" dirty="0" smtClean="0">
+                <a:latin typeface="Times New Roman" panose="02020603050405020304" pitchFamily="18" charset="0"/>
+                <a:cs typeface="Times New Roman" panose="02020603050405020304" pitchFamily="18" charset="0"/>
+              </a:rPr>
+              <a:t>       </a:t>
+            </a:r>
+            <a:r>
+              <a:rPr lang="en-IN" i="1" dirty="0" smtClean="0">
+                <a:latin typeface="Times New Roman" panose="02020603050405020304" pitchFamily="18" charset="0"/>
+                <a:cs typeface="Times New Roman" panose="02020603050405020304" pitchFamily="18" charset="0"/>
+              </a:rPr>
+              <a:t>v</a:t>
+            </a:r>
+            <a:r>
+              <a:rPr lang="en-IN" dirty="0" smtClean="0">
+                <a:latin typeface="Times New Roman" panose="02020603050405020304" pitchFamily="18" charset="0"/>
+                <a:cs typeface="Times New Roman" panose="02020603050405020304" pitchFamily="18" charset="0"/>
+              </a:rPr>
+              <a:t>=0.5</a:t>
+            </a:r>
+            <a:endParaRPr lang="en-IN" dirty="0">
+              <a:latin typeface="Times New Roman" panose="02020603050405020304" pitchFamily="18" charset="0"/>
+              <a:cs typeface="Times New Roman" panose="02020603050405020304" pitchFamily="18" charset="0"/>
+            </a:endParaRPr>
+          </a:p>
+        </p:txBody>
+      </p:sp>
+    </p:spTree>
+    <p:extLst>
+      <p:ext uri="{BB962C8B-B14F-4D97-AF65-F5344CB8AC3E}">
+        <p14:creationId xmlns:p14="http://schemas.microsoft.com/office/powerpoint/2010/main" val="538683382"/>
+      </p:ext>
+    </p:extLst>
+  </p:cSld>
+  <p:clrMapOvr>
+    <a:masterClrMapping/>
+  </p:clrMapOvr>
+  <p:timing>
+    <p:tnLst>
+      <p:par>
+        <p:cTn id="1" dur="indefinite" restart="never" nodeType="tmRoot"/>
+      </p:par>
+    </p:tnLst>
+  </p:timing>
+</p:sld>
+</file>
+
+<file path=ppt/slides/slide12.xml><?xml version="1.0" encoding="utf-8"?>
+<p:sld xmlns:a="http://schemas.openxmlformats.org/drawingml/2006/main" xmlns:r="http://schemas.openxmlformats.org/officeDocument/2006/relationships" xmlns:p="http://schemas.openxmlformats.org/presentationml/2006/main">
+  <p:cSld>
+    <p:spTree>
+      <p:nvGrpSpPr>
+        <p:cNvPr id="1" name=""/>
+        <p:cNvGrpSpPr/>
+        <p:nvPr/>
+      </p:nvGrpSpPr>
+      <p:grpSpPr>
+        <a:xfrm>
+          <a:off x="0" y="0"/>
+          <a:ext cx="0" cy="0"/>
+          <a:chOff x="0" y="0"/>
+          <a:chExt cx="0" cy="0"/>
+        </a:xfrm>
+      </p:grpSpPr>
+      <p:sp>
+        <p:nvSpPr>
+          <p:cNvPr id="2" name="Title 1"/>
+          <p:cNvSpPr>
+            <a:spLocks noGrp="1"/>
+          </p:cNvSpPr>
+          <p:nvPr>
+            <p:ph type="title"/>
+          </p:nvPr>
+        </p:nvSpPr>
         <p:spPr/>
         <p:txBody>
           <a:bodyPr/>
@@ -3203,7 +3690,7 @@
           <a:bodyPr/>
           <a:lstStyle/>
           <a:p>
-            <a:endParaRPr lang="en-IN"/>
+            <a:endParaRPr lang="en-IN" dirty="0"/>
           </a:p>
         </p:txBody>
       </p:sp>
@@ -3255,10 +3742,16 @@
           <a:lstStyle/>
           <a:p>
             <a:r>
-              <a:rPr lang="en-IN" sz="3200" dirty="0" smtClean="0"/>
+              <a:rPr lang="en-IN" sz="3200" b="1" dirty="0" smtClean="0">
+                <a:latin typeface="Times New Roman" panose="02020603050405020304" pitchFamily="18" charset="0"/>
+                <a:cs typeface="Times New Roman" panose="02020603050405020304" pitchFamily="18" charset="0"/>
+              </a:rPr>
               <a:t>Outline:</a:t>
             </a:r>
-            <a:endParaRPr lang="en-IN" sz="3200" dirty="0"/>
+            <a:endParaRPr lang="en-IN" sz="3200" b="1" dirty="0">
+              <a:latin typeface="Times New Roman" panose="02020603050405020304" pitchFamily="18" charset="0"/>
+              <a:cs typeface="Times New Roman" panose="02020603050405020304" pitchFamily="18" charset="0"/>
+            </a:endParaRPr>
           </a:p>
         </p:txBody>
       </p:sp>
@@ -3289,7 +3782,10 @@
               <a:buAutoNum type="arabicPeriod"/>
             </a:pPr>
             <a:r>
-              <a:rPr lang="en-IN" sz="2400" dirty="0" smtClean="0"/>
+              <a:rPr lang="en-IN" sz="2400" b="1" dirty="0" smtClean="0">
+                <a:latin typeface="Times New Roman" panose="02020603050405020304" pitchFamily="18" charset="0"/>
+                <a:cs typeface="Times New Roman" panose="02020603050405020304" pitchFamily="18" charset="0"/>
+              </a:rPr>
               <a:t>Introduction</a:t>
             </a:r>
           </a:p>
@@ -3298,7 +3794,10 @@
               <a:buNone/>
             </a:pPr>
             <a:r>
-              <a:rPr lang="en-IN" sz="2200" dirty="0" smtClean="0"/>
+              <a:rPr lang="en-IN" dirty="0" smtClean="0">
+                <a:latin typeface="Times New Roman" panose="02020603050405020304" pitchFamily="18" charset="0"/>
+                <a:cs typeface="Times New Roman" panose="02020603050405020304" pitchFamily="18" charset="0"/>
+              </a:rPr>
               <a:t>1.A. Histogram </a:t>
             </a:r>
           </a:p>
@@ -3307,7 +3806,10 @@
               <a:buNone/>
             </a:pPr>
             <a:r>
-              <a:rPr lang="en-IN" sz="2200" dirty="0" smtClean="0"/>
+              <a:rPr lang="en-IN" dirty="0" smtClean="0">
+                <a:latin typeface="Times New Roman" panose="02020603050405020304" pitchFamily="18" charset="0"/>
+                <a:cs typeface="Times New Roman" panose="02020603050405020304" pitchFamily="18" charset="0"/>
+              </a:rPr>
               <a:t>1.B. Histogram Equalization</a:t>
             </a:r>
           </a:p>
@@ -3316,7 +3818,10 @@
               <a:buNone/>
             </a:pPr>
             <a:r>
-              <a:rPr lang="en-IN" sz="2200" dirty="0" smtClean="0"/>
+              <a:rPr lang="en-IN" dirty="0" smtClean="0">
+                <a:latin typeface="Times New Roman" panose="02020603050405020304" pitchFamily="18" charset="0"/>
+                <a:cs typeface="Times New Roman" panose="02020603050405020304" pitchFamily="18" charset="0"/>
+              </a:rPr>
               <a:t>1.C. Types of HE    </a:t>
             </a:r>
           </a:p>
@@ -3326,7 +3831,10 @@
               <a:buAutoNum type="arabicPeriod"/>
             </a:pPr>
             <a:r>
-              <a:rPr lang="en-IN" sz="2400" dirty="0" smtClean="0"/>
+              <a:rPr lang="en-IN" sz="2400" dirty="0" smtClean="0">
+                <a:latin typeface="Times New Roman" panose="02020603050405020304" pitchFamily="18" charset="0"/>
+                <a:cs typeface="Times New Roman" panose="02020603050405020304" pitchFamily="18" charset="0"/>
+              </a:rPr>
               <a:t>Technical discussion</a:t>
             </a:r>
           </a:p>
@@ -3336,10 +3844,12 @@
               <a:buAutoNum type="arabicPeriod"/>
             </a:pPr>
             <a:r>
-              <a:rPr lang="en-IN" sz="2400" dirty="0" smtClean="0"/>
+              <a:rPr lang="en-IN" sz="2400" dirty="0" smtClean="0">
+                <a:latin typeface="Times New Roman" panose="02020603050405020304" pitchFamily="18" charset="0"/>
+                <a:cs typeface="Times New Roman" panose="02020603050405020304" pitchFamily="18" charset="0"/>
+              </a:rPr>
               <a:t>Results</a:t>
             </a:r>
-            <a:endParaRPr lang="en-IN" sz="2400" dirty="0" smtClean="0"/>
           </a:p>
           <a:p>
             <a:pPr marL="514350" indent="-514350">
@@ -3347,9 +3857,23 @@
               <a:buAutoNum type="arabicPeriod"/>
             </a:pPr>
             <a:r>
-              <a:rPr lang="en-IN" sz="2400" dirty="0" smtClean="0"/>
-              <a:t>Comparative study</a:t>
-            </a:r>
+              <a:rPr lang="en-IN" sz="2400" dirty="0" smtClean="0">
+                <a:latin typeface="Times New Roman" panose="02020603050405020304" pitchFamily="18" charset="0"/>
+                <a:cs typeface="Times New Roman" panose="02020603050405020304" pitchFamily="18" charset="0"/>
+              </a:rPr>
+              <a:t>Summary </a:t>
+            </a:r>
+            <a:r>
+              <a:rPr lang="en-IN" sz="2400" smtClean="0">
+                <a:latin typeface="Times New Roman" panose="02020603050405020304" pitchFamily="18" charset="0"/>
+                <a:cs typeface="Times New Roman" panose="02020603050405020304" pitchFamily="18" charset="0"/>
+              </a:rPr>
+              <a:t>&amp; Conclusions</a:t>
+            </a:r>
+            <a:endParaRPr lang="en-IN" sz="2400" dirty="0" smtClean="0">
+              <a:latin typeface="Times New Roman" panose="02020603050405020304" pitchFamily="18" charset="0"/>
+              <a:cs typeface="Times New Roman" panose="02020603050405020304" pitchFamily="18" charset="0"/>
+            </a:endParaRPr>
           </a:p>
           <a:p>
             <a:pPr marL="514350" indent="-514350">
@@ -3357,20 +3881,16 @@
               <a:buAutoNum type="arabicPeriod"/>
             </a:pPr>
             <a:r>
-              <a:rPr lang="en-IN" sz="2400" dirty="0" smtClean="0"/>
-              <a:t>Conclusions</a:t>
-            </a:r>
-          </a:p>
-          <a:p>
-            <a:pPr marL="514350" indent="-514350">
-              <a:buFont typeface="+mj-lt"/>
-              <a:buAutoNum type="arabicPeriod"/>
-            </a:pPr>
-            <a:r>
-              <a:rPr lang="en-IN" sz="2400" dirty="0" smtClean="0"/>
+              <a:rPr lang="en-IN" sz="2400" dirty="0" smtClean="0">
+                <a:latin typeface="Times New Roman" panose="02020603050405020304" pitchFamily="18" charset="0"/>
+                <a:cs typeface="Times New Roman" panose="02020603050405020304" pitchFamily="18" charset="0"/>
+              </a:rPr>
               <a:t>Questions &amp; Answers</a:t>
             </a:r>
-            <a:endParaRPr lang="en-IN" sz="2400" dirty="0"/>
+            <a:endParaRPr lang="en-IN" sz="2400" dirty="0">
+              <a:latin typeface="Times New Roman" panose="02020603050405020304" pitchFamily="18" charset="0"/>
+              <a:cs typeface="Times New Roman" panose="02020603050405020304" pitchFamily="18" charset="0"/>
+            </a:endParaRPr>
           </a:p>
         </p:txBody>
       </p:sp>
@@ -3423,7 +3943,7 @@
         </p:nvSpPr>
         <p:spPr>
           <a:xfrm>
-            <a:off x="838200" y="365126"/>
+            <a:off x="838200" y="536576"/>
             <a:ext cx="10515600" cy="573658"/>
           </a:xfrm>
         </p:spPr>
@@ -3434,13 +3954,13 @@
           <a:lstStyle/>
           <a:p>
             <a:r>
-              <a:rPr lang="en-IN" sz="3200" dirty="0" smtClean="0">
+              <a:rPr lang="en-IN" sz="3200" b="1" dirty="0" smtClean="0">
                 <a:latin typeface="Times New Roman" panose="02020603050405020304" pitchFamily="18" charset="0"/>
                 <a:cs typeface="Times New Roman" panose="02020603050405020304" pitchFamily="18" charset="0"/>
               </a:rPr>
               <a:t>1. Introduction.</a:t>
             </a:r>
-            <a:endParaRPr lang="en-IN" sz="3200" dirty="0">
+            <a:endParaRPr lang="en-IN" sz="3200" b="1" dirty="0">
               <a:latin typeface="Times New Roman" panose="02020603050405020304" pitchFamily="18" charset="0"/>
               <a:cs typeface="Times New Roman" panose="02020603050405020304" pitchFamily="18" charset="0"/>
             </a:endParaRPr>
@@ -3459,7 +3979,7 @@
         </p:nvSpPr>
         <p:spPr>
           <a:xfrm>
-            <a:off x="838200" y="938784"/>
+            <a:off x="838200" y="1338834"/>
             <a:ext cx="10515600" cy="5238179"/>
           </a:xfrm>
         </p:spPr>
@@ -3470,10 +3990,13 @@
           <a:lstStyle/>
           <a:p>
             <a:pPr marL="0" indent="0">
-              <a:buNone/>
-            </a:pPr>
-            <a:r>
-              <a:rPr lang="en-IN" sz="2400" dirty="0" smtClean="0">
+              <a:lnSpc>
+                <a:spcPct val="100000"/>
+              </a:lnSpc>
+              <a:buNone/>
+            </a:pPr>
+            <a:r>
+              <a:rPr lang="en-IN" sz="2400" b="1" dirty="0" smtClean="0">
                 <a:latin typeface="Times New Roman" panose="02020603050405020304" pitchFamily="18" charset="0"/>
                 <a:cs typeface="Times New Roman" panose="02020603050405020304" pitchFamily="18" charset="0"/>
               </a:rPr>
@@ -3481,7 +4004,11 @@
             </a:r>
           </a:p>
           <a:p>
-            <a:pPr lvl="1"/>
+            <a:pPr lvl="1">
+              <a:lnSpc>
+                <a:spcPct val="100000"/>
+              </a:lnSpc>
+            </a:pPr>
             <a:r>
               <a:rPr lang="en-IN" sz="2000" dirty="0" smtClean="0">
                 <a:latin typeface="Times New Roman" panose="02020603050405020304" pitchFamily="18" charset="0"/>
@@ -3491,7 +4018,11 @@
             </a:r>
           </a:p>
           <a:p>
-            <a:pPr lvl="1"/>
+            <a:pPr lvl="1">
+              <a:lnSpc>
+                <a:spcPct val="100000"/>
+              </a:lnSpc>
+            </a:pPr>
             <a:r>
               <a:rPr lang="en-IN" sz="2000" dirty="0" smtClean="0">
                 <a:latin typeface="Times New Roman" panose="02020603050405020304" pitchFamily="18" charset="0"/>
@@ -3502,18 +4033,32 @@
           </a:p>
           <a:p>
             <a:pPr marL="0" indent="0">
-              <a:buNone/>
-            </a:pPr>
-            <a:r>
-              <a:rPr lang="en-IN" sz="2400" dirty="0" smtClean="0">
-                <a:latin typeface="Times New Roman" panose="02020603050405020304" pitchFamily="18" charset="0"/>
-                <a:cs typeface="Times New Roman" panose="02020603050405020304" pitchFamily="18" charset="0"/>
-              </a:rPr>
-              <a:t>1.B. Histogram Equalization:</a:t>
-            </a:r>
-          </a:p>
-          <a:p>
-            <a:pPr lvl="1"/>
+              <a:lnSpc>
+                <a:spcPct val="100000"/>
+              </a:lnSpc>
+              <a:buNone/>
+            </a:pPr>
+            <a:r>
+              <a:rPr lang="en-IN" sz="2400" b="1" dirty="0" smtClean="0">
+                <a:latin typeface="Times New Roman" panose="02020603050405020304" pitchFamily="18" charset="0"/>
+                <a:cs typeface="Times New Roman" panose="02020603050405020304" pitchFamily="18" charset="0"/>
+              </a:rPr>
+              <a:t>1.B</a:t>
+            </a:r>
+            <a:r>
+              <a:rPr lang="en-IN" sz="2400" b="1" dirty="0" smtClean="0">
+                <a:latin typeface="Times New Roman" panose="02020603050405020304" pitchFamily="18" charset="0"/>
+                <a:cs typeface="Times New Roman" panose="02020603050405020304" pitchFamily="18" charset="0"/>
+              </a:rPr>
+              <a:t>. Histogram Equalization:</a:t>
+            </a:r>
+          </a:p>
+          <a:p>
+            <a:pPr lvl="1">
+              <a:lnSpc>
+                <a:spcPct val="100000"/>
+              </a:lnSpc>
+            </a:pPr>
             <a:r>
               <a:rPr lang="en-IN" sz="2000" dirty="0">
                 <a:latin typeface="Times New Roman" panose="02020603050405020304" pitchFamily="18" charset="0"/>
@@ -3530,13 +4075,24 @@
             </a:r>
           </a:p>
           <a:p>
-            <a:pPr lvl="1"/>
+            <a:pPr lvl="1">
+              <a:lnSpc>
+                <a:spcPct val="100000"/>
+              </a:lnSpc>
+            </a:pPr>
             <a:r>
               <a:rPr lang="en-IN" sz="2000" dirty="0" smtClean="0">
                 <a:latin typeface="Times New Roman" panose="02020603050405020304" pitchFamily="18" charset="0"/>
                 <a:cs typeface="Times New Roman" panose="02020603050405020304" pitchFamily="18" charset="0"/>
               </a:rPr>
-              <a:t>The level mapping equation is                               where </a:t>
+              <a:t>The level mapping equation </a:t>
+            </a:r>
+            <a:r>
+              <a:rPr lang="en-IN" sz="2000" dirty="0" smtClean="0">
+                <a:latin typeface="Times New Roman" panose="02020603050405020304" pitchFamily="18" charset="0"/>
+                <a:cs typeface="Times New Roman" panose="02020603050405020304" pitchFamily="18" charset="0"/>
+              </a:rPr>
+              <a:t>is </a:t>
             </a:r>
             <a:r>
               <a:rPr lang="en-IN" sz="2000" i="1" dirty="0" err="1" smtClean="0">
@@ -3557,20 +4113,55 @@
                 <a:latin typeface="Times New Roman" panose="02020603050405020304" pitchFamily="18" charset="0"/>
                 <a:cs typeface="Times New Roman" panose="02020603050405020304" pitchFamily="18" charset="0"/>
               </a:rPr>
-              <a:t> is output leve</a:t>
+              <a:t>=(K-1)</a:t>
+            </a:r>
+            <a:r>
+              <a:rPr lang="en-IN" sz="2000" i="1" dirty="0" err="1" smtClean="0">
+                <a:latin typeface="Times New Roman" panose="02020603050405020304" pitchFamily="18" charset="0"/>
+                <a:cs typeface="Times New Roman" panose="02020603050405020304" pitchFamily="18" charset="0"/>
+              </a:rPr>
+              <a:t>xC</a:t>
             </a:r>
             <a:r>
               <a:rPr lang="en-IN" sz="2000" i="1" dirty="0" smtClean="0">
                 <a:latin typeface="Times New Roman" panose="02020603050405020304" pitchFamily="18" charset="0"/>
                 <a:cs typeface="Times New Roman" panose="02020603050405020304" pitchFamily="18" charset="0"/>
               </a:rPr>
-              <a:t>l, K </a:t>
+              <a:t>(k) </a:t>
             </a:r>
             <a:r>
               <a:rPr lang="en-IN" sz="2000" dirty="0" smtClean="0">
                 <a:latin typeface="Times New Roman" panose="02020603050405020304" pitchFamily="18" charset="0"/>
                 <a:cs typeface="Times New Roman" panose="02020603050405020304" pitchFamily="18" charset="0"/>
               </a:rPr>
+              <a:t>where </a:t>
+            </a:r>
+            <a:r>
+              <a:rPr lang="en-IN" sz="2000" i="1" dirty="0" err="1" smtClean="0">
+                <a:latin typeface="Times New Roman" panose="02020603050405020304" pitchFamily="18" charset="0"/>
+                <a:cs typeface="Times New Roman" panose="02020603050405020304" pitchFamily="18" charset="0"/>
+              </a:rPr>
+              <a:t>H</a:t>
+            </a:r>
+            <a:r>
+              <a:rPr lang="en-IN" sz="2000" i="1" baseline="-25000" dirty="0" err="1" smtClean="0">
+                <a:latin typeface="Times New Roman" panose="02020603050405020304" pitchFamily="18" charset="0"/>
+                <a:cs typeface="Times New Roman" panose="02020603050405020304" pitchFamily="18" charset="0"/>
+              </a:rPr>
+              <a:t>k</a:t>
+            </a:r>
+            <a:r>
+              <a:rPr lang="en-IN" sz="2000" i="1" dirty="0" smtClean="0">
+                <a:latin typeface="Times New Roman" panose="02020603050405020304" pitchFamily="18" charset="0"/>
+                <a:cs typeface="Times New Roman" panose="02020603050405020304" pitchFamily="18" charset="0"/>
+              </a:rPr>
+              <a:t> is output level, K </a:t>
+            </a:r>
+            <a:r>
+              <a:rPr lang="en-IN" sz="2000" dirty="0" smtClean="0">
+                <a:latin typeface="Times New Roman" panose="02020603050405020304" pitchFamily="18" charset="0"/>
+                <a:cs typeface="Times New Roman" panose="02020603050405020304" pitchFamily="18" charset="0"/>
+              </a:rPr>
               <a:t> is range of </a:t>
             </a:r>
             <a:r>
@@ -3603,7 +4194,11 @@
             </a:r>
           </a:p>
           <a:p>
-            <a:pPr lvl="1"/>
+            <a:pPr lvl="1">
+              <a:lnSpc>
+                <a:spcPct val="100000"/>
+              </a:lnSpc>
+            </a:pPr>
             <a:r>
               <a:rPr lang="en-IN" sz="2000" dirty="0" smtClean="0">
                 <a:latin typeface="Times New Roman" panose="02020603050405020304" pitchFamily="18" charset="0"/>
@@ -3612,6 +4207,13 @@
               <a:t>The increment in the output level </a:t>
             </a:r>
             <a:r>
+              <a:rPr lang="el-GR" sz="2000" dirty="0" smtClean="0">
+                <a:latin typeface="Times New Roman" panose="02020603050405020304" pitchFamily="18" charset="0"/>
+                <a:cs typeface="Times New Roman" panose="02020603050405020304" pitchFamily="18" charset="0"/>
+              </a:rPr>
+              <a:t>Δ</a:t>
+            </a:r>
+            <a:r>
               <a:rPr lang="en-IN" sz="2000" i="1" dirty="0" err="1" smtClean="0">
                 <a:latin typeface="Times New Roman" panose="02020603050405020304" pitchFamily="18" charset="0"/>
                 <a:cs typeface="Times New Roman" panose="02020603050405020304" pitchFamily="18" charset="0"/>
@@ -3626,18 +4228,60 @@
               <a:t>k</a:t>
             </a:r>
             <a:r>
-              <a:rPr lang="en-IN" sz="2000" dirty="0">
+              <a:rPr lang="en-IN" sz="2000" dirty="0" smtClean="0">
                 <a:latin typeface="Times New Roman" panose="02020603050405020304" pitchFamily="18" charset="0"/>
                 <a:cs typeface="Times New Roman" panose="02020603050405020304" pitchFamily="18" charset="0"/>
               </a:rPr>
               <a:t> </a:t>
             </a:r>
             <a:r>
+              <a:rPr lang="en-IN" sz="2000" i="1" dirty="0" smtClean="0">
+                <a:latin typeface="Times New Roman" panose="02020603050405020304" pitchFamily="18" charset="0"/>
+                <a:cs typeface="Times New Roman" panose="02020603050405020304" pitchFamily="18" charset="0"/>
+              </a:rPr>
+              <a:t>=</a:t>
+            </a:r>
+            <a:r>
+              <a:rPr lang="en-IN" sz="2000" i="1" dirty="0" err="1" smtClean="0">
+                <a:latin typeface="Times New Roman" panose="02020603050405020304" pitchFamily="18" charset="0"/>
+                <a:cs typeface="Times New Roman" panose="02020603050405020304" pitchFamily="18" charset="0"/>
+              </a:rPr>
+              <a:t>H</a:t>
+            </a:r>
+            <a:r>
+              <a:rPr lang="en-IN" sz="2000" i="1" baseline="-25000" dirty="0" err="1" smtClean="0">
+                <a:latin typeface="Times New Roman" panose="02020603050405020304" pitchFamily="18" charset="0"/>
+                <a:cs typeface="Times New Roman" panose="02020603050405020304" pitchFamily="18" charset="0"/>
+              </a:rPr>
+              <a:t>k</a:t>
+            </a:r>
+            <a:r>
+              <a:rPr lang="en-IN" sz="2000" i="1" dirty="0" smtClean="0">
+                <a:latin typeface="Times New Roman" panose="02020603050405020304" pitchFamily="18" charset="0"/>
+                <a:cs typeface="Times New Roman" panose="02020603050405020304" pitchFamily="18" charset="0"/>
+              </a:rPr>
+              <a:t> – H</a:t>
+            </a:r>
+            <a:r>
+              <a:rPr lang="en-IN" sz="2000" i="1" baseline="-25000" dirty="0" smtClean="0">
+                <a:latin typeface="Times New Roman" panose="02020603050405020304" pitchFamily="18" charset="0"/>
+                <a:cs typeface="Times New Roman" panose="02020603050405020304" pitchFamily="18" charset="0"/>
+              </a:rPr>
+              <a:t>k-1</a:t>
+            </a:r>
+            <a:r>
+              <a:rPr lang="en-IN" sz="2000" i="1" dirty="0" smtClean="0">
+                <a:latin typeface="Times New Roman" panose="02020603050405020304" pitchFamily="18" charset="0"/>
+                <a:cs typeface="Times New Roman" panose="02020603050405020304" pitchFamily="18" charset="0"/>
+              </a:rPr>
+              <a:t> = (K-1).P(k)</a:t>
+            </a:r>
+            <a:r>
               <a:rPr lang="en-IN" sz="2000" dirty="0" smtClean="0">
                 <a:latin typeface="Times New Roman" panose="02020603050405020304" pitchFamily="18" charset="0"/>
                 <a:cs typeface="Times New Roman" panose="02020603050405020304" pitchFamily="18" charset="0"/>
               </a:rPr>
-              <a:t>is, </a:t>
+              <a:t> </a:t>
             </a:r>
             <a:endParaRPr lang="en-IN" sz="2000" dirty="0" smtClean="0">
               <a:latin typeface="Times New Roman" panose="02020603050405020304" pitchFamily="18" charset="0"/>
@@ -3646,6 +4290,49 @@
           </a:p>
           <a:p>
             <a:pPr marL="0" indent="0">
+              <a:lnSpc>
+                <a:spcPct val="100000"/>
+              </a:lnSpc>
+              <a:buNone/>
+            </a:pPr>
+            <a:r>
+              <a:rPr lang="en-IN" sz="2400" b="1" dirty="0" smtClean="0">
+                <a:latin typeface="Times New Roman" panose="02020603050405020304" pitchFamily="18" charset="0"/>
+                <a:cs typeface="Times New Roman" panose="02020603050405020304" pitchFamily="18" charset="0"/>
+              </a:rPr>
+              <a:t>1.C. Drawbacks:</a:t>
+            </a:r>
+          </a:p>
+          <a:p>
+            <a:pPr lvl="1">
+              <a:lnSpc>
+                <a:spcPct val="100000"/>
+              </a:lnSpc>
+            </a:pPr>
+            <a:r>
+              <a:rPr lang="en-IN" sz="2000" dirty="0" smtClean="0">
+                <a:latin typeface="Times New Roman" panose="02020603050405020304" pitchFamily="18" charset="0"/>
+                <a:cs typeface="Times New Roman" panose="02020603050405020304" pitchFamily="18" charset="0"/>
+              </a:rPr>
+              <a:t>It cannot be controlled.</a:t>
+            </a:r>
+          </a:p>
+          <a:p>
+            <a:pPr lvl="1">
+              <a:lnSpc>
+                <a:spcPct val="100000"/>
+              </a:lnSpc>
+            </a:pPr>
+            <a:r>
+              <a:rPr lang="en-IN" sz="2000" dirty="0" smtClean="0">
+                <a:latin typeface="Times New Roman" panose="02020603050405020304" pitchFamily="18" charset="0"/>
+                <a:cs typeface="Times New Roman" panose="02020603050405020304" pitchFamily="18" charset="0"/>
+              </a:rPr>
+              <a:t>Unpleasant visual effects such as, over enhancing and increase in noise.</a:t>
+            </a:r>
+          </a:p>
+          <a:p>
+            <a:pPr marL="0" indent="0">
               <a:buNone/>
             </a:pPr>
             <a:r>
@@ -3653,104 +4340,17 @@
                 <a:latin typeface="Times New Roman" panose="02020603050405020304" pitchFamily="18" charset="0"/>
                 <a:cs typeface="Times New Roman" panose="02020603050405020304" pitchFamily="18" charset="0"/>
               </a:rPr>
-              <a:t>1.C. Drawbacks:</a:t>
-            </a:r>
-          </a:p>
-          <a:p>
-            <a:pPr lvl="1"/>
-            <a:r>
-              <a:rPr lang="en-IN" sz="2000" dirty="0" smtClean="0">
-                <a:latin typeface="Times New Roman" panose="02020603050405020304" pitchFamily="18" charset="0"/>
-                <a:cs typeface="Times New Roman" panose="02020603050405020304" pitchFamily="18" charset="0"/>
-              </a:rPr>
-              <a:t>It </a:t>
-            </a:r>
-            <a:r>
-              <a:rPr lang="en-IN" sz="2000" dirty="0" smtClean="0">
-                <a:latin typeface="Times New Roman" panose="02020603050405020304" pitchFamily="18" charset="0"/>
-                <a:cs typeface="Times New Roman" panose="02020603050405020304" pitchFamily="18" charset="0"/>
-              </a:rPr>
-              <a:t>cannot be controlled.</a:t>
-            </a:r>
-          </a:p>
-          <a:p>
-            <a:pPr lvl="1"/>
-            <a:r>
-              <a:rPr lang="en-IN" sz="2000" dirty="0" smtClean="0">
-                <a:latin typeface="Times New Roman" panose="02020603050405020304" pitchFamily="18" charset="0"/>
-                <a:cs typeface="Times New Roman" panose="02020603050405020304" pitchFamily="18" charset="0"/>
-              </a:rPr>
-              <a:t>Unpleasant visual effects such as, over enhancing and increase in noise.</a:t>
+              <a:t> </a:t>
             </a:r>
           </a:p>
           <a:p>
             <a:pPr marL="0" indent="0">
               <a:buNone/>
             </a:pPr>
-            <a:r>
-              <a:rPr lang="en-IN" sz="2400" dirty="0" smtClean="0">
-                <a:latin typeface="Times New Roman" panose="02020603050405020304" pitchFamily="18" charset="0"/>
-                <a:cs typeface="Times New Roman" panose="02020603050405020304" pitchFamily="18" charset="0"/>
-              </a:rPr>
-              <a:t> </a:t>
-            </a:r>
-          </a:p>
-          <a:p>
-            <a:pPr marL="0" indent="0">
-              <a:buNone/>
-            </a:pPr>
             <a:endParaRPr lang="en-IN" dirty="0"/>
           </a:p>
         </p:txBody>
       </p:sp>
-      <p:pic>
-        <p:nvPicPr>
-          <p:cNvPr id="4" name="Picture 3"/>
-          <p:cNvPicPr>
-            <a:picLocks noChangeAspect="1"/>
-          </p:cNvPicPr>
-          <p:nvPr/>
-        </p:nvPicPr>
-        <p:blipFill>
-          <a:blip r:embed="rId2"/>
-          <a:stretch>
-            <a:fillRect/>
-          </a:stretch>
-        </p:blipFill>
-        <p:spPr>
-          <a:xfrm>
-            <a:off x="4781931" y="3178398"/>
-            <a:ext cx="1847850" cy="371475"/>
-          </a:xfrm>
-          <a:prstGeom prst="rect">
-            <a:avLst/>
-          </a:prstGeom>
-        </p:spPr>
-      </p:pic>
-      <p:pic>
-        <p:nvPicPr>
-          <p:cNvPr id="5" name="Picture 4"/>
-          <p:cNvPicPr>
-            <a:picLocks noChangeAspect="1"/>
-          </p:cNvPicPr>
-          <p:nvPr/>
-        </p:nvPicPr>
-        <p:blipFill>
-          <a:blip r:embed="rId3"/>
-          <a:stretch>
-            <a:fillRect/>
-          </a:stretch>
-        </p:blipFill>
-        <p:spPr>
-          <a:xfrm>
-            <a:off x="5705856" y="3818953"/>
-            <a:ext cx="3562350" cy="390525"/>
-          </a:xfrm>
-          <a:prstGeom prst="rect">
-            <a:avLst/>
-          </a:prstGeom>
-        </p:spPr>
-      </p:pic>
     </p:spTree>
     <p:extLst>
       <p:ext uri="{BB962C8B-B14F-4D97-AF65-F5344CB8AC3E}">
@@ -3800,7 +4400,7 @@
         </p:nvSpPr>
         <p:spPr>
           <a:xfrm>
-            <a:off x="838200" y="365125"/>
+            <a:off x="838200" y="522288"/>
             <a:ext cx="10515600" cy="890651"/>
           </a:xfrm>
         </p:spPr>
@@ -3811,17 +4411,17 @@
           <a:lstStyle/>
           <a:p>
             <a:r>
-              <a:rPr lang="en-IN" sz="3200" dirty="0" smtClean="0"/>
+              <a:rPr lang="en-IN" sz="3200" b="1" dirty="0" smtClean="0"/>
               <a:t>1. </a:t>
             </a:r>
             <a:r>
-              <a:rPr lang="en-IN" sz="3200" dirty="0" smtClean="0">
+              <a:rPr lang="en-IN" sz="3200" b="1" dirty="0" smtClean="0">
                 <a:latin typeface="Times New Roman" panose="02020603050405020304" pitchFamily="18" charset="0"/>
                 <a:cs typeface="Times New Roman" panose="02020603050405020304" pitchFamily="18" charset="0"/>
               </a:rPr>
               <a:t>Introduction</a:t>
             </a:r>
-            <a:endParaRPr lang="en-IN" sz="3200" dirty="0">
+            <a:endParaRPr lang="en-IN" sz="3200" b="1" dirty="0">
               <a:latin typeface="Times New Roman" panose="02020603050405020304" pitchFamily="18" charset="0"/>
               <a:cs typeface="Times New Roman" panose="02020603050405020304" pitchFamily="18" charset="0"/>
             </a:endParaRPr>
@@ -3854,18 +4454,63 @@
               <a:buNone/>
             </a:pPr>
             <a:r>
-              <a:rPr lang="en-IN" sz="2400" dirty="0">
+              <a:rPr lang="en-IN" sz="2400" b="1" dirty="0">
                 <a:latin typeface="Times New Roman" panose="02020603050405020304" pitchFamily="18" charset="0"/>
                 <a:cs typeface="Times New Roman" panose="02020603050405020304" pitchFamily="18" charset="0"/>
               </a:rPr>
               <a:t>1.C. Types of </a:t>
             </a:r>
             <a:r>
+              <a:rPr lang="en-IN" sz="2400" b="1" dirty="0" smtClean="0">
+                <a:latin typeface="Times New Roman" panose="02020603050405020304" pitchFamily="18" charset="0"/>
+                <a:cs typeface="Times New Roman" panose="02020603050405020304" pitchFamily="18" charset="0"/>
+              </a:rPr>
+              <a:t>HE:</a:t>
+            </a:r>
+          </a:p>
+          <a:p>
+            <a:pPr marL="0" indent="0">
+              <a:buNone/>
+            </a:pPr>
+            <a:r>
               <a:rPr lang="en-IN" sz="2400" dirty="0" smtClean="0">
                 <a:latin typeface="Times New Roman" panose="02020603050405020304" pitchFamily="18" charset="0"/>
                 <a:cs typeface="Times New Roman" panose="02020603050405020304" pitchFamily="18" charset="0"/>
               </a:rPr>
-              <a:t>HE:</a:t>
+              <a:t>1.C.1</a:t>
+            </a:r>
+            <a:r>
+              <a:rPr lang="en-IN" sz="2400" b="1" dirty="0" smtClean="0">
+                <a:latin typeface="Times New Roman" panose="02020603050405020304" pitchFamily="18" charset="0"/>
+                <a:cs typeface="Times New Roman" panose="02020603050405020304" pitchFamily="18" charset="0"/>
+              </a:rPr>
+              <a:t> Adaptive: </a:t>
+            </a:r>
+          </a:p>
+          <a:p>
+            <a:pPr>
+              <a:buFont typeface="Wingdings" panose="05000000000000000000" pitchFamily="2" charset="2"/>
+              <a:buChar char="§"/>
+            </a:pPr>
+            <a:r>
+              <a:rPr lang="en-IN" sz="2000" dirty="0" smtClean="0">
+                <a:latin typeface="Times New Roman" panose="02020603050405020304" pitchFamily="18" charset="0"/>
+                <a:cs typeface="Times New Roman" panose="02020603050405020304" pitchFamily="18" charset="0"/>
+              </a:rPr>
+              <a:t>In AHE, equalization is based on the histogram and statistics obtained from the neighbourhood around each pixel.</a:t>
+            </a:r>
+          </a:p>
+          <a:p>
+            <a:pPr>
+              <a:buFont typeface="Wingdings" panose="05000000000000000000" pitchFamily="2" charset="2"/>
+              <a:buChar char="§"/>
+            </a:pPr>
+            <a:r>
+              <a:rPr lang="en-IN" sz="2000" dirty="0" smtClean="0">
+                <a:latin typeface="Times New Roman" panose="02020603050405020304" pitchFamily="18" charset="0"/>
+                <a:cs typeface="Times New Roman" panose="02020603050405020304" pitchFamily="18" charset="0"/>
+              </a:rPr>
+              <a:t>Adaptive methods provide greater enhancement than global methods but are computationally intensive.</a:t>
             </a:r>
           </a:p>
           <a:p>
@@ -3877,91 +4522,62 @@
                 <a:latin typeface="Times New Roman" panose="02020603050405020304" pitchFamily="18" charset="0"/>
                 <a:cs typeface="Times New Roman" panose="02020603050405020304" pitchFamily="18" charset="0"/>
               </a:rPr>
-              <a:t>1.C.1</a:t>
+              <a:t>1.C.2 </a:t>
             </a:r>
             <a:r>
               <a:rPr lang="en-IN" sz="2400" b="1" dirty="0" smtClean="0">
                 <a:latin typeface="Times New Roman" panose="02020603050405020304" pitchFamily="18" charset="0"/>
                 <a:cs typeface="Times New Roman" panose="02020603050405020304" pitchFamily="18" charset="0"/>
               </a:rPr>
-              <a:t> Adaptive: </a:t>
-            </a:r>
-          </a:p>
-          <a:p>
+              <a:t>Improved Global methods: </a:t>
+            </a:r>
+          </a:p>
+          <a:p>
+            <a:pPr>
+              <a:buFont typeface="Wingdings" panose="05000000000000000000" pitchFamily="2" charset="2"/>
+              <a:buChar char="§"/>
+            </a:pPr>
             <a:r>
               <a:rPr lang="en-IN" sz="2000" dirty="0" smtClean="0">
                 <a:latin typeface="Times New Roman" panose="02020603050405020304" pitchFamily="18" charset="0"/>
                 <a:cs typeface="Times New Roman" panose="02020603050405020304" pitchFamily="18" charset="0"/>
               </a:rPr>
-              <a:t>In AHE, equalization is based on the histogram and statistics obtained from the neighbourhood around each pixel.</a:t>
-            </a:r>
-          </a:p>
-          <a:p>
+              <a:t>In </a:t>
+            </a:r>
+            <a:r>
+              <a:rPr lang="en-IN" sz="2000" dirty="0">
+                <a:latin typeface="Times New Roman" panose="02020603050405020304" pitchFamily="18" charset="0"/>
+                <a:cs typeface="Times New Roman" panose="02020603050405020304" pitchFamily="18" charset="0"/>
+              </a:rPr>
+              <a:t>the improved global methods, various constraints are added to the global equalization or </a:t>
+            </a:r>
             <a:r>
               <a:rPr lang="en-IN" sz="2000" dirty="0" smtClean="0">
                 <a:latin typeface="Times New Roman" panose="02020603050405020304" pitchFamily="18" charset="0"/>
                 <a:cs typeface="Times New Roman" panose="02020603050405020304" pitchFamily="18" charset="0"/>
               </a:rPr>
-              <a:t>Adaptive methods provide greater enhancement than global methods but are computationally intensive.</a:t>
-            </a:r>
-          </a:p>
-          <a:p>
-            <a:pPr marL="0" indent="0">
-              <a:buNone/>
-            </a:pPr>
-            <a:r>
-              <a:rPr lang="en-IN" sz="2400" dirty="0" smtClean="0">
-                <a:latin typeface="Times New Roman" panose="02020603050405020304" pitchFamily="18" charset="0"/>
-                <a:cs typeface="Times New Roman" panose="02020603050405020304" pitchFamily="18" charset="0"/>
-              </a:rPr>
-              <a:t>1.C.2 </a:t>
-            </a:r>
-            <a:r>
-              <a:rPr lang="en-IN" sz="2400" b="1" dirty="0" smtClean="0">
-                <a:latin typeface="Times New Roman" panose="02020603050405020304" pitchFamily="18" charset="0"/>
-                <a:cs typeface="Times New Roman" panose="02020603050405020304" pitchFamily="18" charset="0"/>
-              </a:rPr>
-              <a:t>Improved Global methods: </a:t>
-            </a:r>
-          </a:p>
-          <a:p>
+              <a:t>the modification </a:t>
+            </a:r>
+            <a:r>
+              <a:rPr lang="en-IN" sz="2000" dirty="0">
+                <a:latin typeface="Times New Roman" panose="02020603050405020304" pitchFamily="18" charset="0"/>
+                <a:cs typeface="Times New Roman" panose="02020603050405020304" pitchFamily="18" charset="0"/>
+              </a:rPr>
+              <a:t>procedures to achieve better performance</a:t>
+            </a:r>
             <a:r>
               <a:rPr lang="en-IN" sz="2000" dirty="0" smtClean="0">
                 <a:latin typeface="Times New Roman" panose="02020603050405020304" pitchFamily="18" charset="0"/>
                 <a:cs typeface="Times New Roman" panose="02020603050405020304" pitchFamily="18" charset="0"/>
               </a:rPr>
-              <a:t>In </a:t>
-            </a:r>
-            <a:r>
-              <a:rPr lang="en-IN" sz="2000" dirty="0">
-                <a:latin typeface="Times New Roman" panose="02020603050405020304" pitchFamily="18" charset="0"/>
-                <a:cs typeface="Times New Roman" panose="02020603050405020304" pitchFamily="18" charset="0"/>
-              </a:rPr>
-              <a:t>the improved global methods, various constraints are added to the global equalization or </a:t>
-            </a:r>
-            <a:r>
-              <a:rPr lang="en-IN" sz="2000" dirty="0" smtClean="0">
-                <a:latin typeface="Times New Roman" panose="02020603050405020304" pitchFamily="18" charset="0"/>
-                <a:cs typeface="Times New Roman" panose="02020603050405020304" pitchFamily="18" charset="0"/>
-              </a:rPr>
-              <a:t>the modification </a:t>
-            </a:r>
-            <a:r>
-              <a:rPr lang="en-IN" sz="2000" dirty="0">
-                <a:latin typeface="Times New Roman" panose="02020603050405020304" pitchFamily="18" charset="0"/>
-                <a:cs typeface="Times New Roman" panose="02020603050405020304" pitchFamily="18" charset="0"/>
-              </a:rPr>
-              <a:t>procedures to achieve better performance</a:t>
-            </a:r>
-            <a:r>
-              <a:rPr lang="en-IN" sz="2000" dirty="0" smtClean="0">
-                <a:latin typeface="Times New Roman" panose="02020603050405020304" pitchFamily="18" charset="0"/>
-                <a:cs typeface="Times New Roman" panose="02020603050405020304" pitchFamily="18" charset="0"/>
-              </a:rPr>
               <a:t>.</a:t>
             </a:r>
           </a:p>
           <a:p>
+            <a:pPr>
+              <a:buFont typeface="Wingdings" panose="05000000000000000000" pitchFamily="2" charset="2"/>
+              <a:buChar char="§"/>
+            </a:pPr>
             <a:r>
               <a:rPr lang="en-IN" sz="2000" dirty="0" smtClean="0">
                 <a:latin typeface="Times New Roman" panose="02020603050405020304" pitchFamily="18" charset="0"/>
@@ -4023,31 +4639,21 @@
             <p:ph type="title"/>
           </p:nvPr>
         </p:nvSpPr>
-        <p:spPr>
-          <a:xfrm>
-            <a:off x="838200" y="365126"/>
-            <a:ext cx="10515600" cy="602041"/>
-          </a:xfrm>
-        </p:spPr>
-        <p:txBody>
-          <a:bodyPr/>
-          <a:lstStyle/>
-          <a:p>
-            <a:r>
-              <a:rPr lang="en-IN" sz="3200" dirty="0">
-                <a:latin typeface="Times New Roman" panose="02020603050405020304" pitchFamily="18" charset="0"/>
-                <a:cs typeface="Times New Roman" panose="02020603050405020304" pitchFamily="18" charset="0"/>
-              </a:rPr>
-              <a:t>2. </a:t>
-            </a:r>
-            <a:r>
-              <a:rPr lang="en-IN" sz="3200" dirty="0" smtClean="0">
-                <a:latin typeface="Times New Roman" panose="02020603050405020304" pitchFamily="18" charset="0"/>
-                <a:cs typeface="Times New Roman" panose="02020603050405020304" pitchFamily="18" charset="0"/>
-              </a:rPr>
-              <a:t>Technical discussion</a:t>
-            </a:r>
-            <a:endParaRPr lang="en-IN" sz="3200" dirty="0">
+        <p:spPr/>
+        <p:txBody>
+          <a:bodyPr>
+            <a:normAutofit/>
+          </a:bodyPr>
+          <a:lstStyle/>
+          <a:p>
+            <a:r>
+              <a:rPr lang="en-IN" sz="3200" b="1" dirty="0" smtClean="0">
+                <a:latin typeface="Times New Roman" panose="02020603050405020304" pitchFamily="18" charset="0"/>
+                <a:cs typeface="Times New Roman" panose="02020603050405020304" pitchFamily="18" charset="0"/>
+              </a:rPr>
+              <a:t>Outline:</a:t>
+            </a:r>
+            <a:endParaRPr lang="en-IN" sz="3200" b="1" dirty="0">
               <a:latin typeface="Times New Roman" panose="02020603050405020304" pitchFamily="18" charset="0"/>
               <a:cs typeface="Times New Roman" panose="02020603050405020304" pitchFamily="18" charset="0"/>
             </a:endParaRPr>
@@ -4066,8 +4672,8 @@
         </p:nvSpPr>
         <p:spPr>
           <a:xfrm>
-            <a:off x="838200" y="967168"/>
-            <a:ext cx="10515600" cy="5209796"/>
+            <a:off x="838200" y="1690688"/>
+            <a:ext cx="10515600" cy="4486275"/>
           </a:xfrm>
         </p:spPr>
         <p:txBody>
@@ -4076,202 +4682,117 @@
           </a:bodyPr>
           <a:lstStyle/>
           <a:p>
+            <a:pPr marL="514350" indent="-514350">
+              <a:buFont typeface="+mj-lt"/>
+              <a:buAutoNum type="arabicPeriod"/>
+            </a:pPr>
             <a:r>
               <a:rPr lang="en-IN" sz="2400" dirty="0" smtClean="0">
                 <a:latin typeface="Times New Roman" panose="02020603050405020304" pitchFamily="18" charset="0"/>
                 <a:cs typeface="Times New Roman" panose="02020603050405020304" pitchFamily="18" charset="0"/>
               </a:rPr>
-              <a:t>The proposed weighted </a:t>
-            </a:r>
-            <a:r>
-              <a:rPr lang="en-IN" sz="2400" dirty="0" err="1" smtClean="0">
-                <a:latin typeface="Times New Roman" panose="02020603050405020304" pitchFamily="18" charset="0"/>
-                <a:cs typeface="Times New Roman" panose="02020603050405020304" pitchFamily="18" charset="0"/>
-              </a:rPr>
-              <a:t>thresholded</a:t>
-            </a:r>
+              <a:t>Introduction</a:t>
+            </a:r>
+          </a:p>
+          <a:p>
+            <a:pPr marL="457200" lvl="1" indent="0">
+              <a:buNone/>
+            </a:pPr>
+            <a:r>
+              <a:rPr lang="en-IN" dirty="0" smtClean="0">
+                <a:latin typeface="Times New Roman" panose="02020603050405020304" pitchFamily="18" charset="0"/>
+                <a:cs typeface="Times New Roman" panose="02020603050405020304" pitchFamily="18" charset="0"/>
+              </a:rPr>
+              <a:t>1.A. Histogram </a:t>
+            </a:r>
+          </a:p>
+          <a:p>
+            <a:pPr marL="457200" lvl="1" indent="0">
+              <a:buNone/>
+            </a:pPr>
+            <a:r>
+              <a:rPr lang="en-IN" dirty="0" smtClean="0">
+                <a:latin typeface="Times New Roman" panose="02020603050405020304" pitchFamily="18" charset="0"/>
+                <a:cs typeface="Times New Roman" panose="02020603050405020304" pitchFamily="18" charset="0"/>
+              </a:rPr>
+              <a:t>1.B. Histogram Equalization</a:t>
+            </a:r>
+          </a:p>
+          <a:p>
+            <a:pPr marL="457200" lvl="1" indent="0">
+              <a:buNone/>
+            </a:pPr>
+            <a:r>
+              <a:rPr lang="en-IN" dirty="0" smtClean="0">
+                <a:latin typeface="Times New Roman" panose="02020603050405020304" pitchFamily="18" charset="0"/>
+                <a:cs typeface="Times New Roman" panose="02020603050405020304" pitchFamily="18" charset="0"/>
+              </a:rPr>
+              <a:t>1.C. Types of HE    </a:t>
+            </a:r>
+          </a:p>
+          <a:p>
+            <a:pPr marL="514350" indent="-514350">
+              <a:buFont typeface="+mj-lt"/>
+              <a:buAutoNum type="arabicPeriod"/>
+            </a:pPr>
+            <a:r>
+              <a:rPr lang="en-IN" sz="2400" b="1" dirty="0" smtClean="0">
+                <a:latin typeface="Times New Roman" panose="02020603050405020304" pitchFamily="18" charset="0"/>
+                <a:cs typeface="Times New Roman" panose="02020603050405020304" pitchFamily="18" charset="0"/>
+              </a:rPr>
+              <a:t>Technical discussion</a:t>
+            </a:r>
+          </a:p>
+          <a:p>
+            <a:pPr marL="514350" indent="-514350">
+              <a:buFont typeface="+mj-lt"/>
+              <a:buAutoNum type="arabicPeriod"/>
+            </a:pPr>
             <a:r>
               <a:rPr lang="en-IN" sz="2400" dirty="0" smtClean="0">
                 <a:latin typeface="Times New Roman" panose="02020603050405020304" pitchFamily="18" charset="0"/>
                 <a:cs typeface="Times New Roman" panose="02020603050405020304" pitchFamily="18" charset="0"/>
               </a:rPr>
-              <a:t>(WTHE) enhancement method performs histogram equalization based on a modified histogram.</a:t>
-            </a:r>
-          </a:p>
-          <a:p>
+              <a:t>Results</a:t>
+            </a:r>
+          </a:p>
+          <a:p>
+            <a:pPr marL="514350" indent="-514350">
+              <a:buFont typeface="+mj-lt"/>
+              <a:buAutoNum type="arabicPeriod"/>
+            </a:pPr>
             <a:r>
               <a:rPr lang="en-IN" sz="2400" dirty="0" smtClean="0">
                 <a:latin typeface="Times New Roman" panose="02020603050405020304" pitchFamily="18" charset="0"/>
                 <a:cs typeface="Times New Roman" panose="02020603050405020304" pitchFamily="18" charset="0"/>
               </a:rPr>
-              <a:t>Each original probability density value </a:t>
-            </a:r>
-            <a:r>
-              <a:rPr lang="en-IN" sz="2400" i="1" dirty="0" smtClean="0">
-                <a:latin typeface="Times New Roman" panose="02020603050405020304" pitchFamily="18" charset="0"/>
-                <a:cs typeface="Times New Roman" panose="02020603050405020304" pitchFamily="18" charset="0"/>
-              </a:rPr>
-              <a:t>P</a:t>
-            </a:r>
+              <a:t>Comparative study</a:t>
+            </a:r>
+          </a:p>
+          <a:p>
+            <a:pPr marL="514350" indent="-514350">
+              <a:buFont typeface="+mj-lt"/>
+              <a:buAutoNum type="arabicPeriod"/>
+            </a:pPr>
             <a:r>
               <a:rPr lang="en-IN" sz="2400" dirty="0" smtClean="0">
                 <a:latin typeface="Times New Roman" panose="02020603050405020304" pitchFamily="18" charset="0"/>
                 <a:cs typeface="Times New Roman" panose="02020603050405020304" pitchFamily="18" charset="0"/>
               </a:rPr>
-              <a:t>(k) is replaced by a weighted and </a:t>
-            </a:r>
-            <a:r>
-              <a:rPr lang="en-IN" sz="2400" dirty="0" err="1" smtClean="0">
-                <a:latin typeface="Times New Roman" panose="02020603050405020304" pitchFamily="18" charset="0"/>
-                <a:cs typeface="Times New Roman" panose="02020603050405020304" pitchFamily="18" charset="0"/>
-              </a:rPr>
-              <a:t>thresholded</a:t>
-            </a:r>
+              <a:t>Conclusions</a:t>
+            </a:r>
+          </a:p>
+          <a:p>
+            <a:pPr marL="514350" indent="-514350">
+              <a:buFont typeface="+mj-lt"/>
+              <a:buAutoNum type="arabicPeriod"/>
+            </a:pPr>
             <a:r>
               <a:rPr lang="en-IN" sz="2400" dirty="0" smtClean="0">
                 <a:latin typeface="Times New Roman" panose="02020603050405020304" pitchFamily="18" charset="0"/>
                 <a:cs typeface="Times New Roman" panose="02020603050405020304" pitchFamily="18" charset="0"/>
               </a:rPr>
-              <a:t> PDF value </a:t>
-            </a:r>
-            <a:r>
-              <a:rPr lang="en-IN" sz="2400" i="1" dirty="0" err="1" smtClean="0">
-                <a:latin typeface="Times New Roman" panose="02020603050405020304" pitchFamily="18" charset="0"/>
-                <a:cs typeface="Times New Roman" panose="02020603050405020304" pitchFamily="18" charset="0"/>
-              </a:rPr>
-              <a:t>P</a:t>
-            </a:r>
-            <a:r>
-              <a:rPr lang="en-IN" sz="2400" i="1" baseline="-25000" dirty="0" err="1" smtClean="0">
-                <a:latin typeface="Times New Roman" panose="02020603050405020304" pitchFamily="18" charset="0"/>
-                <a:cs typeface="Times New Roman" panose="02020603050405020304" pitchFamily="18" charset="0"/>
-              </a:rPr>
-              <a:t>wt</a:t>
-            </a:r>
-            <a:r>
-              <a:rPr lang="en-IN" sz="2400" i="1" dirty="0" smtClean="0">
-                <a:latin typeface="Times New Roman" panose="02020603050405020304" pitchFamily="18" charset="0"/>
-                <a:cs typeface="Times New Roman" panose="02020603050405020304" pitchFamily="18" charset="0"/>
-              </a:rPr>
-              <a:t>(k)</a:t>
-            </a:r>
-            <a:r>
-              <a:rPr lang="en-IN" sz="2400" dirty="0" smtClean="0">
-                <a:latin typeface="Times New Roman" panose="02020603050405020304" pitchFamily="18" charset="0"/>
-                <a:cs typeface="Times New Roman" panose="02020603050405020304" pitchFamily="18" charset="0"/>
-              </a:rPr>
-              <a:t> </a:t>
-            </a:r>
-          </a:p>
-          <a:p>
-            <a:r>
-              <a:rPr lang="en-IN" sz="2400" i="1" dirty="0" err="1" smtClean="0">
-                <a:latin typeface="Times New Roman" panose="02020603050405020304" pitchFamily="18" charset="0"/>
-                <a:cs typeface="Times New Roman" panose="02020603050405020304" pitchFamily="18" charset="0"/>
-              </a:rPr>
-              <a:t>P</a:t>
-            </a:r>
-            <a:r>
-              <a:rPr lang="en-IN" sz="2400" i="1" baseline="-25000" dirty="0" err="1" smtClean="0">
-                <a:latin typeface="Times New Roman" panose="02020603050405020304" pitchFamily="18" charset="0"/>
-                <a:cs typeface="Times New Roman" panose="02020603050405020304" pitchFamily="18" charset="0"/>
-              </a:rPr>
-              <a:t>wt</a:t>
-            </a:r>
-            <a:r>
-              <a:rPr lang="en-IN" sz="2400" i="1" dirty="0" smtClean="0">
-                <a:latin typeface="Times New Roman" panose="02020603050405020304" pitchFamily="18" charset="0"/>
-                <a:cs typeface="Times New Roman" panose="02020603050405020304" pitchFamily="18" charset="0"/>
-              </a:rPr>
-              <a:t>(k) </a:t>
-            </a:r>
-            <a:r>
-              <a:rPr lang="en-IN" sz="2400" dirty="0" smtClean="0">
-                <a:latin typeface="Times New Roman" panose="02020603050405020304" pitchFamily="18" charset="0"/>
-                <a:cs typeface="Times New Roman" panose="02020603050405020304" pitchFamily="18" charset="0"/>
-              </a:rPr>
-              <a:t>is obtained by applying a transformation function </a:t>
-            </a:r>
-            <a:r>
-              <a:rPr lang="el-GR" sz="2400" dirty="0" smtClean="0">
-                <a:latin typeface="Times New Roman" panose="02020603050405020304" pitchFamily="18" charset="0"/>
-                <a:cs typeface="Times New Roman" panose="02020603050405020304" pitchFamily="18" charset="0"/>
-              </a:rPr>
-              <a:t>Ω</a:t>
-            </a:r>
-            <a:r>
-              <a:rPr lang="en-IN" sz="2400" dirty="0" smtClean="0">
-                <a:latin typeface="Times New Roman" panose="02020603050405020304" pitchFamily="18" charset="0"/>
-                <a:cs typeface="Times New Roman" panose="02020603050405020304" pitchFamily="18" charset="0"/>
-              </a:rPr>
-              <a:t>(.) to P(k),</a:t>
-            </a:r>
-          </a:p>
-          <a:p>
-            <a:endParaRPr lang="en-IN" sz="2400" i="1" dirty="0" smtClean="0">
-              <a:latin typeface="Times New Roman" panose="02020603050405020304" pitchFamily="18" charset="0"/>
-              <a:cs typeface="Times New Roman" panose="02020603050405020304" pitchFamily="18" charset="0"/>
-            </a:endParaRPr>
-          </a:p>
-          <a:p>
-            <a:pPr marL="0" indent="0">
-              <a:buNone/>
-            </a:pPr>
-            <a:endParaRPr lang="en-IN" sz="2000" dirty="0" smtClean="0">
-              <a:latin typeface="Times New Roman" panose="02020603050405020304" pitchFamily="18" charset="0"/>
-              <a:cs typeface="Times New Roman" panose="02020603050405020304" pitchFamily="18" charset="0"/>
-            </a:endParaRPr>
-          </a:p>
-          <a:p>
-            <a:pPr marL="0" indent="0">
-              <a:buNone/>
-            </a:pPr>
-            <a:endParaRPr lang="en-IN" dirty="0" smtClean="0">
-              <a:latin typeface="Times New Roman" panose="02020603050405020304" pitchFamily="18" charset="0"/>
-              <a:cs typeface="Times New Roman" panose="02020603050405020304" pitchFamily="18" charset="0"/>
-            </a:endParaRPr>
-          </a:p>
-          <a:p>
-            <a:endParaRPr lang="en-IN" dirty="0" smtClean="0">
-              <a:latin typeface="Times New Roman" panose="02020603050405020304" pitchFamily="18" charset="0"/>
-              <a:cs typeface="Times New Roman" panose="02020603050405020304" pitchFamily="18" charset="0"/>
-            </a:endParaRPr>
-          </a:p>
-          <a:p>
-            <a:r>
-              <a:rPr lang="en-IN" sz="2400" dirty="0" smtClean="0">
-                <a:latin typeface="Times New Roman" panose="02020603050405020304" pitchFamily="18" charset="0"/>
-                <a:cs typeface="Times New Roman" panose="02020603050405020304" pitchFamily="18" charset="0"/>
-              </a:rPr>
-              <a:t>The original PDF is clamped at an upper threshold P</a:t>
-            </a:r>
-            <a:r>
-              <a:rPr lang="en-IN" sz="2400" baseline="-25000" dirty="0" smtClean="0">
-                <a:latin typeface="Times New Roman" panose="02020603050405020304" pitchFamily="18" charset="0"/>
-                <a:cs typeface="Times New Roman" panose="02020603050405020304" pitchFamily="18" charset="0"/>
-              </a:rPr>
-              <a:t>u</a:t>
-            </a:r>
-            <a:r>
-              <a:rPr lang="en-IN" sz="2400" dirty="0" smtClean="0">
-                <a:latin typeface="Times New Roman" panose="02020603050405020304" pitchFamily="18" charset="0"/>
-                <a:cs typeface="Times New Roman" panose="02020603050405020304" pitchFamily="18" charset="0"/>
-              </a:rPr>
-              <a:t> and at a lower threshold P</a:t>
-            </a:r>
-            <a:r>
-              <a:rPr lang="en-IN" sz="2400" baseline="-25000" dirty="0" smtClean="0">
-                <a:latin typeface="Times New Roman" panose="02020603050405020304" pitchFamily="18" charset="0"/>
-                <a:cs typeface="Times New Roman" panose="02020603050405020304" pitchFamily="18" charset="0"/>
-              </a:rPr>
-              <a:t>l</a:t>
-            </a:r>
-            <a:r>
-              <a:rPr lang="en-IN" sz="2400" dirty="0" smtClean="0">
-                <a:latin typeface="Times New Roman" panose="02020603050405020304" pitchFamily="18" charset="0"/>
-                <a:cs typeface="Times New Roman" panose="02020603050405020304" pitchFamily="18" charset="0"/>
-              </a:rPr>
-              <a:t> and all other values between upper and lower thresholds are transformed using a normalized power law function with index r&gt;0.</a:t>
+              <a:t>Questions &amp; Answers</a:t>
             </a:r>
             <a:endParaRPr lang="en-IN" sz="2400" dirty="0">
               <a:latin typeface="Times New Roman" panose="02020603050405020304" pitchFamily="18" charset="0"/>
@@ -4280,58 +4801,10 @@
           </a:p>
         </p:txBody>
       </p:sp>
-      <p:pic>
-        <p:nvPicPr>
-          <p:cNvPr id="5" name="Picture 4"/>
-          <p:cNvPicPr>
-            <a:picLocks noChangeAspect="1"/>
-          </p:cNvPicPr>
-          <p:nvPr/>
-        </p:nvPicPr>
-        <p:blipFill>
-          <a:blip r:embed="rId2"/>
-          <a:stretch>
-            <a:fillRect/>
-          </a:stretch>
-        </p:blipFill>
-        <p:spPr>
-          <a:xfrm>
-            <a:off x="4847462" y="2144458"/>
-            <a:ext cx="2943225" cy="447675"/>
-          </a:xfrm>
-          <a:prstGeom prst="rect">
-            <a:avLst/>
-          </a:prstGeom>
-        </p:spPr>
-      </p:pic>
-      <p:pic>
-        <p:nvPicPr>
-          <p:cNvPr id="6" name="Picture 5"/>
-          <p:cNvPicPr>
-            <a:picLocks noChangeAspect="1"/>
-          </p:cNvPicPr>
-          <p:nvPr/>
-        </p:nvPicPr>
-        <p:blipFill>
-          <a:blip r:embed="rId3"/>
-          <a:stretch>
-            <a:fillRect/>
-          </a:stretch>
-        </p:blipFill>
-        <p:spPr>
-          <a:xfrm>
-            <a:off x="3148012" y="3092005"/>
-            <a:ext cx="5895975" cy="1800225"/>
-          </a:xfrm>
-          <a:prstGeom prst="rect">
-            <a:avLst/>
-          </a:prstGeom>
-        </p:spPr>
-      </p:pic>
     </p:spTree>
     <p:extLst>
       <p:ext uri="{BB962C8B-B14F-4D97-AF65-F5344CB8AC3E}">
-        <p14:creationId xmlns:p14="http://schemas.microsoft.com/office/powerpoint/2010/main" val="2057556621"/>
+        <p14:creationId xmlns:p14="http://schemas.microsoft.com/office/powerpoint/2010/main" val="4264574740"/>
       </p:ext>
     </p:extLst>
   </p:cSld>
@@ -4377,8 +4850,49 @@
         </p:nvSpPr>
         <p:spPr>
           <a:xfrm>
-            <a:off x="838200" y="365125"/>
-            <a:ext cx="10515600" cy="805307"/>
+            <a:off x="838200" y="365126"/>
+            <a:ext cx="10515600" cy="602041"/>
+          </a:xfrm>
+        </p:spPr>
+        <p:txBody>
+          <a:bodyPr/>
+          <a:lstStyle/>
+          <a:p>
+            <a:r>
+              <a:rPr lang="en-IN" sz="3200" b="1" dirty="0">
+                <a:latin typeface="Times New Roman" panose="02020603050405020304" pitchFamily="18" charset="0"/>
+                <a:cs typeface="Times New Roman" panose="02020603050405020304" pitchFamily="18" charset="0"/>
+              </a:rPr>
+              <a:t>2. </a:t>
+            </a:r>
+            <a:r>
+              <a:rPr lang="en-IN" sz="3200" b="1" dirty="0" smtClean="0">
+                <a:latin typeface="Times New Roman" panose="02020603050405020304" pitchFamily="18" charset="0"/>
+                <a:cs typeface="Times New Roman" panose="02020603050405020304" pitchFamily="18" charset="0"/>
+              </a:rPr>
+              <a:t>Technical discussion</a:t>
+            </a:r>
+            <a:endParaRPr lang="en-IN" sz="3200" b="1" dirty="0">
+              <a:latin typeface="Times New Roman" panose="02020603050405020304" pitchFamily="18" charset="0"/>
+              <a:cs typeface="Times New Roman" panose="02020603050405020304" pitchFamily="18" charset="0"/>
+            </a:endParaRPr>
+          </a:p>
+        </p:txBody>
+      </p:sp>
+      <p:sp>
+        <p:nvSpPr>
+          <p:cNvPr id="3" name="Content Placeholder 2"/>
+          <p:cNvSpPr>
+            <a:spLocks noGrp="1"/>
+          </p:cNvSpPr>
+          <p:nvPr>
+            <p:ph idx="1"/>
+          </p:nvPr>
+        </p:nvSpPr>
+        <p:spPr>
+          <a:xfrm>
+            <a:off x="838200" y="967168"/>
+            <a:ext cx="10515600" cy="5209796"/>
           </a:xfrm>
         </p:spPr>
         <p:txBody>
@@ -4387,232 +4901,249 @@
           </a:bodyPr>
           <a:lstStyle/>
           <a:p>
-            <a:r>
-              <a:rPr lang="en-IN" sz="3200" dirty="0" smtClean="0">
-                <a:latin typeface="Times New Roman" panose="02020603050405020304" pitchFamily="18" charset="0"/>
-                <a:cs typeface="Times New Roman" panose="02020603050405020304" pitchFamily="18" charset="0"/>
-              </a:rPr>
-              <a:t>2. Technical discussion</a:t>
-            </a:r>
-            <a:endParaRPr lang="en-IN" sz="3200" dirty="0">
+            <a:pPr>
+              <a:buFont typeface="Wingdings" panose="05000000000000000000" pitchFamily="2" charset="2"/>
+              <a:buChar char="q"/>
+            </a:pPr>
+            <a:r>
+              <a:rPr lang="en-IN" sz="2200" dirty="0" smtClean="0">
+                <a:latin typeface="Times New Roman" panose="02020603050405020304" pitchFamily="18" charset="0"/>
+                <a:cs typeface="Times New Roman" panose="02020603050405020304" pitchFamily="18" charset="0"/>
+              </a:rPr>
+              <a:t>The proposed weighted </a:t>
+            </a:r>
+            <a:r>
+              <a:rPr lang="en-IN" sz="2200" dirty="0" err="1" smtClean="0">
+                <a:latin typeface="Times New Roman" panose="02020603050405020304" pitchFamily="18" charset="0"/>
+                <a:cs typeface="Times New Roman" panose="02020603050405020304" pitchFamily="18" charset="0"/>
+              </a:rPr>
+              <a:t>thresholded</a:t>
+            </a:r>
+            <a:r>
+              <a:rPr lang="en-IN" sz="2200" dirty="0" smtClean="0">
+                <a:latin typeface="Times New Roman" panose="02020603050405020304" pitchFamily="18" charset="0"/>
+                <a:cs typeface="Times New Roman" panose="02020603050405020304" pitchFamily="18" charset="0"/>
+              </a:rPr>
+              <a:t>(WTHE) enhancement method performs histogram equalization based on a modified histogram.</a:t>
+            </a:r>
+          </a:p>
+          <a:p>
+            <a:pPr>
+              <a:buFont typeface="Wingdings" panose="05000000000000000000" pitchFamily="2" charset="2"/>
+              <a:buChar char="q"/>
+            </a:pPr>
+            <a:r>
+              <a:rPr lang="en-IN" sz="2200" dirty="0" smtClean="0">
+                <a:latin typeface="Times New Roman" panose="02020603050405020304" pitchFamily="18" charset="0"/>
+                <a:cs typeface="Times New Roman" panose="02020603050405020304" pitchFamily="18" charset="0"/>
+              </a:rPr>
+              <a:t>Each original probability density value </a:t>
+            </a:r>
+            <a:r>
+              <a:rPr lang="en-IN" sz="2200" i="1" dirty="0" smtClean="0">
+                <a:latin typeface="Times New Roman" panose="02020603050405020304" pitchFamily="18" charset="0"/>
+                <a:cs typeface="Times New Roman" panose="02020603050405020304" pitchFamily="18" charset="0"/>
+              </a:rPr>
+              <a:t>P</a:t>
+            </a:r>
+            <a:r>
+              <a:rPr lang="en-IN" sz="2200" dirty="0" smtClean="0">
+                <a:latin typeface="Times New Roman" panose="02020603050405020304" pitchFamily="18" charset="0"/>
+                <a:cs typeface="Times New Roman" panose="02020603050405020304" pitchFamily="18" charset="0"/>
+              </a:rPr>
+              <a:t>(k) is replaced by a weighted and </a:t>
+            </a:r>
+            <a:r>
+              <a:rPr lang="en-IN" sz="2200" dirty="0" err="1" smtClean="0">
+                <a:latin typeface="Times New Roman" panose="02020603050405020304" pitchFamily="18" charset="0"/>
+                <a:cs typeface="Times New Roman" panose="02020603050405020304" pitchFamily="18" charset="0"/>
+              </a:rPr>
+              <a:t>thresholded</a:t>
+            </a:r>
+            <a:r>
+              <a:rPr lang="en-IN" sz="2200" dirty="0" smtClean="0">
+                <a:latin typeface="Times New Roman" panose="02020603050405020304" pitchFamily="18" charset="0"/>
+                <a:cs typeface="Times New Roman" panose="02020603050405020304" pitchFamily="18" charset="0"/>
+              </a:rPr>
+              <a:t> PDF value </a:t>
+            </a:r>
+            <a:r>
+              <a:rPr lang="en-IN" sz="2200" i="1" dirty="0" err="1" smtClean="0">
+                <a:latin typeface="Times New Roman" panose="02020603050405020304" pitchFamily="18" charset="0"/>
+                <a:cs typeface="Times New Roman" panose="02020603050405020304" pitchFamily="18" charset="0"/>
+              </a:rPr>
+              <a:t>P</a:t>
+            </a:r>
+            <a:r>
+              <a:rPr lang="en-IN" sz="2200" i="1" baseline="-25000" dirty="0" err="1" smtClean="0">
+                <a:latin typeface="Times New Roman" panose="02020603050405020304" pitchFamily="18" charset="0"/>
+                <a:cs typeface="Times New Roman" panose="02020603050405020304" pitchFamily="18" charset="0"/>
+              </a:rPr>
+              <a:t>wt</a:t>
+            </a:r>
+            <a:r>
+              <a:rPr lang="en-IN" sz="2200" i="1" dirty="0" smtClean="0">
+                <a:latin typeface="Times New Roman" panose="02020603050405020304" pitchFamily="18" charset="0"/>
+                <a:cs typeface="Times New Roman" panose="02020603050405020304" pitchFamily="18" charset="0"/>
+              </a:rPr>
+              <a:t>(k)</a:t>
+            </a:r>
+            <a:r>
+              <a:rPr lang="en-IN" sz="2200" dirty="0" smtClean="0">
+                <a:latin typeface="Times New Roman" panose="02020603050405020304" pitchFamily="18" charset="0"/>
+                <a:cs typeface="Times New Roman" panose="02020603050405020304" pitchFamily="18" charset="0"/>
+              </a:rPr>
+              <a:t> </a:t>
+            </a:r>
+          </a:p>
+          <a:p>
+            <a:pPr>
+              <a:buFont typeface="Wingdings" panose="05000000000000000000" pitchFamily="2" charset="2"/>
+              <a:buChar char="q"/>
+            </a:pPr>
+            <a:r>
+              <a:rPr lang="en-IN" sz="2200" i="1" dirty="0" err="1" smtClean="0">
+                <a:latin typeface="Times New Roman" panose="02020603050405020304" pitchFamily="18" charset="0"/>
+                <a:cs typeface="Times New Roman" panose="02020603050405020304" pitchFamily="18" charset="0"/>
+              </a:rPr>
+              <a:t>P</a:t>
+            </a:r>
+            <a:r>
+              <a:rPr lang="en-IN" sz="2200" i="1" baseline="-25000" dirty="0" err="1" smtClean="0">
+                <a:latin typeface="Times New Roman" panose="02020603050405020304" pitchFamily="18" charset="0"/>
+                <a:cs typeface="Times New Roman" panose="02020603050405020304" pitchFamily="18" charset="0"/>
+              </a:rPr>
+              <a:t>wt</a:t>
+            </a:r>
+            <a:r>
+              <a:rPr lang="en-IN" sz="2200" i="1" dirty="0" smtClean="0">
+                <a:latin typeface="Times New Roman" panose="02020603050405020304" pitchFamily="18" charset="0"/>
+                <a:cs typeface="Times New Roman" panose="02020603050405020304" pitchFamily="18" charset="0"/>
+              </a:rPr>
+              <a:t>(k) </a:t>
+            </a:r>
+            <a:r>
+              <a:rPr lang="en-IN" sz="2200" dirty="0" smtClean="0">
+                <a:latin typeface="Times New Roman" panose="02020603050405020304" pitchFamily="18" charset="0"/>
+                <a:cs typeface="Times New Roman" panose="02020603050405020304" pitchFamily="18" charset="0"/>
+              </a:rPr>
+              <a:t>is obtained by applying a transformation function </a:t>
+            </a:r>
+            <a:r>
+              <a:rPr lang="el-GR" sz="2200" dirty="0" smtClean="0">
+                <a:latin typeface="Times New Roman" panose="02020603050405020304" pitchFamily="18" charset="0"/>
+                <a:cs typeface="Times New Roman" panose="02020603050405020304" pitchFamily="18" charset="0"/>
+              </a:rPr>
+              <a:t>Ω</a:t>
+            </a:r>
+            <a:r>
+              <a:rPr lang="en-IN" sz="2200" dirty="0" smtClean="0">
+                <a:latin typeface="Times New Roman" panose="02020603050405020304" pitchFamily="18" charset="0"/>
+                <a:cs typeface="Times New Roman" panose="02020603050405020304" pitchFamily="18" charset="0"/>
+              </a:rPr>
+              <a:t>(.) to P(k),</a:t>
+            </a:r>
+          </a:p>
+          <a:p>
+            <a:pPr>
+              <a:buFont typeface="Wingdings" panose="05000000000000000000" pitchFamily="2" charset="2"/>
+              <a:buChar char="q"/>
+            </a:pPr>
+            <a:endParaRPr lang="en-IN" sz="2200" i="1" dirty="0" smtClean="0">
               <a:latin typeface="Times New Roman" panose="02020603050405020304" pitchFamily="18" charset="0"/>
               <a:cs typeface="Times New Roman" panose="02020603050405020304" pitchFamily="18" charset="0"/>
             </a:endParaRPr>
           </a:p>
-        </p:txBody>
-      </p:sp>
-      <p:sp>
-        <p:nvSpPr>
-          <p:cNvPr id="3" name="Content Placeholder 2"/>
-          <p:cNvSpPr>
-            <a:spLocks noGrp="1"/>
-          </p:cNvSpPr>
-          <p:nvPr>
-            <p:ph idx="1"/>
-          </p:nvPr>
-        </p:nvSpPr>
-        <p:spPr>
-          <a:xfrm>
-            <a:off x="838200" y="1170432"/>
-            <a:ext cx="10515600" cy="5006531"/>
-          </a:xfrm>
-        </p:spPr>
-        <p:txBody>
-          <a:bodyPr>
-            <a:normAutofit/>
-          </a:bodyPr>
-          <a:lstStyle/>
-          <a:p>
-            <a:r>
-              <a:rPr lang="en-IN" sz="2400" dirty="0" smtClean="0">
-                <a:latin typeface="Times New Roman" panose="02020603050405020304" pitchFamily="18" charset="0"/>
-                <a:cs typeface="Times New Roman" panose="02020603050405020304" pitchFamily="18" charset="0"/>
-              </a:rPr>
-              <a:t>The increment for each intensity level can be controlled by adjusting the index r of the power law transformation function.</a:t>
-            </a:r>
-          </a:p>
-          <a:p>
-            <a:pPr marL="0" indent="0">
-              <a:buNone/>
-            </a:pPr>
-            <a:r>
-              <a:rPr lang="en-IN" sz="2400" dirty="0" smtClean="0">
-                <a:latin typeface="Times New Roman" panose="02020603050405020304" pitchFamily="18" charset="0"/>
-                <a:cs typeface="Times New Roman" panose="02020603050405020304" pitchFamily="18" charset="0"/>
-              </a:rPr>
-              <a:t>    Ex: When r&lt;1, higher weights are given to low probabilities than the high probabilities. </a:t>
-            </a:r>
-            <a:r>
-              <a:rPr lang="en-IN" sz="2400" dirty="0" err="1" smtClean="0">
-                <a:latin typeface="Times New Roman" panose="02020603050405020304" pitchFamily="18" charset="0"/>
-                <a:cs typeface="Times New Roman" panose="02020603050405020304" pitchFamily="18" charset="0"/>
-              </a:rPr>
-              <a:t>i.e</a:t>
-            </a:r>
-            <a:r>
-              <a:rPr lang="en-IN" sz="2400" dirty="0" smtClean="0">
-                <a:latin typeface="Times New Roman" panose="02020603050405020304" pitchFamily="18" charset="0"/>
-                <a:cs typeface="Times New Roman" panose="02020603050405020304" pitchFamily="18" charset="0"/>
-              </a:rPr>
-              <a:t>, the less-probable levels are protected and over-enhancement is less likely to occur.</a:t>
-            </a:r>
-          </a:p>
-          <a:p>
-            <a:r>
-              <a:rPr lang="en-IN" sz="2400" dirty="0" smtClean="0">
-                <a:latin typeface="Times New Roman" panose="02020603050405020304" pitchFamily="18" charset="0"/>
-                <a:cs typeface="Times New Roman" panose="02020603050405020304" pitchFamily="18" charset="0"/>
-              </a:rPr>
-              <a:t>Also, there is an upper limit P</a:t>
-            </a:r>
-            <a:r>
-              <a:rPr lang="en-IN" sz="2400" baseline="-25000" dirty="0" smtClean="0">
-                <a:latin typeface="Times New Roman" panose="02020603050405020304" pitchFamily="18" charset="0"/>
-                <a:cs typeface="Times New Roman" panose="02020603050405020304" pitchFamily="18" charset="0"/>
-              </a:rPr>
-              <a:t>u</a:t>
-            </a:r>
-            <a:r>
-              <a:rPr lang="en-IN" sz="2400" dirty="0" smtClean="0">
-                <a:latin typeface="Times New Roman" panose="02020603050405020304" pitchFamily="18" charset="0"/>
-                <a:cs typeface="Times New Roman" panose="02020603050405020304" pitchFamily="18" charset="0"/>
-              </a:rPr>
-              <a:t> as a result, all levels whose PDF values are higher then P</a:t>
-            </a:r>
-            <a:r>
-              <a:rPr lang="en-IN" sz="2400" baseline="-25000" dirty="0" smtClean="0">
-                <a:latin typeface="Times New Roman" panose="02020603050405020304" pitchFamily="18" charset="0"/>
-                <a:cs typeface="Times New Roman" panose="02020603050405020304" pitchFamily="18" charset="0"/>
-              </a:rPr>
-              <a:t>u</a:t>
-            </a:r>
-            <a:r>
-              <a:rPr lang="en-IN" sz="2400" dirty="0" smtClean="0">
-                <a:latin typeface="Times New Roman" panose="02020603050405020304" pitchFamily="18" charset="0"/>
-                <a:cs typeface="Times New Roman" panose="02020603050405020304" pitchFamily="18" charset="0"/>
-              </a:rPr>
-              <a:t> will have the increment clamped at a max. </a:t>
-            </a:r>
-          </a:p>
-          <a:p>
-            <a:r>
-              <a:rPr lang="en-IN" sz="2400" dirty="0" smtClean="0">
-                <a:latin typeface="Times New Roman" panose="02020603050405020304" pitchFamily="18" charset="0"/>
-                <a:cs typeface="Times New Roman" panose="02020603050405020304" pitchFamily="18" charset="0"/>
-              </a:rPr>
-              <a:t>The value of P</a:t>
-            </a:r>
-            <a:r>
-              <a:rPr lang="en-IN" sz="2400" baseline="-25000" dirty="0" smtClean="0">
-                <a:latin typeface="Times New Roman" panose="02020603050405020304" pitchFamily="18" charset="0"/>
-                <a:cs typeface="Times New Roman" panose="02020603050405020304" pitchFamily="18" charset="0"/>
-              </a:rPr>
-              <a:t>u</a:t>
-            </a:r>
-            <a:r>
-              <a:rPr lang="en-IN" sz="2400" dirty="0" smtClean="0">
-                <a:latin typeface="Times New Roman" panose="02020603050405020304" pitchFamily="18" charset="0"/>
-                <a:cs typeface="Times New Roman" panose="02020603050405020304" pitchFamily="18" charset="0"/>
-              </a:rPr>
-              <a:t> is decided by                                           v  is a real number which defines the upper threshold normalized to </a:t>
-            </a:r>
-            <a:r>
-              <a:rPr lang="en-IN" sz="2400" dirty="0" err="1" smtClean="0">
-                <a:latin typeface="Times New Roman" panose="02020603050405020304" pitchFamily="18" charset="0"/>
-                <a:cs typeface="Times New Roman" panose="02020603050405020304" pitchFamily="18" charset="0"/>
-              </a:rPr>
-              <a:t>P</a:t>
-            </a:r>
-            <a:r>
-              <a:rPr lang="en-IN" sz="2400" baseline="-25000" dirty="0" err="1" smtClean="0">
-                <a:latin typeface="Times New Roman" panose="02020603050405020304" pitchFamily="18" charset="0"/>
-                <a:cs typeface="Times New Roman" panose="02020603050405020304" pitchFamily="18" charset="0"/>
-              </a:rPr>
-              <a:t>max</a:t>
-            </a:r>
-            <a:r>
-              <a:rPr lang="en-IN" sz="2400" dirty="0" smtClean="0">
-                <a:latin typeface="Times New Roman" panose="02020603050405020304" pitchFamily="18" charset="0"/>
-                <a:cs typeface="Times New Roman" panose="02020603050405020304" pitchFamily="18" charset="0"/>
-              </a:rPr>
-              <a:t> .</a:t>
-            </a:r>
-          </a:p>
-          <a:p>
-            <a:r>
-              <a:rPr lang="en-IN" sz="2400" dirty="0" smtClean="0">
-                <a:latin typeface="Times New Roman" panose="02020603050405020304" pitchFamily="18" charset="0"/>
-                <a:cs typeface="Times New Roman" panose="02020603050405020304" pitchFamily="18" charset="0"/>
-              </a:rPr>
-              <a:t>The lower threshold P</a:t>
-            </a:r>
-            <a:r>
-              <a:rPr lang="en-IN" sz="2400" baseline="-25000" dirty="0" smtClean="0">
-                <a:latin typeface="Times New Roman" panose="02020603050405020304" pitchFamily="18" charset="0"/>
-                <a:cs typeface="Times New Roman" panose="02020603050405020304" pitchFamily="18" charset="0"/>
-              </a:rPr>
-              <a:t>l</a:t>
-            </a:r>
-            <a:r>
-              <a:rPr lang="en-IN" sz="2400" dirty="0" smtClean="0">
-                <a:latin typeface="Times New Roman" panose="02020603050405020304" pitchFamily="18" charset="0"/>
-                <a:cs typeface="Times New Roman" panose="02020603050405020304" pitchFamily="18" charset="0"/>
-              </a:rPr>
-              <a:t> is only used to cut out the levels whose probabilities are too low( little visual importance).</a:t>
-            </a:r>
-          </a:p>
-          <a:p>
-            <a:r>
-              <a:rPr lang="en-IN" sz="2400" dirty="0" smtClean="0">
-                <a:latin typeface="Times New Roman" panose="02020603050405020304" pitchFamily="18" charset="0"/>
-                <a:cs typeface="Times New Roman" panose="02020603050405020304" pitchFamily="18" charset="0"/>
-              </a:rPr>
-              <a:t>We can also observe that when r=1, P</a:t>
-            </a:r>
-            <a:r>
-              <a:rPr lang="en-IN" sz="2400" baseline="-25000" dirty="0" smtClean="0">
-                <a:latin typeface="Times New Roman" panose="02020603050405020304" pitchFamily="18" charset="0"/>
-                <a:cs typeface="Times New Roman" panose="02020603050405020304" pitchFamily="18" charset="0"/>
-              </a:rPr>
-              <a:t>u</a:t>
-            </a:r>
-            <a:r>
-              <a:rPr lang="en-IN" sz="2400" dirty="0" smtClean="0">
-                <a:latin typeface="Times New Roman" panose="02020603050405020304" pitchFamily="18" charset="0"/>
-                <a:cs typeface="Times New Roman" panose="02020603050405020304" pitchFamily="18" charset="0"/>
-              </a:rPr>
-              <a:t>=1 and P</a:t>
-            </a:r>
-            <a:r>
-              <a:rPr lang="en-IN" sz="2400" baseline="-25000" dirty="0" smtClean="0">
-                <a:latin typeface="Times New Roman" panose="02020603050405020304" pitchFamily="18" charset="0"/>
-                <a:cs typeface="Times New Roman" panose="02020603050405020304" pitchFamily="18" charset="0"/>
-              </a:rPr>
-              <a:t>l</a:t>
-            </a:r>
-            <a:r>
-              <a:rPr lang="en-IN" sz="2400" dirty="0" smtClean="0">
-                <a:latin typeface="Times New Roman" panose="02020603050405020304" pitchFamily="18" charset="0"/>
-                <a:cs typeface="Times New Roman" panose="02020603050405020304" pitchFamily="18" charset="0"/>
-              </a:rPr>
-              <a:t>=0, the WTHE method reduces to traditional HE.</a:t>
-            </a:r>
-            <a:endParaRPr lang="en-IN" sz="2400" dirty="0">
+          <a:p>
+            <a:pPr>
+              <a:buFont typeface="Wingdings" panose="05000000000000000000" pitchFamily="2" charset="2"/>
+              <a:buChar char="q"/>
+            </a:pPr>
+            <a:endParaRPr lang="en-IN" sz="2200" dirty="0" smtClean="0">
               <a:latin typeface="Times New Roman" panose="02020603050405020304" pitchFamily="18" charset="0"/>
               <a:cs typeface="Times New Roman" panose="02020603050405020304" pitchFamily="18" charset="0"/>
             </a:endParaRPr>
           </a:p>
           <a:p>
-            <a:endParaRPr lang="en-IN" sz="2400" dirty="0">
+            <a:pPr>
+              <a:buFont typeface="Wingdings" panose="05000000000000000000" pitchFamily="2" charset="2"/>
+              <a:buChar char="q"/>
+            </a:pPr>
+            <a:endParaRPr lang="en-IN" sz="2200" dirty="0" smtClean="0">
               <a:latin typeface="Times New Roman" panose="02020603050405020304" pitchFamily="18" charset="0"/>
               <a:cs typeface="Times New Roman" panose="02020603050405020304" pitchFamily="18" charset="0"/>
             </a:endParaRPr>
           </a:p>
+          <a:p>
+            <a:pPr>
+              <a:buFont typeface="Wingdings" panose="05000000000000000000" pitchFamily="2" charset="2"/>
+              <a:buChar char="q"/>
+            </a:pPr>
+            <a:endParaRPr lang="en-IN" sz="2200" dirty="0" smtClean="0">
+              <a:latin typeface="Times New Roman" panose="02020603050405020304" pitchFamily="18" charset="0"/>
+              <a:cs typeface="Times New Roman" panose="02020603050405020304" pitchFamily="18" charset="0"/>
+            </a:endParaRPr>
+          </a:p>
+          <a:p>
+            <a:pPr>
+              <a:buFont typeface="Wingdings" panose="05000000000000000000" pitchFamily="2" charset="2"/>
+              <a:buChar char="q"/>
+            </a:pPr>
+            <a:endParaRPr lang="en-IN" sz="2200" dirty="0" smtClean="0">
+              <a:latin typeface="Times New Roman" panose="02020603050405020304" pitchFamily="18" charset="0"/>
+              <a:cs typeface="Times New Roman" panose="02020603050405020304" pitchFamily="18" charset="0"/>
+            </a:endParaRPr>
+          </a:p>
+          <a:p>
+            <a:pPr>
+              <a:buFont typeface="Wingdings" panose="05000000000000000000" pitchFamily="2" charset="2"/>
+              <a:buChar char="q"/>
+            </a:pPr>
+            <a:r>
+              <a:rPr lang="en-IN" sz="2200" dirty="0" smtClean="0">
+                <a:latin typeface="Times New Roman" panose="02020603050405020304" pitchFamily="18" charset="0"/>
+                <a:cs typeface="Times New Roman" panose="02020603050405020304" pitchFamily="18" charset="0"/>
+              </a:rPr>
+              <a:t>The original PDF is clamped at an upper threshold P</a:t>
+            </a:r>
+            <a:r>
+              <a:rPr lang="en-IN" sz="2200" baseline="-25000" dirty="0" smtClean="0">
+                <a:latin typeface="Times New Roman" panose="02020603050405020304" pitchFamily="18" charset="0"/>
+                <a:cs typeface="Times New Roman" panose="02020603050405020304" pitchFamily="18" charset="0"/>
+              </a:rPr>
+              <a:t>u</a:t>
+            </a:r>
+            <a:r>
+              <a:rPr lang="en-IN" sz="2200" dirty="0" smtClean="0">
+                <a:latin typeface="Times New Roman" panose="02020603050405020304" pitchFamily="18" charset="0"/>
+                <a:cs typeface="Times New Roman" panose="02020603050405020304" pitchFamily="18" charset="0"/>
+              </a:rPr>
+              <a:t> and at a lower threshold P</a:t>
+            </a:r>
+            <a:r>
+              <a:rPr lang="en-IN" sz="2200" baseline="-25000" dirty="0" smtClean="0">
+                <a:latin typeface="Times New Roman" panose="02020603050405020304" pitchFamily="18" charset="0"/>
+                <a:cs typeface="Times New Roman" panose="02020603050405020304" pitchFamily="18" charset="0"/>
+              </a:rPr>
+              <a:t>l</a:t>
+            </a:r>
+            <a:r>
+              <a:rPr lang="en-IN" sz="2200" dirty="0" smtClean="0">
+                <a:latin typeface="Times New Roman" panose="02020603050405020304" pitchFamily="18" charset="0"/>
+                <a:cs typeface="Times New Roman" panose="02020603050405020304" pitchFamily="18" charset="0"/>
+              </a:rPr>
+              <a:t> and all other values between upper and lower thresholds are transformed using a normalized power law function with index r&gt;0.</a:t>
+            </a:r>
+            <a:endParaRPr lang="en-IN" sz="2200" dirty="0">
+              <a:latin typeface="Times New Roman" panose="02020603050405020304" pitchFamily="18" charset="0"/>
+              <a:cs typeface="Times New Roman" panose="02020603050405020304" pitchFamily="18" charset="0"/>
+            </a:endParaRPr>
+          </a:p>
         </p:txBody>
       </p:sp>
       <p:pic>
         <p:nvPicPr>
-          <p:cNvPr id="4" name="Picture 3"/>
+          <p:cNvPr id="5" name="Picture 4"/>
           <p:cNvPicPr>
             <a:picLocks noChangeAspect="1"/>
           </p:cNvPicPr>
@@ -4626,8 +5157,8 @@
         </p:blipFill>
         <p:spPr>
           <a:xfrm>
-            <a:off x="7707058" y="3445097"/>
-            <a:ext cx="1971675" cy="457200"/>
+            <a:off x="4047362" y="2044446"/>
+            <a:ext cx="2943225" cy="447675"/>
           </a:xfrm>
           <a:prstGeom prst="rect">
             <a:avLst/>
@@ -4636,7 +5167,7 @@
       </p:pic>
       <p:pic>
         <p:nvPicPr>
-          <p:cNvPr id="5" name="Picture 4"/>
+          <p:cNvPr id="6" name="Picture 5"/>
           <p:cNvPicPr>
             <a:picLocks noChangeAspect="1"/>
           </p:cNvPicPr>
@@ -4650,8 +5181,8 @@
         </p:blipFill>
         <p:spPr>
           <a:xfrm>
-            <a:off x="4720018" y="3673697"/>
-            <a:ext cx="3429000" cy="523875"/>
+            <a:off x="2847974" y="2983610"/>
+            <a:ext cx="5895975" cy="1800225"/>
           </a:xfrm>
           <a:prstGeom prst="rect">
             <a:avLst/>
@@ -4661,7 +5192,7 @@
     </p:spTree>
     <p:extLst>
       <p:ext uri="{BB962C8B-B14F-4D97-AF65-F5344CB8AC3E}">
-        <p14:creationId xmlns:p14="http://schemas.microsoft.com/office/powerpoint/2010/main" val="1109763684"/>
+        <p14:creationId xmlns:p14="http://schemas.microsoft.com/office/powerpoint/2010/main" val="2057556621"/>
       </p:ext>
     </p:extLst>
   </p:cSld>
@@ -4707,7 +5238,577 @@
         </p:nvSpPr>
         <p:spPr>
           <a:xfrm>
-            <a:off x="838200" y="365125"/>
+            <a:off x="838200" y="431800"/>
+            <a:ext cx="10515600" cy="805307"/>
+          </a:xfrm>
+        </p:spPr>
+        <p:txBody>
+          <a:bodyPr>
+            <a:normAutofit/>
+          </a:bodyPr>
+          <a:lstStyle/>
+          <a:p>
+            <a:r>
+              <a:rPr lang="en-IN" sz="3200" b="1" dirty="0" smtClean="0">
+                <a:latin typeface="Times New Roman" panose="02020603050405020304" pitchFamily="18" charset="0"/>
+                <a:cs typeface="Times New Roman" panose="02020603050405020304" pitchFamily="18" charset="0"/>
+              </a:rPr>
+              <a:t>2. Technical discussion</a:t>
+            </a:r>
+            <a:endParaRPr lang="en-IN" sz="3200" b="1" dirty="0">
+              <a:latin typeface="Times New Roman" panose="02020603050405020304" pitchFamily="18" charset="0"/>
+              <a:cs typeface="Times New Roman" panose="02020603050405020304" pitchFamily="18" charset="0"/>
+            </a:endParaRPr>
+          </a:p>
+        </p:txBody>
+      </p:sp>
+      <p:sp>
+        <p:nvSpPr>
+          <p:cNvPr id="3" name="Content Placeholder 2"/>
+          <p:cNvSpPr>
+            <a:spLocks noGrp="1"/>
+          </p:cNvSpPr>
+          <p:nvPr>
+            <p:ph idx="1"/>
+          </p:nvPr>
+        </p:nvSpPr>
+        <p:spPr>
+          <a:xfrm>
+            <a:off x="838200" y="1399031"/>
+            <a:ext cx="10515600" cy="5006531"/>
+          </a:xfrm>
+        </p:spPr>
+        <p:txBody>
+          <a:bodyPr>
+            <a:normAutofit/>
+          </a:bodyPr>
+          <a:lstStyle/>
+          <a:p>
+            <a:pPr>
+              <a:lnSpc>
+                <a:spcPct val="100000"/>
+              </a:lnSpc>
+              <a:buFont typeface="Wingdings" panose="05000000000000000000" pitchFamily="2" charset="2"/>
+              <a:buChar char="q"/>
+            </a:pPr>
+            <a:r>
+              <a:rPr lang="en-IN" sz="2200" dirty="0" smtClean="0">
+                <a:latin typeface="Times New Roman" panose="02020603050405020304" pitchFamily="18" charset="0"/>
+                <a:cs typeface="Times New Roman" panose="02020603050405020304" pitchFamily="18" charset="0"/>
+              </a:rPr>
+              <a:t>The increment for each intensity level can be controlled by adjusting the index </a:t>
+            </a:r>
+            <a:r>
+              <a:rPr lang="en-IN" sz="2200" i="1" dirty="0" smtClean="0">
+                <a:latin typeface="Times New Roman" panose="02020603050405020304" pitchFamily="18" charset="0"/>
+                <a:cs typeface="Times New Roman" panose="02020603050405020304" pitchFamily="18" charset="0"/>
+              </a:rPr>
+              <a:t>r</a:t>
+            </a:r>
+            <a:r>
+              <a:rPr lang="en-IN" sz="2200" dirty="0" smtClean="0">
+                <a:latin typeface="Times New Roman" panose="02020603050405020304" pitchFamily="18" charset="0"/>
+                <a:cs typeface="Times New Roman" panose="02020603050405020304" pitchFamily="18" charset="0"/>
+              </a:rPr>
+              <a:t> of the power law transformation function.</a:t>
+            </a:r>
+          </a:p>
+          <a:p>
+            <a:pPr marL="0" indent="0">
+              <a:lnSpc>
+                <a:spcPct val="100000"/>
+              </a:lnSpc>
+              <a:buNone/>
+            </a:pPr>
+            <a:r>
+              <a:rPr lang="en-IN" sz="2200" dirty="0">
+                <a:latin typeface="Times New Roman" panose="02020603050405020304" pitchFamily="18" charset="0"/>
+                <a:cs typeface="Times New Roman" panose="02020603050405020304" pitchFamily="18" charset="0"/>
+              </a:rPr>
+              <a:t> </a:t>
+            </a:r>
+            <a:r>
+              <a:rPr lang="en-IN" sz="2200" dirty="0" smtClean="0">
+                <a:latin typeface="Times New Roman" panose="02020603050405020304" pitchFamily="18" charset="0"/>
+                <a:cs typeface="Times New Roman" panose="02020603050405020304" pitchFamily="18" charset="0"/>
+              </a:rPr>
+              <a:t>   </a:t>
+            </a:r>
+            <a:r>
+              <a:rPr lang="en-IN" sz="2200" dirty="0" smtClean="0">
+                <a:latin typeface="Times New Roman" panose="02020603050405020304" pitchFamily="18" charset="0"/>
+                <a:cs typeface="Times New Roman" panose="02020603050405020304" pitchFamily="18" charset="0"/>
+              </a:rPr>
+              <a:t>Ex</a:t>
+            </a:r>
+            <a:r>
+              <a:rPr lang="en-IN" sz="2200" dirty="0" smtClean="0">
+                <a:latin typeface="Times New Roman" panose="02020603050405020304" pitchFamily="18" charset="0"/>
+                <a:cs typeface="Times New Roman" panose="02020603050405020304" pitchFamily="18" charset="0"/>
+              </a:rPr>
+              <a:t>: When </a:t>
+            </a:r>
+            <a:r>
+              <a:rPr lang="en-IN" sz="2200" i="1" dirty="0" smtClean="0">
+                <a:latin typeface="Times New Roman" panose="02020603050405020304" pitchFamily="18" charset="0"/>
+                <a:cs typeface="Times New Roman" panose="02020603050405020304" pitchFamily="18" charset="0"/>
+              </a:rPr>
+              <a:t>r</a:t>
+            </a:r>
+            <a:r>
+              <a:rPr lang="en-IN" sz="2200" dirty="0" smtClean="0">
+                <a:latin typeface="Times New Roman" panose="02020603050405020304" pitchFamily="18" charset="0"/>
+                <a:cs typeface="Times New Roman" panose="02020603050405020304" pitchFamily="18" charset="0"/>
+              </a:rPr>
+              <a:t>&lt;1, higher weights are given to low probabilities than the high probabilities. </a:t>
+            </a:r>
+            <a:r>
+              <a:rPr lang="en-IN" sz="2200" dirty="0" err="1" smtClean="0">
+                <a:latin typeface="Times New Roman" panose="02020603050405020304" pitchFamily="18" charset="0"/>
+                <a:cs typeface="Times New Roman" panose="02020603050405020304" pitchFamily="18" charset="0"/>
+              </a:rPr>
+              <a:t>i.e</a:t>
+            </a:r>
+            <a:r>
+              <a:rPr lang="en-IN" sz="2200" dirty="0" smtClean="0">
+                <a:latin typeface="Times New Roman" panose="02020603050405020304" pitchFamily="18" charset="0"/>
+                <a:cs typeface="Times New Roman" panose="02020603050405020304" pitchFamily="18" charset="0"/>
+              </a:rPr>
+              <a:t>, the less-probable levels are protected and over-enhancement is less likely to occur.</a:t>
+            </a:r>
+          </a:p>
+          <a:p>
+            <a:pPr>
+              <a:lnSpc>
+                <a:spcPct val="100000"/>
+              </a:lnSpc>
+              <a:buFont typeface="Wingdings" panose="05000000000000000000" pitchFamily="2" charset="2"/>
+              <a:buChar char="q"/>
+            </a:pPr>
+            <a:r>
+              <a:rPr lang="en-IN" sz="2200" dirty="0" smtClean="0">
+                <a:latin typeface="Times New Roman" panose="02020603050405020304" pitchFamily="18" charset="0"/>
+                <a:cs typeface="Times New Roman" panose="02020603050405020304" pitchFamily="18" charset="0"/>
+              </a:rPr>
+              <a:t>Also, there is an upper limit </a:t>
+            </a:r>
+            <a:r>
+              <a:rPr lang="en-IN" sz="2200" i="1" dirty="0" smtClean="0">
+                <a:latin typeface="Times New Roman" panose="02020603050405020304" pitchFamily="18" charset="0"/>
+                <a:cs typeface="Times New Roman" panose="02020603050405020304" pitchFamily="18" charset="0"/>
+              </a:rPr>
+              <a:t>P</a:t>
+            </a:r>
+            <a:r>
+              <a:rPr lang="en-IN" sz="2200" i="1" baseline="-25000" dirty="0" smtClean="0">
+                <a:latin typeface="Times New Roman" panose="02020603050405020304" pitchFamily="18" charset="0"/>
+                <a:cs typeface="Times New Roman" panose="02020603050405020304" pitchFamily="18" charset="0"/>
+              </a:rPr>
+              <a:t>u</a:t>
+            </a:r>
+            <a:r>
+              <a:rPr lang="en-IN" sz="2200" dirty="0" smtClean="0">
+                <a:latin typeface="Times New Roman" panose="02020603050405020304" pitchFamily="18" charset="0"/>
+                <a:cs typeface="Times New Roman" panose="02020603050405020304" pitchFamily="18" charset="0"/>
+              </a:rPr>
+              <a:t> as a result, all levels whose PDF values are higher then </a:t>
+            </a:r>
+            <a:r>
+              <a:rPr lang="en-IN" sz="2200" i="1" dirty="0" smtClean="0">
+                <a:latin typeface="Times New Roman" panose="02020603050405020304" pitchFamily="18" charset="0"/>
+                <a:cs typeface="Times New Roman" panose="02020603050405020304" pitchFamily="18" charset="0"/>
+              </a:rPr>
+              <a:t>P</a:t>
+            </a:r>
+            <a:r>
+              <a:rPr lang="en-IN" sz="2200" i="1" baseline="-25000" dirty="0" smtClean="0">
+                <a:latin typeface="Times New Roman" panose="02020603050405020304" pitchFamily="18" charset="0"/>
+                <a:cs typeface="Times New Roman" panose="02020603050405020304" pitchFamily="18" charset="0"/>
+              </a:rPr>
+              <a:t>u</a:t>
+            </a:r>
+            <a:r>
+              <a:rPr lang="en-IN" sz="2200" dirty="0" smtClean="0">
+                <a:latin typeface="Times New Roman" panose="02020603050405020304" pitchFamily="18" charset="0"/>
+                <a:cs typeface="Times New Roman" panose="02020603050405020304" pitchFamily="18" charset="0"/>
+              </a:rPr>
+              <a:t> will have the increment clamped at a max. </a:t>
+            </a:r>
+            <a:r>
+              <a:rPr lang="el-GR" sz="2200" dirty="0" smtClean="0">
+                <a:latin typeface="Times New Roman" panose="02020603050405020304" pitchFamily="18" charset="0"/>
+                <a:cs typeface="Times New Roman" panose="02020603050405020304" pitchFamily="18" charset="0"/>
+              </a:rPr>
+              <a:t>Δ</a:t>
+            </a:r>
+            <a:r>
+              <a:rPr lang="en-IN" sz="2200" baseline="-25000" dirty="0" smtClean="0">
+                <a:latin typeface="Times New Roman" panose="02020603050405020304" pitchFamily="18" charset="0"/>
+                <a:cs typeface="Times New Roman" panose="02020603050405020304" pitchFamily="18" charset="0"/>
+              </a:rPr>
+              <a:t>max</a:t>
+            </a:r>
+            <a:r>
+              <a:rPr lang="en-IN" sz="2200" dirty="0" smtClean="0">
+                <a:latin typeface="Times New Roman" panose="02020603050405020304" pitchFamily="18" charset="0"/>
+                <a:cs typeface="Times New Roman" panose="02020603050405020304" pitchFamily="18" charset="0"/>
+              </a:rPr>
+              <a:t> =(</a:t>
+            </a:r>
+            <a:r>
+              <a:rPr lang="en-IN" sz="2200" i="1" dirty="0" smtClean="0">
+                <a:latin typeface="Times New Roman" panose="02020603050405020304" pitchFamily="18" charset="0"/>
+                <a:cs typeface="Times New Roman" panose="02020603050405020304" pitchFamily="18" charset="0"/>
+              </a:rPr>
+              <a:t>K</a:t>
+            </a:r>
+            <a:r>
+              <a:rPr lang="en-IN" sz="2200" dirty="0" smtClean="0">
+                <a:latin typeface="Times New Roman" panose="02020603050405020304" pitchFamily="18" charset="0"/>
+                <a:cs typeface="Times New Roman" panose="02020603050405020304" pitchFamily="18" charset="0"/>
+              </a:rPr>
+              <a:t>-1).</a:t>
+            </a:r>
+            <a:r>
+              <a:rPr lang="en-IN" sz="2200" i="1" dirty="0" smtClean="0">
+                <a:latin typeface="Times New Roman" panose="02020603050405020304" pitchFamily="18" charset="0"/>
+                <a:cs typeface="Times New Roman" panose="02020603050405020304" pitchFamily="18" charset="0"/>
+              </a:rPr>
+              <a:t>P</a:t>
+            </a:r>
+            <a:r>
+              <a:rPr lang="en-IN" sz="2200" i="1" baseline="-25000" dirty="0" smtClean="0">
+                <a:latin typeface="Times New Roman" panose="02020603050405020304" pitchFamily="18" charset="0"/>
+                <a:cs typeface="Times New Roman" panose="02020603050405020304" pitchFamily="18" charset="0"/>
+              </a:rPr>
+              <a:t>u</a:t>
+            </a:r>
+            <a:endParaRPr lang="en-IN" sz="2200" dirty="0" smtClean="0">
+              <a:latin typeface="Times New Roman" panose="02020603050405020304" pitchFamily="18" charset="0"/>
+              <a:cs typeface="Times New Roman" panose="02020603050405020304" pitchFamily="18" charset="0"/>
+            </a:endParaRPr>
+          </a:p>
+          <a:p>
+            <a:pPr>
+              <a:lnSpc>
+                <a:spcPct val="100000"/>
+              </a:lnSpc>
+              <a:buFont typeface="Wingdings" panose="05000000000000000000" pitchFamily="2" charset="2"/>
+              <a:buChar char="q"/>
+            </a:pPr>
+            <a:r>
+              <a:rPr lang="en-IN" sz="2200" dirty="0" smtClean="0">
+                <a:latin typeface="Times New Roman" panose="02020603050405020304" pitchFamily="18" charset="0"/>
+                <a:cs typeface="Times New Roman" panose="02020603050405020304" pitchFamily="18" charset="0"/>
+              </a:rPr>
+              <a:t>The value of </a:t>
+            </a:r>
+            <a:r>
+              <a:rPr lang="en-IN" sz="2200" i="1" dirty="0" smtClean="0">
+                <a:latin typeface="Times New Roman" panose="02020603050405020304" pitchFamily="18" charset="0"/>
+                <a:cs typeface="Times New Roman" panose="02020603050405020304" pitchFamily="18" charset="0"/>
+              </a:rPr>
+              <a:t>P</a:t>
+            </a:r>
+            <a:r>
+              <a:rPr lang="en-IN" sz="2200" i="1" baseline="-25000" dirty="0" smtClean="0">
+                <a:latin typeface="Times New Roman" panose="02020603050405020304" pitchFamily="18" charset="0"/>
+                <a:cs typeface="Times New Roman" panose="02020603050405020304" pitchFamily="18" charset="0"/>
+              </a:rPr>
+              <a:t>u</a:t>
+            </a:r>
+            <a:r>
+              <a:rPr lang="en-IN" sz="2200" dirty="0" smtClean="0">
+                <a:latin typeface="Times New Roman" panose="02020603050405020304" pitchFamily="18" charset="0"/>
+                <a:cs typeface="Times New Roman" panose="02020603050405020304" pitchFamily="18" charset="0"/>
+              </a:rPr>
+              <a:t> is decided by </a:t>
+            </a:r>
+            <a:r>
+              <a:rPr lang="en-IN" sz="2200" i="1" dirty="0" smtClean="0">
+                <a:latin typeface="Times New Roman" panose="02020603050405020304" pitchFamily="18" charset="0"/>
+                <a:cs typeface="Times New Roman" panose="02020603050405020304" pitchFamily="18" charset="0"/>
+              </a:rPr>
+              <a:t>P</a:t>
+            </a:r>
+            <a:r>
+              <a:rPr lang="en-IN" sz="2200" i="1" baseline="-25000" dirty="0" smtClean="0">
+                <a:latin typeface="Times New Roman" panose="02020603050405020304" pitchFamily="18" charset="0"/>
+                <a:cs typeface="Times New Roman" panose="02020603050405020304" pitchFamily="18" charset="0"/>
+              </a:rPr>
+              <a:t>u</a:t>
+            </a:r>
+            <a:r>
+              <a:rPr lang="en-IN" sz="2200" i="1" dirty="0" smtClean="0">
+                <a:latin typeface="Times New Roman" panose="02020603050405020304" pitchFamily="18" charset="0"/>
+                <a:cs typeface="Times New Roman" panose="02020603050405020304" pitchFamily="18" charset="0"/>
+              </a:rPr>
+              <a:t>=</a:t>
+            </a:r>
+            <a:r>
+              <a:rPr lang="en-IN" sz="2200" i="1" dirty="0" err="1" smtClean="0">
+                <a:latin typeface="Times New Roman" panose="02020603050405020304" pitchFamily="18" charset="0"/>
+                <a:cs typeface="Times New Roman" panose="02020603050405020304" pitchFamily="18" charset="0"/>
+              </a:rPr>
+              <a:t>v.P</a:t>
+            </a:r>
+            <a:r>
+              <a:rPr lang="en-IN" sz="2200" i="1" baseline="-25000" dirty="0" err="1" smtClean="0">
+                <a:latin typeface="Times New Roman" panose="02020603050405020304" pitchFamily="18" charset="0"/>
+                <a:cs typeface="Times New Roman" panose="02020603050405020304" pitchFamily="18" charset="0"/>
+              </a:rPr>
+              <a:t>max</a:t>
+            </a:r>
+            <a:r>
+              <a:rPr lang="en-IN" sz="2200" dirty="0" smtClean="0">
+                <a:latin typeface="Times New Roman" panose="02020603050405020304" pitchFamily="18" charset="0"/>
+                <a:cs typeface="Times New Roman" panose="02020603050405020304" pitchFamily="18" charset="0"/>
+              </a:rPr>
+              <a:t> , 0≤</a:t>
+            </a:r>
+            <a:r>
+              <a:rPr lang="en-IN" sz="2200" i="1" dirty="0" smtClean="0">
+                <a:latin typeface="Times New Roman" panose="02020603050405020304" pitchFamily="18" charset="0"/>
+                <a:cs typeface="Times New Roman" panose="02020603050405020304" pitchFamily="18" charset="0"/>
+              </a:rPr>
+              <a:t>v</a:t>
+            </a:r>
+            <a:r>
+              <a:rPr lang="en-IN" sz="2200" dirty="0" smtClean="0">
+                <a:latin typeface="Times New Roman" panose="02020603050405020304" pitchFamily="18" charset="0"/>
+                <a:cs typeface="Times New Roman" panose="02020603050405020304" pitchFamily="18" charset="0"/>
+              </a:rPr>
+              <a:t>≤1.</a:t>
+            </a:r>
+            <a:r>
+              <a:rPr lang="en-IN" sz="2200" dirty="0" smtClean="0">
+                <a:latin typeface="Times New Roman" panose="02020603050405020304" pitchFamily="18" charset="0"/>
+                <a:cs typeface="Times New Roman" panose="02020603050405020304" pitchFamily="18" charset="0"/>
+              </a:rPr>
+              <a:t> </a:t>
+            </a:r>
+            <a:r>
+              <a:rPr lang="en-IN" sz="2200" i="1" dirty="0" smtClean="0">
+                <a:latin typeface="Times New Roman" panose="02020603050405020304" pitchFamily="18" charset="0"/>
+                <a:cs typeface="Times New Roman" panose="02020603050405020304" pitchFamily="18" charset="0"/>
+              </a:rPr>
+              <a:t>v</a:t>
+            </a:r>
+            <a:r>
+              <a:rPr lang="en-IN" sz="2200" dirty="0" smtClean="0">
+                <a:latin typeface="Times New Roman" panose="02020603050405020304" pitchFamily="18" charset="0"/>
+                <a:cs typeface="Times New Roman" panose="02020603050405020304" pitchFamily="18" charset="0"/>
+              </a:rPr>
+              <a:t>  </a:t>
+            </a:r>
+            <a:r>
+              <a:rPr lang="en-IN" sz="2200" dirty="0" smtClean="0">
+                <a:latin typeface="Times New Roman" panose="02020603050405020304" pitchFamily="18" charset="0"/>
+                <a:cs typeface="Times New Roman" panose="02020603050405020304" pitchFamily="18" charset="0"/>
+              </a:rPr>
+              <a:t>is a real number which defines the upper threshold normalized to </a:t>
+            </a:r>
+            <a:r>
+              <a:rPr lang="en-IN" sz="2200" i="1" dirty="0" err="1" smtClean="0">
+                <a:latin typeface="Times New Roman" panose="02020603050405020304" pitchFamily="18" charset="0"/>
+                <a:cs typeface="Times New Roman" panose="02020603050405020304" pitchFamily="18" charset="0"/>
+              </a:rPr>
+              <a:t>P</a:t>
+            </a:r>
+            <a:r>
+              <a:rPr lang="en-IN" sz="2200" i="1" baseline="-25000" dirty="0" err="1" smtClean="0">
+                <a:latin typeface="Times New Roman" panose="02020603050405020304" pitchFamily="18" charset="0"/>
+                <a:cs typeface="Times New Roman" panose="02020603050405020304" pitchFamily="18" charset="0"/>
+              </a:rPr>
+              <a:t>max</a:t>
+            </a:r>
+            <a:r>
+              <a:rPr lang="en-IN" sz="2200" i="1" dirty="0" smtClean="0">
+                <a:latin typeface="Times New Roman" panose="02020603050405020304" pitchFamily="18" charset="0"/>
+                <a:cs typeface="Times New Roman" panose="02020603050405020304" pitchFamily="18" charset="0"/>
+              </a:rPr>
+              <a:t> </a:t>
+            </a:r>
+            <a:r>
+              <a:rPr lang="en-IN" sz="2200" dirty="0" smtClean="0">
+                <a:latin typeface="Times New Roman" panose="02020603050405020304" pitchFamily="18" charset="0"/>
+                <a:cs typeface="Times New Roman" panose="02020603050405020304" pitchFamily="18" charset="0"/>
+              </a:rPr>
+              <a:t>.</a:t>
+            </a:r>
+          </a:p>
+          <a:p>
+            <a:pPr>
+              <a:lnSpc>
+                <a:spcPct val="100000"/>
+              </a:lnSpc>
+              <a:buFont typeface="Wingdings" panose="05000000000000000000" pitchFamily="2" charset="2"/>
+              <a:buChar char="q"/>
+            </a:pPr>
+            <a:r>
+              <a:rPr lang="en-IN" sz="2200" dirty="0" smtClean="0">
+                <a:latin typeface="Times New Roman" panose="02020603050405020304" pitchFamily="18" charset="0"/>
+                <a:cs typeface="Times New Roman" panose="02020603050405020304" pitchFamily="18" charset="0"/>
+              </a:rPr>
+              <a:t>The lower threshold </a:t>
+            </a:r>
+            <a:r>
+              <a:rPr lang="en-IN" sz="2200" i="1" dirty="0" smtClean="0">
+                <a:latin typeface="Times New Roman" panose="02020603050405020304" pitchFamily="18" charset="0"/>
+                <a:cs typeface="Times New Roman" panose="02020603050405020304" pitchFamily="18" charset="0"/>
+              </a:rPr>
+              <a:t>P</a:t>
+            </a:r>
+            <a:r>
+              <a:rPr lang="en-IN" sz="2200" i="1" baseline="-25000" dirty="0" smtClean="0">
+                <a:latin typeface="Times New Roman" panose="02020603050405020304" pitchFamily="18" charset="0"/>
+                <a:cs typeface="Times New Roman" panose="02020603050405020304" pitchFamily="18" charset="0"/>
+              </a:rPr>
+              <a:t>l</a:t>
+            </a:r>
+            <a:r>
+              <a:rPr lang="en-IN" sz="2200" dirty="0" smtClean="0">
+                <a:latin typeface="Times New Roman" panose="02020603050405020304" pitchFamily="18" charset="0"/>
+                <a:cs typeface="Times New Roman" panose="02020603050405020304" pitchFamily="18" charset="0"/>
+              </a:rPr>
+              <a:t> is only used to cut out the levels whose probabilities are too low( little visual importance).</a:t>
+            </a:r>
+          </a:p>
+          <a:p>
+            <a:pPr>
+              <a:lnSpc>
+                <a:spcPct val="100000"/>
+              </a:lnSpc>
+              <a:buFont typeface="Wingdings" panose="05000000000000000000" pitchFamily="2" charset="2"/>
+              <a:buChar char="q"/>
+            </a:pPr>
+            <a:r>
+              <a:rPr lang="en-IN" sz="2200" dirty="0" smtClean="0">
+                <a:latin typeface="Times New Roman" panose="02020603050405020304" pitchFamily="18" charset="0"/>
+                <a:cs typeface="Times New Roman" panose="02020603050405020304" pitchFamily="18" charset="0"/>
+              </a:rPr>
+              <a:t>We can also observe that when </a:t>
+            </a:r>
+            <a:r>
+              <a:rPr lang="en-IN" sz="2200" i="1" dirty="0" smtClean="0">
+                <a:latin typeface="Times New Roman" panose="02020603050405020304" pitchFamily="18" charset="0"/>
+                <a:cs typeface="Times New Roman" panose="02020603050405020304" pitchFamily="18" charset="0"/>
+              </a:rPr>
+              <a:t>r</a:t>
+            </a:r>
+            <a:r>
+              <a:rPr lang="en-IN" sz="2200" dirty="0" smtClean="0">
+                <a:latin typeface="Times New Roman" panose="02020603050405020304" pitchFamily="18" charset="0"/>
+                <a:cs typeface="Times New Roman" panose="02020603050405020304" pitchFamily="18" charset="0"/>
+              </a:rPr>
+              <a:t>=1, </a:t>
+            </a:r>
+            <a:r>
+              <a:rPr lang="en-IN" sz="2200" i="1" dirty="0" smtClean="0">
+                <a:latin typeface="Times New Roman" panose="02020603050405020304" pitchFamily="18" charset="0"/>
+                <a:cs typeface="Times New Roman" panose="02020603050405020304" pitchFamily="18" charset="0"/>
+              </a:rPr>
+              <a:t>P</a:t>
+            </a:r>
+            <a:r>
+              <a:rPr lang="en-IN" sz="2200" i="1" baseline="-25000" dirty="0" smtClean="0">
+                <a:latin typeface="Times New Roman" panose="02020603050405020304" pitchFamily="18" charset="0"/>
+                <a:cs typeface="Times New Roman" panose="02020603050405020304" pitchFamily="18" charset="0"/>
+              </a:rPr>
+              <a:t>u</a:t>
+            </a:r>
+            <a:r>
+              <a:rPr lang="en-IN" sz="2200" dirty="0" smtClean="0">
+                <a:latin typeface="Times New Roman" panose="02020603050405020304" pitchFamily="18" charset="0"/>
+                <a:cs typeface="Times New Roman" panose="02020603050405020304" pitchFamily="18" charset="0"/>
+              </a:rPr>
+              <a:t>=1 and </a:t>
+            </a:r>
+            <a:r>
+              <a:rPr lang="en-IN" sz="2200" i="1" dirty="0" smtClean="0">
+                <a:latin typeface="Times New Roman" panose="02020603050405020304" pitchFamily="18" charset="0"/>
+                <a:cs typeface="Times New Roman" panose="02020603050405020304" pitchFamily="18" charset="0"/>
+              </a:rPr>
+              <a:t>P</a:t>
+            </a:r>
+            <a:r>
+              <a:rPr lang="en-IN" sz="2200" i="1" baseline="-25000" dirty="0" smtClean="0">
+                <a:latin typeface="Times New Roman" panose="02020603050405020304" pitchFamily="18" charset="0"/>
+                <a:cs typeface="Times New Roman" panose="02020603050405020304" pitchFamily="18" charset="0"/>
+              </a:rPr>
+              <a:t>l</a:t>
+            </a:r>
+            <a:r>
+              <a:rPr lang="en-IN" sz="2200" dirty="0" smtClean="0">
+                <a:latin typeface="Times New Roman" panose="02020603050405020304" pitchFamily="18" charset="0"/>
+                <a:cs typeface="Times New Roman" panose="02020603050405020304" pitchFamily="18" charset="0"/>
+              </a:rPr>
+              <a:t>=0, the WTHE method reduces to traditional HE</a:t>
+            </a:r>
+            <a:r>
+              <a:rPr lang="en-IN" sz="2200" dirty="0" smtClean="0">
+                <a:latin typeface="Times New Roman" panose="02020603050405020304" pitchFamily="18" charset="0"/>
+                <a:cs typeface="Times New Roman" panose="02020603050405020304" pitchFamily="18" charset="0"/>
+              </a:rPr>
+              <a:t>.</a:t>
+            </a:r>
+            <a:endParaRPr lang="en-IN" sz="2200" dirty="0">
+              <a:latin typeface="Times New Roman" panose="02020603050405020304" pitchFamily="18" charset="0"/>
+              <a:cs typeface="Times New Roman" panose="02020603050405020304" pitchFamily="18" charset="0"/>
+            </a:endParaRPr>
+          </a:p>
+        </p:txBody>
+      </p:sp>
+    </p:spTree>
+    <p:extLst>
+      <p:ext uri="{BB962C8B-B14F-4D97-AF65-F5344CB8AC3E}">
+        <p14:creationId xmlns:p14="http://schemas.microsoft.com/office/powerpoint/2010/main" val="1109763684"/>
+      </p:ext>
+    </p:extLst>
+  </p:cSld>
+  <p:clrMapOvr>
+    <a:masterClrMapping/>
+  </p:clrMapOvr>
+  <p:timing>
+    <p:tnLst>
+      <p:par>
+        <p:cTn id="1" dur="indefinite" restart="never" nodeType="tmRoot"/>
+      </p:par>
+    </p:tnLst>
+  </p:timing>
+</p:sld>
+</file>
+
+<file path=ppt/slides/slide8.xml><?xml version="1.0" encoding="utf-8"?>
+<p:sld xmlns:a="http://schemas.openxmlformats.org/drawingml/2006/main" xmlns:r="http://schemas.openxmlformats.org/officeDocument/2006/relationships" xmlns:p="http://schemas.openxmlformats.org/presentationml/2006/main">
+  <p:cSld>
+    <p:spTree>
+      <p:nvGrpSpPr>
+        <p:cNvPr id="1" name=""/>
+        <p:cNvGrpSpPr/>
+        <p:nvPr/>
+      </p:nvGrpSpPr>
+      <p:grpSpPr>
+        <a:xfrm>
+          <a:off x="0" y="0"/>
+          <a:ext cx="0" cy="0"/>
+          <a:chOff x="0" y="0"/>
+          <a:chExt cx="0" cy="0"/>
+        </a:xfrm>
+      </p:grpSpPr>
+      <p:sp>
+        <p:nvSpPr>
+          <p:cNvPr id="2" name="Title 1"/>
+          <p:cNvSpPr>
+            <a:spLocks noGrp="1"/>
+          </p:cNvSpPr>
+          <p:nvPr>
+            <p:ph type="title"/>
+          </p:nvPr>
+        </p:nvSpPr>
+        <p:spPr>
+          <a:xfrm>
+            <a:off x="838200" y="432309"/>
             <a:ext cx="10515600" cy="585851"/>
           </a:xfrm>
         </p:spPr>
@@ -4718,7 +5819,7 @@
           <a:lstStyle/>
           <a:p>
             <a:r>
-              <a:rPr lang="en-IN" sz="3200" dirty="0">
+              <a:rPr lang="en-IN" sz="3200" b="1" dirty="0">
                 <a:latin typeface="Times New Roman" panose="02020603050405020304" pitchFamily="18" charset="0"/>
                 <a:cs typeface="Times New Roman" panose="02020603050405020304" pitchFamily="18" charset="0"/>
               </a:rPr>
@@ -4739,7 +5840,7 @@
         </p:nvSpPr>
         <p:spPr>
           <a:xfrm>
-            <a:off x="838200" y="950976"/>
+            <a:off x="838200" y="1176717"/>
             <a:ext cx="10515600" cy="5225987"/>
           </a:xfrm>
         </p:spPr>
@@ -4749,22 +5850,33 @@
           </a:bodyPr>
           <a:lstStyle/>
           <a:p>
-            <a:r>
-              <a:rPr lang="en-IN" sz="2400" dirty="0" smtClean="0">
-                <a:latin typeface="Times New Roman" panose="02020603050405020304" pitchFamily="18" charset="0"/>
-                <a:cs typeface="Times New Roman" panose="02020603050405020304" pitchFamily="18" charset="0"/>
-              </a:rPr>
-              <a:t>After the weighted </a:t>
-            </a:r>
-            <a:r>
-              <a:rPr lang="en-IN" sz="2400" dirty="0" err="1" smtClean="0">
+            <a:pPr>
+              <a:buFont typeface="Wingdings" panose="05000000000000000000" pitchFamily="2" charset="2"/>
+              <a:buChar char="q"/>
+            </a:pPr>
+            <a:r>
+              <a:rPr lang="en-IN" sz="2200" dirty="0" smtClean="0">
+                <a:latin typeface="Times New Roman" panose="02020603050405020304" pitchFamily="18" charset="0"/>
+                <a:cs typeface="Times New Roman" panose="02020603050405020304" pitchFamily="18" charset="0"/>
+              </a:rPr>
+              <a:t> After </a:t>
+            </a:r>
+            <a:r>
+              <a:rPr lang="en-IN" sz="2200" dirty="0" smtClean="0">
+                <a:latin typeface="Times New Roman" panose="02020603050405020304" pitchFamily="18" charset="0"/>
+                <a:cs typeface="Times New Roman" panose="02020603050405020304" pitchFamily="18" charset="0"/>
+              </a:rPr>
+              <a:t>the weighted </a:t>
+            </a:r>
+            <a:r>
+              <a:rPr lang="en-IN" sz="2200" dirty="0" err="1" smtClean="0">
                 <a:latin typeface="Times New Roman" panose="02020603050405020304" pitchFamily="18" charset="0"/>
                 <a:cs typeface="Times New Roman" panose="02020603050405020304" pitchFamily="18" charset="0"/>
               </a:rPr>
               <a:t>thresholded</a:t>
             </a:r>
             <a:r>
-              <a:rPr lang="en-IN" sz="2400" dirty="0" smtClean="0">
+              <a:rPr lang="en-IN" sz="2200" dirty="0" smtClean="0">
                 <a:latin typeface="Times New Roman" panose="02020603050405020304" pitchFamily="18" charset="0"/>
                 <a:cs typeface="Times New Roman" panose="02020603050405020304" pitchFamily="18" charset="0"/>
               </a:rPr>
@@ -4772,113 +5884,122 @@
             </a:r>
           </a:p>
           <a:p>
-            <a:endParaRPr lang="en-IN" sz="2400" dirty="0">
+            <a:pPr>
+              <a:buFont typeface="Wingdings" panose="05000000000000000000" pitchFamily="2" charset="2"/>
+              <a:buChar char="q"/>
+            </a:pPr>
+            <a:endParaRPr lang="en-IN" sz="2200" dirty="0">
               <a:latin typeface="Times New Roman" panose="02020603050405020304" pitchFamily="18" charset="0"/>
               <a:cs typeface="Times New Roman" panose="02020603050405020304" pitchFamily="18" charset="0"/>
             </a:endParaRPr>
           </a:p>
           <a:p>
+            <a:pPr>
+              <a:buFont typeface="Wingdings" panose="05000000000000000000" pitchFamily="2" charset="2"/>
+              <a:buChar char="q"/>
+            </a:pPr>
+            <a:r>
+              <a:rPr lang="en-IN" sz="2200" dirty="0" smtClean="0">
+                <a:latin typeface="Times New Roman" panose="02020603050405020304" pitchFamily="18" charset="0"/>
+                <a:cs typeface="Times New Roman" panose="02020603050405020304" pitchFamily="18" charset="0"/>
+              </a:rPr>
+              <a:t> The </a:t>
+            </a:r>
+            <a:r>
+              <a:rPr lang="en-IN" sz="2200" dirty="0" smtClean="0">
+                <a:latin typeface="Times New Roman" panose="02020603050405020304" pitchFamily="18" charset="0"/>
+                <a:cs typeface="Times New Roman" panose="02020603050405020304" pitchFamily="18" charset="0"/>
+              </a:rPr>
+              <a:t>HE procedure is, </a:t>
+            </a:r>
+          </a:p>
+          <a:p>
+            <a:pPr>
+              <a:buFont typeface="Wingdings" panose="05000000000000000000" pitchFamily="2" charset="2"/>
+              <a:buChar char="q"/>
+            </a:pPr>
+            <a:r>
+              <a:rPr lang="en-IN" sz="2200" i="1" dirty="0" smtClean="0">
+                <a:latin typeface="Times New Roman" panose="02020603050405020304" pitchFamily="18" charset="0"/>
+                <a:cs typeface="Times New Roman" panose="02020603050405020304" pitchFamily="18" charset="0"/>
+              </a:rPr>
+              <a:t> </a:t>
+            </a:r>
+            <a:r>
+              <a:rPr lang="en-IN" sz="2200" i="1" dirty="0" err="1" smtClean="0">
+                <a:latin typeface="Times New Roman" panose="02020603050405020304" pitchFamily="18" charset="0"/>
+                <a:cs typeface="Times New Roman" panose="02020603050405020304" pitchFamily="18" charset="0"/>
+              </a:rPr>
+              <a:t>W</a:t>
+            </a:r>
+            <a:r>
+              <a:rPr lang="en-IN" sz="2200" i="1" baseline="-25000" dirty="0" err="1" smtClean="0">
+                <a:latin typeface="Times New Roman" panose="02020603050405020304" pitchFamily="18" charset="0"/>
+                <a:cs typeface="Times New Roman" panose="02020603050405020304" pitchFamily="18" charset="0"/>
+              </a:rPr>
+              <a:t>out</a:t>
+            </a:r>
+            <a:r>
+              <a:rPr lang="en-IN" sz="2200" i="1" dirty="0" smtClean="0">
+                <a:latin typeface="Times New Roman" panose="02020603050405020304" pitchFamily="18" charset="0"/>
+                <a:cs typeface="Times New Roman" panose="02020603050405020304" pitchFamily="18" charset="0"/>
+              </a:rPr>
+              <a:t> </a:t>
+            </a:r>
+            <a:r>
+              <a:rPr lang="en-IN" sz="2200" dirty="0" smtClean="0">
+                <a:latin typeface="Times New Roman" panose="02020603050405020304" pitchFamily="18" charset="0"/>
+                <a:cs typeface="Times New Roman" panose="02020603050405020304" pitchFamily="18" charset="0"/>
+              </a:rPr>
+              <a:t>is the dynamic range of output image, </a:t>
+            </a:r>
+            <a:r>
+              <a:rPr lang="en-IN" sz="2200" i="1" dirty="0" err="1" smtClean="0">
+                <a:latin typeface="Times New Roman" panose="02020603050405020304" pitchFamily="18" charset="0"/>
+                <a:cs typeface="Times New Roman" panose="02020603050405020304" pitchFamily="18" charset="0"/>
+              </a:rPr>
+              <a:t>M</a:t>
+            </a:r>
+            <a:r>
+              <a:rPr lang="en-IN" sz="2200" i="1" baseline="-25000" dirty="0" err="1" smtClean="0">
+                <a:latin typeface="Times New Roman" panose="02020603050405020304" pitchFamily="18" charset="0"/>
+                <a:cs typeface="Times New Roman" panose="02020603050405020304" pitchFamily="18" charset="0"/>
+              </a:rPr>
+              <a:t>adj</a:t>
+            </a:r>
+            <a:r>
+              <a:rPr lang="en-IN" sz="2200" dirty="0" smtClean="0">
+                <a:latin typeface="Times New Roman" panose="02020603050405020304" pitchFamily="18" charset="0"/>
+                <a:cs typeface="Times New Roman" panose="02020603050405020304" pitchFamily="18" charset="0"/>
+              </a:rPr>
+              <a:t> is the mean luminance level after enhancement. </a:t>
+            </a:r>
+          </a:p>
+          <a:p>
+            <a:pPr>
+              <a:buFont typeface="Wingdings" panose="05000000000000000000" pitchFamily="2" charset="2"/>
+              <a:buChar char="q"/>
+            </a:pPr>
             <a:endParaRPr lang="en-IN" sz="2400" dirty="0" smtClean="0">
               <a:latin typeface="Times New Roman" panose="02020603050405020304" pitchFamily="18" charset="0"/>
               <a:cs typeface="Times New Roman" panose="02020603050405020304" pitchFamily="18" charset="0"/>
             </a:endParaRPr>
           </a:p>
           <a:p>
-            <a:r>
-              <a:rPr lang="en-IN" sz="2400" dirty="0" smtClean="0">
-                <a:latin typeface="Times New Roman" panose="02020603050405020304" pitchFamily="18" charset="0"/>
-                <a:cs typeface="Times New Roman" panose="02020603050405020304" pitchFamily="18" charset="0"/>
-              </a:rPr>
-              <a:t>The HE procedure is, </a:t>
-            </a:r>
-          </a:p>
-          <a:p>
-            <a:r>
-              <a:rPr lang="en-IN" sz="2400" dirty="0" err="1" smtClean="0">
-                <a:latin typeface="Times New Roman" panose="02020603050405020304" pitchFamily="18" charset="0"/>
-                <a:cs typeface="Times New Roman" panose="02020603050405020304" pitchFamily="18" charset="0"/>
-              </a:rPr>
-              <a:t>W</a:t>
-            </a:r>
-            <a:r>
-              <a:rPr lang="en-IN" sz="2400" baseline="-25000" dirty="0" err="1" smtClean="0">
-                <a:latin typeface="Times New Roman" panose="02020603050405020304" pitchFamily="18" charset="0"/>
-                <a:cs typeface="Times New Roman" panose="02020603050405020304" pitchFamily="18" charset="0"/>
-              </a:rPr>
-              <a:t>out</a:t>
-            </a:r>
-            <a:r>
-              <a:rPr lang="en-IN" sz="2400" dirty="0" smtClean="0">
-                <a:latin typeface="Times New Roman" panose="02020603050405020304" pitchFamily="18" charset="0"/>
-                <a:cs typeface="Times New Roman" panose="02020603050405020304" pitchFamily="18" charset="0"/>
-              </a:rPr>
-              <a:t> is the dynamic range of output image, </a:t>
-            </a:r>
-            <a:r>
-              <a:rPr lang="en-IN" sz="2400" dirty="0" err="1" smtClean="0">
-                <a:latin typeface="Times New Roman" panose="02020603050405020304" pitchFamily="18" charset="0"/>
-                <a:cs typeface="Times New Roman" panose="02020603050405020304" pitchFamily="18" charset="0"/>
-              </a:rPr>
-              <a:t>M</a:t>
-            </a:r>
-            <a:r>
-              <a:rPr lang="en-IN" sz="2400" baseline="-25000" dirty="0" err="1" smtClean="0">
-                <a:latin typeface="Times New Roman" panose="02020603050405020304" pitchFamily="18" charset="0"/>
-                <a:cs typeface="Times New Roman" panose="02020603050405020304" pitchFamily="18" charset="0"/>
-              </a:rPr>
-              <a:t>adj</a:t>
-            </a:r>
-            <a:r>
-              <a:rPr lang="en-IN" sz="2400" dirty="0" smtClean="0">
-                <a:latin typeface="Times New Roman" panose="02020603050405020304" pitchFamily="18" charset="0"/>
-                <a:cs typeface="Times New Roman" panose="02020603050405020304" pitchFamily="18" charset="0"/>
-              </a:rPr>
-              <a:t> is the mean luminance level after enhancement. </a:t>
-            </a:r>
-          </a:p>
-          <a:p>
-            <a:pPr marL="0" indent="0">
-              <a:buNone/>
-            </a:pPr>
-            <a:r>
-              <a:rPr lang="en-IN" sz="2400" b="1" dirty="0" smtClean="0">
-                <a:latin typeface="Times New Roman" panose="02020603050405020304" pitchFamily="18" charset="0"/>
-                <a:cs typeface="Times New Roman" panose="02020603050405020304" pitchFamily="18" charset="0"/>
-              </a:rPr>
-              <a:t>Video Enhancement:</a:t>
-            </a:r>
-          </a:p>
-          <a:p>
-            <a:r>
-              <a:rPr lang="en-IN" sz="2400" dirty="0" smtClean="0">
-                <a:latin typeface="Times New Roman" panose="02020603050405020304" pitchFamily="18" charset="0"/>
-                <a:cs typeface="Times New Roman" panose="02020603050405020304" pitchFamily="18" charset="0"/>
-              </a:rPr>
-              <a:t>The proposed WTHE enhancement method is applied to the luminance component of the video, leaving chrominance components unchanged.</a:t>
-            </a:r>
-          </a:p>
-          <a:p>
-            <a:r>
-              <a:rPr lang="en-IN" sz="2400" dirty="0" smtClean="0">
-                <a:latin typeface="Times New Roman" panose="02020603050405020304" pitchFamily="18" charset="0"/>
-                <a:cs typeface="Times New Roman" panose="02020603050405020304" pitchFamily="18" charset="0"/>
-              </a:rPr>
-              <a:t>The equation for WTHE introduces enhancement gain control that constraints the ratio between the output and input dynamic range. </a:t>
-            </a:r>
-          </a:p>
-          <a:p>
-            <a:endParaRPr lang="en-IN" sz="2400" dirty="0" smtClean="0">
-              <a:latin typeface="Times New Roman" panose="02020603050405020304" pitchFamily="18" charset="0"/>
-              <a:cs typeface="Times New Roman" panose="02020603050405020304" pitchFamily="18" charset="0"/>
-            </a:endParaRPr>
-          </a:p>
-          <a:p>
+            <a:pPr>
+              <a:buFont typeface="Wingdings" panose="05000000000000000000" pitchFamily="2" charset="2"/>
+              <a:buChar char="q"/>
+            </a:pPr>
             <a:endParaRPr lang="en-IN" sz="2400" b="1" dirty="0" smtClean="0">
               <a:latin typeface="Times New Roman" panose="02020603050405020304" pitchFamily="18" charset="0"/>
               <a:cs typeface="Times New Roman" panose="02020603050405020304" pitchFamily="18" charset="0"/>
             </a:endParaRPr>
           </a:p>
           <a:p>
+            <a:pPr>
+              <a:buFont typeface="Wingdings" panose="05000000000000000000" pitchFamily="2" charset="2"/>
+              <a:buChar char="q"/>
+            </a:pPr>
             <a:endParaRPr lang="en-IN" sz="2400" dirty="0">
               <a:latin typeface="Times New Roman" panose="02020603050405020304" pitchFamily="18" charset="0"/>
               <a:cs typeface="Times New Roman" panose="02020603050405020304" pitchFamily="18" charset="0"/>
@@ -4902,7 +6023,7 @@
         </p:blipFill>
         <p:spPr>
           <a:xfrm>
-            <a:off x="5620893" y="1467135"/>
+            <a:off x="5666032" y="1508475"/>
             <a:ext cx="4705350" cy="847725"/>
           </a:xfrm>
           <a:prstGeom prst="rect">
@@ -4926,7 +6047,7 @@
         </p:blipFill>
         <p:spPr>
           <a:xfrm>
-            <a:off x="3839718" y="2550031"/>
+            <a:off x="3682554" y="2299048"/>
             <a:ext cx="4133850" cy="561975"/>
           </a:xfrm>
           <a:prstGeom prst="rect">
@@ -4936,7 +6057,7 @@
       </p:pic>
       <p:pic>
         <p:nvPicPr>
-          <p:cNvPr id="6" name="Picture 5"/>
+          <p:cNvPr id="7" name="Picture 6"/>
           <p:cNvPicPr>
             <a:picLocks noChangeAspect="1"/>
           </p:cNvPicPr>
@@ -4950,8 +6071,56 @@
         </p:blipFill>
         <p:spPr>
           <a:xfrm>
-            <a:off x="4664773" y="5888354"/>
-            <a:ext cx="3057525" cy="514350"/>
+            <a:off x="252402" y="3983354"/>
+            <a:ext cx="4019550" cy="2419350"/>
+          </a:xfrm>
+          <a:prstGeom prst="rect">
+            <a:avLst/>
+          </a:prstGeom>
+        </p:spPr>
+      </p:pic>
+      <p:pic>
+        <p:nvPicPr>
+          <p:cNvPr id="8" name="Picture 7"/>
+          <p:cNvPicPr>
+            <a:picLocks noChangeAspect="1"/>
+          </p:cNvPicPr>
+          <p:nvPr/>
+        </p:nvPicPr>
+        <p:blipFill>
+          <a:blip r:embed="rId5"/>
+          <a:stretch>
+            <a:fillRect/>
+          </a:stretch>
+        </p:blipFill>
+        <p:spPr>
+          <a:xfrm>
+            <a:off x="4194404" y="3316604"/>
+            <a:ext cx="4171950" cy="3086100"/>
+          </a:xfrm>
+          <a:prstGeom prst="rect">
+            <a:avLst/>
+          </a:prstGeom>
+        </p:spPr>
+      </p:pic>
+      <p:pic>
+        <p:nvPicPr>
+          <p:cNvPr id="9" name="Picture 8"/>
+          <p:cNvPicPr>
+            <a:picLocks noChangeAspect="1"/>
+          </p:cNvPicPr>
+          <p:nvPr/>
+        </p:nvPicPr>
+        <p:blipFill>
+          <a:blip r:embed="rId6"/>
+          <a:stretch>
+            <a:fillRect/>
+          </a:stretch>
+        </p:blipFill>
+        <p:spPr>
+          <a:xfrm>
+            <a:off x="8285855" y="4082712"/>
+            <a:ext cx="3962400" cy="2428875"/>
           </a:xfrm>
           <a:prstGeom prst="rect">
             <a:avLst/>
@@ -4968,264 +6137,13 @@
   <p:clrMapOvr>
     <a:masterClrMapping/>
   </p:clrMapOvr>
-</p:sld>
-</file>
-
-<file path=ppt/slides/slide8.xml><?xml version="1.0" encoding="utf-8"?>
-<p:sld xmlns:a="http://schemas.openxmlformats.org/drawingml/2006/main" xmlns:r="http://schemas.openxmlformats.org/officeDocument/2006/relationships" xmlns:p="http://schemas.openxmlformats.org/presentationml/2006/main">
-  <p:cSld>
-    <p:spTree>
-      <p:nvGrpSpPr>
-        <p:cNvPr id="1" name=""/>
-        <p:cNvGrpSpPr/>
-        <p:nvPr/>
-      </p:nvGrpSpPr>
-      <p:grpSpPr>
-        <a:xfrm>
-          <a:off x="0" y="0"/>
-          <a:ext cx="0" cy="0"/>
-          <a:chOff x="0" y="0"/>
-          <a:chExt cx="0" cy="0"/>
-        </a:xfrm>
-      </p:grpSpPr>
-      <p:sp>
-        <p:nvSpPr>
-          <p:cNvPr id="2" name="Title 1"/>
-          <p:cNvSpPr>
-            <a:spLocks noGrp="1"/>
-          </p:cNvSpPr>
-          <p:nvPr>
-            <p:ph type="title"/>
-          </p:nvPr>
-        </p:nvSpPr>
-        <p:spPr>
-          <a:xfrm>
-            <a:off x="838200" y="365125"/>
-            <a:ext cx="10515600" cy="683387"/>
-          </a:xfrm>
-        </p:spPr>
-        <p:txBody>
-          <a:bodyPr>
-            <a:normAutofit/>
-          </a:bodyPr>
-          <a:lstStyle/>
-          <a:p>
-            <a:r>
-              <a:rPr lang="en-IN" sz="3200" dirty="0" smtClean="0">
-                <a:latin typeface="Times New Roman" panose="02020603050405020304" pitchFamily="18" charset="0"/>
-                <a:cs typeface="Times New Roman" panose="02020603050405020304" pitchFamily="18" charset="0"/>
-              </a:rPr>
-              <a:t>2. Technical discussion</a:t>
-            </a:r>
-            <a:endParaRPr lang="en-IN" sz="3200" dirty="0">
-              <a:latin typeface="Times New Roman" panose="02020603050405020304" pitchFamily="18" charset="0"/>
-              <a:cs typeface="Times New Roman" panose="02020603050405020304" pitchFamily="18" charset="0"/>
-            </a:endParaRPr>
-          </a:p>
-        </p:txBody>
-      </p:sp>
-      <p:sp>
-        <p:nvSpPr>
-          <p:cNvPr id="3" name="Content Placeholder 2"/>
-          <p:cNvSpPr>
-            <a:spLocks noGrp="1"/>
-          </p:cNvSpPr>
-          <p:nvPr>
-            <p:ph idx="1"/>
-          </p:nvPr>
-        </p:nvSpPr>
-        <p:spPr>
-          <a:xfrm>
-            <a:off x="838200" y="1048512"/>
-            <a:ext cx="10515600" cy="5128451"/>
-          </a:xfrm>
-        </p:spPr>
-        <p:txBody>
-          <a:bodyPr>
-            <a:normAutofit/>
-          </a:bodyPr>
-          <a:lstStyle/>
-          <a:p>
-            <a:r>
-              <a:rPr lang="en-IN" dirty="0" smtClean="0"/>
-              <a:t>W</a:t>
-            </a:r>
-            <a:r>
-              <a:rPr lang="en-IN" baseline="-25000" dirty="0" smtClean="0"/>
-              <a:t>in</a:t>
-            </a:r>
-            <a:r>
-              <a:rPr lang="en-IN" dirty="0" smtClean="0"/>
-              <a:t> is the dynamic range of the input image and </a:t>
-            </a:r>
-            <a:r>
-              <a:rPr lang="en-IN" dirty="0" err="1" smtClean="0"/>
-              <a:t>G</a:t>
-            </a:r>
-            <a:r>
-              <a:rPr lang="en-IN" baseline="-25000" dirty="0" err="1" smtClean="0"/>
-              <a:t>max</a:t>
-            </a:r>
-            <a:r>
-              <a:rPr lang="en-IN" dirty="0" smtClean="0"/>
-              <a:t> is a pre-set maximum gain of dynamic range. Enhancement gain control is especially useful for scenes that have narrow or gradually changing dynamic ranges.</a:t>
-            </a:r>
-          </a:p>
-          <a:p>
-            <a:r>
-              <a:rPr lang="en-IN" dirty="0" err="1" smtClean="0"/>
-              <a:t>M</a:t>
-            </a:r>
-            <a:r>
-              <a:rPr lang="en-IN" baseline="-25000" dirty="0" err="1" smtClean="0"/>
-              <a:t>adj</a:t>
-            </a:r>
-            <a:r>
-              <a:rPr lang="en-IN" dirty="0" smtClean="0"/>
-              <a:t> is </a:t>
-            </a:r>
-            <a:r>
-              <a:rPr lang="en-IN" dirty="0"/>
-              <a:t>the mean adjustment quantity </a:t>
-            </a:r>
-            <a:r>
-              <a:rPr lang="en-IN" dirty="0" smtClean="0"/>
-              <a:t>that reduces </a:t>
-            </a:r>
-            <a:r>
-              <a:rPr lang="en-IN" dirty="0"/>
-              <a:t>the luminance changes after enhancement. To </a:t>
-            </a:r>
-            <a:r>
-              <a:rPr lang="en-IN" dirty="0" smtClean="0"/>
-              <a:t>decide on </a:t>
-            </a:r>
-            <a:r>
-              <a:rPr lang="en-IN" dirty="0"/>
-              <a:t>the value of </a:t>
-            </a:r>
-            <a:r>
-              <a:rPr lang="en-IN" dirty="0" err="1" smtClean="0"/>
-              <a:t>M</a:t>
-            </a:r>
-            <a:r>
-              <a:rPr lang="en-IN" baseline="-25000" dirty="0" err="1" smtClean="0"/>
-              <a:t>adj</a:t>
-            </a:r>
-            <a:r>
-              <a:rPr lang="en-IN" dirty="0" smtClean="0"/>
-              <a:t>, </a:t>
-            </a:r>
-            <a:r>
-              <a:rPr lang="en-IN" dirty="0"/>
-              <a:t>we first calculate the mean of </a:t>
-            </a:r>
-            <a:r>
-              <a:rPr lang="en-IN" dirty="0" smtClean="0"/>
-              <a:t>the enhanced image F </a:t>
-            </a:r>
-            <a:r>
-              <a:rPr lang="en-IN" baseline="-25000" dirty="0" smtClean="0"/>
-              <a:t>hat</a:t>
-            </a:r>
-            <a:r>
-              <a:rPr lang="en-IN" dirty="0" smtClean="0"/>
-              <a:t>(</a:t>
-            </a:r>
-            <a:r>
-              <a:rPr lang="en-IN" dirty="0" err="1" smtClean="0"/>
-              <a:t>i,j</a:t>
-            </a:r>
-            <a:r>
-              <a:rPr lang="en-IN" dirty="0" smtClean="0"/>
-              <a:t>)</a:t>
-            </a:r>
-            <a:r>
-              <a:rPr lang="en-IN" baseline="-25000" dirty="0" smtClean="0"/>
-              <a:t> </a:t>
-            </a:r>
-            <a:r>
-              <a:rPr lang="en-IN" dirty="0" smtClean="0"/>
-              <a:t>assuming </a:t>
-            </a:r>
-            <a:r>
-              <a:rPr lang="en-IN" dirty="0" err="1" smtClean="0"/>
-              <a:t>M</a:t>
-            </a:r>
-            <a:r>
-              <a:rPr lang="en-IN" baseline="-25000" dirty="0" err="1" smtClean="0"/>
-              <a:t>adj</a:t>
-            </a:r>
-            <a:r>
-              <a:rPr lang="en-IN" dirty="0" smtClean="0"/>
-              <a:t> </a:t>
-            </a:r>
-            <a:r>
-              <a:rPr lang="en-IN" dirty="0"/>
-              <a:t>=0.</a:t>
-            </a:r>
-          </a:p>
-          <a:p>
-            <a:r>
-              <a:rPr lang="en-IN" dirty="0"/>
-              <a:t>Then the difference between it and the mean of the original </a:t>
-            </a:r>
-            <a:r>
-              <a:rPr lang="en-IN" dirty="0" smtClean="0"/>
-              <a:t>image </a:t>
-            </a:r>
-            <a:r>
-              <a:rPr lang="en-IN" dirty="0"/>
-              <a:t>is calculated. </a:t>
-            </a:r>
-            <a:r>
-              <a:rPr lang="en-IN" dirty="0" err="1" smtClean="0"/>
-              <a:t>M</a:t>
-            </a:r>
-            <a:r>
-              <a:rPr lang="en-IN" baseline="-25000" dirty="0" err="1" smtClean="0"/>
-              <a:t>adj</a:t>
-            </a:r>
-            <a:r>
-              <a:rPr lang="en-IN" dirty="0" smtClean="0"/>
-              <a:t> </a:t>
-            </a:r>
-            <a:r>
-              <a:rPr lang="en-IN" dirty="0"/>
-              <a:t>is set equal to the value closest to </a:t>
-            </a:r>
-            <a:r>
-              <a:rPr lang="en-IN" dirty="0" smtClean="0"/>
-              <a:t>this mean difference </a:t>
-            </a:r>
-            <a:r>
-              <a:rPr lang="en-IN" dirty="0"/>
-              <a:t>such that it does not cause serious </a:t>
-            </a:r>
-            <a:r>
-              <a:rPr lang="en-IN" dirty="0" smtClean="0"/>
-              <a:t>level saturation (clipping</a:t>
-            </a:r>
-            <a:r>
-              <a:rPr lang="en-IN" dirty="0"/>
-              <a:t>). </a:t>
-            </a:r>
-          </a:p>
-          <a:p>
-            <a:endParaRPr lang="en-IN" dirty="0"/>
-          </a:p>
-        </p:txBody>
-      </p:sp>
-    </p:spTree>
-    <p:extLst>
-      <p:ext uri="{BB962C8B-B14F-4D97-AF65-F5344CB8AC3E}">
-        <p14:creationId xmlns:p14="http://schemas.microsoft.com/office/powerpoint/2010/main" val="288147633"/>
-      </p:ext>
-    </p:extLst>
-  </p:cSld>
-  <p:clrMapOvr>
-    <a:masterClrMapping/>
-  </p:clrMapOvr>
+  <p:timing>
+    <p:tnLst>
+      <p:par>
+        <p:cTn id="1" dur="indefinite" restart="never" nodeType="tmRoot"/>
+      </p:par>
+    </p:tnLst>
+  </p:timing>
 </p:sld>
 </file>
 
@@ -5256,16 +6174,29 @@
             <p:ph type="title"/>
           </p:nvPr>
         </p:nvSpPr>
-        <p:spPr/>
-        <p:txBody>
-          <a:bodyPr/>
-          <a:lstStyle/>
-          <a:p>
-            <a:r>
-              <a:rPr lang="en-IN" dirty="0" smtClean="0"/>
-              <a:t>3. Results</a:t>
-            </a:r>
-            <a:endParaRPr lang="en-IN" dirty="0"/>
+        <p:spPr>
+          <a:xfrm>
+            <a:off x="838200" y="436562"/>
+            <a:ext cx="10515600" cy="683387"/>
+          </a:xfrm>
+        </p:spPr>
+        <p:txBody>
+          <a:bodyPr>
+            <a:normAutofit/>
+          </a:bodyPr>
+          <a:lstStyle/>
+          <a:p>
+            <a:r>
+              <a:rPr lang="en-IN" sz="3200" b="1" dirty="0" smtClean="0">
+                <a:latin typeface="Times New Roman" panose="02020603050405020304" pitchFamily="18" charset="0"/>
+                <a:cs typeface="Times New Roman" panose="02020603050405020304" pitchFamily="18" charset="0"/>
+              </a:rPr>
+              <a:t>2. Technical discussion</a:t>
+            </a:r>
+            <a:endParaRPr lang="en-IN" sz="3200" b="1" dirty="0">
+              <a:latin typeface="Times New Roman" panose="02020603050405020304" pitchFamily="18" charset="0"/>
+              <a:cs typeface="Times New Roman" panose="02020603050405020304" pitchFamily="18" charset="0"/>
+            </a:endParaRPr>
           </a:p>
         </p:txBody>
       </p:sp>
@@ -5279,19 +6210,432 @@
             <p:ph idx="1"/>
           </p:nvPr>
         </p:nvSpPr>
-        <p:spPr/>
-        <p:txBody>
-          <a:bodyPr/>
-          <a:lstStyle/>
-          <a:p>
-            <a:endParaRPr lang="en-IN" dirty="0"/>
-          </a:p>
-        </p:txBody>
-      </p:sp>
+        <p:spPr>
+          <a:xfrm>
+            <a:off x="838200" y="1119949"/>
+            <a:ext cx="10515600" cy="5371339"/>
+          </a:xfrm>
+        </p:spPr>
+        <p:txBody>
+          <a:bodyPr>
+            <a:normAutofit/>
+          </a:bodyPr>
+          <a:lstStyle/>
+          <a:p>
+            <a:pPr marL="0" indent="0">
+              <a:buNone/>
+            </a:pPr>
+            <a:r>
+              <a:rPr lang="en-IN" sz="2200" b="1" dirty="0">
+                <a:latin typeface="Times New Roman" panose="02020603050405020304" pitchFamily="18" charset="0"/>
+                <a:cs typeface="Times New Roman" panose="02020603050405020304" pitchFamily="18" charset="0"/>
+              </a:rPr>
+              <a:t>Video Enhancement:</a:t>
+            </a:r>
+          </a:p>
+          <a:p>
+            <a:pPr>
+              <a:buFont typeface="Wingdings" panose="05000000000000000000" pitchFamily="2" charset="2"/>
+              <a:buChar char="q"/>
+            </a:pPr>
+            <a:r>
+              <a:rPr lang="en-IN" sz="2200" dirty="0">
+                <a:latin typeface="Times New Roman" panose="02020603050405020304" pitchFamily="18" charset="0"/>
+                <a:cs typeface="Times New Roman" panose="02020603050405020304" pitchFamily="18" charset="0"/>
+              </a:rPr>
+              <a:t> The proposed WTHE enhancement method is applied to the luminance component of the video, leaving chrominance components unchanged.</a:t>
+            </a:r>
+          </a:p>
+          <a:p>
+            <a:pPr>
+              <a:buFont typeface="Wingdings" panose="05000000000000000000" pitchFamily="2" charset="2"/>
+              <a:buChar char="q"/>
+            </a:pPr>
+            <a:r>
+              <a:rPr lang="en-IN" sz="2200" dirty="0">
+                <a:latin typeface="Times New Roman" panose="02020603050405020304" pitchFamily="18" charset="0"/>
+                <a:cs typeface="Times New Roman" panose="02020603050405020304" pitchFamily="18" charset="0"/>
+              </a:rPr>
+              <a:t> The equation for WTHE introduces enhancement gain control that constraints the ratio between the output and input dynamic range. </a:t>
+            </a:r>
+            <a:endParaRPr lang="en-IN" sz="2200" dirty="0" smtClean="0">
+              <a:latin typeface="Times New Roman" panose="02020603050405020304" pitchFamily="18" charset="0"/>
+              <a:cs typeface="Times New Roman" panose="02020603050405020304" pitchFamily="18" charset="0"/>
+            </a:endParaRPr>
+          </a:p>
+          <a:p>
+            <a:pPr>
+              <a:buFont typeface="Wingdings" panose="05000000000000000000" pitchFamily="2" charset="2"/>
+              <a:buChar char="q"/>
+            </a:pPr>
+            <a:endParaRPr lang="en-IN" sz="2200" i="1" dirty="0" smtClean="0">
+              <a:latin typeface="Times New Roman" panose="02020603050405020304" pitchFamily="18" charset="0"/>
+              <a:cs typeface="Times New Roman" panose="02020603050405020304" pitchFamily="18" charset="0"/>
+            </a:endParaRPr>
+          </a:p>
+          <a:p>
+            <a:pPr>
+              <a:lnSpc>
+                <a:spcPct val="100000"/>
+              </a:lnSpc>
+              <a:buFont typeface="Wingdings" panose="05000000000000000000" pitchFamily="2" charset="2"/>
+              <a:buChar char="q"/>
+            </a:pPr>
+            <a:r>
+              <a:rPr lang="en-IN" sz="2200" i="1" dirty="0" smtClean="0">
+                <a:latin typeface="Times New Roman" panose="02020603050405020304" pitchFamily="18" charset="0"/>
+                <a:cs typeface="Times New Roman" panose="02020603050405020304" pitchFamily="18" charset="0"/>
+              </a:rPr>
+              <a:t>W</a:t>
+            </a:r>
+            <a:r>
+              <a:rPr lang="en-IN" sz="2200" i="1" baseline="-25000" dirty="0" smtClean="0">
+                <a:latin typeface="Times New Roman" panose="02020603050405020304" pitchFamily="18" charset="0"/>
+                <a:cs typeface="Times New Roman" panose="02020603050405020304" pitchFamily="18" charset="0"/>
+              </a:rPr>
+              <a:t>in</a:t>
+            </a:r>
+            <a:r>
+              <a:rPr lang="en-IN" sz="2200" dirty="0" smtClean="0">
+                <a:latin typeface="Times New Roman" panose="02020603050405020304" pitchFamily="18" charset="0"/>
+                <a:cs typeface="Times New Roman" panose="02020603050405020304" pitchFamily="18" charset="0"/>
+              </a:rPr>
+              <a:t> </a:t>
+            </a:r>
+            <a:r>
+              <a:rPr lang="en-IN" sz="2200" dirty="0" smtClean="0">
+                <a:latin typeface="Times New Roman" panose="02020603050405020304" pitchFamily="18" charset="0"/>
+                <a:cs typeface="Times New Roman" panose="02020603050405020304" pitchFamily="18" charset="0"/>
+              </a:rPr>
+              <a:t>is the dynamic range of the input image and </a:t>
+            </a:r>
+            <a:r>
+              <a:rPr lang="en-IN" sz="2200" i="1" dirty="0" err="1" smtClean="0">
+                <a:latin typeface="Times New Roman" panose="02020603050405020304" pitchFamily="18" charset="0"/>
+                <a:cs typeface="Times New Roman" panose="02020603050405020304" pitchFamily="18" charset="0"/>
+              </a:rPr>
+              <a:t>G</a:t>
+            </a:r>
+            <a:r>
+              <a:rPr lang="en-IN" sz="2200" i="1" baseline="-25000" dirty="0" err="1" smtClean="0">
+                <a:latin typeface="Times New Roman" panose="02020603050405020304" pitchFamily="18" charset="0"/>
+                <a:cs typeface="Times New Roman" panose="02020603050405020304" pitchFamily="18" charset="0"/>
+              </a:rPr>
+              <a:t>max</a:t>
+            </a:r>
+            <a:r>
+              <a:rPr lang="en-IN" sz="2200" dirty="0" smtClean="0">
+                <a:latin typeface="Times New Roman" panose="02020603050405020304" pitchFamily="18" charset="0"/>
+                <a:cs typeface="Times New Roman" panose="02020603050405020304" pitchFamily="18" charset="0"/>
+              </a:rPr>
+              <a:t> is a pre-set maximum gain of dynamic range</a:t>
+            </a:r>
+            <a:r>
+              <a:rPr lang="en-IN" sz="2200" dirty="0" smtClean="0">
+                <a:latin typeface="Times New Roman" panose="02020603050405020304" pitchFamily="18" charset="0"/>
+                <a:cs typeface="Times New Roman" panose="02020603050405020304" pitchFamily="18" charset="0"/>
+              </a:rPr>
+              <a:t>.</a:t>
+            </a:r>
+            <a:r>
+              <a:rPr lang="en-IN" sz="2200" i="1" dirty="0" smtClean="0">
+                <a:latin typeface="Times New Roman" panose="02020603050405020304" pitchFamily="18" charset="0"/>
+                <a:cs typeface="Times New Roman" panose="02020603050405020304" pitchFamily="18" charset="0"/>
+              </a:rPr>
+              <a:t> </a:t>
+            </a:r>
+            <a:r>
+              <a:rPr lang="en-IN" sz="2200" i="1" dirty="0" err="1" smtClean="0">
+                <a:latin typeface="Times New Roman" panose="02020603050405020304" pitchFamily="18" charset="0"/>
+                <a:cs typeface="Times New Roman" panose="02020603050405020304" pitchFamily="18" charset="0"/>
+              </a:rPr>
+              <a:t>M</a:t>
+            </a:r>
+            <a:r>
+              <a:rPr lang="en-IN" sz="2200" i="1" baseline="-25000" dirty="0" err="1" smtClean="0">
+                <a:latin typeface="Times New Roman" panose="02020603050405020304" pitchFamily="18" charset="0"/>
+                <a:cs typeface="Times New Roman" panose="02020603050405020304" pitchFamily="18" charset="0"/>
+              </a:rPr>
+              <a:t>adj</a:t>
+            </a:r>
+            <a:r>
+              <a:rPr lang="en-IN" sz="2200" dirty="0" smtClean="0">
+                <a:latin typeface="Times New Roman" panose="02020603050405020304" pitchFamily="18" charset="0"/>
+                <a:cs typeface="Times New Roman" panose="02020603050405020304" pitchFamily="18" charset="0"/>
+              </a:rPr>
+              <a:t> </a:t>
+            </a:r>
+            <a:r>
+              <a:rPr lang="en-IN" sz="2200" dirty="0" smtClean="0">
+                <a:latin typeface="Times New Roman" panose="02020603050405020304" pitchFamily="18" charset="0"/>
+                <a:cs typeface="Times New Roman" panose="02020603050405020304" pitchFamily="18" charset="0"/>
+              </a:rPr>
+              <a:t>is </a:t>
+            </a:r>
+            <a:r>
+              <a:rPr lang="en-IN" sz="2200" dirty="0">
+                <a:latin typeface="Times New Roman" panose="02020603050405020304" pitchFamily="18" charset="0"/>
+                <a:cs typeface="Times New Roman" panose="02020603050405020304" pitchFamily="18" charset="0"/>
+              </a:rPr>
+              <a:t>the mean adjustment quantity </a:t>
+            </a:r>
+            <a:r>
+              <a:rPr lang="en-IN" sz="2200" dirty="0" smtClean="0">
+                <a:latin typeface="Times New Roman" panose="02020603050405020304" pitchFamily="18" charset="0"/>
+                <a:cs typeface="Times New Roman" panose="02020603050405020304" pitchFamily="18" charset="0"/>
+              </a:rPr>
+              <a:t>that reduces </a:t>
+            </a:r>
+            <a:r>
+              <a:rPr lang="en-IN" sz="2200" dirty="0">
+                <a:latin typeface="Times New Roman" panose="02020603050405020304" pitchFamily="18" charset="0"/>
+                <a:cs typeface="Times New Roman" panose="02020603050405020304" pitchFamily="18" charset="0"/>
+              </a:rPr>
+              <a:t>the luminance changes after enhancement. </a:t>
+            </a:r>
+            <a:r>
+              <a:rPr lang="en-IN" sz="2200" dirty="0" smtClean="0">
+                <a:latin typeface="Times New Roman" panose="02020603050405020304" pitchFamily="18" charset="0"/>
+                <a:cs typeface="Times New Roman" panose="02020603050405020304" pitchFamily="18" charset="0"/>
+              </a:rPr>
+              <a:t>For </a:t>
+            </a:r>
+            <a:r>
+              <a:rPr lang="en-IN" sz="2200" i="1" dirty="0" err="1" smtClean="0">
+                <a:latin typeface="Times New Roman" panose="02020603050405020304" pitchFamily="18" charset="0"/>
+                <a:cs typeface="Times New Roman" panose="02020603050405020304" pitchFamily="18" charset="0"/>
+              </a:rPr>
+              <a:t>M</a:t>
+            </a:r>
+            <a:r>
+              <a:rPr lang="en-IN" sz="2200" i="1" baseline="-25000" dirty="0" err="1" smtClean="0">
+                <a:latin typeface="Times New Roman" panose="02020603050405020304" pitchFamily="18" charset="0"/>
+                <a:cs typeface="Times New Roman" panose="02020603050405020304" pitchFamily="18" charset="0"/>
+              </a:rPr>
+              <a:t>adj</a:t>
+            </a:r>
+            <a:r>
+              <a:rPr lang="en-IN" sz="2200" dirty="0" smtClean="0">
+                <a:latin typeface="Times New Roman" panose="02020603050405020304" pitchFamily="18" charset="0"/>
+                <a:cs typeface="Times New Roman" panose="02020603050405020304" pitchFamily="18" charset="0"/>
+              </a:rPr>
+              <a:t>, </a:t>
+            </a:r>
+            <a:r>
+              <a:rPr lang="en-IN" sz="2200" dirty="0">
+                <a:latin typeface="Times New Roman" panose="02020603050405020304" pitchFamily="18" charset="0"/>
+                <a:cs typeface="Times New Roman" panose="02020603050405020304" pitchFamily="18" charset="0"/>
+              </a:rPr>
+              <a:t>we first calculate the mean of </a:t>
+            </a:r>
+            <a:r>
+              <a:rPr lang="en-IN" sz="2200" dirty="0" smtClean="0">
+                <a:latin typeface="Times New Roman" panose="02020603050405020304" pitchFamily="18" charset="0"/>
+                <a:cs typeface="Times New Roman" panose="02020603050405020304" pitchFamily="18" charset="0"/>
+              </a:rPr>
+              <a:t>the enhanced image </a:t>
+            </a:r>
+            <a:r>
+              <a:rPr lang="en-IN" sz="2200" i="1" dirty="0" err="1" smtClean="0">
+                <a:latin typeface="Times New Roman" panose="02020603050405020304" pitchFamily="18" charset="0"/>
+                <a:cs typeface="Times New Roman" panose="02020603050405020304" pitchFamily="18" charset="0"/>
+              </a:rPr>
+              <a:t>F</a:t>
+            </a:r>
+            <a:r>
+              <a:rPr lang="en-IN" sz="2200" i="1" baseline="-25000" dirty="0" err="1" smtClean="0">
+                <a:latin typeface="Times New Roman" panose="02020603050405020304" pitchFamily="18" charset="0"/>
+                <a:cs typeface="Times New Roman" panose="02020603050405020304" pitchFamily="18" charset="0"/>
+              </a:rPr>
+              <a:t>hat</a:t>
+            </a:r>
+            <a:r>
+              <a:rPr lang="en-IN" sz="2200" i="1" dirty="0" smtClean="0">
+                <a:latin typeface="Times New Roman" panose="02020603050405020304" pitchFamily="18" charset="0"/>
+                <a:cs typeface="Times New Roman" panose="02020603050405020304" pitchFamily="18" charset="0"/>
+              </a:rPr>
+              <a:t>(</a:t>
+            </a:r>
+            <a:r>
+              <a:rPr lang="en-IN" sz="2200" i="1" dirty="0" err="1" smtClean="0">
+                <a:latin typeface="Times New Roman" panose="02020603050405020304" pitchFamily="18" charset="0"/>
+                <a:cs typeface="Times New Roman" panose="02020603050405020304" pitchFamily="18" charset="0"/>
+              </a:rPr>
+              <a:t>i,j</a:t>
+            </a:r>
+            <a:r>
+              <a:rPr lang="en-IN" sz="2200" i="1" dirty="0" smtClean="0">
+                <a:latin typeface="Times New Roman" panose="02020603050405020304" pitchFamily="18" charset="0"/>
+                <a:cs typeface="Times New Roman" panose="02020603050405020304" pitchFamily="18" charset="0"/>
+              </a:rPr>
+              <a:t>)</a:t>
+            </a:r>
+            <a:r>
+              <a:rPr lang="en-IN" sz="2200" baseline="-25000" dirty="0" smtClean="0">
+                <a:latin typeface="Times New Roman" panose="02020603050405020304" pitchFamily="18" charset="0"/>
+                <a:cs typeface="Times New Roman" panose="02020603050405020304" pitchFamily="18" charset="0"/>
+              </a:rPr>
+              <a:t> </a:t>
+            </a:r>
+            <a:r>
+              <a:rPr lang="en-IN" sz="2200" dirty="0" smtClean="0">
+                <a:latin typeface="Times New Roman" panose="02020603050405020304" pitchFamily="18" charset="0"/>
+                <a:cs typeface="Times New Roman" panose="02020603050405020304" pitchFamily="18" charset="0"/>
+              </a:rPr>
+              <a:t>assuming </a:t>
+            </a:r>
+            <a:r>
+              <a:rPr lang="en-IN" sz="2200" i="1" dirty="0" err="1" smtClean="0">
+                <a:latin typeface="Times New Roman" panose="02020603050405020304" pitchFamily="18" charset="0"/>
+                <a:cs typeface="Times New Roman" panose="02020603050405020304" pitchFamily="18" charset="0"/>
+              </a:rPr>
+              <a:t>M</a:t>
+            </a:r>
+            <a:r>
+              <a:rPr lang="en-IN" sz="2200" i="1" baseline="-25000" dirty="0" err="1" smtClean="0">
+                <a:latin typeface="Times New Roman" panose="02020603050405020304" pitchFamily="18" charset="0"/>
+                <a:cs typeface="Times New Roman" panose="02020603050405020304" pitchFamily="18" charset="0"/>
+              </a:rPr>
+              <a:t>adj</a:t>
+            </a:r>
+            <a:r>
+              <a:rPr lang="en-IN" sz="2200" dirty="0" smtClean="0">
+                <a:latin typeface="Times New Roman" panose="02020603050405020304" pitchFamily="18" charset="0"/>
+                <a:cs typeface="Times New Roman" panose="02020603050405020304" pitchFamily="18" charset="0"/>
+              </a:rPr>
+              <a:t> </a:t>
+            </a:r>
+            <a:r>
+              <a:rPr lang="en-IN" sz="2200" dirty="0">
+                <a:latin typeface="Times New Roman" panose="02020603050405020304" pitchFamily="18" charset="0"/>
+                <a:cs typeface="Times New Roman" panose="02020603050405020304" pitchFamily="18" charset="0"/>
+              </a:rPr>
+              <a:t>=0.</a:t>
+            </a:r>
+          </a:p>
+          <a:p>
+            <a:pPr>
+              <a:lnSpc>
+                <a:spcPct val="100000"/>
+              </a:lnSpc>
+              <a:buFont typeface="Wingdings" panose="05000000000000000000" pitchFamily="2" charset="2"/>
+              <a:buChar char="q"/>
+            </a:pPr>
+            <a:r>
+              <a:rPr lang="en-IN" sz="2200" dirty="0" smtClean="0">
+                <a:latin typeface="Times New Roman" panose="02020603050405020304" pitchFamily="18" charset="0"/>
+                <a:cs typeface="Times New Roman" panose="02020603050405020304" pitchFamily="18" charset="0"/>
+              </a:rPr>
+              <a:t> Then </a:t>
+            </a:r>
+            <a:r>
+              <a:rPr lang="en-IN" sz="2200" dirty="0">
+                <a:latin typeface="Times New Roman" panose="02020603050405020304" pitchFamily="18" charset="0"/>
+                <a:cs typeface="Times New Roman" panose="02020603050405020304" pitchFamily="18" charset="0"/>
+              </a:rPr>
+              <a:t>the difference between it and the mean of the original </a:t>
+            </a:r>
+            <a:r>
+              <a:rPr lang="en-IN" sz="2200" dirty="0" smtClean="0">
+                <a:latin typeface="Times New Roman" panose="02020603050405020304" pitchFamily="18" charset="0"/>
+                <a:cs typeface="Times New Roman" panose="02020603050405020304" pitchFamily="18" charset="0"/>
+              </a:rPr>
+              <a:t>image </a:t>
+            </a:r>
+            <a:r>
+              <a:rPr lang="en-IN" sz="2200" dirty="0">
+                <a:latin typeface="Times New Roman" panose="02020603050405020304" pitchFamily="18" charset="0"/>
+                <a:cs typeface="Times New Roman" panose="02020603050405020304" pitchFamily="18" charset="0"/>
+              </a:rPr>
+              <a:t>is calculated. </a:t>
+            </a:r>
+            <a:r>
+              <a:rPr lang="en-IN" sz="2200" i="1" dirty="0" err="1" smtClean="0">
+                <a:latin typeface="Times New Roman" panose="02020603050405020304" pitchFamily="18" charset="0"/>
+                <a:cs typeface="Times New Roman" panose="02020603050405020304" pitchFamily="18" charset="0"/>
+              </a:rPr>
+              <a:t>M</a:t>
+            </a:r>
+            <a:r>
+              <a:rPr lang="en-IN" sz="2200" i="1" baseline="-25000" dirty="0" err="1" smtClean="0">
+                <a:latin typeface="Times New Roman" panose="02020603050405020304" pitchFamily="18" charset="0"/>
+                <a:cs typeface="Times New Roman" panose="02020603050405020304" pitchFamily="18" charset="0"/>
+              </a:rPr>
+              <a:t>adj</a:t>
+            </a:r>
+            <a:r>
+              <a:rPr lang="en-IN" sz="2200" dirty="0" smtClean="0">
+                <a:latin typeface="Times New Roman" panose="02020603050405020304" pitchFamily="18" charset="0"/>
+                <a:cs typeface="Times New Roman" panose="02020603050405020304" pitchFamily="18" charset="0"/>
+              </a:rPr>
+              <a:t> </a:t>
+            </a:r>
+            <a:r>
+              <a:rPr lang="en-IN" sz="2200" dirty="0">
+                <a:latin typeface="Times New Roman" panose="02020603050405020304" pitchFamily="18" charset="0"/>
+                <a:cs typeface="Times New Roman" panose="02020603050405020304" pitchFamily="18" charset="0"/>
+              </a:rPr>
+              <a:t>is set equal to the value closest to </a:t>
+            </a:r>
+            <a:r>
+              <a:rPr lang="en-IN" sz="2200" dirty="0" smtClean="0">
+                <a:latin typeface="Times New Roman" panose="02020603050405020304" pitchFamily="18" charset="0"/>
+                <a:cs typeface="Times New Roman" panose="02020603050405020304" pitchFamily="18" charset="0"/>
+              </a:rPr>
+              <a:t>this mean difference </a:t>
+            </a:r>
+            <a:r>
+              <a:rPr lang="en-IN" sz="2200" dirty="0">
+                <a:latin typeface="Times New Roman" panose="02020603050405020304" pitchFamily="18" charset="0"/>
+                <a:cs typeface="Times New Roman" panose="02020603050405020304" pitchFamily="18" charset="0"/>
+              </a:rPr>
+              <a:t>such that it does not cause serious </a:t>
+            </a:r>
+            <a:r>
+              <a:rPr lang="en-IN" sz="2200" dirty="0" smtClean="0">
+                <a:latin typeface="Times New Roman" panose="02020603050405020304" pitchFamily="18" charset="0"/>
+                <a:cs typeface="Times New Roman" panose="02020603050405020304" pitchFamily="18" charset="0"/>
+              </a:rPr>
+              <a:t>level saturation (clipping</a:t>
+            </a:r>
+            <a:r>
+              <a:rPr lang="en-IN" sz="2200" dirty="0">
+                <a:latin typeface="Times New Roman" panose="02020603050405020304" pitchFamily="18" charset="0"/>
+                <a:cs typeface="Times New Roman" panose="02020603050405020304" pitchFamily="18" charset="0"/>
+              </a:rPr>
+              <a:t>). </a:t>
+            </a:r>
+          </a:p>
+        </p:txBody>
+      </p:sp>
+      <p:pic>
+        <p:nvPicPr>
+          <p:cNvPr id="4" name="Picture 3"/>
+          <p:cNvPicPr>
+            <a:picLocks noChangeAspect="1"/>
+          </p:cNvPicPr>
+          <p:nvPr/>
+        </p:nvPicPr>
+        <p:blipFill>
+          <a:blip r:embed="rId2"/>
+          <a:stretch>
+            <a:fillRect/>
+          </a:stretch>
+        </p:blipFill>
+        <p:spPr>
+          <a:xfrm>
+            <a:off x="4567237" y="3005517"/>
+            <a:ext cx="3057525" cy="514350"/>
+          </a:xfrm>
+          <a:prstGeom prst="rect">
+            <a:avLst/>
+          </a:prstGeom>
+        </p:spPr>
+      </p:pic>
     </p:spTree>
     <p:extLst>
       <p:ext uri="{BB962C8B-B14F-4D97-AF65-F5344CB8AC3E}">
-        <p14:creationId xmlns:p14="http://schemas.microsoft.com/office/powerpoint/2010/main" val="538683382"/>
+        <p14:creationId xmlns:p14="http://schemas.microsoft.com/office/powerpoint/2010/main" val="288147633"/>
       </p:ext>
     </p:extLst>
   </p:cSld>

</xml_diff>

<commit_message>
Done with everything, added KU template also
</commit_message>
<xml_diff>
--- a/Project/Presentation.pptx
+++ b/Project/Presentation.pptx
@@ -2,7 +2,7 @@
 <file path=ppt/presentation.xml><?xml version="1.0" encoding="utf-8"?>
 <p:presentation xmlns:a="http://schemas.openxmlformats.org/drawingml/2006/main" xmlns:r="http://schemas.openxmlformats.org/officeDocument/2006/relationships" xmlns:p="http://schemas.openxmlformats.org/presentationml/2006/main" saveSubsetFonts="1">
   <p:sldMasterIdLst>
-    <p:sldMasterId id="2147483648" r:id="rId1"/>
+    <p:sldMasterId id="2147483660" r:id="rId1"/>
   </p:sldMasterIdLst>
   <p:sldIdLst>
     <p:sldId id="256" r:id="rId2"/>
@@ -16,7 +16,9 @@
     <p:sldId id="266" r:id="rId10"/>
     <p:sldId id="268" r:id="rId11"/>
     <p:sldId id="261" r:id="rId12"/>
-    <p:sldId id="262" r:id="rId13"/>
+    <p:sldId id="269" r:id="rId13"/>
+    <p:sldId id="262" r:id="rId14"/>
+    <p:sldId id="270" r:id="rId15"/>
   </p:sldIdLst>
   <p:sldSz cx="12192000" cy="6858000"/>
   <p:notesSz cx="6858000" cy="9144000"/>
@@ -124,7 +126,7 @@
 </file>
 
 <file path=ppt/slideLayouts/slideLayout1.xml><?xml version="1.0" encoding="utf-8"?>
-<p:sldLayout xmlns:a="http://schemas.openxmlformats.org/drawingml/2006/main" xmlns:r="http://schemas.openxmlformats.org/officeDocument/2006/relationships" xmlns:p="http://schemas.openxmlformats.org/presentationml/2006/main" type="title" preserve="1">
+<p:sldLayout xmlns:a="http://schemas.openxmlformats.org/drawingml/2006/main" xmlns:r="http://schemas.openxmlformats.org/officeDocument/2006/relationships" xmlns:p="http://schemas.openxmlformats.org/presentationml/2006/main" showMasterSp="0" type="title" preserve="1">
   <p:cSld name="Title Slide">
     <p:spTree>
       <p:nvGrpSpPr>
@@ -142,9 +144,9 @@
       </p:grpSpPr>
       <p:sp>
         <p:nvSpPr>
-          <p:cNvPr id="2" name="Title 1"/>
-          <p:cNvSpPr>
-            <a:spLocks noGrp="1"/>
+          <p:cNvPr id="3091" name="Rectangle 19"/>
+          <p:cNvSpPr>
+            <a:spLocks noGrp="1" noChangeArrowheads="1"/>
           </p:cNvSpPr>
           <p:nvPr>
             <p:ph type="ctrTitle"/>
@@ -152,31 +154,323 @@
         </p:nvSpPr>
         <p:spPr>
           <a:xfrm>
-            <a:off x="1524000" y="1122363"/>
-            <a:ext cx="9144000" cy="2387600"/>
+            <a:off x="2540000" y="3810000"/>
+            <a:ext cx="8534400" cy="1143000"/>
           </a:xfrm>
         </p:spPr>
         <p:txBody>
-          <a:bodyPr anchor="b"/>
+          <a:bodyPr anchor="ctr"/>
           <a:lstStyle>
             <a:lvl1pPr algn="ctr">
-              <a:defRPr sz="6000"/>
+              <a:lnSpc>
+                <a:spcPct val="80000"/>
+              </a:lnSpc>
+              <a:defRPr>
+                <a:solidFill>
+                  <a:schemeClr val="hlink"/>
+                </a:solidFill>
+              </a:defRPr>
             </a:lvl1pPr>
           </a:lstStyle>
           <a:p>
-            <a:r>
-              <a:rPr lang="en-US" smtClean="0"/>
+            <a:pPr lvl="0"/>
+            <a:r>
+              <a:rPr lang="en-US" altLang="en-US" noProof="0" smtClean="0"/>
               <a:t>Click to edit Master title style</a:t>
             </a:r>
-            <a:endParaRPr lang="en-IN"/>
-          </a:p>
-        </p:txBody>
-      </p:sp>
-      <p:sp>
-        <p:nvSpPr>
-          <p:cNvPr id="3" name="Subtitle 2"/>
-          <p:cNvSpPr>
-            <a:spLocks noGrp="1"/>
+            <a:endParaRPr lang="en-IN" altLang="en-US" noProof="0" smtClean="0"/>
+          </a:p>
+        </p:txBody>
+      </p:sp>
+      <p:grpSp>
+        <p:nvGrpSpPr>
+          <p:cNvPr id="3089" name="Group 17"/>
+          <p:cNvGrpSpPr>
+            <a:grpSpLocks/>
+          </p:cNvGrpSpPr>
+          <p:nvPr/>
+        </p:nvGrpSpPr>
+        <p:grpSpPr bwMode="auto">
+          <a:xfrm>
+            <a:off x="0" y="0"/>
+            <a:ext cx="12192000" cy="6858000"/>
+            <a:chOff x="0" y="0"/>
+            <a:chExt cx="5760" cy="4320"/>
+          </a:xfrm>
+        </p:grpSpPr>
+        <p:sp>
+          <p:nvSpPr>
+            <p:cNvPr id="3079" name="Rectangle 7"/>
+            <p:cNvSpPr>
+              <a:spLocks noChangeArrowheads="1"/>
+            </p:cNvSpPr>
+            <p:nvPr userDrawn="1"/>
+          </p:nvSpPr>
+          <p:spPr bwMode="auto">
+            <a:xfrm>
+              <a:off x="0" y="0"/>
+              <a:ext cx="5760" cy="432"/>
+            </a:xfrm>
+            <a:prstGeom prst="rect">
+              <a:avLst/>
+            </a:prstGeom>
+            <a:solidFill>
+              <a:srgbClr val="0B4599"/>
+            </a:solidFill>
+            <a:ln>
+              <a:noFill/>
+            </a:ln>
+            <a:extLst>
+              <a:ext uri="{91240B29-F687-4F45-9708-019B960494DF}">
+                <a14:hiddenLine xmlns:a14="http://schemas.microsoft.com/office/drawing/2010/main" w="9525">
+                  <a:solidFill>
+                    <a:schemeClr val="tx1"/>
+                  </a:solidFill>
+                  <a:miter lim="800000"/>
+                  <a:headEnd/>
+                  <a:tailEnd/>
+                </a14:hiddenLine>
+              </a:ext>
+            </a:extLst>
+          </p:spPr>
+          <p:txBody>
+            <a:bodyPr wrap="none" anchor="ctr"/>
+            <a:lstStyle/>
+            <a:p>
+              <a:endParaRPr lang="en-IN" sz="1800"/>
+            </a:p>
+          </p:txBody>
+        </p:sp>
+        <p:sp>
+          <p:nvSpPr>
+            <p:cNvPr id="3083" name="Rectangle 11"/>
+            <p:cNvSpPr>
+              <a:spLocks noChangeArrowheads="1"/>
+            </p:cNvSpPr>
+            <p:nvPr userDrawn="1"/>
+          </p:nvSpPr>
+          <p:spPr bwMode="auto">
+            <a:xfrm flipH="1" flipV="1">
+              <a:off x="672" y="4147"/>
+              <a:ext cx="5088" cy="29"/>
+            </a:xfrm>
+            <a:prstGeom prst="rect">
+              <a:avLst/>
+            </a:prstGeom>
+            <a:solidFill>
+              <a:srgbClr val="FFDF22"/>
+            </a:solidFill>
+            <a:ln>
+              <a:noFill/>
+            </a:ln>
+            <a:extLst>
+              <a:ext uri="{91240B29-F687-4F45-9708-019B960494DF}">
+                <a14:hiddenLine xmlns:a14="http://schemas.microsoft.com/office/drawing/2010/main" w="9525">
+                  <a:solidFill>
+                    <a:schemeClr val="tx1"/>
+                  </a:solidFill>
+                  <a:miter lim="800000"/>
+                  <a:headEnd/>
+                  <a:tailEnd/>
+                </a14:hiddenLine>
+              </a:ext>
+            </a:extLst>
+          </p:spPr>
+          <p:txBody>
+            <a:bodyPr wrap="none" anchor="ctr"/>
+            <a:lstStyle/>
+            <a:p>
+              <a:endParaRPr lang="en-IN" sz="1800"/>
+            </a:p>
+          </p:txBody>
+        </p:sp>
+        <p:sp>
+          <p:nvSpPr>
+            <p:cNvPr id="3084" name="Rectangle 12"/>
+            <p:cNvSpPr>
+              <a:spLocks noChangeArrowheads="1"/>
+            </p:cNvSpPr>
+            <p:nvPr userDrawn="1"/>
+          </p:nvSpPr>
+          <p:spPr bwMode="auto">
+            <a:xfrm flipH="1">
+              <a:off x="672" y="4176"/>
+              <a:ext cx="5088" cy="144"/>
+            </a:xfrm>
+            <a:prstGeom prst="rect">
+              <a:avLst/>
+            </a:prstGeom>
+            <a:solidFill>
+              <a:srgbClr val="0B4599"/>
+            </a:solidFill>
+            <a:ln>
+              <a:noFill/>
+            </a:ln>
+            <a:extLst>
+              <a:ext uri="{91240B29-F687-4F45-9708-019B960494DF}">
+                <a14:hiddenLine xmlns:a14="http://schemas.microsoft.com/office/drawing/2010/main" w="9525">
+                  <a:solidFill>
+                    <a:schemeClr val="tx1"/>
+                  </a:solidFill>
+                  <a:miter lim="800000"/>
+                  <a:headEnd/>
+                  <a:tailEnd/>
+                </a14:hiddenLine>
+              </a:ext>
+            </a:extLst>
+          </p:spPr>
+          <p:txBody>
+            <a:bodyPr wrap="none" anchor="ctr"/>
+            <a:lstStyle/>
+            <a:p>
+              <a:endParaRPr lang="en-IN" sz="1800"/>
+            </a:p>
+          </p:txBody>
+        </p:sp>
+        <p:pic>
+          <p:nvPicPr>
+            <p:cNvPr id="3085" name="Picture 13" descr="PetitColumn"/>
+            <p:cNvPicPr>
+              <a:picLocks noChangeAspect="1" noChangeArrowheads="1"/>
+            </p:cNvPicPr>
+            <p:nvPr userDrawn="1"/>
+          </p:nvPicPr>
+          <p:blipFill>
+            <a:blip r:embed="rId2">
+              <a:extLst>
+                <a:ext uri="{28A0092B-C50C-407E-A947-70E740481C1C}">
+                  <a14:useLocalDpi xmlns:a14="http://schemas.microsoft.com/office/drawing/2010/main" val="0"/>
+                </a:ext>
+              </a:extLst>
+            </a:blip>
+            <a:srcRect/>
+            <a:stretch>
+              <a:fillRect/>
+            </a:stretch>
+          </p:blipFill>
+          <p:spPr bwMode="auto">
+            <a:xfrm>
+              <a:off x="0" y="839"/>
+              <a:ext cx="1110" cy="3481"/>
+            </a:xfrm>
+            <a:prstGeom prst="rect">
+              <a:avLst/>
+            </a:prstGeom>
+            <a:noFill/>
+            <a:ln>
+              <a:noFill/>
+            </a:ln>
+            <a:extLst>
+              <a:ext uri="{909E8E84-426E-40DD-AFC4-6F175D3DCCD1}">
+                <a14:hiddenFill xmlns:a14="http://schemas.microsoft.com/office/drawing/2010/main">
+                  <a:solidFill>
+                    <a:srgbClr val="FFFFFF"/>
+                  </a:solidFill>
+                </a14:hiddenFill>
+              </a:ext>
+              <a:ext uri="{91240B29-F687-4F45-9708-019B960494DF}">
+                <a14:hiddenLine xmlns:a14="http://schemas.microsoft.com/office/drawing/2010/main" w="9525">
+                  <a:solidFill>
+                    <a:srgbClr val="000000"/>
+                  </a:solidFill>
+                  <a:miter lim="800000"/>
+                  <a:headEnd/>
+                  <a:tailEnd/>
+                </a14:hiddenLine>
+              </a:ext>
+            </a:extLst>
+          </p:spPr>
+        </p:pic>
+        <p:sp>
+          <p:nvSpPr>
+            <p:cNvPr id="3086" name="Rectangle 14"/>
+            <p:cNvSpPr>
+              <a:spLocks noChangeArrowheads="1"/>
+            </p:cNvSpPr>
+            <p:nvPr userDrawn="1"/>
+          </p:nvSpPr>
+          <p:spPr bwMode="auto">
+            <a:xfrm flipH="1">
+              <a:off x="2" y="816"/>
+              <a:ext cx="5758" cy="29"/>
+            </a:xfrm>
+            <a:prstGeom prst="rect">
+              <a:avLst/>
+            </a:prstGeom>
+            <a:solidFill>
+              <a:srgbClr val="FF0E22"/>
+            </a:solidFill>
+            <a:ln>
+              <a:noFill/>
+            </a:ln>
+            <a:extLst>
+              <a:ext uri="{91240B29-F687-4F45-9708-019B960494DF}">
+                <a14:hiddenLine xmlns:a14="http://schemas.microsoft.com/office/drawing/2010/main" w="9525">
+                  <a:solidFill>
+                    <a:schemeClr val="tx1"/>
+                  </a:solidFill>
+                  <a:miter lim="800000"/>
+                  <a:headEnd/>
+                  <a:tailEnd/>
+                </a14:hiddenLine>
+              </a:ext>
+            </a:extLst>
+          </p:spPr>
+          <p:txBody>
+            <a:bodyPr wrap="none" anchor="ctr"/>
+            <a:lstStyle/>
+            <a:p>
+              <a:endParaRPr lang="en-IN" sz="1800"/>
+            </a:p>
+          </p:txBody>
+        </p:sp>
+        <p:pic>
+          <p:nvPicPr>
+            <p:cNvPr id="3087" name="Picture 15" descr="Panorama"/>
+            <p:cNvPicPr>
+              <a:picLocks noChangeAspect="1" noChangeArrowheads="1"/>
+            </p:cNvPicPr>
+            <p:nvPr userDrawn="1"/>
+          </p:nvPicPr>
+          <p:blipFill>
+            <a:blip r:embed="rId3">
+              <a:extLst>
+                <a:ext uri="{28A0092B-C50C-407E-A947-70E740481C1C}">
+                  <a14:useLocalDpi xmlns:a14="http://schemas.microsoft.com/office/drawing/2010/main" val="0"/>
+                </a:ext>
+              </a:extLst>
+            </a:blip>
+            <a:srcRect/>
+            <a:stretch>
+              <a:fillRect/>
+            </a:stretch>
+          </p:blipFill>
+          <p:spPr bwMode="auto">
+            <a:xfrm>
+              <a:off x="2" y="96"/>
+              <a:ext cx="5758" cy="719"/>
+            </a:xfrm>
+            <a:prstGeom prst="rect">
+              <a:avLst/>
+            </a:prstGeom>
+            <a:noFill/>
+            <a:extLst>
+              <a:ext uri="{909E8E84-426E-40DD-AFC4-6F175D3DCCD1}">
+                <a14:hiddenFill xmlns:a14="http://schemas.microsoft.com/office/drawing/2010/main">
+                  <a:solidFill>
+                    <a:srgbClr val="FFFFFF"/>
+                  </a:solidFill>
+                </a14:hiddenFill>
+              </a:ext>
+            </a:extLst>
+          </p:spPr>
+        </p:pic>
+      </p:grpSp>
+      <p:sp>
+        <p:nvSpPr>
+          <p:cNvPr id="3092" name="Rectangle 20"/>
+          <p:cNvSpPr>
+            <a:spLocks noGrp="1" noChangeArrowheads="1"/>
           </p:cNvSpPr>
           <p:nvPr>
             <p:ph type="subTitle" idx="1"/>
@@ -184,128 +478,81 @@
         </p:nvSpPr>
         <p:spPr>
           <a:xfrm>
-            <a:off x="1524000" y="3602038"/>
-            <a:ext cx="9144000" cy="1655762"/>
+            <a:off x="2540000" y="5181600"/>
+            <a:ext cx="8534400" cy="533400"/>
           </a:xfrm>
         </p:spPr>
         <p:txBody>
           <a:bodyPr/>
           <a:lstStyle>
             <a:lvl1pPr marL="0" indent="0" algn="ctr">
+              <a:lnSpc>
+                <a:spcPct val="70000"/>
+              </a:lnSpc>
+              <a:buFont typeface="Wingdings" panose="05000000000000000000" pitchFamily="2" charset="2"/>
               <a:buNone/>
-              <a:defRPr sz="2400"/>
+              <a:defRPr sz="1400" b="1">
+                <a:solidFill>
+                  <a:schemeClr val="bg2"/>
+                </a:solidFill>
+              </a:defRPr>
             </a:lvl1pPr>
-            <a:lvl2pPr marL="457200" indent="0" algn="ctr">
-              <a:buNone/>
-              <a:defRPr sz="2000"/>
-            </a:lvl2pPr>
-            <a:lvl3pPr marL="914400" indent="0" algn="ctr">
-              <a:buNone/>
-              <a:defRPr sz="1800"/>
-            </a:lvl3pPr>
-            <a:lvl4pPr marL="1371600" indent="0" algn="ctr">
-              <a:buNone/>
-              <a:defRPr sz="1600"/>
-            </a:lvl4pPr>
-            <a:lvl5pPr marL="1828800" indent="0" algn="ctr">
-              <a:buNone/>
-              <a:defRPr sz="1600"/>
-            </a:lvl5pPr>
-            <a:lvl6pPr marL="2286000" indent="0" algn="ctr">
-              <a:buNone/>
-              <a:defRPr sz="1600"/>
-            </a:lvl6pPr>
-            <a:lvl7pPr marL="2743200" indent="0" algn="ctr">
-              <a:buNone/>
-              <a:defRPr sz="1600"/>
-            </a:lvl7pPr>
-            <a:lvl8pPr marL="3200400" indent="0" algn="ctr">
-              <a:buNone/>
-              <a:defRPr sz="1600"/>
-            </a:lvl8pPr>
-            <a:lvl9pPr marL="3657600" indent="0" algn="ctr">
-              <a:buNone/>
-              <a:defRPr sz="1600"/>
-            </a:lvl9pPr>
           </a:lstStyle>
           <a:p>
-            <a:r>
-              <a:rPr lang="en-US" smtClean="0"/>
+            <a:pPr lvl="0"/>
+            <a:r>
+              <a:rPr lang="en-US" altLang="en-US" noProof="0" smtClean="0"/>
               <a:t>Click to edit Master subtitle style</a:t>
             </a:r>
-            <a:endParaRPr lang="en-IN"/>
-          </a:p>
-        </p:txBody>
-      </p:sp>
-      <p:sp>
-        <p:nvSpPr>
-          <p:cNvPr id="4" name="Date Placeholder 3"/>
-          <p:cNvSpPr>
-            <a:spLocks noGrp="1"/>
-          </p:cNvSpPr>
-          <p:nvPr>
-            <p:ph type="dt" sz="half" idx="10"/>
-          </p:nvPr>
-        </p:nvSpPr>
-        <p:spPr/>
-        <p:txBody>
-          <a:bodyPr/>
-          <a:lstStyle/>
-          <a:p>
-            <a:fld id="{B2D0CF44-E440-43D6-9C2C-A2A207973FB3}" type="datetimeFigureOut">
-              <a:rPr lang="en-IN" smtClean="0"/>
-              <a:t>05-11-2015</a:t>
-            </a:fld>
-            <a:endParaRPr lang="en-IN"/>
-          </a:p>
-        </p:txBody>
-      </p:sp>
-      <p:sp>
-        <p:nvSpPr>
-          <p:cNvPr id="5" name="Footer Placeholder 4"/>
-          <p:cNvSpPr>
-            <a:spLocks noGrp="1"/>
-          </p:cNvSpPr>
-          <p:nvPr>
-            <p:ph type="ftr" sz="quarter" idx="11"/>
-          </p:nvPr>
-        </p:nvSpPr>
-        <p:spPr/>
-        <p:txBody>
-          <a:bodyPr/>
-          <a:lstStyle/>
-          <a:p>
-            <a:endParaRPr lang="en-IN"/>
-          </a:p>
-        </p:txBody>
-      </p:sp>
-      <p:sp>
-        <p:nvSpPr>
-          <p:cNvPr id="6" name="Slide Number Placeholder 5"/>
-          <p:cNvSpPr>
-            <a:spLocks noGrp="1"/>
-          </p:cNvSpPr>
-          <p:nvPr>
-            <p:ph type="sldNum" sz="quarter" idx="12"/>
-          </p:nvPr>
-        </p:nvSpPr>
-        <p:spPr/>
-        <p:txBody>
-          <a:bodyPr/>
-          <a:lstStyle/>
-          <a:p>
-            <a:fld id="{04544889-53BA-4735-AA10-E8867CC63671}" type="slidenum">
-              <a:rPr lang="en-IN" smtClean="0"/>
-              <a:t>‹#›</a:t>
-            </a:fld>
-            <a:endParaRPr lang="en-IN"/>
-          </a:p>
-        </p:txBody>
-      </p:sp>
+            <a:endParaRPr lang="en-IN" altLang="en-US" noProof="0" smtClean="0"/>
+          </a:p>
+        </p:txBody>
+      </p:sp>
+      <p:pic>
+        <p:nvPicPr>
+          <p:cNvPr id="3098" name="Picture 26" descr="Jayhawk_horzsig"/>
+          <p:cNvPicPr>
+            <a:picLocks noChangeAspect="1" noChangeArrowheads="1"/>
+          </p:cNvPicPr>
+          <p:nvPr/>
+        </p:nvPicPr>
+        <p:blipFill>
+          <a:blip r:embed="rId4">
+            <a:extLst>
+              <a:ext uri="{28A0092B-C50C-407E-A947-70E740481C1C}">
+                <a14:useLocalDpi xmlns:a14="http://schemas.microsoft.com/office/drawing/2010/main" val="0"/>
+              </a:ext>
+            </a:extLst>
+          </a:blip>
+          <a:srcRect/>
+          <a:stretch>
+            <a:fillRect/>
+          </a:stretch>
+        </p:blipFill>
+        <p:spPr bwMode="auto">
+          <a:xfrm>
+            <a:off x="3562352" y="1981201"/>
+            <a:ext cx="6191249" cy="1660525"/>
+          </a:xfrm>
+          <a:prstGeom prst="rect">
+            <a:avLst/>
+          </a:prstGeom>
+          <a:noFill/>
+          <a:extLst>
+            <a:ext uri="{909E8E84-426E-40DD-AFC4-6F175D3DCCD1}">
+              <a14:hiddenFill xmlns:a14="http://schemas.microsoft.com/office/drawing/2010/main">
+                <a:solidFill>
+                  <a:srgbClr val="FFFFFF"/>
+                </a:solidFill>
+              </a14:hiddenFill>
+            </a:ext>
+          </a:extLst>
+        </p:spPr>
+      </p:pic>
     </p:spTree>
     <p:extLst>
       <p:ext uri="{BB962C8B-B14F-4D97-AF65-F5344CB8AC3E}">
-        <p14:creationId xmlns:p14="http://schemas.microsoft.com/office/powerpoint/2010/main" val="1756843220"/>
+        <p14:creationId xmlns:p14="http://schemas.microsoft.com/office/powerpoint/2010/main" val="1452340754"/>
       </p:ext>
     </p:extLst>
   </p:cSld>
@@ -420,7 +667,11 @@
         <p:spPr/>
         <p:txBody>
           <a:bodyPr/>
-          <a:lstStyle/>
+          <a:lstStyle>
+            <a:lvl1pPr>
+              <a:defRPr/>
+            </a:lvl1pPr>
+          </a:lstStyle>
           <a:p>
             <a:fld id="{B2D0CF44-E440-43D6-9C2C-A2A207973FB3}" type="datetimeFigureOut">
               <a:rPr lang="en-IN" smtClean="0"/>
@@ -443,7 +694,11 @@
         <p:spPr/>
         <p:txBody>
           <a:bodyPr/>
-          <a:lstStyle/>
+          <a:lstStyle>
+            <a:lvl1pPr>
+              <a:defRPr/>
+            </a:lvl1pPr>
+          </a:lstStyle>
           <a:p>
             <a:endParaRPr lang="en-IN"/>
           </a:p>
@@ -462,7 +717,11 @@
         <p:spPr/>
         <p:txBody>
           <a:bodyPr/>
-          <a:lstStyle/>
+          <a:lstStyle>
+            <a:lvl1pPr>
+              <a:defRPr/>
+            </a:lvl1pPr>
+          </a:lstStyle>
           <a:p>
             <a:fld id="{04544889-53BA-4735-AA10-E8867CC63671}" type="slidenum">
               <a:rPr lang="en-IN" smtClean="0"/>
@@ -475,7 +734,7 @@
     </p:spTree>
     <p:extLst>
       <p:ext uri="{BB962C8B-B14F-4D97-AF65-F5344CB8AC3E}">
-        <p14:creationId xmlns:p14="http://schemas.microsoft.com/office/powerpoint/2010/main" val="884686194"/>
+        <p14:creationId xmlns:p14="http://schemas.microsoft.com/office/powerpoint/2010/main" val="341831981"/>
       </p:ext>
     </p:extLst>
   </p:cSld>
@@ -514,8 +773,8 @@
         </p:nvSpPr>
         <p:spPr>
           <a:xfrm>
-            <a:off x="8724900" y="365125"/>
-            <a:ext cx="2628900" cy="5811838"/>
+            <a:off x="9220201" y="533400"/>
+            <a:ext cx="2501900" cy="5638800"/>
           </a:xfrm>
         </p:spPr>
         <p:txBody>
@@ -542,8 +801,8 @@
         </p:nvSpPr>
         <p:spPr>
           <a:xfrm>
-            <a:off x="838200" y="365125"/>
-            <a:ext cx="7734300" cy="5811838"/>
+            <a:off x="1708152" y="533400"/>
+            <a:ext cx="7308849" cy="5638800"/>
           </a:xfrm>
         </p:spPr>
         <p:txBody>
@@ -600,7 +859,11 @@
         <p:spPr/>
         <p:txBody>
           <a:bodyPr/>
-          <a:lstStyle/>
+          <a:lstStyle>
+            <a:lvl1pPr>
+              <a:defRPr/>
+            </a:lvl1pPr>
+          </a:lstStyle>
           <a:p>
             <a:fld id="{B2D0CF44-E440-43D6-9C2C-A2A207973FB3}" type="datetimeFigureOut">
               <a:rPr lang="en-IN" smtClean="0"/>
@@ -623,7 +886,11 @@
         <p:spPr/>
         <p:txBody>
           <a:bodyPr/>
-          <a:lstStyle/>
+          <a:lstStyle>
+            <a:lvl1pPr>
+              <a:defRPr/>
+            </a:lvl1pPr>
+          </a:lstStyle>
           <a:p>
             <a:endParaRPr lang="en-IN"/>
           </a:p>
@@ -642,7 +909,11 @@
         <p:spPr/>
         <p:txBody>
           <a:bodyPr/>
-          <a:lstStyle/>
+          <a:lstStyle>
+            <a:lvl1pPr>
+              <a:defRPr/>
+            </a:lvl1pPr>
+          </a:lstStyle>
           <a:p>
             <a:fld id="{04544889-53BA-4735-AA10-E8867CC63671}" type="slidenum">
               <a:rPr lang="en-IN" smtClean="0"/>
@@ -655,7 +926,7 @@
     </p:spTree>
     <p:extLst>
       <p:ext uri="{BB962C8B-B14F-4D97-AF65-F5344CB8AC3E}">
-        <p14:creationId xmlns:p14="http://schemas.microsoft.com/office/powerpoint/2010/main" val="1654759302"/>
+        <p14:creationId xmlns:p14="http://schemas.microsoft.com/office/powerpoint/2010/main" val="2849483737"/>
       </p:ext>
     </p:extLst>
   </p:cSld>
@@ -770,7 +1041,11 @@
         <p:spPr/>
         <p:txBody>
           <a:bodyPr/>
-          <a:lstStyle/>
+          <a:lstStyle>
+            <a:lvl1pPr>
+              <a:defRPr/>
+            </a:lvl1pPr>
+          </a:lstStyle>
           <a:p>
             <a:fld id="{B2D0CF44-E440-43D6-9C2C-A2A207973FB3}" type="datetimeFigureOut">
               <a:rPr lang="en-IN" smtClean="0"/>
@@ -793,7 +1068,11 @@
         <p:spPr/>
         <p:txBody>
           <a:bodyPr/>
-          <a:lstStyle/>
+          <a:lstStyle>
+            <a:lvl1pPr>
+              <a:defRPr/>
+            </a:lvl1pPr>
+          </a:lstStyle>
           <a:p>
             <a:endParaRPr lang="en-IN"/>
           </a:p>
@@ -812,7 +1091,11 @@
         <p:spPr/>
         <p:txBody>
           <a:bodyPr/>
-          <a:lstStyle/>
+          <a:lstStyle>
+            <a:lvl1pPr>
+              <a:defRPr/>
+            </a:lvl1pPr>
+          </a:lstStyle>
           <a:p>
             <a:fld id="{04544889-53BA-4735-AA10-E8867CC63671}" type="slidenum">
               <a:rPr lang="en-IN" smtClean="0"/>
@@ -825,7 +1108,7 @@
     </p:spTree>
     <p:extLst>
       <p:ext uri="{BB962C8B-B14F-4D97-AF65-F5344CB8AC3E}">
-        <p14:creationId xmlns:p14="http://schemas.microsoft.com/office/powerpoint/2010/main" val="2901334722"/>
+        <p14:creationId xmlns:p14="http://schemas.microsoft.com/office/powerpoint/2010/main" val="539227367"/>
       </p:ext>
     </p:extLst>
   </p:cSld>
@@ -864,7 +1147,7 @@
         </p:nvSpPr>
         <p:spPr>
           <a:xfrm>
-            <a:off x="831850" y="1709738"/>
+            <a:off x="831851" y="1709739"/>
             <a:ext cx="10515600" cy="2852737"/>
           </a:xfrm>
         </p:spPr>
@@ -896,7 +1179,7 @@
         </p:nvSpPr>
         <p:spPr>
           <a:xfrm>
-            <a:off x="831850" y="4589463"/>
+            <a:off x="831851" y="4589464"/>
             <a:ext cx="10515600" cy="1500187"/>
           </a:xfrm>
         </p:spPr>
@@ -905,93 +1188,39 @@
           <a:lstStyle>
             <a:lvl1pPr marL="0" indent="0">
               <a:buNone/>
-              <a:defRPr sz="2400">
-                <a:solidFill>
-                  <a:schemeClr val="tx1">
-                    <a:tint val="75000"/>
-                  </a:schemeClr>
-                </a:solidFill>
-              </a:defRPr>
+              <a:defRPr sz="2400"/>
             </a:lvl1pPr>
             <a:lvl2pPr marL="457200" indent="0">
               <a:buNone/>
-              <a:defRPr sz="2000">
-                <a:solidFill>
-                  <a:schemeClr val="tx1">
-                    <a:tint val="75000"/>
-                  </a:schemeClr>
-                </a:solidFill>
-              </a:defRPr>
+              <a:defRPr sz="2000"/>
             </a:lvl2pPr>
             <a:lvl3pPr marL="914400" indent="0">
               <a:buNone/>
-              <a:defRPr sz="1800">
-                <a:solidFill>
-                  <a:schemeClr val="tx1">
-                    <a:tint val="75000"/>
-                  </a:schemeClr>
-                </a:solidFill>
-              </a:defRPr>
+              <a:defRPr sz="1800"/>
             </a:lvl3pPr>
             <a:lvl4pPr marL="1371600" indent="0">
               <a:buNone/>
-              <a:defRPr sz="1600">
-                <a:solidFill>
-                  <a:schemeClr val="tx1">
-                    <a:tint val="75000"/>
-                  </a:schemeClr>
-                </a:solidFill>
-              </a:defRPr>
+              <a:defRPr sz="1600"/>
             </a:lvl4pPr>
             <a:lvl5pPr marL="1828800" indent="0">
               <a:buNone/>
-              <a:defRPr sz="1600">
-                <a:solidFill>
-                  <a:schemeClr val="tx1">
-                    <a:tint val="75000"/>
-                  </a:schemeClr>
-                </a:solidFill>
-              </a:defRPr>
+              <a:defRPr sz="1600"/>
             </a:lvl5pPr>
             <a:lvl6pPr marL="2286000" indent="0">
               <a:buNone/>
-              <a:defRPr sz="1600">
-                <a:solidFill>
-                  <a:schemeClr val="tx1">
-                    <a:tint val="75000"/>
-                  </a:schemeClr>
-                </a:solidFill>
-              </a:defRPr>
+              <a:defRPr sz="1600"/>
             </a:lvl6pPr>
             <a:lvl7pPr marL="2743200" indent="0">
               <a:buNone/>
-              <a:defRPr sz="1600">
-                <a:solidFill>
-                  <a:schemeClr val="tx1">
-                    <a:tint val="75000"/>
-                  </a:schemeClr>
-                </a:solidFill>
-              </a:defRPr>
+              <a:defRPr sz="1600"/>
             </a:lvl7pPr>
             <a:lvl8pPr marL="3200400" indent="0">
               <a:buNone/>
-              <a:defRPr sz="1600">
-                <a:solidFill>
-                  <a:schemeClr val="tx1">
-                    <a:tint val="75000"/>
-                  </a:schemeClr>
-                </a:solidFill>
-              </a:defRPr>
+              <a:defRPr sz="1600"/>
             </a:lvl8pPr>
             <a:lvl9pPr marL="3657600" indent="0">
               <a:buNone/>
-              <a:defRPr sz="1600">
-                <a:solidFill>
-                  <a:schemeClr val="tx1">
-                    <a:tint val="75000"/>
-                  </a:schemeClr>
-                </a:solidFill>
-              </a:defRPr>
+              <a:defRPr sz="1600"/>
             </a:lvl9pPr>
           </a:lstStyle>
           <a:p>
@@ -1016,7 +1245,11 @@
         <p:spPr/>
         <p:txBody>
           <a:bodyPr/>
-          <a:lstStyle/>
+          <a:lstStyle>
+            <a:lvl1pPr>
+              <a:defRPr/>
+            </a:lvl1pPr>
+          </a:lstStyle>
           <a:p>
             <a:fld id="{B2D0CF44-E440-43D6-9C2C-A2A207973FB3}" type="datetimeFigureOut">
               <a:rPr lang="en-IN" smtClean="0"/>
@@ -1039,7 +1272,11 @@
         <p:spPr/>
         <p:txBody>
           <a:bodyPr/>
-          <a:lstStyle/>
+          <a:lstStyle>
+            <a:lvl1pPr>
+              <a:defRPr/>
+            </a:lvl1pPr>
+          </a:lstStyle>
           <a:p>
             <a:endParaRPr lang="en-IN"/>
           </a:p>
@@ -1058,7 +1295,11 @@
         <p:spPr/>
         <p:txBody>
           <a:bodyPr/>
-          <a:lstStyle/>
+          <a:lstStyle>
+            <a:lvl1pPr>
+              <a:defRPr/>
+            </a:lvl1pPr>
+          </a:lstStyle>
           <a:p>
             <a:fld id="{04544889-53BA-4735-AA10-E8867CC63671}" type="slidenum">
               <a:rPr lang="en-IN" smtClean="0"/>
@@ -1071,7 +1312,7 @@
     </p:spTree>
     <p:extLst>
       <p:ext uri="{BB962C8B-B14F-4D97-AF65-F5344CB8AC3E}">
-        <p14:creationId xmlns:p14="http://schemas.microsoft.com/office/powerpoint/2010/main" val="29575688"/>
+        <p14:creationId xmlns:p14="http://schemas.microsoft.com/office/powerpoint/2010/main" val="2934529998"/>
       </p:ext>
     </p:extLst>
   </p:cSld>
@@ -1133,8 +1374,8 @@
         </p:nvSpPr>
         <p:spPr>
           <a:xfrm>
-            <a:off x="838200" y="1825625"/>
-            <a:ext cx="5181600" cy="4351338"/>
+            <a:off x="1708151" y="1219200"/>
+            <a:ext cx="4904316" cy="4953000"/>
           </a:xfrm>
         </p:spPr>
         <p:txBody>
@@ -1190,8 +1431,8 @@
         </p:nvSpPr>
         <p:spPr>
           <a:xfrm>
-            <a:off x="6172200" y="1825625"/>
-            <a:ext cx="5181600" cy="4351338"/>
+            <a:off x="6815668" y="1219200"/>
+            <a:ext cx="4906433" cy="4953000"/>
           </a:xfrm>
         </p:spPr>
         <p:txBody>
@@ -1248,7 +1489,11 @@
         <p:spPr/>
         <p:txBody>
           <a:bodyPr/>
-          <a:lstStyle/>
+          <a:lstStyle>
+            <a:lvl1pPr>
+              <a:defRPr/>
+            </a:lvl1pPr>
+          </a:lstStyle>
           <a:p>
             <a:fld id="{B2D0CF44-E440-43D6-9C2C-A2A207973FB3}" type="datetimeFigureOut">
               <a:rPr lang="en-IN" smtClean="0"/>
@@ -1271,7 +1516,11 @@
         <p:spPr/>
         <p:txBody>
           <a:bodyPr/>
-          <a:lstStyle/>
+          <a:lstStyle>
+            <a:lvl1pPr>
+              <a:defRPr/>
+            </a:lvl1pPr>
+          </a:lstStyle>
           <a:p>
             <a:endParaRPr lang="en-IN"/>
           </a:p>
@@ -1290,7 +1539,11 @@
         <p:spPr/>
         <p:txBody>
           <a:bodyPr/>
-          <a:lstStyle/>
+          <a:lstStyle>
+            <a:lvl1pPr>
+              <a:defRPr/>
+            </a:lvl1pPr>
+          </a:lstStyle>
           <a:p>
             <a:fld id="{04544889-53BA-4735-AA10-E8867CC63671}" type="slidenum">
               <a:rPr lang="en-IN" smtClean="0"/>
@@ -1303,7 +1556,7 @@
     </p:spTree>
     <p:extLst>
       <p:ext uri="{BB962C8B-B14F-4D97-AF65-F5344CB8AC3E}">
-        <p14:creationId xmlns:p14="http://schemas.microsoft.com/office/powerpoint/2010/main" val="2269480074"/>
+        <p14:creationId xmlns:p14="http://schemas.microsoft.com/office/powerpoint/2010/main" val="515667297"/>
       </p:ext>
     </p:extLst>
   </p:cSld>
@@ -1342,7 +1595,7 @@
         </p:nvSpPr>
         <p:spPr>
           <a:xfrm>
-            <a:off x="839788" y="365125"/>
+            <a:off x="840317" y="365126"/>
             <a:ext cx="10515600" cy="1325563"/>
           </a:xfrm>
         </p:spPr>
@@ -1370,8 +1623,8 @@
         </p:nvSpPr>
         <p:spPr>
           <a:xfrm>
-            <a:off x="839788" y="1681163"/>
-            <a:ext cx="5157787" cy="823912"/>
+            <a:off x="840318" y="1681163"/>
+            <a:ext cx="5158316" cy="823912"/>
           </a:xfrm>
         </p:spPr>
         <p:txBody>
@@ -1435,8 +1688,8 @@
         </p:nvSpPr>
         <p:spPr>
           <a:xfrm>
-            <a:off x="839788" y="2505075"/>
-            <a:ext cx="5157787" cy="3684588"/>
+            <a:off x="840318" y="2505075"/>
+            <a:ext cx="5158316" cy="3684588"/>
           </a:xfrm>
         </p:spPr>
         <p:txBody>
@@ -1493,7 +1746,7 @@
         <p:spPr>
           <a:xfrm>
             <a:off x="6172200" y="1681163"/>
-            <a:ext cx="5183188" cy="823912"/>
+            <a:ext cx="5183717" cy="823912"/>
           </a:xfrm>
         </p:spPr>
         <p:txBody>
@@ -1558,7 +1811,7 @@
         <p:spPr>
           <a:xfrm>
             <a:off x="6172200" y="2505075"/>
-            <a:ext cx="5183188" cy="3684588"/>
+            <a:ext cx="5183717" cy="3684588"/>
           </a:xfrm>
         </p:spPr>
         <p:txBody>
@@ -1615,7 +1868,11 @@
         <p:spPr/>
         <p:txBody>
           <a:bodyPr/>
-          <a:lstStyle/>
+          <a:lstStyle>
+            <a:lvl1pPr>
+              <a:defRPr/>
+            </a:lvl1pPr>
+          </a:lstStyle>
           <a:p>
             <a:fld id="{B2D0CF44-E440-43D6-9C2C-A2A207973FB3}" type="datetimeFigureOut">
               <a:rPr lang="en-IN" smtClean="0"/>
@@ -1638,7 +1895,11 @@
         <p:spPr/>
         <p:txBody>
           <a:bodyPr/>
-          <a:lstStyle/>
+          <a:lstStyle>
+            <a:lvl1pPr>
+              <a:defRPr/>
+            </a:lvl1pPr>
+          </a:lstStyle>
           <a:p>
             <a:endParaRPr lang="en-IN"/>
           </a:p>
@@ -1657,7 +1918,11 @@
         <p:spPr/>
         <p:txBody>
           <a:bodyPr/>
-          <a:lstStyle/>
+          <a:lstStyle>
+            <a:lvl1pPr>
+              <a:defRPr/>
+            </a:lvl1pPr>
+          </a:lstStyle>
           <a:p>
             <a:fld id="{04544889-53BA-4735-AA10-E8867CC63671}" type="slidenum">
               <a:rPr lang="en-IN" smtClean="0"/>
@@ -1670,7 +1935,7 @@
     </p:spTree>
     <p:extLst>
       <p:ext uri="{BB962C8B-B14F-4D97-AF65-F5344CB8AC3E}">
-        <p14:creationId xmlns:p14="http://schemas.microsoft.com/office/powerpoint/2010/main" val="86938345"/>
+        <p14:creationId xmlns:p14="http://schemas.microsoft.com/office/powerpoint/2010/main" val="2539947867"/>
       </p:ext>
     </p:extLst>
   </p:cSld>
@@ -1733,7 +1998,11 @@
         <p:spPr/>
         <p:txBody>
           <a:bodyPr/>
-          <a:lstStyle/>
+          <a:lstStyle>
+            <a:lvl1pPr>
+              <a:defRPr/>
+            </a:lvl1pPr>
+          </a:lstStyle>
           <a:p>
             <a:fld id="{B2D0CF44-E440-43D6-9C2C-A2A207973FB3}" type="datetimeFigureOut">
               <a:rPr lang="en-IN" smtClean="0"/>
@@ -1756,7 +2025,11 @@
         <p:spPr/>
         <p:txBody>
           <a:bodyPr/>
-          <a:lstStyle/>
+          <a:lstStyle>
+            <a:lvl1pPr>
+              <a:defRPr/>
+            </a:lvl1pPr>
+          </a:lstStyle>
           <a:p>
             <a:endParaRPr lang="en-IN"/>
           </a:p>
@@ -1775,7 +2048,11 @@
         <p:spPr/>
         <p:txBody>
           <a:bodyPr/>
-          <a:lstStyle/>
+          <a:lstStyle>
+            <a:lvl1pPr>
+              <a:defRPr/>
+            </a:lvl1pPr>
+          </a:lstStyle>
           <a:p>
             <a:fld id="{04544889-53BA-4735-AA10-E8867CC63671}" type="slidenum">
               <a:rPr lang="en-IN" smtClean="0"/>
@@ -1788,7 +2065,7 @@
     </p:spTree>
     <p:extLst>
       <p:ext uri="{BB962C8B-B14F-4D97-AF65-F5344CB8AC3E}">
-        <p14:creationId xmlns:p14="http://schemas.microsoft.com/office/powerpoint/2010/main" val="501251114"/>
+        <p14:creationId xmlns:p14="http://schemas.microsoft.com/office/powerpoint/2010/main" val="1670315177"/>
       </p:ext>
     </p:extLst>
   </p:cSld>
@@ -1828,7 +2105,11 @@
         <p:spPr/>
         <p:txBody>
           <a:bodyPr/>
-          <a:lstStyle/>
+          <a:lstStyle>
+            <a:lvl1pPr>
+              <a:defRPr/>
+            </a:lvl1pPr>
+          </a:lstStyle>
           <a:p>
             <a:fld id="{B2D0CF44-E440-43D6-9C2C-A2A207973FB3}" type="datetimeFigureOut">
               <a:rPr lang="en-IN" smtClean="0"/>
@@ -1851,7 +2132,11 @@
         <p:spPr/>
         <p:txBody>
           <a:bodyPr/>
-          <a:lstStyle/>
+          <a:lstStyle>
+            <a:lvl1pPr>
+              <a:defRPr/>
+            </a:lvl1pPr>
+          </a:lstStyle>
           <a:p>
             <a:endParaRPr lang="en-IN"/>
           </a:p>
@@ -1870,7 +2155,11 @@
         <p:spPr/>
         <p:txBody>
           <a:bodyPr/>
-          <a:lstStyle/>
+          <a:lstStyle>
+            <a:lvl1pPr>
+              <a:defRPr/>
+            </a:lvl1pPr>
+          </a:lstStyle>
           <a:p>
             <a:fld id="{04544889-53BA-4735-AA10-E8867CC63671}" type="slidenum">
               <a:rPr lang="en-IN" smtClean="0"/>
@@ -1883,7 +2172,7 @@
     </p:spTree>
     <p:extLst>
       <p:ext uri="{BB962C8B-B14F-4D97-AF65-F5344CB8AC3E}">
-        <p14:creationId xmlns:p14="http://schemas.microsoft.com/office/powerpoint/2010/main" val="3501064992"/>
+        <p14:creationId xmlns:p14="http://schemas.microsoft.com/office/powerpoint/2010/main" val="1853573837"/>
       </p:ext>
     </p:extLst>
   </p:cSld>
@@ -1922,8 +2211,8 @@
         </p:nvSpPr>
         <p:spPr>
           <a:xfrm>
-            <a:off x="839788" y="457200"/>
-            <a:ext cx="3932237" cy="1600200"/>
+            <a:off x="840318" y="457200"/>
+            <a:ext cx="3932767" cy="1600200"/>
           </a:xfrm>
         </p:spPr>
         <p:txBody>
@@ -1954,7 +2243,7 @@
         </p:nvSpPr>
         <p:spPr>
           <a:xfrm>
-            <a:off x="5183188" y="987425"/>
+            <a:off x="5183717" y="987426"/>
             <a:ext cx="6172200" cy="4873625"/>
           </a:xfrm>
         </p:spPr>
@@ -2039,8 +2328,8 @@
         </p:nvSpPr>
         <p:spPr>
           <a:xfrm>
-            <a:off x="839788" y="2057400"/>
-            <a:ext cx="3932237" cy="3811588"/>
+            <a:off x="840318" y="2057400"/>
+            <a:ext cx="3932767" cy="3811588"/>
           </a:xfrm>
         </p:spPr>
         <p:txBody>
@@ -2105,7 +2394,11 @@
         <p:spPr/>
         <p:txBody>
           <a:bodyPr/>
-          <a:lstStyle/>
+          <a:lstStyle>
+            <a:lvl1pPr>
+              <a:defRPr/>
+            </a:lvl1pPr>
+          </a:lstStyle>
           <a:p>
             <a:fld id="{B2D0CF44-E440-43D6-9C2C-A2A207973FB3}" type="datetimeFigureOut">
               <a:rPr lang="en-IN" smtClean="0"/>
@@ -2128,7 +2421,11 @@
         <p:spPr/>
         <p:txBody>
           <a:bodyPr/>
-          <a:lstStyle/>
+          <a:lstStyle>
+            <a:lvl1pPr>
+              <a:defRPr/>
+            </a:lvl1pPr>
+          </a:lstStyle>
           <a:p>
             <a:endParaRPr lang="en-IN"/>
           </a:p>
@@ -2147,7 +2444,11 @@
         <p:spPr/>
         <p:txBody>
           <a:bodyPr/>
-          <a:lstStyle/>
+          <a:lstStyle>
+            <a:lvl1pPr>
+              <a:defRPr/>
+            </a:lvl1pPr>
+          </a:lstStyle>
           <a:p>
             <a:fld id="{04544889-53BA-4735-AA10-E8867CC63671}" type="slidenum">
               <a:rPr lang="en-IN" smtClean="0"/>
@@ -2160,7 +2461,7 @@
     </p:spTree>
     <p:extLst>
       <p:ext uri="{BB962C8B-B14F-4D97-AF65-F5344CB8AC3E}">
-        <p14:creationId xmlns:p14="http://schemas.microsoft.com/office/powerpoint/2010/main" val="720388123"/>
+        <p14:creationId xmlns:p14="http://schemas.microsoft.com/office/powerpoint/2010/main" val="2379762384"/>
       </p:ext>
     </p:extLst>
   </p:cSld>
@@ -2199,8 +2500,8 @@
         </p:nvSpPr>
         <p:spPr>
           <a:xfrm>
-            <a:off x="839788" y="457200"/>
-            <a:ext cx="3932237" cy="1600200"/>
+            <a:off x="840318" y="457200"/>
+            <a:ext cx="3932767" cy="1600200"/>
           </a:xfrm>
         </p:spPr>
         <p:txBody>
@@ -2231,7 +2532,7 @@
         </p:nvSpPr>
         <p:spPr>
           <a:xfrm>
-            <a:off x="5183188" y="987425"/>
+            <a:off x="5183717" y="987426"/>
             <a:ext cx="6172200" cy="4873625"/>
           </a:xfrm>
         </p:spPr>
@@ -2276,6 +2577,10 @@
             </a:lvl9pPr>
           </a:lstStyle>
           <a:p>
+            <a:r>
+              <a:rPr lang="en-US" smtClean="0"/>
+              <a:t>Click icon to add picture</a:t>
+            </a:r>
             <a:endParaRPr lang="en-IN"/>
           </a:p>
         </p:txBody>
@@ -2292,8 +2597,8 @@
         </p:nvSpPr>
         <p:spPr>
           <a:xfrm>
-            <a:off x="839788" y="2057400"/>
-            <a:ext cx="3932237" cy="3811588"/>
+            <a:off x="840318" y="2057400"/>
+            <a:ext cx="3932767" cy="3811588"/>
           </a:xfrm>
         </p:spPr>
         <p:txBody>
@@ -2358,7 +2663,11 @@
         <p:spPr/>
         <p:txBody>
           <a:bodyPr/>
-          <a:lstStyle/>
+          <a:lstStyle>
+            <a:lvl1pPr>
+              <a:defRPr/>
+            </a:lvl1pPr>
+          </a:lstStyle>
           <a:p>
             <a:fld id="{B2D0CF44-E440-43D6-9C2C-A2A207973FB3}" type="datetimeFigureOut">
               <a:rPr lang="en-IN" smtClean="0"/>
@@ -2381,7 +2690,11 @@
         <p:spPr/>
         <p:txBody>
           <a:bodyPr/>
-          <a:lstStyle/>
+          <a:lstStyle>
+            <a:lvl1pPr>
+              <a:defRPr/>
+            </a:lvl1pPr>
+          </a:lstStyle>
           <a:p>
             <a:endParaRPr lang="en-IN"/>
           </a:p>
@@ -2400,7 +2713,11 @@
         <p:spPr/>
         <p:txBody>
           <a:bodyPr/>
-          <a:lstStyle/>
+          <a:lstStyle>
+            <a:lvl1pPr>
+              <a:defRPr/>
+            </a:lvl1pPr>
+          </a:lstStyle>
           <a:p>
             <a:fld id="{04544889-53BA-4735-AA10-E8867CC63671}" type="slidenum">
               <a:rPr lang="en-IN" smtClean="0"/>
@@ -2413,7 +2730,7 @@
     </p:spTree>
     <p:extLst>
       <p:ext uri="{BB962C8B-B14F-4D97-AF65-F5344CB8AC3E}">
-        <p14:creationId xmlns:p14="http://schemas.microsoft.com/office/powerpoint/2010/main" val="45464190"/>
+        <p14:creationId xmlns:p14="http://schemas.microsoft.com/office/powerpoint/2010/main" val="659810565"/>
       </p:ext>
     </p:extLst>
   </p:cSld>
@@ -2427,9 +2744,12 @@
 <p:sldMaster xmlns:a="http://schemas.openxmlformats.org/drawingml/2006/main" xmlns:r="http://schemas.openxmlformats.org/officeDocument/2006/relationships" xmlns:p="http://schemas.openxmlformats.org/presentationml/2006/main">
   <p:cSld>
     <p:bg>
-      <p:bgRef idx="1001">
-        <a:schemeClr val="bg1"/>
-      </p:bgRef>
+      <p:bgPr>
+        <a:solidFill>
+          <a:srgbClr val="FFFFFF"/>
+        </a:solidFill>
+        <a:effectLst/>
+      </p:bgPr>
     </p:bg>
     <p:spTree>
       <p:nvGrpSpPr>
@@ -2447,127 +2767,323 @@
       </p:grpSpPr>
       <p:sp>
         <p:nvSpPr>
-          <p:cNvPr id="2" name="Title Placeholder 1"/>
-          <p:cNvSpPr>
-            <a:spLocks noGrp="1"/>
-          </p:cNvSpPr>
-          <p:nvPr>
-            <p:ph type="title"/>
-          </p:nvPr>
-        </p:nvSpPr>
-        <p:spPr>
+          <p:cNvPr id="1036" name="Rectangle 12"/>
+          <p:cNvSpPr>
+            <a:spLocks noChangeArrowheads="1"/>
+          </p:cNvSpPr>
+          <p:nvPr/>
+        </p:nvSpPr>
+        <p:spPr bwMode="auto">
           <a:xfrm>
-            <a:off x="838200" y="365125"/>
-            <a:ext cx="10515600" cy="1325563"/>
+            <a:off x="0" y="457200"/>
+            <a:ext cx="1625600" cy="6400800"/>
           </a:xfrm>
           <a:prstGeom prst="rect">
             <a:avLst/>
           </a:prstGeom>
+          <a:solidFill>
+            <a:srgbClr val="E6E6E6"/>
+          </a:solidFill>
+          <a:ln>
+            <a:noFill/>
+          </a:ln>
+          <a:extLst>
+            <a:ext uri="{91240B29-F687-4F45-9708-019B960494DF}">
+              <a14:hiddenLine xmlns:a14="http://schemas.microsoft.com/office/drawing/2010/main" w="9525">
+                <a:solidFill>
+                  <a:schemeClr val="tx1"/>
+                </a:solidFill>
+                <a:miter lim="800000"/>
+                <a:headEnd/>
+                <a:tailEnd/>
+              </a14:hiddenLine>
+            </a:ext>
+          </a:extLst>
         </p:spPr>
         <p:txBody>
-          <a:bodyPr vert="horz" lIns="91440" tIns="45720" rIns="91440" bIns="45720" rtlCol="0" anchor="ctr">
-            <a:normAutofit/>
-          </a:bodyPr>
+          <a:bodyPr wrap="none" anchor="ctr"/>
           <a:lstStyle/>
           <a:p>
-            <a:r>
-              <a:rPr lang="en-US" smtClean="0"/>
-              <a:t>Click to edit Master title style</a:t>
-            </a:r>
-            <a:endParaRPr lang="en-IN"/>
-          </a:p>
-        </p:txBody>
-      </p:sp>
-      <p:sp>
-        <p:nvSpPr>
-          <p:cNvPr id="3" name="Text Placeholder 2"/>
-          <p:cNvSpPr>
-            <a:spLocks noGrp="1"/>
-          </p:cNvSpPr>
-          <p:nvPr>
-            <p:ph type="body" idx="1"/>
-          </p:nvPr>
-        </p:nvSpPr>
-        <p:spPr>
+            <a:endParaRPr lang="en-IN" sz="1800"/>
+          </a:p>
+        </p:txBody>
+      </p:sp>
+      <p:pic>
+        <p:nvPicPr>
+          <p:cNvPr id="1042" name="Picture 18" descr="Column"/>
+          <p:cNvPicPr>
+            <a:picLocks noChangeAspect="1" noChangeArrowheads="1"/>
+          </p:cNvPicPr>
+          <p:nvPr/>
+        </p:nvPicPr>
+        <p:blipFill>
+          <a:blip r:embed="rId13">
+            <a:extLst>
+              <a:ext uri="{28A0092B-C50C-407E-A947-70E740481C1C}">
+                <a14:useLocalDpi xmlns:a14="http://schemas.microsoft.com/office/drawing/2010/main" val="0"/>
+              </a:ext>
+            </a:extLst>
+          </a:blip>
+          <a:srcRect l="37888" r="15483" b="2444"/>
+          <a:stretch>
+            <a:fillRect/>
+          </a:stretch>
+        </p:blipFill>
+        <p:spPr bwMode="auto">
           <a:xfrm>
-            <a:off x="838200" y="1825625"/>
-            <a:ext cx="10515600" cy="4351338"/>
+            <a:off x="0" y="457200"/>
+            <a:ext cx="1625600" cy="6019800"/>
           </a:xfrm>
           <a:prstGeom prst="rect">
             <a:avLst/>
           </a:prstGeom>
+          <a:noFill/>
+          <a:extLst>
+            <a:ext uri="{909E8E84-426E-40DD-AFC4-6F175D3DCCD1}">
+              <a14:hiddenFill xmlns:a14="http://schemas.microsoft.com/office/drawing/2010/main">
+                <a:solidFill>
+                  <a:srgbClr val="FFFFFF"/>
+                </a:solidFill>
+              </a14:hiddenFill>
+            </a:ext>
+          </a:extLst>
         </p:spPr>
-        <p:txBody>
-          <a:bodyPr vert="horz" lIns="91440" tIns="45720" rIns="91440" bIns="45720" rtlCol="0">
-            <a:normAutofit/>
-          </a:bodyPr>
-          <a:lstStyle/>
-          <a:p>
-            <a:pPr lvl="0"/>
-            <a:r>
-              <a:rPr lang="en-US" smtClean="0"/>
-              <a:t>Click to edit Master text styles</a:t>
-            </a:r>
-          </a:p>
-          <a:p>
-            <a:pPr lvl="1"/>
-            <a:r>
-              <a:rPr lang="en-US" smtClean="0"/>
-              <a:t>Second level</a:t>
-            </a:r>
-          </a:p>
-          <a:p>
-            <a:pPr lvl="2"/>
-            <a:r>
-              <a:rPr lang="en-US" smtClean="0"/>
-              <a:t>Third level</a:t>
-            </a:r>
-          </a:p>
-          <a:p>
-            <a:pPr lvl="3"/>
-            <a:r>
-              <a:rPr lang="en-US" smtClean="0"/>
-              <a:t>Fourth level</a:t>
-            </a:r>
-          </a:p>
-          <a:p>
-            <a:pPr lvl="4"/>
-            <a:r>
-              <a:rPr lang="en-US" smtClean="0"/>
-              <a:t>Fifth level</a:t>
-            </a:r>
-            <a:endParaRPr lang="en-IN"/>
-          </a:p>
-        </p:txBody>
-      </p:sp>
-      <p:sp>
-        <p:nvSpPr>
-          <p:cNvPr id="4" name="Date Placeholder 3"/>
-          <p:cNvSpPr>
-            <a:spLocks noGrp="1"/>
-          </p:cNvSpPr>
-          <p:nvPr>
-            <p:ph type="dt" sz="half" idx="2"/>
-          </p:nvPr>
-        </p:nvSpPr>
-        <p:spPr>
+      </p:pic>
+      <p:sp>
+        <p:nvSpPr>
+          <p:cNvPr id="1026" name="Rectangle 2"/>
+          <p:cNvSpPr>
+            <a:spLocks noGrp="1" noChangeArrowheads="1"/>
+          </p:cNvSpPr>
+          <p:nvPr>
+            <p:ph type="title"/>
+          </p:nvPr>
+        </p:nvSpPr>
+        <p:spPr bwMode="auto">
           <a:xfrm>
-            <a:off x="838200" y="6356350"/>
-            <a:ext cx="2743200" cy="365125"/>
+            <a:off x="1727201" y="533400"/>
+            <a:ext cx="9994900" cy="685800"/>
           </a:xfrm>
           <a:prstGeom prst="rect">
             <a:avLst/>
           </a:prstGeom>
+          <a:noFill/>
+          <a:ln>
+            <a:noFill/>
+          </a:ln>
+          <a:effectLst/>
+          <a:extLst>
+            <a:ext uri="{909E8E84-426E-40DD-AFC4-6F175D3DCCD1}">
+              <a14:hiddenFill xmlns:a14="http://schemas.microsoft.com/office/drawing/2010/main">
+                <a:solidFill>
+                  <a:schemeClr val="accent1"/>
+                </a:solidFill>
+              </a14:hiddenFill>
+            </a:ext>
+            <a:ext uri="{91240B29-F687-4F45-9708-019B960494DF}">
+              <a14:hiddenLine xmlns:a14="http://schemas.microsoft.com/office/drawing/2010/main" w="9525">
+                <a:solidFill>
+                  <a:schemeClr val="tx1"/>
+                </a:solidFill>
+                <a:miter lim="800000"/>
+                <a:headEnd/>
+                <a:tailEnd/>
+              </a14:hiddenLine>
+            </a:ext>
+            <a:ext uri="{AF507438-7753-43E0-B8FC-AC1667EBCBE1}">
+              <a14:hiddenEffects xmlns:a14="http://schemas.microsoft.com/office/drawing/2010/main">
+                <a:effectLst>
+                  <a:outerShdw blurRad="50800" dist="12700" dir="8100000" algn="ctr" rotWithShape="0">
+                    <a:srgbClr val="FFFFFF">
+                      <a:alpha val="75000"/>
+                    </a:srgbClr>
+                  </a:outerShdw>
+                </a:effectLst>
+              </a14:hiddenEffects>
+            </a:ext>
+          </a:extLst>
         </p:spPr>
         <p:txBody>
-          <a:bodyPr vert="horz" lIns="91440" tIns="45720" rIns="91440" bIns="45720" rtlCol="0" anchor="ctr"/>
+          <a:bodyPr vert="horz" wrap="square" lIns="91440" tIns="45720" rIns="91440" bIns="45720" numCol="1" anchor="t" anchorCtr="0" compatLnSpc="1">
+            <a:prstTxWarp prst="textNoShape">
+              <a:avLst/>
+            </a:prstTxWarp>
+          </a:bodyPr>
+          <a:lstStyle/>
+          <a:p>
+            <a:pPr lvl="0"/>
+            <a:r>
+              <a:rPr lang="en-US" altLang="en-US" smtClean="0"/>
+              <a:t>Click to edit Master title style</a:t>
+            </a:r>
+            <a:endParaRPr lang="en-IN" altLang="en-US" smtClean="0"/>
+          </a:p>
+        </p:txBody>
+      </p:sp>
+      <p:sp>
+        <p:nvSpPr>
+          <p:cNvPr id="1027" name="Rectangle 3"/>
+          <p:cNvSpPr>
+            <a:spLocks noGrp="1" noChangeArrowheads="1"/>
+          </p:cNvSpPr>
+          <p:nvPr>
+            <p:ph type="body" idx="1"/>
+          </p:nvPr>
+        </p:nvSpPr>
+        <p:spPr bwMode="auto">
+          <a:xfrm>
+            <a:off x="1708151" y="1219200"/>
+            <a:ext cx="10013949" cy="4953000"/>
+          </a:xfrm>
+          <a:prstGeom prst="rect">
+            <a:avLst/>
+          </a:prstGeom>
+          <a:noFill/>
+          <a:ln>
+            <a:noFill/>
+          </a:ln>
+          <a:effectLst/>
+          <a:extLst>
+            <a:ext uri="{909E8E84-426E-40DD-AFC4-6F175D3DCCD1}">
+              <a14:hiddenFill xmlns:a14="http://schemas.microsoft.com/office/drawing/2010/main">
+                <a:solidFill>
+                  <a:schemeClr val="accent1"/>
+                </a:solidFill>
+              </a14:hiddenFill>
+            </a:ext>
+            <a:ext uri="{91240B29-F687-4F45-9708-019B960494DF}">
+              <a14:hiddenLine xmlns:a14="http://schemas.microsoft.com/office/drawing/2010/main" w="9525">
+                <a:solidFill>
+                  <a:schemeClr val="tx1"/>
+                </a:solidFill>
+                <a:miter lim="800000"/>
+                <a:headEnd/>
+                <a:tailEnd/>
+              </a14:hiddenLine>
+            </a:ext>
+            <a:ext uri="{AF507438-7753-43E0-B8FC-AC1667EBCBE1}">
+              <a14:hiddenEffects xmlns:a14="http://schemas.microsoft.com/office/drawing/2010/main">
+                <a:effectLst>
+                  <a:outerShdw blurRad="50800" dist="12700" dir="8100000" algn="ctr" rotWithShape="0">
+                    <a:srgbClr val="FFFFFF">
+                      <a:alpha val="75000"/>
+                    </a:srgbClr>
+                  </a:outerShdw>
+                </a:effectLst>
+              </a14:hiddenEffects>
+            </a:ext>
+          </a:extLst>
+        </p:spPr>
+        <p:txBody>
+          <a:bodyPr vert="horz" wrap="square" lIns="91440" tIns="45720" rIns="91440" bIns="45720" numCol="1" anchor="t" anchorCtr="0" compatLnSpc="1">
+            <a:prstTxWarp prst="textNoShape">
+              <a:avLst/>
+            </a:prstTxWarp>
+          </a:bodyPr>
+          <a:lstStyle/>
+          <a:p>
+            <a:pPr lvl="0"/>
+            <a:r>
+              <a:rPr lang="en-US" altLang="en-US" smtClean="0"/>
+              <a:t>Click to edit Master text styles</a:t>
+            </a:r>
+          </a:p>
+          <a:p>
+            <a:pPr lvl="1"/>
+            <a:r>
+              <a:rPr lang="en-US" altLang="en-US" smtClean="0"/>
+              <a:t>Second level</a:t>
+            </a:r>
+          </a:p>
+          <a:p>
+            <a:pPr lvl="2"/>
+            <a:r>
+              <a:rPr lang="en-US" altLang="en-US" smtClean="0"/>
+              <a:t>Third level</a:t>
+            </a:r>
+          </a:p>
+          <a:p>
+            <a:pPr lvl="3"/>
+            <a:r>
+              <a:rPr lang="en-US" altLang="en-US" smtClean="0"/>
+              <a:t>Fourth level</a:t>
+            </a:r>
+          </a:p>
+          <a:p>
+            <a:pPr lvl="4"/>
+            <a:r>
+              <a:rPr lang="en-US" altLang="en-US" smtClean="0"/>
+              <a:t>Fifth level</a:t>
+            </a:r>
+            <a:endParaRPr lang="en-IN" altLang="en-US" smtClean="0"/>
+          </a:p>
+        </p:txBody>
+      </p:sp>
+      <p:sp>
+        <p:nvSpPr>
+          <p:cNvPr id="1028" name="Rectangle 4"/>
+          <p:cNvSpPr>
+            <a:spLocks noGrp="1" noChangeArrowheads="1"/>
+          </p:cNvSpPr>
+          <p:nvPr>
+            <p:ph type="dt" sz="half" idx="2"/>
+          </p:nvPr>
+        </p:nvSpPr>
+        <p:spPr bwMode="auto">
+          <a:xfrm>
+            <a:off x="1727200" y="6596064"/>
+            <a:ext cx="2032000" cy="198437"/>
+          </a:xfrm>
+          <a:prstGeom prst="rect">
+            <a:avLst/>
+          </a:prstGeom>
+          <a:noFill/>
+          <a:ln>
+            <a:noFill/>
+          </a:ln>
+          <a:effectLst/>
+          <a:extLst>
+            <a:ext uri="{909E8E84-426E-40DD-AFC4-6F175D3DCCD1}">
+              <a14:hiddenFill xmlns:a14="http://schemas.microsoft.com/office/drawing/2010/main">
+                <a:solidFill>
+                  <a:schemeClr val="accent1"/>
+                </a:solidFill>
+              </a14:hiddenFill>
+            </a:ext>
+            <a:ext uri="{91240B29-F687-4F45-9708-019B960494DF}">
+              <a14:hiddenLine xmlns:a14="http://schemas.microsoft.com/office/drawing/2010/main" w="9525">
+                <a:solidFill>
+                  <a:schemeClr val="tx1"/>
+                </a:solidFill>
+                <a:miter lim="800000"/>
+                <a:headEnd/>
+                <a:tailEnd/>
+              </a14:hiddenLine>
+            </a:ext>
+            <a:ext uri="{AF507438-7753-43E0-B8FC-AC1667EBCBE1}">
+              <a14:hiddenEffects xmlns:a14="http://schemas.microsoft.com/office/drawing/2010/main">
+                <a:effectLst>
+                  <a:outerShdw blurRad="50800" dist="12700" dir="8100000" algn="ctr" rotWithShape="0">
+                    <a:srgbClr val="FFFFFF">
+                      <a:alpha val="75000"/>
+                    </a:srgbClr>
+                  </a:outerShdw>
+                </a:effectLst>
+              </a14:hiddenEffects>
+            </a:ext>
+          </a:extLst>
+        </p:spPr>
+        <p:txBody>
+          <a:bodyPr vert="horz" wrap="square" lIns="91440" tIns="45720" rIns="91440" bIns="45720" numCol="1" anchor="t" anchorCtr="0" compatLnSpc="1">
+            <a:prstTxWarp prst="textNoShape">
+              <a:avLst/>
+            </a:prstTxWarp>
+          </a:bodyPr>
           <a:lstStyle>
-            <a:lvl1pPr algn="l">
-              <a:defRPr sz="1200">
+            <a:lvl1pPr>
+              <a:defRPr sz="1000">
                 <a:solidFill>
-                  <a:schemeClr val="tx1">
-                    <a:tint val="75000"/>
-                  </a:schemeClr>
+                  <a:schemeClr val="bg2"/>
                 </a:solidFill>
               </a:defRPr>
             </a:lvl1pPr>
@@ -2583,32 +3099,69 @@
       </p:sp>
       <p:sp>
         <p:nvSpPr>
-          <p:cNvPr id="5" name="Footer Placeholder 4"/>
-          <p:cNvSpPr>
-            <a:spLocks noGrp="1"/>
+          <p:cNvPr id="1029" name="Rectangle 5"/>
+          <p:cNvSpPr>
+            <a:spLocks noGrp="1" noChangeArrowheads="1"/>
           </p:cNvSpPr>
           <p:nvPr>
             <p:ph type="ftr" sz="quarter" idx="3"/>
           </p:nvPr>
         </p:nvSpPr>
-        <p:spPr>
+        <p:spPr bwMode="auto">
           <a:xfrm>
-            <a:off x="4038600" y="6356350"/>
-            <a:ext cx="4114800" cy="365125"/>
+            <a:off x="5384801" y="6594476"/>
+            <a:ext cx="3638551" cy="201613"/>
           </a:xfrm>
           <a:prstGeom prst="rect">
             <a:avLst/>
           </a:prstGeom>
+          <a:noFill/>
+          <a:ln>
+            <a:noFill/>
+          </a:ln>
+          <a:effectLst/>
+          <a:extLst>
+            <a:ext uri="{909E8E84-426E-40DD-AFC4-6F175D3DCCD1}">
+              <a14:hiddenFill xmlns:a14="http://schemas.microsoft.com/office/drawing/2010/main">
+                <a:solidFill>
+                  <a:schemeClr val="accent1"/>
+                </a:solidFill>
+              </a14:hiddenFill>
+            </a:ext>
+            <a:ext uri="{91240B29-F687-4F45-9708-019B960494DF}">
+              <a14:hiddenLine xmlns:a14="http://schemas.microsoft.com/office/drawing/2010/main" w="9525">
+                <a:solidFill>
+                  <a:schemeClr val="tx1"/>
+                </a:solidFill>
+                <a:miter lim="800000"/>
+                <a:headEnd/>
+                <a:tailEnd/>
+              </a14:hiddenLine>
+            </a:ext>
+            <a:ext uri="{AF507438-7753-43E0-B8FC-AC1667EBCBE1}">
+              <a14:hiddenEffects xmlns:a14="http://schemas.microsoft.com/office/drawing/2010/main">
+                <a:effectLst>
+                  <a:outerShdw blurRad="50800" dist="12700" dir="8100000" algn="ctr" rotWithShape="0">
+                    <a:srgbClr val="FFFFFF">
+                      <a:alpha val="75000"/>
+                    </a:srgbClr>
+                  </a:outerShdw>
+                </a:effectLst>
+              </a14:hiddenEffects>
+            </a:ext>
+          </a:extLst>
         </p:spPr>
         <p:txBody>
-          <a:bodyPr vert="horz" lIns="91440" tIns="45720" rIns="91440" bIns="45720" rtlCol="0" anchor="ctr"/>
+          <a:bodyPr vert="horz" wrap="square" lIns="91440" tIns="45720" rIns="91440" bIns="45720" numCol="1" anchor="t" anchorCtr="0" compatLnSpc="1">
+            <a:prstTxWarp prst="textNoShape">
+              <a:avLst/>
+            </a:prstTxWarp>
+          </a:bodyPr>
           <a:lstStyle>
-            <a:lvl1pPr algn="ctr">
-              <a:defRPr sz="1200">
+            <a:lvl1pPr>
+              <a:defRPr sz="1000">
                 <a:solidFill>
-                  <a:schemeClr val="tx1">
-                    <a:tint val="75000"/>
-                  </a:schemeClr>
+                  <a:schemeClr val="bg2"/>
                 </a:solidFill>
               </a:defRPr>
             </a:lvl1pPr>
@@ -2620,32 +3173,325 @@
       </p:sp>
       <p:sp>
         <p:nvSpPr>
-          <p:cNvPr id="6" name="Slide Number Placeholder 5"/>
-          <p:cNvSpPr>
-            <a:spLocks noGrp="1"/>
-          </p:cNvSpPr>
-          <p:nvPr>
-            <p:ph type="sldNum" sz="quarter" idx="4"/>
-          </p:nvPr>
-        </p:nvSpPr>
-        <p:spPr>
+          <p:cNvPr id="1039" name="Rectangle 15"/>
+          <p:cNvSpPr>
+            <a:spLocks noChangeArrowheads="1"/>
+          </p:cNvSpPr>
+          <p:nvPr/>
+        </p:nvSpPr>
+        <p:spPr bwMode="auto">
           <a:xfrm>
-            <a:off x="8610600" y="6356350"/>
-            <a:ext cx="2743200" cy="365125"/>
+            <a:off x="0" y="0"/>
+            <a:ext cx="11887200" cy="381000"/>
           </a:xfrm>
           <a:prstGeom prst="rect">
             <a:avLst/>
           </a:prstGeom>
+          <a:solidFill>
+            <a:srgbClr val="0B4599"/>
+          </a:solidFill>
+          <a:ln>
+            <a:noFill/>
+          </a:ln>
+          <a:extLst>
+            <a:ext uri="{91240B29-F687-4F45-9708-019B960494DF}">
+              <a14:hiddenLine xmlns:a14="http://schemas.microsoft.com/office/drawing/2010/main" w="9525">
+                <a:solidFill>
+                  <a:schemeClr val="tx1"/>
+                </a:solidFill>
+                <a:miter lim="800000"/>
+                <a:headEnd/>
+                <a:tailEnd/>
+              </a14:hiddenLine>
+            </a:ext>
+          </a:extLst>
         </p:spPr>
         <p:txBody>
-          <a:bodyPr vert="horz" lIns="91440" tIns="45720" rIns="91440" bIns="45720" rtlCol="0" anchor="ctr"/>
+          <a:bodyPr wrap="none" anchor="ctr"/>
+          <a:lstStyle/>
+          <a:p>
+            <a:endParaRPr lang="en-IN" sz="1800"/>
+          </a:p>
+        </p:txBody>
+      </p:sp>
+      <p:sp>
+        <p:nvSpPr>
+          <p:cNvPr id="1040" name="Rectangle 16"/>
+          <p:cNvSpPr>
+            <a:spLocks noChangeArrowheads="1"/>
+          </p:cNvSpPr>
+          <p:nvPr/>
+        </p:nvSpPr>
+        <p:spPr bwMode="auto">
+          <a:xfrm>
+            <a:off x="0" y="381000"/>
+            <a:ext cx="1625600" cy="76200"/>
+          </a:xfrm>
+          <a:prstGeom prst="rect">
+            <a:avLst/>
+          </a:prstGeom>
+          <a:solidFill>
+            <a:schemeClr val="accent2"/>
+          </a:solidFill>
+          <a:ln>
+            <a:noFill/>
+          </a:ln>
+          <a:extLst>
+            <a:ext uri="{91240B29-F687-4F45-9708-019B960494DF}">
+              <a14:hiddenLine xmlns:a14="http://schemas.microsoft.com/office/drawing/2010/main" w="9525">
+                <a:solidFill>
+                  <a:schemeClr val="tx1"/>
+                </a:solidFill>
+                <a:miter lim="800000"/>
+                <a:headEnd/>
+                <a:tailEnd/>
+              </a14:hiddenLine>
+            </a:ext>
+          </a:extLst>
+        </p:spPr>
+        <p:txBody>
+          <a:bodyPr wrap="none" anchor="ctr"/>
+          <a:lstStyle/>
+          <a:p>
+            <a:endParaRPr lang="en-IN" sz="1800"/>
+          </a:p>
+        </p:txBody>
+      </p:sp>
+      <p:sp>
+        <p:nvSpPr>
+          <p:cNvPr id="1041" name="Rectangle 17"/>
+          <p:cNvSpPr>
+            <a:spLocks noChangeArrowheads="1"/>
+          </p:cNvSpPr>
+          <p:nvPr/>
+        </p:nvSpPr>
+        <p:spPr bwMode="auto">
+          <a:xfrm>
+            <a:off x="11722101" y="0"/>
+            <a:ext cx="469900" cy="381000"/>
+          </a:xfrm>
+          <a:prstGeom prst="rect">
+            <a:avLst/>
+          </a:prstGeom>
+          <a:solidFill>
+            <a:srgbClr val="FFDF22"/>
+          </a:solidFill>
+          <a:ln>
+            <a:noFill/>
+          </a:ln>
+          <a:extLst>
+            <a:ext uri="{91240B29-F687-4F45-9708-019B960494DF}">
+              <a14:hiddenLine xmlns:a14="http://schemas.microsoft.com/office/drawing/2010/main" w="9525">
+                <a:solidFill>
+                  <a:schemeClr val="tx1"/>
+                </a:solidFill>
+                <a:miter lim="800000"/>
+                <a:headEnd/>
+                <a:tailEnd/>
+              </a14:hiddenLine>
+            </a:ext>
+          </a:extLst>
+        </p:spPr>
+        <p:txBody>
+          <a:bodyPr wrap="none" anchor="ctr"/>
+          <a:lstStyle/>
+          <a:p>
+            <a:endParaRPr lang="en-IN" sz="1800"/>
+          </a:p>
+        </p:txBody>
+      </p:sp>
+      <p:sp>
+        <p:nvSpPr>
+          <p:cNvPr id="1043" name="Rectangle 19"/>
+          <p:cNvSpPr>
+            <a:spLocks noChangeArrowheads="1"/>
+          </p:cNvSpPr>
+          <p:nvPr/>
+        </p:nvSpPr>
+        <p:spPr bwMode="auto">
+          <a:xfrm>
+            <a:off x="1625600" y="6426200"/>
+            <a:ext cx="10566400" cy="152400"/>
+          </a:xfrm>
+          <a:prstGeom prst="rect">
+            <a:avLst/>
+          </a:prstGeom>
+          <a:solidFill>
+            <a:srgbClr val="0B4599"/>
+          </a:solidFill>
+          <a:ln>
+            <a:noFill/>
+          </a:ln>
+          <a:extLst>
+            <a:ext uri="{91240B29-F687-4F45-9708-019B960494DF}">
+              <a14:hiddenLine xmlns:a14="http://schemas.microsoft.com/office/drawing/2010/main" w="9525">
+                <a:solidFill>
+                  <a:schemeClr val="tx1"/>
+                </a:solidFill>
+                <a:miter lim="800000"/>
+                <a:headEnd/>
+                <a:tailEnd/>
+              </a14:hiddenLine>
+            </a:ext>
+          </a:extLst>
+        </p:spPr>
+        <p:txBody>
+          <a:bodyPr wrap="none" anchor="ctr"/>
+          <a:lstStyle/>
+          <a:p>
+            <a:endParaRPr lang="en-IN" sz="1800"/>
+          </a:p>
+        </p:txBody>
+      </p:sp>
+      <p:sp>
+        <p:nvSpPr>
+          <p:cNvPr id="1044" name="Rectangle 20"/>
+          <p:cNvSpPr>
+            <a:spLocks noChangeArrowheads="1"/>
+          </p:cNvSpPr>
+          <p:nvPr/>
+        </p:nvSpPr>
+        <p:spPr bwMode="auto">
+          <a:xfrm>
+            <a:off x="0" y="6426200"/>
+            <a:ext cx="1625600" cy="152400"/>
+          </a:xfrm>
+          <a:prstGeom prst="rect">
+            <a:avLst/>
+          </a:prstGeom>
+          <a:solidFill>
+            <a:srgbClr val="FF0E22"/>
+          </a:solidFill>
+          <a:ln>
+            <a:noFill/>
+          </a:ln>
+          <a:extLst>
+            <a:ext uri="{91240B29-F687-4F45-9708-019B960494DF}">
+              <a14:hiddenLine xmlns:a14="http://schemas.microsoft.com/office/drawing/2010/main" w="9525">
+                <a:solidFill>
+                  <a:schemeClr val="tx1"/>
+                </a:solidFill>
+                <a:miter lim="800000"/>
+                <a:headEnd/>
+                <a:tailEnd/>
+              </a14:hiddenLine>
+            </a:ext>
+          </a:extLst>
+        </p:spPr>
+        <p:txBody>
+          <a:bodyPr wrap="none" anchor="ctr"/>
+          <a:lstStyle/>
+          <a:p>
+            <a:endParaRPr lang="en-IN" sz="1800"/>
+          </a:p>
+        </p:txBody>
+      </p:sp>
+      <p:pic>
+        <p:nvPicPr>
+          <p:cNvPr id="1045" name="Picture 21" descr="Classified"/>
+          <p:cNvPicPr>
+            <a:picLocks noChangeAspect="1" noChangeArrowheads="1"/>
+          </p:cNvPicPr>
+          <p:nvPr/>
+        </p:nvPicPr>
+        <p:blipFill>
+          <a:blip r:embed="rId14">
+            <a:extLst>
+              <a:ext uri="{28A0092B-C50C-407E-A947-70E740481C1C}">
+                <a14:useLocalDpi xmlns:a14="http://schemas.microsoft.com/office/drawing/2010/main" val="0"/>
+              </a:ext>
+            </a:extLst>
+          </a:blip>
+          <a:srcRect/>
+          <a:stretch>
+            <a:fillRect/>
+          </a:stretch>
+        </p:blipFill>
+        <p:spPr bwMode="auto">
+          <a:xfrm>
+            <a:off x="9144001" y="6248401"/>
+            <a:ext cx="2588684" cy="563563"/>
+          </a:xfrm>
+          <a:prstGeom prst="rect">
+            <a:avLst/>
+          </a:prstGeom>
+          <a:noFill/>
+          <a:extLst>
+            <a:ext uri="{909E8E84-426E-40DD-AFC4-6F175D3DCCD1}">
+              <a14:hiddenFill xmlns:a14="http://schemas.microsoft.com/office/drawing/2010/main">
+                <a:solidFill>
+                  <a:srgbClr val="FFFFFF"/>
+                </a:solidFill>
+              </a14:hiddenFill>
+            </a:ext>
+          </a:extLst>
+        </p:spPr>
+      </p:pic>
+      <p:sp>
+        <p:nvSpPr>
+          <p:cNvPr id="1030" name="Rectangle 6"/>
+          <p:cNvSpPr>
+            <a:spLocks noGrp="1" noChangeArrowheads="1"/>
+          </p:cNvSpPr>
+          <p:nvPr>
+            <p:ph type="sldNum" sz="quarter" idx="4"/>
+          </p:nvPr>
+        </p:nvSpPr>
+        <p:spPr bwMode="auto">
+          <a:xfrm>
+            <a:off x="10924117" y="6592889"/>
+            <a:ext cx="1219200" cy="212725"/>
+          </a:xfrm>
+          <a:prstGeom prst="rect">
+            <a:avLst/>
+          </a:prstGeom>
+          <a:noFill/>
+          <a:ln>
+            <a:noFill/>
+          </a:ln>
+          <a:effectLst/>
+          <a:extLst>
+            <a:ext uri="{909E8E84-426E-40DD-AFC4-6F175D3DCCD1}">
+              <a14:hiddenFill xmlns:a14="http://schemas.microsoft.com/office/drawing/2010/main">
+                <a:solidFill>
+                  <a:schemeClr val="accent1"/>
+                </a:solidFill>
+              </a14:hiddenFill>
+            </a:ext>
+            <a:ext uri="{91240B29-F687-4F45-9708-019B960494DF}">
+              <a14:hiddenLine xmlns:a14="http://schemas.microsoft.com/office/drawing/2010/main" w="9525">
+                <a:solidFill>
+                  <a:schemeClr val="tx1"/>
+                </a:solidFill>
+                <a:miter lim="800000"/>
+                <a:headEnd/>
+                <a:tailEnd/>
+              </a14:hiddenLine>
+            </a:ext>
+            <a:ext uri="{AF507438-7753-43E0-B8FC-AC1667EBCBE1}">
+              <a14:hiddenEffects xmlns:a14="http://schemas.microsoft.com/office/drawing/2010/main">
+                <a:effectLst>
+                  <a:outerShdw blurRad="50800" dist="12700" dir="8100000" algn="ctr" rotWithShape="0">
+                    <a:srgbClr val="FFFFFF">
+                      <a:alpha val="75000"/>
+                    </a:srgbClr>
+                  </a:outerShdw>
+                </a:effectLst>
+              </a14:hiddenEffects>
+            </a:ext>
+          </a:extLst>
+        </p:spPr>
+        <p:txBody>
+          <a:bodyPr vert="horz" wrap="square" lIns="91440" tIns="45720" rIns="91440" bIns="45720" numCol="1" anchor="t" anchorCtr="0" compatLnSpc="1">
+            <a:prstTxWarp prst="textNoShape">
+              <a:avLst/>
+            </a:prstTxWarp>
+          </a:bodyPr>
           <a:lstStyle>
             <a:lvl1pPr algn="r">
-              <a:defRPr sz="1200">
+              <a:defRPr sz="1000">
                 <a:solidFill>
-                  <a:schemeClr val="tx1">
-                    <a:tint val="75000"/>
-                  </a:schemeClr>
+                  <a:schemeClr val="bg2"/>
                 </a:solidFill>
               </a:defRPr>
             </a:lvl1pPr>
@@ -2662,55 +3508,177 @@
     </p:spTree>
     <p:extLst>
       <p:ext uri="{BB962C8B-B14F-4D97-AF65-F5344CB8AC3E}">
-        <p14:creationId xmlns:p14="http://schemas.microsoft.com/office/powerpoint/2010/main" val="1677647226"/>
+        <p14:creationId xmlns:p14="http://schemas.microsoft.com/office/powerpoint/2010/main" val="666088655"/>
       </p:ext>
     </p:extLst>
   </p:cSld>
   <p:clrMap bg1="lt1" tx1="dk1" bg2="lt2" tx2="dk2" accent1="accent1" accent2="accent2" accent3="accent3" accent4="accent4" accent5="accent5" accent6="accent6" hlink="hlink" folHlink="folHlink"/>
   <p:sldLayoutIdLst>
-    <p:sldLayoutId id="2147483649" r:id="rId1"/>
-    <p:sldLayoutId id="2147483650" r:id="rId2"/>
-    <p:sldLayoutId id="2147483651" r:id="rId3"/>
-    <p:sldLayoutId id="2147483652" r:id="rId4"/>
-    <p:sldLayoutId id="2147483653" r:id="rId5"/>
-    <p:sldLayoutId id="2147483654" r:id="rId6"/>
-    <p:sldLayoutId id="2147483655" r:id="rId7"/>
-    <p:sldLayoutId id="2147483656" r:id="rId8"/>
-    <p:sldLayoutId id="2147483657" r:id="rId9"/>
-    <p:sldLayoutId id="2147483658" r:id="rId10"/>
-    <p:sldLayoutId id="2147483659" r:id="rId11"/>
+    <p:sldLayoutId id="2147483661" r:id="rId1"/>
+    <p:sldLayoutId id="2147483662" r:id="rId2"/>
+    <p:sldLayoutId id="2147483663" r:id="rId3"/>
+    <p:sldLayoutId id="2147483664" r:id="rId4"/>
+    <p:sldLayoutId id="2147483665" r:id="rId5"/>
+    <p:sldLayoutId id="2147483666" r:id="rId6"/>
+    <p:sldLayoutId id="2147483667" r:id="rId7"/>
+    <p:sldLayoutId id="2147483668" r:id="rId8"/>
+    <p:sldLayoutId id="2147483669" r:id="rId9"/>
+    <p:sldLayoutId id="2147483670" r:id="rId10"/>
+    <p:sldLayoutId id="2147483671" r:id="rId11"/>
   </p:sldLayoutIdLst>
   <p:txStyles>
     <p:titleStyle>
-      <a:lvl1pPr algn="l" defTabSz="914400" rtl="0" eaLnBrk="1" latinLnBrk="0" hangingPunct="1">
-        <a:lnSpc>
-          <a:spcPct val="90000"/>
-        </a:lnSpc>
+      <a:lvl1pPr algn="l" rtl="0" eaLnBrk="1" fontAlgn="base" hangingPunct="1">
         <a:spcBef>
           <a:spcPct val="0"/>
         </a:spcBef>
-        <a:buNone/>
-        <a:defRPr sz="4400" kern="1200">
+        <a:spcAft>
+          <a:spcPct val="0"/>
+        </a:spcAft>
+        <a:defRPr sz="3200" kern="1200">
           <a:solidFill>
-            <a:schemeClr val="tx1"/>
+            <a:schemeClr val="tx2"/>
           </a:solidFill>
           <a:latin typeface="+mj-lt"/>
           <a:ea typeface="+mj-ea"/>
           <a:cs typeface="+mj-cs"/>
         </a:defRPr>
       </a:lvl1pPr>
+      <a:lvl2pPr algn="l" rtl="0" eaLnBrk="1" fontAlgn="base" hangingPunct="1">
+        <a:spcBef>
+          <a:spcPct val="0"/>
+        </a:spcBef>
+        <a:spcAft>
+          <a:spcPct val="0"/>
+        </a:spcAft>
+        <a:defRPr sz="3200">
+          <a:solidFill>
+            <a:schemeClr val="tx2"/>
+          </a:solidFill>
+          <a:latin typeface="Impact" panose="020B0806030902050204" pitchFamily="34" charset="0"/>
+          <a:ea typeface="MS Pゴシック" pitchFamily="-92" charset="-128"/>
+        </a:defRPr>
+      </a:lvl2pPr>
+      <a:lvl3pPr algn="l" rtl="0" eaLnBrk="1" fontAlgn="base" hangingPunct="1">
+        <a:spcBef>
+          <a:spcPct val="0"/>
+        </a:spcBef>
+        <a:spcAft>
+          <a:spcPct val="0"/>
+        </a:spcAft>
+        <a:defRPr sz="3200">
+          <a:solidFill>
+            <a:schemeClr val="tx2"/>
+          </a:solidFill>
+          <a:latin typeface="Impact" panose="020B0806030902050204" pitchFamily="34" charset="0"/>
+          <a:ea typeface="MS Pゴシック" pitchFamily="-92" charset="-128"/>
+        </a:defRPr>
+      </a:lvl3pPr>
+      <a:lvl4pPr algn="l" rtl="0" eaLnBrk="1" fontAlgn="base" hangingPunct="1">
+        <a:spcBef>
+          <a:spcPct val="0"/>
+        </a:spcBef>
+        <a:spcAft>
+          <a:spcPct val="0"/>
+        </a:spcAft>
+        <a:defRPr sz="3200">
+          <a:solidFill>
+            <a:schemeClr val="tx2"/>
+          </a:solidFill>
+          <a:latin typeface="Impact" panose="020B0806030902050204" pitchFamily="34" charset="0"/>
+          <a:ea typeface="MS Pゴシック" pitchFamily="-92" charset="-128"/>
+        </a:defRPr>
+      </a:lvl4pPr>
+      <a:lvl5pPr algn="l" rtl="0" eaLnBrk="1" fontAlgn="base" hangingPunct="1">
+        <a:spcBef>
+          <a:spcPct val="0"/>
+        </a:spcBef>
+        <a:spcAft>
+          <a:spcPct val="0"/>
+        </a:spcAft>
+        <a:defRPr sz="3200">
+          <a:solidFill>
+            <a:schemeClr val="tx2"/>
+          </a:solidFill>
+          <a:latin typeface="Impact" panose="020B0806030902050204" pitchFamily="34" charset="0"/>
+          <a:ea typeface="MS Pゴシック" pitchFamily="-92" charset="-128"/>
+        </a:defRPr>
+      </a:lvl5pPr>
+      <a:lvl6pPr marL="457200" algn="l" rtl="0" eaLnBrk="1" fontAlgn="base" hangingPunct="1">
+        <a:spcBef>
+          <a:spcPct val="0"/>
+        </a:spcBef>
+        <a:spcAft>
+          <a:spcPct val="0"/>
+        </a:spcAft>
+        <a:defRPr sz="3200">
+          <a:solidFill>
+            <a:schemeClr val="tx2"/>
+          </a:solidFill>
+          <a:latin typeface="Impact" panose="020B0806030902050204" pitchFamily="34" charset="0"/>
+          <a:ea typeface="MS Pゴシック" pitchFamily="-92" charset="-128"/>
+        </a:defRPr>
+      </a:lvl6pPr>
+      <a:lvl7pPr marL="914400" algn="l" rtl="0" eaLnBrk="1" fontAlgn="base" hangingPunct="1">
+        <a:spcBef>
+          <a:spcPct val="0"/>
+        </a:spcBef>
+        <a:spcAft>
+          <a:spcPct val="0"/>
+        </a:spcAft>
+        <a:defRPr sz="3200">
+          <a:solidFill>
+            <a:schemeClr val="tx2"/>
+          </a:solidFill>
+          <a:latin typeface="Impact" panose="020B0806030902050204" pitchFamily="34" charset="0"/>
+          <a:ea typeface="MS Pゴシック" pitchFamily="-92" charset="-128"/>
+        </a:defRPr>
+      </a:lvl7pPr>
+      <a:lvl8pPr marL="1371600" algn="l" rtl="0" eaLnBrk="1" fontAlgn="base" hangingPunct="1">
+        <a:spcBef>
+          <a:spcPct val="0"/>
+        </a:spcBef>
+        <a:spcAft>
+          <a:spcPct val="0"/>
+        </a:spcAft>
+        <a:defRPr sz="3200">
+          <a:solidFill>
+            <a:schemeClr val="tx2"/>
+          </a:solidFill>
+          <a:latin typeface="Impact" panose="020B0806030902050204" pitchFamily="34" charset="0"/>
+          <a:ea typeface="MS Pゴシック" pitchFamily="-92" charset="-128"/>
+        </a:defRPr>
+      </a:lvl8pPr>
+      <a:lvl9pPr marL="1828800" algn="l" rtl="0" eaLnBrk="1" fontAlgn="base" hangingPunct="1">
+        <a:spcBef>
+          <a:spcPct val="0"/>
+        </a:spcBef>
+        <a:spcAft>
+          <a:spcPct val="0"/>
+        </a:spcAft>
+        <a:defRPr sz="3200">
+          <a:solidFill>
+            <a:schemeClr val="tx2"/>
+          </a:solidFill>
+          <a:latin typeface="Impact" panose="020B0806030902050204" pitchFamily="34" charset="0"/>
+          <a:ea typeface="MS Pゴシック" pitchFamily="-92" charset="-128"/>
+        </a:defRPr>
+      </a:lvl9pPr>
     </p:titleStyle>
     <p:bodyStyle>
-      <a:lvl1pPr marL="228600" indent="-228600" algn="l" defTabSz="914400" rtl="0" eaLnBrk="1" latinLnBrk="0" hangingPunct="1">
-        <a:lnSpc>
-          <a:spcPct val="90000"/>
-        </a:lnSpc>
+      <a:lvl1pPr marL="168275" indent="-168275" algn="l" rtl="0" eaLnBrk="1" fontAlgn="base" hangingPunct="1">
         <a:spcBef>
-          <a:spcPts val="1000"/>
+          <a:spcPct val="20000"/>
         </a:spcBef>
-        <a:buFont typeface="Arial" panose="020B0604020202020204" pitchFamily="34" charset="0"/>
-        <a:buChar char="•"/>
-        <a:defRPr sz="2800" kern="1200">
+        <a:spcAft>
+          <a:spcPct val="0"/>
+        </a:spcAft>
+        <a:buClr>
+          <a:schemeClr val="tx2"/>
+        </a:buClr>
+        <a:buFont typeface="Wingdings" panose="05000000000000000000" pitchFamily="2" charset="2"/>
+        <a:buChar char="§"/>
+        <a:defRPr sz="2000" kern="1200">
           <a:solidFill>
             <a:schemeClr val="tx1"/>
           </a:solidFill>
@@ -2719,16 +3687,19 @@
           <a:cs typeface="+mn-cs"/>
         </a:defRPr>
       </a:lvl1pPr>
-      <a:lvl2pPr marL="685800" indent="-228600" algn="l" defTabSz="914400" rtl="0" eaLnBrk="1" latinLnBrk="0" hangingPunct="1">
-        <a:lnSpc>
-          <a:spcPct val="90000"/>
-        </a:lnSpc>
+      <a:lvl2pPr marL="512763" indent="-168275" algn="l" rtl="0" eaLnBrk="1" fontAlgn="base" hangingPunct="1">
         <a:spcBef>
-          <a:spcPts val="500"/>
+          <a:spcPct val="20000"/>
         </a:spcBef>
-        <a:buFont typeface="Arial" panose="020B0604020202020204" pitchFamily="34" charset="0"/>
-        <a:buChar char="•"/>
-        <a:defRPr sz="2400" kern="1200">
+        <a:spcAft>
+          <a:spcPct val="0"/>
+        </a:spcAft>
+        <a:buClr>
+          <a:schemeClr val="tx2"/>
+        </a:buClr>
+        <a:buFont typeface="Wingdings" panose="05000000000000000000" pitchFamily="2" charset="2"/>
+        <a:buChar char="§"/>
+        <a:defRPr kern="1200">
           <a:solidFill>
             <a:schemeClr val="tx1"/>
           </a:solidFill>
@@ -2737,16 +3708,19 @@
           <a:cs typeface="+mn-cs"/>
         </a:defRPr>
       </a:lvl2pPr>
-      <a:lvl3pPr marL="1143000" indent="-228600" algn="l" defTabSz="914400" rtl="0" eaLnBrk="1" latinLnBrk="0" hangingPunct="1">
-        <a:lnSpc>
-          <a:spcPct val="90000"/>
-        </a:lnSpc>
+      <a:lvl3pPr marL="857250" indent="-168275" algn="l" rtl="0" eaLnBrk="1" fontAlgn="base" hangingPunct="1">
         <a:spcBef>
-          <a:spcPts val="500"/>
+          <a:spcPct val="20000"/>
         </a:spcBef>
-        <a:buFont typeface="Arial" panose="020B0604020202020204" pitchFamily="34" charset="0"/>
-        <a:buChar char="•"/>
-        <a:defRPr sz="2000" kern="1200">
+        <a:spcAft>
+          <a:spcPct val="0"/>
+        </a:spcAft>
+        <a:buClr>
+          <a:schemeClr val="tx2"/>
+        </a:buClr>
+        <a:buFont typeface="Wingdings" panose="05000000000000000000" pitchFamily="2" charset="2"/>
+        <a:buChar char="§"/>
+        <a:defRPr sz="1600" kern="1200">
           <a:solidFill>
             <a:schemeClr val="tx1"/>
           </a:solidFill>
@@ -2755,16 +3729,19 @@
           <a:cs typeface="+mn-cs"/>
         </a:defRPr>
       </a:lvl3pPr>
-      <a:lvl4pPr marL="1600200" indent="-228600" algn="l" defTabSz="914400" rtl="0" eaLnBrk="1" latinLnBrk="0" hangingPunct="1">
-        <a:lnSpc>
-          <a:spcPct val="90000"/>
-        </a:lnSpc>
+      <a:lvl4pPr marL="1201738" indent="-176213" algn="l" rtl="0" eaLnBrk="1" fontAlgn="base" hangingPunct="1">
         <a:spcBef>
-          <a:spcPts val="500"/>
+          <a:spcPct val="20000"/>
         </a:spcBef>
-        <a:buFont typeface="Arial" panose="020B0604020202020204" pitchFamily="34" charset="0"/>
-        <a:buChar char="•"/>
-        <a:defRPr sz="1800" kern="1200">
+        <a:spcAft>
+          <a:spcPct val="0"/>
+        </a:spcAft>
+        <a:buClr>
+          <a:schemeClr val="tx2"/>
+        </a:buClr>
+        <a:buFont typeface="Wingdings" panose="05000000000000000000" pitchFamily="2" charset="2"/>
+        <a:buChar char="§"/>
+        <a:defRPr sz="1400" kern="1200">
           <a:solidFill>
             <a:schemeClr val="tx1"/>
           </a:solidFill>
@@ -2773,16 +3750,19 @@
           <a:cs typeface="+mn-cs"/>
         </a:defRPr>
       </a:lvl4pPr>
-      <a:lvl5pPr marL="2057400" indent="-228600" algn="l" defTabSz="914400" rtl="0" eaLnBrk="1" latinLnBrk="0" hangingPunct="1">
-        <a:lnSpc>
-          <a:spcPct val="90000"/>
-        </a:lnSpc>
+      <a:lvl5pPr marL="1544638" indent="-174625" algn="l" rtl="0" eaLnBrk="1" fontAlgn="base" hangingPunct="1">
         <a:spcBef>
-          <a:spcPts val="500"/>
+          <a:spcPct val="20000"/>
         </a:spcBef>
-        <a:buFont typeface="Arial" panose="020B0604020202020204" pitchFamily="34" charset="0"/>
-        <a:buChar char="•"/>
-        <a:defRPr sz="1800" kern="1200">
+        <a:spcAft>
+          <a:spcPct val="0"/>
+        </a:spcAft>
+        <a:buClr>
+          <a:schemeClr val="tx2"/>
+        </a:buClr>
+        <a:buFont typeface="Wingdings" panose="05000000000000000000" pitchFamily="2" charset="2"/>
+        <a:buChar char="§"/>
+        <a:defRPr sz="1200" kern="1200">
           <a:solidFill>
             <a:schemeClr val="tx1"/>
           </a:solidFill>
@@ -2993,7 +3973,7 @@
         <p:spPr/>
         <p:txBody>
           <a:bodyPr>
-            <a:normAutofit/>
+            <a:normAutofit fontScale="90000"/>
           </a:bodyPr>
           <a:lstStyle/>
           <a:p>
@@ -3036,20 +4016,32 @@
           <a:lstStyle/>
           <a:p>
             <a:r>
-              <a:rPr lang="en-IN" dirty="0" smtClean="0"/>
-              <a:t>EECS 740 Digital Image </a:t>
-            </a:r>
-            <a:r>
-              <a:rPr lang="en-IN" smtClean="0"/>
-              <a:t>Processing Project</a:t>
-            </a:r>
-          </a:p>
-          <a:p>
-            <a:r>
-              <a:rPr lang="en-IN" smtClean="0"/>
+              <a:rPr lang="en-IN" sz="2000" dirty="0" smtClean="0">
+                <a:latin typeface="Times New Roman" panose="02020603050405020304" pitchFamily="18" charset="0"/>
+                <a:cs typeface="Times New Roman" panose="02020603050405020304" pitchFamily="18" charset="0"/>
+              </a:rPr>
+              <a:t>EECS 740 Digital Image Processing </a:t>
+            </a:r>
+            <a:r>
+              <a:rPr lang="en-IN" sz="2000" dirty="0" smtClean="0">
+                <a:latin typeface="Times New Roman" panose="02020603050405020304" pitchFamily="18" charset="0"/>
+                <a:cs typeface="Times New Roman" panose="02020603050405020304" pitchFamily="18" charset="0"/>
+              </a:rPr>
+              <a:t>Project</a:t>
+            </a:r>
+          </a:p>
+          <a:p>
+            <a:r>
+              <a:rPr lang="en-IN" sz="2000" dirty="0" smtClean="0">
+                <a:latin typeface="Times New Roman" panose="02020603050405020304" pitchFamily="18" charset="0"/>
+                <a:cs typeface="Times New Roman" panose="02020603050405020304" pitchFamily="18" charset="0"/>
+              </a:rPr>
               <a:t>Lohith</a:t>
             </a:r>
-            <a:endParaRPr lang="en-IN" dirty="0"/>
+            <a:endParaRPr lang="en-IN" sz="2000" dirty="0">
+              <a:latin typeface="Times New Roman" panose="02020603050405020304" pitchFamily="18" charset="0"/>
+              <a:cs typeface="Times New Roman" panose="02020603050405020304" pitchFamily="18" charset="0"/>
+            </a:endParaRPr>
           </a:p>
         </p:txBody>
       </p:sp>
@@ -3133,8 +4125,8 @@
         </p:nvSpPr>
         <p:spPr>
           <a:xfrm>
-            <a:off x="838200" y="1690688"/>
-            <a:ext cx="10515600" cy="4486275"/>
+            <a:off x="1727201" y="1504950"/>
+            <a:ext cx="9794874" cy="4486275"/>
           </a:xfrm>
         </p:spPr>
         <p:txBody>
@@ -3227,21 +4219,12 @@
                 <a:latin typeface="Times New Roman" panose="02020603050405020304" pitchFamily="18" charset="0"/>
                 <a:cs typeface="Times New Roman" panose="02020603050405020304" pitchFamily="18" charset="0"/>
               </a:rPr>
-              <a:t>Comparative study</a:t>
-            </a:r>
-          </a:p>
-          <a:p>
-            <a:pPr marL="514350" indent="-514350">
-              <a:buFont typeface="+mj-lt"/>
-              <a:buAutoNum type="arabicPeriod"/>
-            </a:pPr>
-            <a:r>
-              <a:rPr lang="en-IN" sz="2400" dirty="0" smtClean="0">
-                <a:latin typeface="Times New Roman" panose="02020603050405020304" pitchFamily="18" charset="0"/>
-                <a:cs typeface="Times New Roman" panose="02020603050405020304" pitchFamily="18" charset="0"/>
-              </a:rPr>
               <a:t>Conclusions</a:t>
             </a:r>
+            <a:endParaRPr lang="en-IN" sz="2400" dirty="0" smtClean="0">
+              <a:latin typeface="Times New Roman" panose="02020603050405020304" pitchFamily="18" charset="0"/>
+              <a:cs typeface="Times New Roman" panose="02020603050405020304" pitchFamily="18" charset="0"/>
+            </a:endParaRPr>
           </a:p>
           <a:p>
             <a:pPr marL="514350" indent="-514350">
@@ -3311,8 +4294,8 @@
         </p:nvSpPr>
         <p:spPr>
           <a:xfrm>
-            <a:off x="838200" y="365125"/>
-            <a:ext cx="10515600" cy="677863"/>
+            <a:off x="1738313" y="474644"/>
+            <a:ext cx="9720263" cy="677863"/>
           </a:xfrm>
         </p:spPr>
         <p:txBody>
@@ -3359,7 +4342,7 @@
         </p:blipFill>
         <p:spPr>
           <a:xfrm>
-            <a:off x="838199" y="1228717"/>
+            <a:off x="1724032" y="1000109"/>
             <a:ext cx="3890963" cy="2571750"/>
           </a:xfrm>
         </p:spPr>
@@ -3380,7 +4363,7 @@
         </p:blipFill>
         <p:spPr>
           <a:xfrm>
-            <a:off x="5872163" y="1107273"/>
+            <a:off x="6329359" y="878668"/>
             <a:ext cx="4029075" cy="2814637"/>
           </a:xfrm>
           <a:prstGeom prst="rect">
@@ -3404,7 +4387,7 @@
         </p:blipFill>
         <p:spPr>
           <a:xfrm>
-            <a:off x="838198" y="4114799"/>
+            <a:off x="1738313" y="3729023"/>
             <a:ext cx="3890963" cy="2576513"/>
           </a:xfrm>
           <a:prstGeom prst="rect">
@@ -3428,7 +4411,7 @@
         </p:blipFill>
         <p:spPr>
           <a:xfrm>
-            <a:off x="5976937" y="4114798"/>
+            <a:off x="6391281" y="3814750"/>
             <a:ext cx="3924301" cy="2576513"/>
           </a:xfrm>
           <a:prstGeom prst="rect">
@@ -3444,8 +4427,8 @@
         </p:nvSpPr>
         <p:spPr>
           <a:xfrm>
-            <a:off x="4729161" y="3598744"/>
-            <a:ext cx="1247776" cy="646331"/>
+            <a:off x="5628101" y="3296498"/>
+            <a:ext cx="811997" cy="707886"/>
           </a:xfrm>
           <a:prstGeom prst="rect">
             <a:avLst/>
@@ -3459,20 +4442,32 @@
           <a:lstStyle/>
           <a:p>
             <a:r>
-              <a:rPr lang="en-IN" dirty="0" smtClean="0"/>
-              <a:t>a               b</a:t>
-            </a:r>
-          </a:p>
-          <a:p>
-            <a:r>
-              <a:rPr lang="en-IN" dirty="0"/>
+              <a:rPr lang="en-IN" sz="2000" dirty="0" smtClean="0">
+                <a:latin typeface="Times New Roman" panose="02020603050405020304" pitchFamily="18" charset="0"/>
+                <a:cs typeface="Times New Roman" panose="02020603050405020304" pitchFamily="18" charset="0"/>
+              </a:rPr>
+              <a:t>a     b</a:t>
+            </a:r>
+          </a:p>
+          <a:p>
+            <a:r>
+              <a:rPr lang="en-IN" sz="2000" dirty="0">
+                <a:latin typeface="Times New Roman" panose="02020603050405020304" pitchFamily="18" charset="0"/>
+                <a:cs typeface="Times New Roman" panose="02020603050405020304" pitchFamily="18" charset="0"/>
+              </a:rPr>
               <a:t>c</a:t>
             </a:r>
             <a:r>
-              <a:rPr lang="en-IN" dirty="0" smtClean="0"/>
-              <a:t>               d</a:t>
-            </a:r>
-            <a:endParaRPr lang="en-IN" dirty="0"/>
+              <a:rPr lang="en-IN" sz="2000" dirty="0" smtClean="0">
+                <a:latin typeface="Times New Roman" panose="02020603050405020304" pitchFamily="18" charset="0"/>
+                <a:cs typeface="Times New Roman" panose="02020603050405020304" pitchFamily="18" charset="0"/>
+              </a:rPr>
+              <a:t>     d</a:t>
+            </a:r>
+            <a:endParaRPr lang="en-IN" sz="2000" dirty="0">
+              <a:latin typeface="Times New Roman" panose="02020603050405020304" pitchFamily="18" charset="0"/>
+              <a:cs typeface="Times New Roman" panose="02020603050405020304" pitchFamily="18" charset="0"/>
+            </a:endParaRPr>
           </a:p>
         </p:txBody>
       </p:sp>
@@ -3484,8 +4479,8 @@
         </p:nvSpPr>
         <p:spPr>
           <a:xfrm>
-            <a:off x="9954795" y="4643438"/>
-            <a:ext cx="2377639" cy="1754326"/>
+            <a:off x="10292960" y="3321158"/>
+            <a:ext cx="1845408" cy="2585323"/>
           </a:xfrm>
           <a:prstGeom prst="rect">
             <a:avLst/>
@@ -3493,7 +4488,7 @@
           <a:noFill/>
         </p:spPr>
         <p:txBody>
-          <a:bodyPr wrap="none" rtlCol="0">
+          <a:bodyPr wrap="square" rtlCol="0">
             <a:spAutoFit/>
           </a:bodyPr>
           <a:lstStyle/>
@@ -3658,20 +4653,297 @@
             <p:ph type="title"/>
           </p:nvPr>
         </p:nvSpPr>
-        <p:spPr/>
-        <p:txBody>
-          <a:bodyPr/>
+        <p:spPr>
+          <a:xfrm>
+            <a:off x="1781175" y="512760"/>
+            <a:ext cx="8820150" cy="849313"/>
+          </a:xfrm>
+        </p:spPr>
+        <p:txBody>
+          <a:bodyPr>
+            <a:normAutofit/>
+          </a:bodyPr>
           <a:lstStyle/>
           <a:p>
             <a:r>
-              <a:rPr lang="en-IN" dirty="0"/>
-              <a:t>5</a:t>
-            </a:r>
-            <a:r>
-              <a:rPr lang="en-IN" dirty="0" smtClean="0"/>
-              <a:t>. Conclusions</a:t>
-            </a:r>
-            <a:endParaRPr lang="en-IN" dirty="0"/>
+              <a:rPr lang="en-IN" sz="3200" b="1" dirty="0" smtClean="0">
+                <a:latin typeface="Times New Roman" panose="02020603050405020304" pitchFamily="18" charset="0"/>
+                <a:cs typeface="Times New Roman" panose="02020603050405020304" pitchFamily="18" charset="0"/>
+              </a:rPr>
+              <a:t>3. Results</a:t>
+            </a:r>
+            <a:endParaRPr lang="en-IN" sz="3200" b="1" dirty="0">
+              <a:latin typeface="Times New Roman" panose="02020603050405020304" pitchFamily="18" charset="0"/>
+              <a:cs typeface="Times New Roman" panose="02020603050405020304" pitchFamily="18" charset="0"/>
+            </a:endParaRPr>
+          </a:p>
+        </p:txBody>
+      </p:sp>
+      <p:pic>
+        <p:nvPicPr>
+          <p:cNvPr id="4" name="Content Placeholder 3"/>
+          <p:cNvPicPr>
+            <a:picLocks noGrp="1" noChangeAspect="1"/>
+          </p:cNvPicPr>
+          <p:nvPr>
+            <p:ph idx="1"/>
+          </p:nvPr>
+        </p:nvPicPr>
+        <p:blipFill>
+          <a:blip r:embed="rId2"/>
+          <a:stretch>
+            <a:fillRect/>
+          </a:stretch>
+        </p:blipFill>
+        <p:spPr>
+          <a:xfrm>
+            <a:off x="1752602" y="1104890"/>
+            <a:ext cx="4133850" cy="2657475"/>
+          </a:xfrm>
+          <a:prstGeom prst="rect">
+            <a:avLst/>
+          </a:prstGeom>
+        </p:spPr>
+      </p:pic>
+      <p:pic>
+        <p:nvPicPr>
+          <p:cNvPr id="5" name="Picture 4"/>
+          <p:cNvPicPr>
+            <a:picLocks noChangeAspect="1"/>
+          </p:cNvPicPr>
+          <p:nvPr/>
+        </p:nvPicPr>
+        <p:blipFill>
+          <a:blip r:embed="rId3"/>
+          <a:stretch>
+            <a:fillRect/>
+          </a:stretch>
+        </p:blipFill>
+        <p:spPr>
+          <a:xfrm>
+            <a:off x="6934200" y="1104891"/>
+            <a:ext cx="4110038" cy="2657474"/>
+          </a:xfrm>
+          <a:prstGeom prst="rect">
+            <a:avLst/>
+          </a:prstGeom>
+        </p:spPr>
+      </p:pic>
+      <p:pic>
+        <p:nvPicPr>
+          <p:cNvPr id="6" name="Picture 5"/>
+          <p:cNvPicPr>
+            <a:picLocks noChangeAspect="1"/>
+          </p:cNvPicPr>
+          <p:nvPr/>
+        </p:nvPicPr>
+        <p:blipFill>
+          <a:blip r:embed="rId4"/>
+          <a:stretch>
+            <a:fillRect/>
+          </a:stretch>
+        </p:blipFill>
+        <p:spPr>
+          <a:xfrm>
+            <a:off x="4024316" y="3819518"/>
+            <a:ext cx="4305301" cy="2838450"/>
+          </a:xfrm>
+          <a:prstGeom prst="rect">
+            <a:avLst/>
+          </a:prstGeom>
+        </p:spPr>
+      </p:pic>
+      <p:sp>
+        <p:nvSpPr>
+          <p:cNvPr id="7" name="TextBox 6"/>
+          <p:cNvSpPr txBox="1"/>
+          <p:nvPr/>
+        </p:nvSpPr>
+        <p:spPr>
+          <a:xfrm>
+            <a:off x="5629275" y="2805216"/>
+            <a:ext cx="1304925" cy="1107996"/>
+          </a:xfrm>
+          <a:prstGeom prst="rect">
+            <a:avLst/>
+          </a:prstGeom>
+          <a:noFill/>
+        </p:spPr>
+        <p:txBody>
+          <a:bodyPr wrap="square" rtlCol="0">
+            <a:spAutoFit/>
+          </a:bodyPr>
+          <a:lstStyle/>
+          <a:p>
+            <a:r>
+              <a:rPr lang="en-IN" sz="2200" dirty="0" smtClean="0">
+                <a:latin typeface="Times New Roman" panose="02020603050405020304" pitchFamily="18" charset="0"/>
+                <a:cs typeface="Times New Roman" panose="02020603050405020304" pitchFamily="18" charset="0"/>
+              </a:rPr>
+              <a:t> a           b</a:t>
+            </a:r>
+          </a:p>
+          <a:p>
+            <a:endParaRPr lang="en-IN" sz="2200" dirty="0" smtClean="0">
+              <a:latin typeface="Times New Roman" panose="02020603050405020304" pitchFamily="18" charset="0"/>
+              <a:cs typeface="Times New Roman" panose="02020603050405020304" pitchFamily="18" charset="0"/>
+            </a:endParaRPr>
+          </a:p>
+          <a:p>
+            <a:r>
+              <a:rPr lang="en-IN" sz="2200" dirty="0" smtClean="0">
+                <a:latin typeface="Times New Roman" panose="02020603050405020304" pitchFamily="18" charset="0"/>
+                <a:cs typeface="Times New Roman" panose="02020603050405020304" pitchFamily="18" charset="0"/>
+              </a:rPr>
+              <a:t>       c</a:t>
+            </a:r>
+            <a:endParaRPr lang="en-IN" sz="2200" dirty="0">
+              <a:latin typeface="Times New Roman" panose="02020603050405020304" pitchFamily="18" charset="0"/>
+              <a:cs typeface="Times New Roman" panose="02020603050405020304" pitchFamily="18" charset="0"/>
+            </a:endParaRPr>
+          </a:p>
+        </p:txBody>
+      </p:sp>
+      <p:sp>
+        <p:nvSpPr>
+          <p:cNvPr id="8" name="TextBox 7"/>
+          <p:cNvSpPr txBox="1"/>
+          <p:nvPr/>
+        </p:nvSpPr>
+        <p:spPr>
+          <a:xfrm>
+            <a:off x="8686801" y="4684745"/>
+            <a:ext cx="2709862" cy="1107996"/>
+          </a:xfrm>
+          <a:prstGeom prst="rect">
+            <a:avLst/>
+          </a:prstGeom>
+          <a:noFill/>
+        </p:spPr>
+        <p:txBody>
+          <a:bodyPr wrap="square" rtlCol="0">
+            <a:spAutoFit/>
+          </a:bodyPr>
+          <a:lstStyle/>
+          <a:p>
+            <a:pPr marL="342900" indent="-342900">
+              <a:buAutoNum type="alphaLcPeriod"/>
+            </a:pPr>
+            <a:r>
+              <a:rPr lang="en-IN" sz="2200" dirty="0" smtClean="0">
+                <a:latin typeface="Times New Roman" panose="02020603050405020304" pitchFamily="18" charset="0"/>
+                <a:cs typeface="Times New Roman" panose="02020603050405020304" pitchFamily="18" charset="0"/>
+              </a:rPr>
+              <a:t>Original</a:t>
+            </a:r>
+          </a:p>
+          <a:p>
+            <a:pPr marL="342900" indent="-342900">
+              <a:buAutoNum type="alphaLcPeriod"/>
+            </a:pPr>
+            <a:r>
+              <a:rPr lang="en-IN" sz="2200" dirty="0" smtClean="0">
+                <a:latin typeface="Times New Roman" panose="02020603050405020304" pitchFamily="18" charset="0"/>
+                <a:cs typeface="Times New Roman" panose="02020603050405020304" pitchFamily="18" charset="0"/>
+              </a:rPr>
+              <a:t>MMBEBHE</a:t>
+            </a:r>
+          </a:p>
+          <a:p>
+            <a:pPr marL="342900" indent="-342900">
+              <a:buAutoNum type="alphaLcPeriod"/>
+            </a:pPr>
+            <a:r>
+              <a:rPr lang="en-IN" sz="2200" dirty="0" smtClean="0">
+                <a:latin typeface="Times New Roman" panose="02020603050405020304" pitchFamily="18" charset="0"/>
+                <a:cs typeface="Times New Roman" panose="02020603050405020304" pitchFamily="18" charset="0"/>
+              </a:rPr>
+              <a:t>WTHE</a:t>
+            </a:r>
+            <a:endParaRPr lang="en-IN" sz="2200" dirty="0">
+              <a:latin typeface="Times New Roman" panose="02020603050405020304" pitchFamily="18" charset="0"/>
+              <a:cs typeface="Times New Roman" panose="02020603050405020304" pitchFamily="18" charset="0"/>
+            </a:endParaRPr>
+          </a:p>
+        </p:txBody>
+      </p:sp>
+    </p:spTree>
+    <p:extLst>
+      <p:ext uri="{BB962C8B-B14F-4D97-AF65-F5344CB8AC3E}">
+        <p14:creationId xmlns:p14="http://schemas.microsoft.com/office/powerpoint/2010/main" val="1029662579"/>
+      </p:ext>
+    </p:extLst>
+  </p:cSld>
+  <p:clrMapOvr>
+    <a:masterClrMapping/>
+  </p:clrMapOvr>
+  <p:timing>
+    <p:tnLst>
+      <p:par>
+        <p:cTn id="1" dur="indefinite" restart="never" nodeType="tmRoot"/>
+      </p:par>
+    </p:tnLst>
+  </p:timing>
+</p:sld>
+</file>
+
+<file path=ppt/slides/slide13.xml><?xml version="1.0" encoding="utf-8"?>
+<p:sld xmlns:a="http://schemas.openxmlformats.org/drawingml/2006/main" xmlns:r="http://schemas.openxmlformats.org/officeDocument/2006/relationships" xmlns:p="http://schemas.openxmlformats.org/presentationml/2006/main">
+  <p:cSld>
+    <p:spTree>
+      <p:nvGrpSpPr>
+        <p:cNvPr id="1" name=""/>
+        <p:cNvGrpSpPr/>
+        <p:nvPr/>
+      </p:nvGrpSpPr>
+      <p:grpSpPr>
+        <a:xfrm>
+          <a:off x="0" y="0"/>
+          <a:ext cx="0" cy="0"/>
+          <a:chOff x="0" y="0"/>
+          <a:chExt cx="0" cy="0"/>
+        </a:xfrm>
+      </p:grpSpPr>
+      <p:sp>
+        <p:nvSpPr>
+          <p:cNvPr id="2" name="Title 1"/>
+          <p:cNvSpPr>
+            <a:spLocks noGrp="1"/>
+          </p:cNvSpPr>
+          <p:nvPr>
+            <p:ph type="title"/>
+          </p:nvPr>
+        </p:nvSpPr>
+        <p:spPr>
+          <a:xfrm>
+            <a:off x="1666875" y="493712"/>
+            <a:ext cx="9505950" cy="1120775"/>
+          </a:xfrm>
+        </p:spPr>
+        <p:txBody>
+          <a:bodyPr>
+            <a:normAutofit/>
+          </a:bodyPr>
+          <a:lstStyle/>
+          <a:p>
+            <a:r>
+              <a:rPr lang="en-IN" sz="3200" b="1" dirty="0">
+                <a:latin typeface="Times New Roman" panose="02020603050405020304" pitchFamily="18" charset="0"/>
+                <a:cs typeface="Times New Roman" panose="02020603050405020304" pitchFamily="18" charset="0"/>
+              </a:rPr>
+              <a:t>4</a:t>
+            </a:r>
+            <a:r>
+              <a:rPr lang="en-IN" sz="3200" b="1" dirty="0" smtClean="0">
+                <a:latin typeface="Times New Roman" panose="02020603050405020304" pitchFamily="18" charset="0"/>
+                <a:cs typeface="Times New Roman" panose="02020603050405020304" pitchFamily="18" charset="0"/>
+              </a:rPr>
+              <a:t>. Summary &amp; Conclusions</a:t>
+            </a:r>
+            <a:endParaRPr lang="en-IN" sz="3200" b="1" dirty="0">
+              <a:latin typeface="Times New Roman" panose="02020603050405020304" pitchFamily="18" charset="0"/>
+              <a:cs typeface="Times New Roman" panose="02020603050405020304" pitchFamily="18" charset="0"/>
+            </a:endParaRPr>
           </a:p>
         </p:txBody>
       </p:sp>
@@ -3685,12 +4957,203 @@
             <p:ph idx="1"/>
           </p:nvPr>
         </p:nvSpPr>
-        <p:spPr/>
-        <p:txBody>
-          <a:bodyPr/>
+        <p:spPr>
+          <a:xfrm>
+            <a:off x="1666875" y="1371600"/>
+            <a:ext cx="9934575" cy="4691063"/>
+          </a:xfrm>
+        </p:spPr>
+        <p:txBody>
+          <a:bodyPr>
+            <a:normAutofit lnSpcReduction="10000"/>
+          </a:bodyPr>
           <a:lstStyle/>
           <a:p>
-            <a:endParaRPr lang="en-IN" dirty="0"/>
+            <a:pPr>
+              <a:buFont typeface="Wingdings" panose="05000000000000000000" pitchFamily="2" charset="2"/>
+              <a:buChar char="v"/>
+            </a:pPr>
+            <a:r>
+              <a:rPr lang="en-IN" sz="2200" dirty="0" smtClean="0">
+                <a:latin typeface="Times New Roman" panose="02020603050405020304" pitchFamily="18" charset="0"/>
+                <a:cs typeface="Times New Roman" panose="02020603050405020304" pitchFamily="18" charset="0"/>
+              </a:rPr>
+              <a:t> Histogram</a:t>
+            </a:r>
+          </a:p>
+          <a:p>
+            <a:pPr>
+              <a:buFont typeface="Wingdings" panose="05000000000000000000" pitchFamily="2" charset="2"/>
+              <a:buChar char="v"/>
+            </a:pPr>
+            <a:r>
+              <a:rPr lang="en-IN" sz="2200" dirty="0" smtClean="0">
+                <a:latin typeface="Times New Roman" panose="02020603050405020304" pitchFamily="18" charset="0"/>
+                <a:cs typeface="Times New Roman" panose="02020603050405020304" pitchFamily="18" charset="0"/>
+              </a:rPr>
+              <a:t> Histogram Equalization</a:t>
+            </a:r>
+          </a:p>
+          <a:p>
+            <a:pPr>
+              <a:buFont typeface="Wingdings" panose="05000000000000000000" pitchFamily="2" charset="2"/>
+              <a:buChar char="v"/>
+            </a:pPr>
+            <a:r>
+              <a:rPr lang="en-IN" sz="2200" dirty="0">
+                <a:latin typeface="Times New Roman" panose="02020603050405020304" pitchFamily="18" charset="0"/>
+                <a:cs typeface="Times New Roman" panose="02020603050405020304" pitchFamily="18" charset="0"/>
+              </a:rPr>
+              <a:t> </a:t>
+            </a:r>
+            <a:r>
+              <a:rPr lang="en-IN" sz="2200" dirty="0" smtClean="0">
+                <a:latin typeface="Times New Roman" panose="02020603050405020304" pitchFamily="18" charset="0"/>
+                <a:cs typeface="Times New Roman" panose="02020603050405020304" pitchFamily="18" charset="0"/>
+              </a:rPr>
+              <a:t>Adaptive HE</a:t>
+            </a:r>
+          </a:p>
+          <a:p>
+            <a:pPr>
+              <a:buFont typeface="Wingdings" panose="05000000000000000000" pitchFamily="2" charset="2"/>
+              <a:buChar char="v"/>
+            </a:pPr>
+            <a:r>
+              <a:rPr lang="en-IN" sz="2200" dirty="0" smtClean="0">
+                <a:latin typeface="Times New Roman" panose="02020603050405020304" pitchFamily="18" charset="0"/>
+                <a:cs typeface="Times New Roman" panose="02020603050405020304" pitchFamily="18" charset="0"/>
+              </a:rPr>
+              <a:t> Global HE</a:t>
+            </a:r>
+          </a:p>
+          <a:p>
+            <a:pPr>
+              <a:buFont typeface="Wingdings" panose="05000000000000000000" pitchFamily="2" charset="2"/>
+              <a:buChar char="v"/>
+            </a:pPr>
+            <a:r>
+              <a:rPr lang="en-IN" sz="2200" dirty="0" smtClean="0">
+                <a:latin typeface="Times New Roman" panose="02020603050405020304" pitchFamily="18" charset="0"/>
+                <a:cs typeface="Times New Roman" panose="02020603050405020304" pitchFamily="18" charset="0"/>
+              </a:rPr>
+              <a:t> Weighted Thresholded HE</a:t>
+            </a:r>
+          </a:p>
+          <a:p>
+            <a:pPr>
+              <a:buFont typeface="Wingdings" panose="05000000000000000000" pitchFamily="2" charset="2"/>
+              <a:buChar char="v"/>
+            </a:pPr>
+            <a:endParaRPr lang="en-IN" sz="2200" dirty="0">
+              <a:latin typeface="Times New Roman" panose="02020603050405020304" pitchFamily="18" charset="0"/>
+              <a:cs typeface="Times New Roman" panose="02020603050405020304" pitchFamily="18" charset="0"/>
+            </a:endParaRPr>
+          </a:p>
+          <a:p>
+            <a:pPr>
+              <a:buFont typeface="Wingdings" panose="05000000000000000000" pitchFamily="2" charset="2"/>
+              <a:buChar char="v"/>
+            </a:pPr>
+            <a:endParaRPr lang="en-IN" sz="2200" dirty="0" smtClean="0">
+              <a:latin typeface="Times New Roman" panose="02020603050405020304" pitchFamily="18" charset="0"/>
+              <a:cs typeface="Times New Roman" panose="02020603050405020304" pitchFamily="18" charset="0"/>
+            </a:endParaRPr>
+          </a:p>
+          <a:p>
+            <a:pPr>
+              <a:buFont typeface="Wingdings" panose="05000000000000000000" pitchFamily="2" charset="2"/>
+              <a:buChar char="v"/>
+            </a:pPr>
+            <a:r>
+              <a:rPr lang="en-IN" sz="2200" dirty="0" smtClean="0">
+                <a:latin typeface="Times New Roman" panose="02020603050405020304" pitchFamily="18" charset="0"/>
+                <a:cs typeface="Times New Roman" panose="02020603050405020304" pitchFamily="18" charset="0"/>
+              </a:rPr>
+              <a:t> The proposed WTHE method is found to achieve visually pleasant enhancement effects.</a:t>
+            </a:r>
+          </a:p>
+          <a:p>
+            <a:pPr>
+              <a:buFont typeface="Wingdings" panose="05000000000000000000" pitchFamily="2" charset="2"/>
+              <a:buChar char="v"/>
+            </a:pPr>
+            <a:r>
+              <a:rPr lang="en-IN" sz="2200" dirty="0" smtClean="0">
+                <a:latin typeface="Times New Roman" panose="02020603050405020304" pitchFamily="18" charset="0"/>
+                <a:cs typeface="Times New Roman" panose="02020603050405020304" pitchFamily="18" charset="0"/>
+              </a:rPr>
+              <a:t> The </a:t>
+            </a:r>
+            <a:r>
+              <a:rPr lang="en-IN" sz="2200" dirty="0">
+                <a:latin typeface="Times New Roman" panose="02020603050405020304" pitchFamily="18" charset="0"/>
+                <a:cs typeface="Times New Roman" panose="02020603050405020304" pitchFamily="18" charset="0"/>
+              </a:rPr>
+              <a:t>control </a:t>
+            </a:r>
+            <a:r>
+              <a:rPr lang="en-IN" sz="2200" dirty="0">
+                <a:latin typeface="Times New Roman" panose="02020603050405020304" pitchFamily="18" charset="0"/>
+                <a:cs typeface="Times New Roman" panose="02020603050405020304" pitchFamily="18" charset="0"/>
+              </a:rPr>
+              <a:t>mechanism in WTHE is convenient and smooth </a:t>
+            </a:r>
+            <a:r>
+              <a:rPr lang="en-IN" sz="2200" dirty="0">
+                <a:latin typeface="Times New Roman" panose="02020603050405020304" pitchFamily="18" charset="0"/>
+                <a:cs typeface="Times New Roman" panose="02020603050405020304" pitchFamily="18" charset="0"/>
+              </a:rPr>
+              <a:t>by mainly </a:t>
+            </a:r>
+            <a:r>
+              <a:rPr lang="en-IN" sz="2200" dirty="0" smtClean="0">
+                <a:latin typeface="Times New Roman" panose="02020603050405020304" pitchFamily="18" charset="0"/>
+                <a:cs typeface="Times New Roman" panose="02020603050405020304" pitchFamily="18" charset="0"/>
+              </a:rPr>
+              <a:t>being able to  adjust </a:t>
+            </a:r>
+            <a:r>
+              <a:rPr lang="en-IN" sz="2200" dirty="0">
+                <a:latin typeface="Times New Roman" panose="02020603050405020304" pitchFamily="18" charset="0"/>
+                <a:cs typeface="Times New Roman" panose="02020603050405020304" pitchFamily="18" charset="0"/>
+              </a:rPr>
+              <a:t>the power factor r</a:t>
+            </a:r>
+            <a:r>
+              <a:rPr lang="en-IN" sz="2200" dirty="0" smtClean="0">
+                <a:latin typeface="Times New Roman" panose="02020603050405020304" pitchFamily="18" charset="0"/>
+                <a:cs typeface="Times New Roman" panose="02020603050405020304" pitchFamily="18" charset="0"/>
+              </a:rPr>
+              <a:t>.</a:t>
+            </a:r>
+          </a:p>
+          <a:p>
+            <a:pPr>
+              <a:buFont typeface="Wingdings" panose="05000000000000000000" pitchFamily="2" charset="2"/>
+              <a:buChar char="v"/>
+            </a:pPr>
+            <a:r>
+              <a:rPr lang="en-IN" sz="2200" dirty="0" smtClean="0">
+                <a:latin typeface="Times New Roman" panose="02020603050405020304" pitchFamily="18" charset="0"/>
+                <a:cs typeface="Times New Roman" panose="02020603050405020304" pitchFamily="18" charset="0"/>
+              </a:rPr>
+              <a:t> This method is computationally simple and suitable for processor based implementation.</a:t>
+            </a:r>
+            <a:endParaRPr lang="en-IN" sz="2200" dirty="0">
+              <a:latin typeface="Times New Roman" panose="02020603050405020304" pitchFamily="18" charset="0"/>
+              <a:cs typeface="Times New Roman" panose="02020603050405020304" pitchFamily="18" charset="0"/>
+            </a:endParaRPr>
+          </a:p>
+          <a:p>
+            <a:pPr>
+              <a:buFont typeface="Wingdings" panose="05000000000000000000" pitchFamily="2" charset="2"/>
+              <a:buChar char="v"/>
+            </a:pPr>
+            <a:endParaRPr lang="en-IN" sz="2200" dirty="0">
+              <a:latin typeface="Times New Roman" panose="02020603050405020304" pitchFamily="18" charset="0"/>
+              <a:cs typeface="Times New Roman" panose="02020603050405020304" pitchFamily="18" charset="0"/>
+            </a:endParaRPr>
           </a:p>
         </p:txBody>
       </p:sp>
@@ -3704,6 +5167,110 @@
   <p:clrMapOvr>
     <a:masterClrMapping/>
   </p:clrMapOvr>
+  <p:timing>
+    <p:tnLst>
+      <p:par>
+        <p:cTn id="1" dur="indefinite" restart="never" nodeType="tmRoot"/>
+      </p:par>
+    </p:tnLst>
+  </p:timing>
+</p:sld>
+</file>
+
+<file path=ppt/slides/slide14.xml><?xml version="1.0" encoding="utf-8"?>
+<p:sld xmlns:a="http://schemas.openxmlformats.org/drawingml/2006/main" xmlns:r="http://schemas.openxmlformats.org/officeDocument/2006/relationships" xmlns:p="http://schemas.openxmlformats.org/presentationml/2006/main">
+  <p:cSld>
+    <p:spTree>
+      <p:nvGrpSpPr>
+        <p:cNvPr id="1" name=""/>
+        <p:cNvGrpSpPr/>
+        <p:nvPr/>
+      </p:nvGrpSpPr>
+      <p:grpSpPr>
+        <a:xfrm>
+          <a:off x="0" y="0"/>
+          <a:ext cx="0" cy="0"/>
+          <a:chOff x="0" y="0"/>
+          <a:chExt cx="0" cy="0"/>
+        </a:xfrm>
+      </p:grpSpPr>
+      <p:sp>
+        <p:nvSpPr>
+          <p:cNvPr id="2" name="Title 1"/>
+          <p:cNvSpPr>
+            <a:spLocks noGrp="1"/>
+          </p:cNvSpPr>
+          <p:nvPr>
+            <p:ph type="title"/>
+          </p:nvPr>
+        </p:nvSpPr>
+        <p:spPr/>
+        <p:txBody>
+          <a:bodyPr>
+            <a:normAutofit/>
+          </a:bodyPr>
+          <a:lstStyle/>
+          <a:p>
+            <a:r>
+              <a:rPr lang="en-IN" sz="3200" dirty="0" smtClean="0">
+                <a:latin typeface="Times New Roman" panose="02020603050405020304" pitchFamily="18" charset="0"/>
+                <a:cs typeface="Times New Roman" panose="02020603050405020304" pitchFamily="18" charset="0"/>
+              </a:rPr>
+              <a:t>5. Questions &amp; Answers</a:t>
+            </a:r>
+            <a:endParaRPr lang="en-IN" sz="3200" dirty="0">
+              <a:latin typeface="Times New Roman" panose="02020603050405020304" pitchFamily="18" charset="0"/>
+              <a:cs typeface="Times New Roman" panose="02020603050405020304" pitchFamily="18" charset="0"/>
+            </a:endParaRPr>
+          </a:p>
+        </p:txBody>
+      </p:sp>
+      <p:pic>
+        <p:nvPicPr>
+          <p:cNvPr id="4" name="Content Placeholder 3"/>
+          <p:cNvPicPr>
+            <a:picLocks noGrp="1" noChangeAspect="1"/>
+          </p:cNvPicPr>
+          <p:nvPr>
+            <p:ph idx="1"/>
+          </p:nvPr>
+        </p:nvPicPr>
+        <p:blipFill>
+          <a:blip r:embed="rId2" cstate="print">
+            <a:extLst>
+              <a:ext uri="{28A0092B-C50C-407E-A947-70E740481C1C}">
+                <a14:useLocalDpi xmlns:a14="http://schemas.microsoft.com/office/drawing/2010/main" val="0"/>
+              </a:ext>
+            </a:extLst>
+          </a:blip>
+          <a:stretch>
+            <a:fillRect/>
+          </a:stretch>
+        </p:blipFill>
+        <p:spPr>
+          <a:xfrm>
+            <a:off x="1700217" y="1190624"/>
+            <a:ext cx="7529512" cy="5181600"/>
+          </a:xfrm>
+        </p:spPr>
+      </p:pic>
+    </p:spTree>
+    <p:extLst>
+      <p:ext uri="{BB962C8B-B14F-4D97-AF65-F5344CB8AC3E}">
+        <p14:creationId xmlns:p14="http://schemas.microsoft.com/office/powerpoint/2010/main" val="1506567548"/>
+      </p:ext>
+    </p:extLst>
+  </p:cSld>
+  <p:clrMapOvr>
+    <a:masterClrMapping/>
+  </p:clrMapOvr>
+  <p:timing>
+    <p:tnLst>
+      <p:par>
+        <p:cTn id="1" dur="indefinite" restart="never" nodeType="tmRoot"/>
+      </p:par>
+    </p:tnLst>
+  </p:timing>
 </p:sld>
 </file>
 
@@ -3767,8 +5334,8 @@
         </p:nvSpPr>
         <p:spPr>
           <a:xfrm>
-            <a:off x="838200" y="1690688"/>
-            <a:ext cx="10515600" cy="4486275"/>
+            <a:off x="1727201" y="1576388"/>
+            <a:ext cx="7805738" cy="4486275"/>
           </a:xfrm>
         </p:spPr>
         <p:txBody>
@@ -3861,14 +5428,7 @@
                 <a:latin typeface="Times New Roman" panose="02020603050405020304" pitchFamily="18" charset="0"/>
                 <a:cs typeface="Times New Roman" panose="02020603050405020304" pitchFamily="18" charset="0"/>
               </a:rPr>
-              <a:t>Summary </a:t>
-            </a:r>
-            <a:r>
-              <a:rPr lang="en-IN" sz="2400" smtClean="0">
-                <a:latin typeface="Times New Roman" panose="02020603050405020304" pitchFamily="18" charset="0"/>
-                <a:cs typeface="Times New Roman" panose="02020603050405020304" pitchFamily="18" charset="0"/>
-              </a:rPr>
-              <a:t>&amp; Conclusions</a:t>
+              <a:t>Summary &amp; Conclusions</a:t>
             </a:r>
             <a:endParaRPr lang="en-IN" sz="2400" dirty="0" smtClean="0">
               <a:latin typeface="Times New Roman" panose="02020603050405020304" pitchFamily="18" charset="0"/>
@@ -3943,13 +5503,13 @@
         </p:nvSpPr>
         <p:spPr>
           <a:xfrm>
-            <a:off x="838200" y="536576"/>
-            <a:ext cx="10515600" cy="573658"/>
+            <a:off x="1771650" y="636589"/>
+            <a:ext cx="8648700" cy="573658"/>
           </a:xfrm>
         </p:spPr>
         <p:txBody>
           <a:bodyPr>
-            <a:normAutofit/>
+            <a:normAutofit fontScale="90000"/>
           </a:bodyPr>
           <a:lstStyle/>
           <a:p>
@@ -3979,8 +5539,8 @@
         </p:nvSpPr>
         <p:spPr>
           <a:xfrm>
-            <a:off x="838200" y="1338834"/>
-            <a:ext cx="10515600" cy="5238179"/>
+            <a:off x="1771650" y="1367410"/>
+            <a:ext cx="9705975" cy="4661916"/>
           </a:xfrm>
         </p:spPr>
         <p:txBody>
@@ -4400,8 +5960,8 @@
         </p:nvSpPr>
         <p:spPr>
           <a:xfrm>
-            <a:off x="838200" y="522288"/>
-            <a:ext cx="10515600" cy="890651"/>
+            <a:off x="1707356" y="579439"/>
+            <a:ext cx="8777288" cy="749300"/>
           </a:xfrm>
         </p:spPr>
         <p:txBody>
@@ -4440,8 +6000,8 @@
         </p:nvSpPr>
         <p:spPr>
           <a:xfrm>
-            <a:off x="838200" y="1524000"/>
-            <a:ext cx="10515600" cy="4652963"/>
+            <a:off x="1707356" y="1481137"/>
+            <a:ext cx="9939338" cy="4652963"/>
           </a:xfrm>
         </p:spPr>
         <p:txBody>
@@ -4672,8 +6232,8 @@
         </p:nvSpPr>
         <p:spPr>
           <a:xfrm>
-            <a:off x="838200" y="1690688"/>
-            <a:ext cx="10515600" cy="4486275"/>
+            <a:off x="1727201" y="1633538"/>
+            <a:ext cx="8516937" cy="4486275"/>
           </a:xfrm>
         </p:spPr>
         <p:txBody>
@@ -4766,21 +6326,12 @@
                 <a:latin typeface="Times New Roman" panose="02020603050405020304" pitchFamily="18" charset="0"/>
                 <a:cs typeface="Times New Roman" panose="02020603050405020304" pitchFamily="18" charset="0"/>
               </a:rPr>
-              <a:t>Comparative study</a:t>
-            </a:r>
-          </a:p>
-          <a:p>
-            <a:pPr marL="514350" indent="-514350">
-              <a:buFont typeface="+mj-lt"/>
-              <a:buAutoNum type="arabicPeriod"/>
-            </a:pPr>
-            <a:r>
-              <a:rPr lang="en-IN" sz="2400" dirty="0" smtClean="0">
-                <a:latin typeface="Times New Roman" panose="02020603050405020304" pitchFamily="18" charset="0"/>
-                <a:cs typeface="Times New Roman" panose="02020603050405020304" pitchFamily="18" charset="0"/>
-              </a:rPr>
               <a:t>Conclusions</a:t>
             </a:r>
+            <a:endParaRPr lang="en-IN" sz="2400" dirty="0" smtClean="0">
+              <a:latin typeface="Times New Roman" panose="02020603050405020304" pitchFamily="18" charset="0"/>
+              <a:cs typeface="Times New Roman" panose="02020603050405020304" pitchFamily="18" charset="0"/>
+            </a:endParaRPr>
           </a:p>
           <a:p>
             <a:pPr marL="514350" indent="-514350">
@@ -4850,8 +6401,8 @@
         </p:nvSpPr>
         <p:spPr>
           <a:xfrm>
-            <a:off x="838200" y="365126"/>
-            <a:ext cx="10515600" cy="602041"/>
+            <a:off x="1695450" y="434184"/>
+            <a:ext cx="8577263" cy="602041"/>
           </a:xfrm>
         </p:spPr>
         <p:txBody>
@@ -4891,8 +6442,8 @@
         </p:nvSpPr>
         <p:spPr>
           <a:xfrm>
-            <a:off x="838200" y="967168"/>
-            <a:ext cx="10515600" cy="5209796"/>
+            <a:off x="1695450" y="1129475"/>
+            <a:ext cx="10277475" cy="5209796"/>
           </a:xfrm>
         </p:spPr>
         <p:txBody>
@@ -5065,9 +6616,8 @@
             </a:endParaRPr>
           </a:p>
           <a:p>
-            <a:pPr>
-              <a:buFont typeface="Wingdings" panose="05000000000000000000" pitchFamily="2" charset="2"/>
-              <a:buChar char="q"/>
+            <a:pPr marL="0" indent="0">
+              <a:buNone/>
             </a:pPr>
             <a:endParaRPr lang="en-IN" sz="2200" dirty="0" smtClean="0">
               <a:latin typeface="Times New Roman" panose="02020603050405020304" pitchFamily="18" charset="0"/>
@@ -5104,10 +6654,17 @@
                 <a:latin typeface="Times New Roman" panose="02020603050405020304" pitchFamily="18" charset="0"/>
                 <a:cs typeface="Times New Roman" panose="02020603050405020304" pitchFamily="18" charset="0"/>
               </a:rPr>
-              <a:t>The original PDF is clamped at an upper threshold P</a:t>
-            </a:r>
-            <a:r>
-              <a:rPr lang="en-IN" sz="2200" baseline="-25000" dirty="0" smtClean="0">
+              <a:t>The original PDF is clamped at an upper threshold </a:t>
+            </a:r>
+            <a:r>
+              <a:rPr lang="en-IN" sz="2200" i="1" dirty="0" smtClean="0">
+                <a:latin typeface="Times New Roman" panose="02020603050405020304" pitchFamily="18" charset="0"/>
+                <a:cs typeface="Times New Roman" panose="02020603050405020304" pitchFamily="18" charset="0"/>
+              </a:rPr>
+              <a:t>P</a:t>
+            </a:r>
+            <a:r>
+              <a:rPr lang="en-IN" sz="2200" i="1" baseline="-25000" dirty="0" smtClean="0">
                 <a:latin typeface="Times New Roman" panose="02020603050405020304" pitchFamily="18" charset="0"/>
                 <a:cs typeface="Times New Roman" panose="02020603050405020304" pitchFamily="18" charset="0"/>
               </a:rPr>
@@ -5118,10 +6675,17 @@
                 <a:latin typeface="Times New Roman" panose="02020603050405020304" pitchFamily="18" charset="0"/>
                 <a:cs typeface="Times New Roman" panose="02020603050405020304" pitchFamily="18" charset="0"/>
               </a:rPr>
-              <a:t> and at a lower threshold P</a:t>
-            </a:r>
-            <a:r>
-              <a:rPr lang="en-IN" sz="2200" baseline="-25000" dirty="0" smtClean="0">
+              <a:t> and at a lower threshold </a:t>
+            </a:r>
+            <a:r>
+              <a:rPr lang="en-IN" sz="2200" i="1" dirty="0" smtClean="0">
+                <a:latin typeface="Times New Roman" panose="02020603050405020304" pitchFamily="18" charset="0"/>
+                <a:cs typeface="Times New Roman" panose="02020603050405020304" pitchFamily="18" charset="0"/>
+              </a:rPr>
+              <a:t>P</a:t>
+            </a:r>
+            <a:r>
+              <a:rPr lang="en-IN" sz="2200" i="1" baseline="-25000" dirty="0" smtClean="0">
                 <a:latin typeface="Times New Roman" panose="02020603050405020304" pitchFamily="18" charset="0"/>
                 <a:cs typeface="Times New Roman" panose="02020603050405020304" pitchFamily="18" charset="0"/>
               </a:rPr>
@@ -5132,7 +6696,21 @@
                 <a:latin typeface="Times New Roman" panose="02020603050405020304" pitchFamily="18" charset="0"/>
                 <a:cs typeface="Times New Roman" panose="02020603050405020304" pitchFamily="18" charset="0"/>
               </a:rPr>
-              <a:t> and all other values between upper and lower thresholds are transformed using a normalized power law function with index r&gt;0.</a:t>
+              <a:t> and all other values between upper and lower thresholds are transformed using a normalized power law function with index </a:t>
+            </a:r>
+            <a:r>
+              <a:rPr lang="en-IN" sz="2200" i="1" dirty="0" smtClean="0">
+                <a:latin typeface="Times New Roman" panose="02020603050405020304" pitchFamily="18" charset="0"/>
+                <a:cs typeface="Times New Roman" panose="02020603050405020304" pitchFamily="18" charset="0"/>
+              </a:rPr>
+              <a:t>r</a:t>
+            </a:r>
+            <a:r>
+              <a:rPr lang="en-IN" sz="2200" dirty="0" smtClean="0">
+                <a:latin typeface="Times New Roman" panose="02020603050405020304" pitchFamily="18" charset="0"/>
+                <a:cs typeface="Times New Roman" panose="02020603050405020304" pitchFamily="18" charset="0"/>
+              </a:rPr>
+              <a:t>&gt;0.</a:t>
             </a:r>
             <a:endParaRPr lang="en-IN" sz="2200" dirty="0">
               <a:latin typeface="Times New Roman" panose="02020603050405020304" pitchFamily="18" charset="0"/>
@@ -5157,7 +6735,7 @@
         </p:blipFill>
         <p:spPr>
           <a:xfrm>
-            <a:off x="4047362" y="2044446"/>
+            <a:off x="4947474" y="2244471"/>
             <a:ext cx="2943225" cy="447675"/>
           </a:xfrm>
           <a:prstGeom prst="rect">
@@ -5181,7 +6759,7 @@
         </p:blipFill>
         <p:spPr>
           <a:xfrm>
-            <a:off x="2847974" y="2983610"/>
+            <a:off x="2905124" y="3197923"/>
             <a:ext cx="5895975" cy="1800225"/>
           </a:xfrm>
           <a:prstGeom prst="rect">
@@ -5238,8 +6816,8 @@
         </p:nvSpPr>
         <p:spPr>
           <a:xfrm>
-            <a:off x="838200" y="431800"/>
-            <a:ext cx="10515600" cy="805307"/>
+            <a:off x="1724025" y="593724"/>
+            <a:ext cx="9777413" cy="805307"/>
           </a:xfrm>
         </p:spPr>
         <p:txBody>
@@ -5274,8 +6852,8 @@
         </p:nvSpPr>
         <p:spPr>
           <a:xfrm>
-            <a:off x="838200" y="1399031"/>
-            <a:ext cx="10515600" cy="5006531"/>
+            <a:off x="1724025" y="1399031"/>
+            <a:ext cx="10234613" cy="5006531"/>
           </a:xfrm>
         </p:spPr>
         <p:txBody>
@@ -5808,8 +7386,8 @@
         </p:nvSpPr>
         <p:spPr>
           <a:xfrm>
-            <a:off x="838200" y="432309"/>
-            <a:ext cx="10515600" cy="585851"/>
+            <a:off x="1736969" y="488505"/>
+            <a:ext cx="8634413" cy="585851"/>
           </a:xfrm>
         </p:spPr>
         <p:txBody>
@@ -5840,8 +7418,8 @@
         </p:nvSpPr>
         <p:spPr>
           <a:xfrm>
-            <a:off x="838200" y="1176717"/>
-            <a:ext cx="10515600" cy="5225987"/>
+            <a:off x="1736969" y="1136648"/>
+            <a:ext cx="9533182" cy="5225987"/>
           </a:xfrm>
         </p:spPr>
         <p:txBody>
@@ -6023,7 +7601,7 @@
         </p:blipFill>
         <p:spPr>
           <a:xfrm>
-            <a:off x="5666032" y="1508475"/>
+            <a:off x="5337420" y="1540929"/>
             <a:ext cx="4705350" cy="847725"/>
           </a:xfrm>
           <a:prstGeom prst="rect">
@@ -6095,7 +7673,7 @@
         </p:blipFill>
         <p:spPr>
           <a:xfrm>
-            <a:off x="4194404" y="3316604"/>
+            <a:off x="4194404" y="3345180"/>
             <a:ext cx="4171950" cy="3086100"/>
           </a:xfrm>
           <a:prstGeom prst="rect">
@@ -6119,7 +7697,7 @@
         </p:blipFill>
         <p:spPr>
           <a:xfrm>
-            <a:off x="8285855" y="4082712"/>
+            <a:off x="8285855" y="3639794"/>
             <a:ext cx="3962400" cy="2428875"/>
           </a:xfrm>
           <a:prstGeom prst="rect">
@@ -6176,8 +7754,8 @@
         </p:nvSpPr>
         <p:spPr>
           <a:xfrm>
-            <a:off x="838200" y="436562"/>
-            <a:ext cx="10515600" cy="683387"/>
+            <a:off x="1657349" y="536575"/>
+            <a:ext cx="8877300" cy="683387"/>
           </a:xfrm>
         </p:spPr>
         <p:txBody>
@@ -6212,8 +7790,8 @@
         </p:nvSpPr>
         <p:spPr>
           <a:xfrm>
-            <a:off x="838200" y="1119949"/>
-            <a:ext cx="10515600" cy="5371339"/>
+            <a:off x="1657349" y="1219962"/>
+            <a:ext cx="10177463" cy="5371339"/>
           </a:xfrm>
         </p:spPr>
         <p:txBody>
@@ -6653,116 +8231,56 @@
 </file>
 
 <file path=ppt/theme/theme1.xml><?xml version="1.0" encoding="utf-8"?>
-<a:theme xmlns:a="http://schemas.openxmlformats.org/drawingml/2006/main" name="Office Theme">
+<a:theme xmlns:a="http://schemas.openxmlformats.org/drawingml/2006/main" name="KUtemp1-jhawk">
   <a:themeElements>
-    <a:clrScheme name="Office">
+    <a:clrScheme name="Office Theme 1">
       <a:dk1>
-        <a:sysClr val="windowText" lastClr="000000"/>
+        <a:srgbClr val="000000"/>
       </a:dk1>
       <a:lt1>
-        <a:sysClr val="window" lastClr="FFFFFF"/>
+        <a:srgbClr val="FFFFFF"/>
       </a:lt1>
       <a:dk2>
-        <a:srgbClr val="44546A"/>
+        <a:srgbClr val="0B4599"/>
       </a:dk2>
       <a:lt2>
-        <a:srgbClr val="E7E6E6"/>
+        <a:srgbClr val="868A8B"/>
       </a:lt2>
       <a:accent1>
-        <a:srgbClr val="5B9BD5"/>
+        <a:srgbClr val="0B4599"/>
       </a:accent1>
       <a:accent2>
-        <a:srgbClr val="ED7D31"/>
+        <a:srgbClr val="FF0000"/>
       </a:accent2>
       <a:accent3>
-        <a:srgbClr val="A5A5A5"/>
+        <a:srgbClr val="FFFFFF"/>
       </a:accent3>
       <a:accent4>
-        <a:srgbClr val="FFC000"/>
+        <a:srgbClr val="000000"/>
       </a:accent4>
       <a:accent5>
-        <a:srgbClr val="4472C4"/>
+        <a:srgbClr val="AAB0CA"/>
       </a:accent5>
       <a:accent6>
-        <a:srgbClr val="70AD47"/>
+        <a:srgbClr val="E70000"/>
       </a:accent6>
       <a:hlink>
-        <a:srgbClr val="0563C1"/>
+        <a:srgbClr val="0B4599"/>
       </a:hlink>
       <a:folHlink>
-        <a:srgbClr val="954F72"/>
+        <a:srgbClr val="FFFF00"/>
       </a:folHlink>
     </a:clrScheme>
-    <a:fontScheme name="Office">
+    <a:fontScheme name="Office Theme">
       <a:majorFont>
-        <a:latin typeface="Calibri Light" panose="020F0302020204030204"/>
-        <a:ea typeface=""/>
+        <a:latin typeface="Impact"/>
+        <a:ea typeface="MS Pゴシック"/>
         <a:cs typeface=""/>
-        <a:font script="Jpan" typeface="ＭＳ Ｐゴシック"/>
-        <a:font script="Hang" typeface="맑은 고딕"/>
-        <a:font script="Hans" typeface="宋体"/>
-        <a:font script="Hant" typeface="新細明體"/>
-        <a:font script="Arab" typeface="Times New Roman"/>
-        <a:font script="Hebr" typeface="Times New Roman"/>
-        <a:font script="Thai" typeface="Angsana New"/>
-        <a:font script="Ethi" typeface="Nyala"/>
-        <a:font script="Beng" typeface="Vrinda"/>
-        <a:font script="Gujr" typeface="Shruti"/>
-        <a:font script="Khmr" typeface="MoolBoran"/>
-        <a:font script="Knda" typeface="Tunga"/>
-        <a:font script="Guru" typeface="Raavi"/>
-        <a:font script="Cans" typeface="Euphemia"/>
-        <a:font script="Cher" typeface="Plantagenet Cherokee"/>
-        <a:font script="Yiii" typeface="Microsoft Yi Baiti"/>
-        <a:font script="Tibt" typeface="Microsoft Himalaya"/>
-        <a:font script="Thaa" typeface="MV Boli"/>
-        <a:font script="Deva" typeface="Mangal"/>
-        <a:font script="Telu" typeface="Gautami"/>
-        <a:font script="Taml" typeface="Latha"/>
-        <a:font script="Syrc" typeface="Estrangelo Edessa"/>
-        <a:font script="Orya" typeface="Kalinga"/>
-        <a:font script="Mlym" typeface="Kartika"/>
-        <a:font script="Laoo" typeface="DokChampa"/>
-        <a:font script="Sinh" typeface="Iskoola Pota"/>
-        <a:font script="Mong" typeface="Mongolian Baiti"/>
-        <a:font script="Viet" typeface="Times New Roman"/>
-        <a:font script="Uigh" typeface="Microsoft Uighur"/>
-        <a:font script="Geor" typeface="Sylfaen"/>
       </a:majorFont>
       <a:minorFont>
-        <a:latin typeface="Calibri" panose="020F0502020204030204"/>
-        <a:ea typeface=""/>
+        <a:latin typeface="Arial"/>
+        <a:ea typeface="MS Pゴシック"/>
         <a:cs typeface=""/>
-        <a:font script="Jpan" typeface="ＭＳ Ｐゴシック"/>
-        <a:font script="Hang" typeface="맑은 고딕"/>
-        <a:font script="Hans" typeface="宋体"/>
-        <a:font script="Hant" typeface="新細明體"/>
-        <a:font script="Arab" typeface="Arial"/>
-        <a:font script="Hebr" typeface="Arial"/>
-        <a:font script="Thai" typeface="Cordia New"/>
-        <a:font script="Ethi" typeface="Nyala"/>
-        <a:font script="Beng" typeface="Vrinda"/>
-        <a:font script="Gujr" typeface="Shruti"/>
-        <a:font script="Khmr" typeface="DaunPenh"/>
-        <a:font script="Knda" typeface="Tunga"/>
-        <a:font script="Guru" typeface="Raavi"/>
-        <a:font script="Cans" typeface="Euphemia"/>
-        <a:font script="Cher" typeface="Plantagenet Cherokee"/>
-        <a:font script="Yiii" typeface="Microsoft Yi Baiti"/>
-        <a:font script="Tibt" typeface="Microsoft Himalaya"/>
-        <a:font script="Thaa" typeface="MV Boli"/>
-        <a:font script="Deva" typeface="Mangal"/>
-        <a:font script="Telu" typeface="Gautami"/>
-        <a:font script="Taml" typeface="Latha"/>
-        <a:font script="Syrc" typeface="Estrangelo Edessa"/>
-        <a:font script="Orya" typeface="Kalinga"/>
-        <a:font script="Mlym" typeface="Kartika"/>
-        <a:font script="Laoo" typeface="DokChampa"/>
-        <a:font script="Sinh" typeface="Iskoola Pota"/>
-        <a:font script="Mong" typeface="Mongolian Baiti"/>
-        <a:font script="Viet" typeface="Arial"/>
-        <a:font script="Uigh" typeface="Microsoft Uighur"/>
-        <a:font script="Geor" typeface="Sylfaen"/>
       </a:minorFont>
     </a:fontScheme>
     <a:fmtScheme name="Office">
@@ -6903,8 +8421,199 @@
       </a:bgFillStyleLst>
     </a:fmtScheme>
   </a:themeElements>
-  <a:objectDefaults/>
-  <a:extraClrSchemeLst/>
+  <a:objectDefaults>
+    <a:spDef>
+      <a:spPr bwMode="auto">
+        <a:xfrm>
+          <a:off x="0" y="0"/>
+          <a:ext cx="1" cy="1"/>
+        </a:xfrm>
+        <a:custGeom>
+          <a:avLst/>
+          <a:gdLst/>
+          <a:ahLst/>
+          <a:cxnLst/>
+          <a:rect l="0" t="0" r="0" b="0"/>
+          <a:pathLst/>
+        </a:custGeom>
+        <a:solidFill>
+          <a:schemeClr val="accent1"/>
+        </a:solidFill>
+        <a:ln w="9525" cap="flat" cmpd="sng" algn="ctr">
+          <a:solidFill>
+            <a:schemeClr val="tx1"/>
+          </a:solidFill>
+          <a:prstDash val="solid"/>
+          <a:round/>
+          <a:headEnd type="none" w="med" len="med"/>
+          <a:tailEnd type="none" w="med" len="med"/>
+        </a:ln>
+        <a:effectLst/>
+        <a:extLst>
+          <a:ext uri="{AF507438-7753-43E0-B8FC-AC1667EBCBE1}">
+            <a14:hiddenEffects xmlns:a14="http://schemas.microsoft.com/office/drawing/2010/main">
+              <a:effectLst>
+                <a:outerShdw dist="35921" dir="2700000" algn="ctr" rotWithShape="0">
+                  <a:schemeClr val="bg2"/>
+                </a:outerShdw>
+              </a:effectLst>
+            </a14:hiddenEffects>
+          </a:ext>
+        </a:extLst>
+      </a:spPr>
+      <a:bodyPr vert="horz" wrap="square" lIns="91440" tIns="45720" rIns="91440" bIns="45720" numCol="1" anchor="t" anchorCtr="0" compatLnSpc="1">
+        <a:prstTxWarp prst="textNoShape">
+          <a:avLst/>
+        </a:prstTxWarp>
+      </a:bodyPr>
+      <a:lstStyle>
+        <a:defPPr marL="0" marR="0" indent="0" algn="l" defTabSz="914400" rtl="0" eaLnBrk="0" fontAlgn="base" latinLnBrk="0" hangingPunct="0">
+          <a:lnSpc>
+            <a:spcPct val="100000"/>
+          </a:lnSpc>
+          <a:spcBef>
+            <a:spcPct val="0"/>
+          </a:spcBef>
+          <a:spcAft>
+            <a:spcPct val="0"/>
+          </a:spcAft>
+          <a:buClrTx/>
+          <a:buSzTx/>
+          <a:buFontTx/>
+          <a:buNone/>
+          <a:tabLst/>
+          <a:defRPr kumimoji="0" lang="en-IN" altLang="en-US" sz="2400" b="0" i="0" u="none" strike="noStrike" cap="none" normalizeH="0" baseline="0" smtClean="0">
+            <a:ln>
+              <a:noFill/>
+            </a:ln>
+            <a:solidFill>
+              <a:schemeClr val="tx1"/>
+            </a:solidFill>
+            <a:effectLst/>
+            <a:latin typeface="Arial" panose="020B0604020202020204" pitchFamily="34" charset="0"/>
+            <a:ea typeface="MS Pゴシック" pitchFamily="-92" charset="-128"/>
+          </a:defRPr>
+        </a:defPPr>
+      </a:lstStyle>
+    </a:spDef>
+    <a:lnDef>
+      <a:spPr bwMode="auto">
+        <a:xfrm>
+          <a:off x="0" y="0"/>
+          <a:ext cx="1" cy="1"/>
+        </a:xfrm>
+        <a:custGeom>
+          <a:avLst/>
+          <a:gdLst/>
+          <a:ahLst/>
+          <a:cxnLst/>
+          <a:rect l="0" t="0" r="0" b="0"/>
+          <a:pathLst/>
+        </a:custGeom>
+        <a:solidFill>
+          <a:schemeClr val="accent1"/>
+        </a:solidFill>
+        <a:ln w="9525" cap="flat" cmpd="sng" algn="ctr">
+          <a:solidFill>
+            <a:schemeClr val="tx1"/>
+          </a:solidFill>
+          <a:prstDash val="solid"/>
+          <a:round/>
+          <a:headEnd type="none" w="med" len="med"/>
+          <a:tailEnd type="none" w="med" len="med"/>
+        </a:ln>
+        <a:effectLst/>
+        <a:extLst>
+          <a:ext uri="{AF507438-7753-43E0-B8FC-AC1667EBCBE1}">
+            <a14:hiddenEffects xmlns:a14="http://schemas.microsoft.com/office/drawing/2010/main">
+              <a:effectLst>
+                <a:outerShdw dist="35921" dir="2700000" algn="ctr" rotWithShape="0">
+                  <a:schemeClr val="bg2"/>
+                </a:outerShdw>
+              </a:effectLst>
+            </a14:hiddenEffects>
+          </a:ext>
+        </a:extLst>
+      </a:spPr>
+      <a:bodyPr vert="horz" wrap="square" lIns="91440" tIns="45720" rIns="91440" bIns="45720" numCol="1" anchor="t" anchorCtr="0" compatLnSpc="1">
+        <a:prstTxWarp prst="textNoShape">
+          <a:avLst/>
+        </a:prstTxWarp>
+      </a:bodyPr>
+      <a:lstStyle>
+        <a:defPPr marL="0" marR="0" indent="0" algn="l" defTabSz="914400" rtl="0" eaLnBrk="0" fontAlgn="base" latinLnBrk="0" hangingPunct="0">
+          <a:lnSpc>
+            <a:spcPct val="100000"/>
+          </a:lnSpc>
+          <a:spcBef>
+            <a:spcPct val="0"/>
+          </a:spcBef>
+          <a:spcAft>
+            <a:spcPct val="0"/>
+          </a:spcAft>
+          <a:buClrTx/>
+          <a:buSzTx/>
+          <a:buFontTx/>
+          <a:buNone/>
+          <a:tabLst/>
+          <a:defRPr kumimoji="0" lang="en-IN" altLang="en-US" sz="2400" b="0" i="0" u="none" strike="noStrike" cap="none" normalizeH="0" baseline="0" smtClean="0">
+            <a:ln>
+              <a:noFill/>
+            </a:ln>
+            <a:solidFill>
+              <a:schemeClr val="tx1"/>
+            </a:solidFill>
+            <a:effectLst/>
+            <a:latin typeface="Arial" panose="020B0604020202020204" pitchFamily="34" charset="0"/>
+            <a:ea typeface="MS Pゴシック" pitchFamily="-92" charset="-128"/>
+          </a:defRPr>
+        </a:defPPr>
+      </a:lstStyle>
+    </a:lnDef>
+  </a:objectDefaults>
+  <a:extraClrSchemeLst>
+    <a:extraClrScheme>
+      <a:clrScheme name="Office Theme 1">
+        <a:dk1>
+          <a:srgbClr val="000000"/>
+        </a:dk1>
+        <a:lt1>
+          <a:srgbClr val="FFFFFF"/>
+        </a:lt1>
+        <a:dk2>
+          <a:srgbClr val="0B4599"/>
+        </a:dk2>
+        <a:lt2>
+          <a:srgbClr val="868A8B"/>
+        </a:lt2>
+        <a:accent1>
+          <a:srgbClr val="0B4599"/>
+        </a:accent1>
+        <a:accent2>
+          <a:srgbClr val="FF0000"/>
+        </a:accent2>
+        <a:accent3>
+          <a:srgbClr val="FFFFFF"/>
+        </a:accent3>
+        <a:accent4>
+          <a:srgbClr val="000000"/>
+        </a:accent4>
+        <a:accent5>
+          <a:srgbClr val="AAB0CA"/>
+        </a:accent5>
+        <a:accent6>
+          <a:srgbClr val="E70000"/>
+        </a:accent6>
+        <a:hlink>
+          <a:srgbClr val="0B4599"/>
+        </a:hlink>
+        <a:folHlink>
+          <a:srgbClr val="FFFF00"/>
+        </a:folHlink>
+      </a:clrScheme>
+      <a:clrMap bg1="lt1" tx1="dk1" bg2="lt2" tx2="dk2" accent1="accent1" accent2="accent2" accent3="accent3" accent4="accent4" accent5="accent5" accent6="accent6" hlink="hlink" folHlink="folHlink"/>
+    </a:extraClrScheme>
+  </a:extraClrSchemeLst>
   <a:extLst>
     <a:ext uri="{05A4C25C-085E-4340-85A3-A5531E510DB2}">
       <thm15:themeFamily xmlns:thm15="http://schemas.microsoft.com/office/thememl/2012/main" name="Office Theme" id="{62F939B6-93AF-4DB8-9C6B-D6C7DFDC589F}" vid="{4A3C46E8-61CC-4603-A589-7422A47A8E4A}"/>

</xml_diff>